<commit_message>
found issue in plot 2b - trying to fix
</commit_message>
<xml_diff>
--- a/output/plots/Presentation1.pptx
+++ b/output/plots/Presentation1.pptx
@@ -5,7 +5,9 @@
     <p:sldMasterId id="2147483648" r:id="rId1"/>
   </p:sldMasterIdLst>
   <p:sldIdLst>
-    <p:sldId id="256" r:id="rId2"/>
+    <p:sldId id="258" r:id="rId2"/>
+    <p:sldId id="257" r:id="rId3"/>
+    <p:sldId id="256" r:id="rId4"/>
   </p:sldIdLst>
   <p:sldSz cx="12192000" cy="6858000"/>
   <p:notesSz cx="6858000" cy="9144000"/>
@@ -104,6 +106,11 @@
       </a:defRPr>
     </a:lvl9pPr>
   </p:defaultTextStyle>
+  <p:extLst>
+    <p:ext uri="{EFAFB233-063F-42B5-8137-9DF3F51BA10A}">
+      <p15:sldGuideLst xmlns:p15="http://schemas.microsoft.com/office/powerpoint/2012/main"/>
+    </p:ext>
+  </p:extLst>
 </p:presentation>
 </file>
 
@@ -2967,25 +2974,56 @@
       <p:pic>
         <p:nvPicPr>
           <p:cNvPr id="4" name="Picture 3"/>
-          <p:cNvPicPr/>
+          <p:cNvPicPr>
+            <a:picLocks noChangeAspect="1"/>
+          </p:cNvPicPr>
           <p:nvPr/>
         </p:nvPicPr>
         <p:blipFill>
-          <a:blip r:embed="rId2"/>
+          <a:blip r:embed="rId2" cstate="print">
+            <a:extLst>
+              <a:ext uri="{28A0092B-C50C-407E-A947-70E740481C1C}">
+                <a14:useLocalDpi xmlns:a14="http://schemas.microsoft.com/office/drawing/2010/main" val="0"/>
+              </a:ext>
+            </a:extLst>
+          </a:blip>
           <a:stretch>
             <a:fillRect/>
           </a:stretch>
         </p:blipFill>
         <p:spPr>
           <a:xfrm>
-            <a:off x="1920239" y="232755"/>
-            <a:ext cx="8703425" cy="6276109"/>
+            <a:off x="2032000" y="1906033"/>
+            <a:ext cx="465551" cy="230981"/>
           </a:xfrm>
           <a:prstGeom prst="rect">
             <a:avLst/>
           </a:prstGeom>
         </p:spPr>
       </p:pic>
+      <p:sp>
+        <p:nvSpPr>
+          <p:cNvPr id="2" name="Title 1"/>
+          <p:cNvSpPr>
+            <a:spLocks noGrp="1"/>
+          </p:cNvSpPr>
+          <p:nvPr>
+            <p:ph type="title"/>
+          </p:nvPr>
+        </p:nvSpPr>
+        <p:spPr/>
+        <p:txBody>
+          <a:bodyPr/>
+          <a:lstStyle/>
+          <a:p>
+            <a:r>
+              <a:rPr lang="en-US" dirty="0" smtClean="0"/>
+              <a:t>Key</a:t>
+            </a:r>
+            <a:endParaRPr lang="en-US" dirty="0"/>
+          </a:p>
+        </p:txBody>
+      </p:sp>
       <p:pic>
         <p:nvPicPr>
           <p:cNvPr id="5" name="Picture 4"/>
@@ -3008,8 +3046,8 @@
         </p:blipFill>
         <p:spPr>
           <a:xfrm>
-            <a:off x="5530835" y="6005699"/>
-            <a:ext cx="352900" cy="301447"/>
+            <a:off x="2069651" y="2602200"/>
+            <a:ext cx="407273" cy="248159"/>
           </a:xfrm>
           <a:prstGeom prst="rect">
             <a:avLst/>
@@ -3038,8 +3076,8 @@
         </p:blipFill>
         <p:spPr>
           <a:xfrm>
-            <a:off x="4576732" y="6051666"/>
-            <a:ext cx="427530" cy="212117"/>
+            <a:off x="2078833" y="1499893"/>
+            <a:ext cx="279903" cy="282580"/>
           </a:xfrm>
           <a:prstGeom prst="rect">
             <a:avLst/>
@@ -3068,8 +3106,8 @@
         </p:blipFill>
         <p:spPr>
           <a:xfrm>
-            <a:off x="3653251" y="6041144"/>
-            <a:ext cx="385640" cy="234978"/>
+            <a:off x="2069651" y="2970153"/>
+            <a:ext cx="370436" cy="297787"/>
           </a:xfrm>
           <a:prstGeom prst="rect">
             <a:avLst/>
@@ -3098,8 +3136,8 @@
         </p:blipFill>
         <p:spPr>
           <a:xfrm>
-            <a:off x="5133084" y="6041144"/>
-            <a:ext cx="268929" cy="244995"/>
+            <a:off x="2080256" y="1132645"/>
+            <a:ext cx="323395" cy="284940"/>
           </a:xfrm>
           <a:prstGeom prst="rect">
             <a:avLst/>
@@ -3128,8 +3166,8 @@
         </p:blipFill>
         <p:spPr>
           <a:xfrm>
-            <a:off x="4178980" y="5984760"/>
-            <a:ext cx="276380" cy="279023"/>
+            <a:off x="2078832" y="2237652"/>
+            <a:ext cx="395345" cy="325047"/>
           </a:xfrm>
           <a:prstGeom prst="rect">
             <a:avLst/>
@@ -3157,39 +3195,324 @@
           </a:stretch>
         </p:blipFill>
         <p:spPr>
-          <a:xfrm>
-            <a:off x="3220859" y="6028804"/>
-            <a:ext cx="292304" cy="234979"/>
+          <a:xfrm flipH="1">
+            <a:off x="2080256" y="733268"/>
+            <a:ext cx="386064" cy="329776"/>
           </a:xfrm>
           <a:prstGeom prst="rect">
             <a:avLst/>
           </a:prstGeom>
         </p:spPr>
       </p:pic>
+      <p:graphicFrame>
+        <p:nvGraphicFramePr>
+          <p:cNvPr id="12" name="Table 11"/>
+          <p:cNvGraphicFramePr>
+            <a:graphicFrameLocks noGrp="1"/>
+          </p:cNvGraphicFramePr>
+          <p:nvPr>
+            <p:extLst>
+              <p:ext uri="{D42A27DB-BD31-4B8C-83A1-F6EECF244321}">
+                <p14:modId xmlns:p14="http://schemas.microsoft.com/office/powerpoint/2010/main" val="1220923099"/>
+              </p:ext>
+            </p:extLst>
+          </p:nvPr>
+        </p:nvGraphicFramePr>
+        <p:xfrm>
+          <a:off x="2032000" y="719666"/>
+          <a:ext cx="1914850" cy="2595880"/>
+        </p:xfrm>
+        <a:graphic>
+          <a:graphicData uri="http://schemas.openxmlformats.org/drawingml/2006/table">
+            <a:tbl>
+              <a:tblPr firstRow="1" bandRow="1">
+                <a:tableStyleId>{5940675A-B579-460E-94D1-54222C63F5DA}</a:tableStyleId>
+              </a:tblPr>
+              <a:tblGrid>
+                <a:gridCol w="487265">
+                  <a:extLst>
+                    <a:ext uri="{9D8B030D-6E8A-4147-A177-3AD203B41FA5}">
+                      <a16:colId xmlns:a16="http://schemas.microsoft.com/office/drawing/2014/main" val="1812283001"/>
+                    </a:ext>
+                  </a:extLst>
+                </a:gridCol>
+                <a:gridCol w="1427585">
+                  <a:extLst>
+                    <a:ext uri="{9D8B030D-6E8A-4147-A177-3AD203B41FA5}">
+                      <a16:colId xmlns:a16="http://schemas.microsoft.com/office/drawing/2014/main" val="3574134326"/>
+                    </a:ext>
+                  </a:extLst>
+                </a:gridCol>
+              </a:tblGrid>
+              <a:tr h="370840">
+                <a:tc>
+                  <a:txBody>
+                    <a:bodyPr/>
+                    <a:lstStyle/>
+                    <a:p>
+                      <a:endParaRPr lang="en-US" dirty="0"/>
+                    </a:p>
+                  </a:txBody>
+                  <a:tcPr/>
+                </a:tc>
+                <a:tc>
+                  <a:txBody>
+                    <a:bodyPr/>
+                    <a:lstStyle/>
+                    <a:p>
+                      <a:r>
+                        <a:rPr lang="en-US" dirty="0" smtClean="0"/>
+                        <a:t>Birds</a:t>
+                      </a:r>
+                      <a:endParaRPr lang="en-US" dirty="0"/>
+                    </a:p>
+                  </a:txBody>
+                  <a:tcPr/>
+                </a:tc>
+                <a:extLst>
+                  <a:ext uri="{0D108BD9-81ED-4DB2-BD59-A6C34878D82A}">
+                    <a16:rowId xmlns:a16="http://schemas.microsoft.com/office/drawing/2014/main" val="34741539"/>
+                  </a:ext>
+                </a:extLst>
+              </a:tr>
+              <a:tr h="370840">
+                <a:tc>
+                  <a:txBody>
+                    <a:bodyPr/>
+                    <a:lstStyle/>
+                    <a:p>
+                      <a:endParaRPr lang="en-US" dirty="0"/>
+                    </a:p>
+                  </a:txBody>
+                  <a:tcPr/>
+                </a:tc>
+                <a:tc>
+                  <a:txBody>
+                    <a:bodyPr/>
+                    <a:lstStyle/>
+                    <a:p>
+                      <a:r>
+                        <a:rPr lang="en-US" dirty="0" smtClean="0"/>
+                        <a:t>Plants</a:t>
+                      </a:r>
+                      <a:endParaRPr lang="en-US" dirty="0"/>
+                    </a:p>
+                  </a:txBody>
+                  <a:tcPr/>
+                </a:tc>
+                <a:extLst>
+                  <a:ext uri="{0D108BD9-81ED-4DB2-BD59-A6C34878D82A}">
+                    <a16:rowId xmlns:a16="http://schemas.microsoft.com/office/drawing/2014/main" val="1816204491"/>
+                  </a:ext>
+                </a:extLst>
+              </a:tr>
+              <a:tr h="370840">
+                <a:tc>
+                  <a:txBody>
+                    <a:bodyPr/>
+                    <a:lstStyle/>
+                    <a:p>
+                      <a:endParaRPr lang="en-US"/>
+                    </a:p>
+                  </a:txBody>
+                  <a:tcPr/>
+                </a:tc>
+                <a:tc>
+                  <a:txBody>
+                    <a:bodyPr/>
+                    <a:lstStyle/>
+                    <a:p>
+                      <a:r>
+                        <a:rPr lang="en-US" dirty="0" smtClean="0"/>
+                        <a:t>Mammals</a:t>
+                      </a:r>
+                      <a:endParaRPr lang="en-US" dirty="0"/>
+                    </a:p>
+                  </a:txBody>
+                  <a:tcPr/>
+                </a:tc>
+                <a:extLst>
+                  <a:ext uri="{0D108BD9-81ED-4DB2-BD59-A6C34878D82A}">
+                    <a16:rowId xmlns:a16="http://schemas.microsoft.com/office/drawing/2014/main" val="3053943592"/>
+                  </a:ext>
+                </a:extLst>
+              </a:tr>
+              <a:tr h="370840">
+                <a:tc>
+                  <a:txBody>
+                    <a:bodyPr/>
+                    <a:lstStyle/>
+                    <a:p>
+                      <a:endParaRPr lang="en-US" dirty="0"/>
+                    </a:p>
+                  </a:txBody>
+                  <a:tcPr/>
+                </a:tc>
+                <a:tc>
+                  <a:txBody>
+                    <a:bodyPr/>
+                    <a:lstStyle/>
+                    <a:p>
+                      <a:r>
+                        <a:rPr lang="en-US" dirty="0" smtClean="0"/>
+                        <a:t>Fish</a:t>
+                      </a:r>
+                      <a:endParaRPr lang="en-US" dirty="0"/>
+                    </a:p>
+                  </a:txBody>
+                  <a:tcPr/>
+                </a:tc>
+                <a:extLst>
+                  <a:ext uri="{0D108BD9-81ED-4DB2-BD59-A6C34878D82A}">
+                    <a16:rowId xmlns:a16="http://schemas.microsoft.com/office/drawing/2014/main" val="1425409090"/>
+                  </a:ext>
+                </a:extLst>
+              </a:tr>
+              <a:tr h="370840">
+                <a:tc>
+                  <a:txBody>
+                    <a:bodyPr/>
+                    <a:lstStyle/>
+                    <a:p>
+                      <a:endParaRPr lang="en-US" dirty="0"/>
+                    </a:p>
+                  </a:txBody>
+                  <a:tcPr/>
+                </a:tc>
+                <a:tc>
+                  <a:txBody>
+                    <a:bodyPr/>
+                    <a:lstStyle/>
+                    <a:p>
+                      <a:r>
+                        <a:rPr lang="en-US" dirty="0" smtClean="0"/>
+                        <a:t>Invertebrates</a:t>
+                      </a:r>
+                      <a:endParaRPr lang="en-US" dirty="0"/>
+                    </a:p>
+                  </a:txBody>
+                  <a:tcPr/>
+                </a:tc>
+                <a:extLst>
+                  <a:ext uri="{0D108BD9-81ED-4DB2-BD59-A6C34878D82A}">
+                    <a16:rowId xmlns:a16="http://schemas.microsoft.com/office/drawing/2014/main" val="3097088923"/>
+                  </a:ext>
+                </a:extLst>
+              </a:tr>
+              <a:tr h="370840">
+                <a:tc>
+                  <a:txBody>
+                    <a:bodyPr/>
+                    <a:lstStyle/>
+                    <a:p>
+                      <a:endParaRPr lang="en-US"/>
+                    </a:p>
+                  </a:txBody>
+                  <a:tcPr/>
+                </a:tc>
+                <a:tc>
+                  <a:txBody>
+                    <a:bodyPr/>
+                    <a:lstStyle/>
+                    <a:p>
+                      <a:r>
+                        <a:rPr lang="en-US" dirty="0" smtClean="0"/>
+                        <a:t>Benthos</a:t>
+                      </a:r>
+                      <a:endParaRPr lang="en-US" dirty="0"/>
+                    </a:p>
+                  </a:txBody>
+                  <a:tcPr/>
+                </a:tc>
+                <a:extLst>
+                  <a:ext uri="{0D108BD9-81ED-4DB2-BD59-A6C34878D82A}">
+                    <a16:rowId xmlns:a16="http://schemas.microsoft.com/office/drawing/2014/main" val="1149511687"/>
+                  </a:ext>
+                </a:extLst>
+              </a:tr>
+              <a:tr h="370840">
+                <a:tc>
+                  <a:txBody>
+                    <a:bodyPr/>
+                    <a:lstStyle/>
+                    <a:p>
+                      <a:endParaRPr lang="en-US"/>
+                    </a:p>
+                  </a:txBody>
+                  <a:tcPr/>
+                </a:tc>
+                <a:tc>
+                  <a:txBody>
+                    <a:bodyPr/>
+                    <a:lstStyle/>
+                    <a:p>
+                      <a:r>
+                        <a:rPr lang="en-US" dirty="0" smtClean="0"/>
+                        <a:t>Plankton</a:t>
+                      </a:r>
+                      <a:endParaRPr lang="en-US" dirty="0"/>
+                    </a:p>
+                  </a:txBody>
+                  <a:tcPr/>
+                </a:tc>
+                <a:extLst>
+                  <a:ext uri="{0D108BD9-81ED-4DB2-BD59-A6C34878D82A}">
+                    <a16:rowId xmlns:a16="http://schemas.microsoft.com/office/drawing/2014/main" val="785655806"/>
+                  </a:ext>
+                </a:extLst>
+              </a:tr>
+            </a:tbl>
+          </a:graphicData>
+        </a:graphic>
+      </p:graphicFrame>
+    </p:spTree>
+    <p:extLst>
+      <p:ext uri="{BB962C8B-B14F-4D97-AF65-F5344CB8AC3E}">
+        <p14:creationId xmlns:p14="http://schemas.microsoft.com/office/powerpoint/2010/main" val="722852940"/>
+      </p:ext>
+    </p:extLst>
+  </p:cSld>
+  <p:clrMapOvr>
+    <a:masterClrMapping/>
+  </p:clrMapOvr>
+</p:sld>
+</file>
+
+<file path=ppt/slides/slide2.xml><?xml version="1.0" encoding="utf-8"?>
+<p:sld xmlns:a="http://schemas.openxmlformats.org/drawingml/2006/main" xmlns:r="http://schemas.openxmlformats.org/officeDocument/2006/relationships" xmlns:p="http://schemas.openxmlformats.org/presentationml/2006/main">
+  <p:cSld>
+    <p:spTree>
+      <p:nvGrpSpPr>
+        <p:cNvPr id="1" name=""/>
+        <p:cNvGrpSpPr/>
+        <p:nvPr/>
+      </p:nvGrpSpPr>
+      <p:grpSpPr>
+        <a:xfrm>
+          <a:off x="0" y="0"/>
+          <a:ext cx="0" cy="0"/>
+          <a:chOff x="0" y="0"/>
+          <a:chExt cx="0" cy="0"/>
+        </a:xfrm>
+      </p:grpSpPr>
       <p:pic>
         <p:nvPicPr>
-          <p:cNvPr id="11" name="Picture 10"/>
+          <p:cNvPr id="4" name="Picture 3"/>
           <p:cNvPicPr>
             <a:picLocks noChangeAspect="1"/>
           </p:cNvPicPr>
           <p:nvPr/>
         </p:nvPicPr>
         <p:blipFill>
-          <a:blip r:embed="rId9" cstate="print">
-            <a:extLst>
-              <a:ext uri="{28A0092B-C50C-407E-A947-70E740481C1C}">
-                <a14:useLocalDpi xmlns:a14="http://schemas.microsoft.com/office/drawing/2010/main" val="0"/>
-              </a:ext>
-            </a:extLst>
-          </a:blip>
+          <a:blip r:embed="rId2"/>
           <a:stretch>
             <a:fillRect/>
           </a:stretch>
         </p:blipFill>
         <p:spPr>
           <a:xfrm>
-            <a:off x="2765201" y="6051666"/>
-            <a:ext cx="240744" cy="212117"/>
+            <a:off x="1511559" y="0"/>
+            <a:ext cx="9044181" cy="6776975"/>
           </a:xfrm>
           <a:prstGeom prst="rect">
             <a:avLst/>
@@ -3218,8 +3541,8 @@
         </p:blipFill>
         <p:spPr>
           <a:xfrm>
-            <a:off x="10020904" y="6032737"/>
-            <a:ext cx="352900" cy="301447"/>
+            <a:off x="4031625" y="6134687"/>
+            <a:ext cx="325640" cy="161565"/>
           </a:xfrm>
           <a:prstGeom prst="rect">
             <a:avLst/>
@@ -3248,8 +3571,8 @@
         </p:blipFill>
         <p:spPr>
           <a:xfrm>
-            <a:off x="9066801" y="6078704"/>
-            <a:ext cx="427530" cy="212117"/>
+            <a:off x="4881605" y="6121809"/>
+            <a:ext cx="306915" cy="187009"/>
           </a:xfrm>
           <a:prstGeom prst="rect">
             <a:avLst/>
@@ -3278,8 +3601,8 @@
         </p:blipFill>
         <p:spPr>
           <a:xfrm>
-            <a:off x="8143320" y="6068182"/>
-            <a:ext cx="385640" cy="234978"/>
+            <a:off x="3661985" y="6102516"/>
+            <a:ext cx="223459" cy="225596"/>
           </a:xfrm>
           <a:prstGeom prst="rect">
             <a:avLst/>
@@ -3308,8 +3631,8 @@
         </p:blipFill>
         <p:spPr>
           <a:xfrm>
-            <a:off x="9623153" y="6068182"/>
-            <a:ext cx="268929" cy="244995"/>
+            <a:off x="5313497" y="6117565"/>
+            <a:ext cx="280633" cy="225596"/>
           </a:xfrm>
           <a:prstGeom prst="rect">
             <a:avLst/>
@@ -3338,8 +3661,8 @@
         </p:blipFill>
         <p:spPr>
           <a:xfrm>
-            <a:off x="8669049" y="6011798"/>
-            <a:ext cx="276380" cy="279023"/>
+            <a:off x="3261460" y="6115811"/>
+            <a:ext cx="254344" cy="224100"/>
           </a:xfrm>
           <a:prstGeom prst="rect">
             <a:avLst/>
@@ -3368,8 +3691,8 @@
         </p:blipFill>
         <p:spPr>
           <a:xfrm>
-            <a:off x="7710928" y="6055842"/>
-            <a:ext cx="292304" cy="234979"/>
+            <a:off x="4482242" y="6117351"/>
+            <a:ext cx="274386" cy="225596"/>
           </a:xfrm>
           <a:prstGeom prst="rect">
             <a:avLst/>
@@ -3397,9 +3720,736 @@
           </a:stretch>
         </p:blipFill>
         <p:spPr>
-          <a:xfrm>
-            <a:off x="7255270" y="6078704"/>
-            <a:ext cx="240744" cy="212117"/>
+          <a:xfrm flipH="1">
+            <a:off x="2855131" y="6115811"/>
+            <a:ext cx="255789" cy="218495"/>
+          </a:xfrm>
+          <a:prstGeom prst="rect">
+            <a:avLst/>
+          </a:prstGeom>
+        </p:spPr>
+      </p:pic>
+      <p:pic>
+        <p:nvPicPr>
+          <p:cNvPr id="19" name="Picture 18"/>
+          <p:cNvPicPr>
+            <a:picLocks noChangeAspect="1"/>
+          </p:cNvPicPr>
+          <p:nvPr/>
+        </p:nvPicPr>
+        <p:blipFill>
+          <a:blip r:embed="rId3" cstate="print">
+            <a:extLst>
+              <a:ext uri="{28A0092B-C50C-407E-A947-70E740481C1C}">
+                <a14:useLocalDpi xmlns:a14="http://schemas.microsoft.com/office/drawing/2010/main" val="0"/>
+              </a:ext>
+            </a:extLst>
+          </a:blip>
+          <a:stretch>
+            <a:fillRect/>
+          </a:stretch>
+        </p:blipFill>
+        <p:spPr>
+          <a:xfrm>
+            <a:off x="8717412" y="6140292"/>
+            <a:ext cx="325640" cy="161565"/>
+          </a:xfrm>
+          <a:prstGeom prst="rect">
+            <a:avLst/>
+          </a:prstGeom>
+        </p:spPr>
+      </p:pic>
+      <p:pic>
+        <p:nvPicPr>
+          <p:cNvPr id="20" name="Picture 19"/>
+          <p:cNvPicPr>
+            <a:picLocks noChangeAspect="1"/>
+          </p:cNvPicPr>
+          <p:nvPr/>
+        </p:nvPicPr>
+        <p:blipFill>
+          <a:blip r:embed="rId4" cstate="print">
+            <a:extLst>
+              <a:ext uri="{28A0092B-C50C-407E-A947-70E740481C1C}">
+                <a14:useLocalDpi xmlns:a14="http://schemas.microsoft.com/office/drawing/2010/main" val="0"/>
+              </a:ext>
+            </a:extLst>
+          </a:blip>
+          <a:stretch>
+            <a:fillRect/>
+          </a:stretch>
+        </p:blipFill>
+        <p:spPr>
+          <a:xfrm>
+            <a:off x="9567392" y="6127414"/>
+            <a:ext cx="306915" cy="187009"/>
+          </a:xfrm>
+          <a:prstGeom prst="rect">
+            <a:avLst/>
+          </a:prstGeom>
+        </p:spPr>
+      </p:pic>
+      <p:pic>
+        <p:nvPicPr>
+          <p:cNvPr id="21" name="Picture 20"/>
+          <p:cNvPicPr>
+            <a:picLocks noChangeAspect="1"/>
+          </p:cNvPicPr>
+          <p:nvPr/>
+        </p:nvPicPr>
+        <p:blipFill>
+          <a:blip r:embed="rId5" cstate="print">
+            <a:extLst>
+              <a:ext uri="{28A0092B-C50C-407E-A947-70E740481C1C}">
+                <a14:useLocalDpi xmlns:a14="http://schemas.microsoft.com/office/drawing/2010/main" val="0"/>
+              </a:ext>
+            </a:extLst>
+          </a:blip>
+          <a:stretch>
+            <a:fillRect/>
+          </a:stretch>
+        </p:blipFill>
+        <p:spPr>
+          <a:xfrm>
+            <a:off x="8347772" y="6108121"/>
+            <a:ext cx="223459" cy="225596"/>
+          </a:xfrm>
+          <a:prstGeom prst="rect">
+            <a:avLst/>
+          </a:prstGeom>
+        </p:spPr>
+      </p:pic>
+      <p:pic>
+        <p:nvPicPr>
+          <p:cNvPr id="22" name="Picture 21"/>
+          <p:cNvPicPr>
+            <a:picLocks noChangeAspect="1"/>
+          </p:cNvPicPr>
+          <p:nvPr/>
+        </p:nvPicPr>
+        <p:blipFill>
+          <a:blip r:embed="rId6" cstate="print">
+            <a:extLst>
+              <a:ext uri="{28A0092B-C50C-407E-A947-70E740481C1C}">
+                <a14:useLocalDpi xmlns:a14="http://schemas.microsoft.com/office/drawing/2010/main" val="0"/>
+              </a:ext>
+            </a:extLst>
+          </a:blip>
+          <a:stretch>
+            <a:fillRect/>
+          </a:stretch>
+        </p:blipFill>
+        <p:spPr>
+          <a:xfrm>
+            <a:off x="9999284" y="6123170"/>
+            <a:ext cx="280633" cy="225596"/>
+          </a:xfrm>
+          <a:prstGeom prst="rect">
+            <a:avLst/>
+          </a:prstGeom>
+        </p:spPr>
+      </p:pic>
+      <p:pic>
+        <p:nvPicPr>
+          <p:cNvPr id="23" name="Picture 22"/>
+          <p:cNvPicPr>
+            <a:picLocks noChangeAspect="1"/>
+          </p:cNvPicPr>
+          <p:nvPr/>
+        </p:nvPicPr>
+        <p:blipFill>
+          <a:blip r:embed="rId7" cstate="print">
+            <a:extLst>
+              <a:ext uri="{28A0092B-C50C-407E-A947-70E740481C1C}">
+                <a14:useLocalDpi xmlns:a14="http://schemas.microsoft.com/office/drawing/2010/main" val="0"/>
+              </a:ext>
+            </a:extLst>
+          </a:blip>
+          <a:stretch>
+            <a:fillRect/>
+          </a:stretch>
+        </p:blipFill>
+        <p:spPr>
+          <a:xfrm>
+            <a:off x="7947247" y="6121416"/>
+            <a:ext cx="254344" cy="224100"/>
+          </a:xfrm>
+          <a:prstGeom prst="rect">
+            <a:avLst/>
+          </a:prstGeom>
+        </p:spPr>
+      </p:pic>
+      <p:pic>
+        <p:nvPicPr>
+          <p:cNvPr id="24" name="Picture 23"/>
+          <p:cNvPicPr>
+            <a:picLocks noChangeAspect="1"/>
+          </p:cNvPicPr>
+          <p:nvPr/>
+        </p:nvPicPr>
+        <p:blipFill>
+          <a:blip r:embed="rId8" cstate="print">
+            <a:extLst>
+              <a:ext uri="{28A0092B-C50C-407E-A947-70E740481C1C}">
+                <a14:useLocalDpi xmlns:a14="http://schemas.microsoft.com/office/drawing/2010/main" val="0"/>
+              </a:ext>
+            </a:extLst>
+          </a:blip>
+          <a:stretch>
+            <a:fillRect/>
+          </a:stretch>
+        </p:blipFill>
+        <p:spPr>
+          <a:xfrm>
+            <a:off x="9168029" y="6122956"/>
+            <a:ext cx="274386" cy="225596"/>
+          </a:xfrm>
+          <a:prstGeom prst="rect">
+            <a:avLst/>
+          </a:prstGeom>
+        </p:spPr>
+      </p:pic>
+      <p:pic>
+        <p:nvPicPr>
+          <p:cNvPr id="25" name="Picture 24"/>
+          <p:cNvPicPr>
+            <a:picLocks noChangeAspect="1"/>
+          </p:cNvPicPr>
+          <p:nvPr/>
+        </p:nvPicPr>
+        <p:blipFill>
+          <a:blip r:embed="rId9" cstate="print">
+            <a:extLst>
+              <a:ext uri="{28A0092B-C50C-407E-A947-70E740481C1C}">
+                <a14:useLocalDpi xmlns:a14="http://schemas.microsoft.com/office/drawing/2010/main" val="0"/>
+              </a:ext>
+            </a:extLst>
+          </a:blip>
+          <a:stretch>
+            <a:fillRect/>
+          </a:stretch>
+        </p:blipFill>
+        <p:spPr>
+          <a:xfrm flipH="1">
+            <a:off x="7540918" y="6121416"/>
+            <a:ext cx="255789" cy="218495"/>
+          </a:xfrm>
+          <a:prstGeom prst="rect">
+            <a:avLst/>
+          </a:prstGeom>
+        </p:spPr>
+      </p:pic>
+    </p:spTree>
+    <p:extLst>
+      <p:ext uri="{BB962C8B-B14F-4D97-AF65-F5344CB8AC3E}">
+        <p14:creationId xmlns:p14="http://schemas.microsoft.com/office/powerpoint/2010/main" val="1066287001"/>
+      </p:ext>
+    </p:extLst>
+  </p:cSld>
+  <p:clrMapOvr>
+    <a:masterClrMapping/>
+  </p:clrMapOvr>
+</p:sld>
+</file>
+
+<file path=ppt/slides/slide3.xml><?xml version="1.0" encoding="utf-8"?>
+<p:sld xmlns:a="http://schemas.openxmlformats.org/drawingml/2006/main" xmlns:r="http://schemas.openxmlformats.org/officeDocument/2006/relationships" xmlns:p="http://schemas.openxmlformats.org/presentationml/2006/main">
+  <p:cSld>
+    <p:spTree>
+      <p:nvGrpSpPr>
+        <p:cNvPr id="1" name=""/>
+        <p:cNvGrpSpPr/>
+        <p:nvPr/>
+      </p:nvGrpSpPr>
+      <p:grpSpPr>
+        <a:xfrm>
+          <a:off x="0" y="0"/>
+          <a:ext cx="0" cy="0"/>
+          <a:chOff x="0" y="0"/>
+          <a:chExt cx="0" cy="0"/>
+        </a:xfrm>
+      </p:grpSpPr>
+      <p:sp>
+        <p:nvSpPr>
+          <p:cNvPr id="41" name="Rectangle 40"/>
+          <p:cNvSpPr/>
+          <p:nvPr/>
+        </p:nvSpPr>
+        <p:spPr>
+          <a:xfrm>
+            <a:off x="3088433" y="5164914"/>
+            <a:ext cx="671804" cy="284164"/>
+          </a:xfrm>
+          <a:prstGeom prst="rect">
+            <a:avLst/>
+          </a:prstGeom>
+          <a:solidFill>
+            <a:schemeClr val="bg1"/>
+          </a:solidFill>
+        </p:spPr>
+        <p:style>
+          <a:lnRef idx="2">
+            <a:schemeClr val="accent1">
+              <a:shade val="50000"/>
+            </a:schemeClr>
+          </a:lnRef>
+          <a:fillRef idx="1">
+            <a:schemeClr val="accent1"/>
+          </a:fillRef>
+          <a:effectRef idx="0">
+            <a:schemeClr val="accent1"/>
+          </a:effectRef>
+          <a:fontRef idx="minor">
+            <a:schemeClr val="lt1"/>
+          </a:fontRef>
+        </p:style>
+        <p:txBody>
+          <a:bodyPr rtlCol="0" anchor="ctr"/>
+          <a:lstStyle/>
+          <a:p>
+            <a:pPr algn="ctr"/>
+            <a:endParaRPr lang="en-US"/>
+          </a:p>
+        </p:txBody>
+      </p:sp>
+      <p:pic>
+        <p:nvPicPr>
+          <p:cNvPr id="2" name="Picture 1"/>
+          <p:cNvPicPr>
+            <a:picLocks noChangeAspect="1"/>
+          </p:cNvPicPr>
+          <p:nvPr/>
+        </p:nvPicPr>
+        <p:blipFill>
+          <a:blip r:embed="rId2"/>
+          <a:stretch>
+            <a:fillRect/>
+          </a:stretch>
+        </p:blipFill>
+        <p:spPr>
+          <a:xfrm>
+            <a:off x="4340" y="1138844"/>
+            <a:ext cx="12187660" cy="4443324"/>
+          </a:xfrm>
+          <a:prstGeom prst="rect">
+            <a:avLst/>
+          </a:prstGeom>
+        </p:spPr>
+      </p:pic>
+      <p:pic>
+        <p:nvPicPr>
+          <p:cNvPr id="6" name="Picture 5"/>
+          <p:cNvPicPr>
+            <a:picLocks noChangeAspect="1"/>
+          </p:cNvPicPr>
+          <p:nvPr/>
+        </p:nvPicPr>
+        <p:blipFill>
+          <a:blip r:embed="rId3" cstate="print">
+            <a:extLst>
+              <a:ext uri="{28A0092B-C50C-407E-A947-70E740481C1C}">
+                <a14:useLocalDpi xmlns:a14="http://schemas.microsoft.com/office/drawing/2010/main" val="0"/>
+              </a:ext>
+            </a:extLst>
+          </a:blip>
+          <a:stretch>
+            <a:fillRect/>
+          </a:stretch>
+        </p:blipFill>
+        <p:spPr>
+          <a:xfrm>
+            <a:off x="3860375" y="4950875"/>
+            <a:ext cx="541407" cy="268617"/>
+          </a:xfrm>
+          <a:prstGeom prst="rect">
+            <a:avLst/>
+          </a:prstGeom>
+        </p:spPr>
+      </p:pic>
+      <p:pic>
+        <p:nvPicPr>
+          <p:cNvPr id="7" name="Picture 6"/>
+          <p:cNvPicPr>
+            <a:picLocks noChangeAspect="1"/>
+          </p:cNvPicPr>
+          <p:nvPr/>
+        </p:nvPicPr>
+        <p:blipFill>
+          <a:blip r:embed="rId4" cstate="print">
+            <a:extLst>
+              <a:ext uri="{28A0092B-C50C-407E-A947-70E740481C1C}">
+                <a14:useLocalDpi xmlns:a14="http://schemas.microsoft.com/office/drawing/2010/main" val="0"/>
+              </a:ext>
+            </a:extLst>
+          </a:blip>
+          <a:stretch>
+            <a:fillRect/>
+          </a:stretch>
+        </p:blipFill>
+        <p:spPr>
+          <a:xfrm>
+            <a:off x="4589043" y="4907807"/>
+            <a:ext cx="510273" cy="310919"/>
+          </a:xfrm>
+          <a:prstGeom prst="rect">
+            <a:avLst/>
+          </a:prstGeom>
+        </p:spPr>
+      </p:pic>
+      <p:pic>
+        <p:nvPicPr>
+          <p:cNvPr id="9" name="Picture 8"/>
+          <p:cNvPicPr>
+            <a:picLocks noChangeAspect="1"/>
+          </p:cNvPicPr>
+          <p:nvPr/>
+        </p:nvPicPr>
+        <p:blipFill>
+          <a:blip r:embed="rId5" cstate="print">
+            <a:extLst>
+              <a:ext uri="{28A0092B-C50C-407E-A947-70E740481C1C}">
+                <a14:useLocalDpi xmlns:a14="http://schemas.microsoft.com/office/drawing/2010/main" val="0"/>
+              </a:ext>
+            </a:extLst>
+          </a:blip>
+          <a:stretch>
+            <a:fillRect/>
+          </a:stretch>
+        </p:blipFill>
+        <p:spPr>
+          <a:xfrm>
+            <a:off x="3203119" y="4844417"/>
+            <a:ext cx="371522" cy="375075"/>
+          </a:xfrm>
+          <a:prstGeom prst="rect">
+            <a:avLst/>
+          </a:prstGeom>
+        </p:spPr>
+      </p:pic>
+      <p:pic>
+        <p:nvPicPr>
+          <p:cNvPr id="10" name="Picture 9"/>
+          <p:cNvPicPr>
+            <a:picLocks noChangeAspect="1"/>
+          </p:cNvPicPr>
+          <p:nvPr/>
+        </p:nvPicPr>
+        <p:blipFill>
+          <a:blip r:embed="rId6" cstate="print">
+            <a:extLst>
+              <a:ext uri="{28A0092B-C50C-407E-A947-70E740481C1C}">
+                <a14:useLocalDpi xmlns:a14="http://schemas.microsoft.com/office/drawing/2010/main" val="0"/>
+              </a:ext>
+            </a:extLst>
+          </a:blip>
+          <a:stretch>
+            <a:fillRect/>
+          </a:stretch>
+        </p:blipFill>
+        <p:spPr>
+          <a:xfrm>
+            <a:off x="1706433" y="4897645"/>
+            <a:ext cx="466579" cy="375075"/>
+          </a:xfrm>
+          <a:prstGeom prst="rect">
+            <a:avLst/>
+          </a:prstGeom>
+        </p:spPr>
+      </p:pic>
+      <p:pic>
+        <p:nvPicPr>
+          <p:cNvPr id="11" name="Picture 10"/>
+          <p:cNvPicPr>
+            <a:picLocks noChangeAspect="1"/>
+          </p:cNvPicPr>
+          <p:nvPr/>
+        </p:nvPicPr>
+        <p:blipFill>
+          <a:blip r:embed="rId7" cstate="print">
+            <a:extLst>
+              <a:ext uri="{28A0092B-C50C-407E-A947-70E740481C1C}">
+                <a14:useLocalDpi xmlns:a14="http://schemas.microsoft.com/office/drawing/2010/main" val="0"/>
+              </a:ext>
+            </a:extLst>
+          </a:blip>
+          <a:stretch>
+            <a:fillRect/>
+          </a:stretch>
+        </p:blipFill>
+        <p:spPr>
+          <a:xfrm>
+            <a:off x="999494" y="4879745"/>
+            <a:ext cx="422871" cy="372587"/>
+          </a:xfrm>
+          <a:prstGeom prst="rect">
+            <a:avLst/>
+          </a:prstGeom>
+        </p:spPr>
+      </p:pic>
+      <p:pic>
+        <p:nvPicPr>
+          <p:cNvPr id="3" name="Picture 2"/>
+          <p:cNvPicPr>
+            <a:picLocks noChangeAspect="1"/>
+          </p:cNvPicPr>
+          <p:nvPr/>
+        </p:nvPicPr>
+        <p:blipFill>
+          <a:blip r:embed="rId8" cstate="print">
+            <a:extLst>
+              <a:ext uri="{28A0092B-C50C-407E-A947-70E740481C1C}">
+                <a14:useLocalDpi xmlns:a14="http://schemas.microsoft.com/office/drawing/2010/main" val="0"/>
+              </a:ext>
+            </a:extLst>
+          </a:blip>
+          <a:stretch>
+            <a:fillRect/>
+          </a:stretch>
+        </p:blipFill>
+        <p:spPr>
+          <a:xfrm>
+            <a:off x="2445279" y="4879000"/>
+            <a:ext cx="456193" cy="375075"/>
+          </a:xfrm>
+          <a:prstGeom prst="rect">
+            <a:avLst/>
+          </a:prstGeom>
+        </p:spPr>
+      </p:pic>
+      <p:pic>
+        <p:nvPicPr>
+          <p:cNvPr id="33" name="Picture 32"/>
+          <p:cNvPicPr>
+            <a:picLocks noChangeAspect="1"/>
+          </p:cNvPicPr>
+          <p:nvPr/>
+        </p:nvPicPr>
+        <p:blipFill>
+          <a:blip r:embed="rId3" cstate="print">
+            <a:extLst>
+              <a:ext uri="{28A0092B-C50C-407E-A947-70E740481C1C}">
+                <a14:useLocalDpi xmlns:a14="http://schemas.microsoft.com/office/drawing/2010/main" val="0"/>
+              </a:ext>
+            </a:extLst>
+          </a:blip>
+          <a:stretch>
+            <a:fillRect/>
+          </a:stretch>
+        </p:blipFill>
+        <p:spPr>
+          <a:xfrm>
+            <a:off x="10049681" y="4897063"/>
+            <a:ext cx="541407" cy="268617"/>
+          </a:xfrm>
+          <a:prstGeom prst="rect">
+            <a:avLst/>
+          </a:prstGeom>
+        </p:spPr>
+      </p:pic>
+      <p:pic>
+        <p:nvPicPr>
+          <p:cNvPr id="34" name="Picture 33"/>
+          <p:cNvPicPr>
+            <a:picLocks noChangeAspect="1"/>
+          </p:cNvPicPr>
+          <p:nvPr/>
+        </p:nvPicPr>
+        <p:blipFill>
+          <a:blip r:embed="rId4" cstate="print">
+            <a:extLst>
+              <a:ext uri="{28A0092B-C50C-407E-A947-70E740481C1C}">
+                <a14:useLocalDpi xmlns:a14="http://schemas.microsoft.com/office/drawing/2010/main" val="0"/>
+              </a:ext>
+            </a:extLst>
+          </a:blip>
+          <a:stretch>
+            <a:fillRect/>
+          </a:stretch>
+        </p:blipFill>
+        <p:spPr>
+          <a:xfrm>
+            <a:off x="10778349" y="4853995"/>
+            <a:ext cx="510273" cy="310919"/>
+          </a:xfrm>
+          <a:prstGeom prst="rect">
+            <a:avLst/>
+          </a:prstGeom>
+        </p:spPr>
+      </p:pic>
+      <p:pic>
+        <p:nvPicPr>
+          <p:cNvPr id="35" name="Picture 34"/>
+          <p:cNvPicPr>
+            <a:picLocks noChangeAspect="1"/>
+          </p:cNvPicPr>
+          <p:nvPr/>
+        </p:nvPicPr>
+        <p:blipFill>
+          <a:blip r:embed="rId5" cstate="print">
+            <a:extLst>
+              <a:ext uri="{28A0092B-C50C-407E-A947-70E740481C1C}">
+                <a14:useLocalDpi xmlns:a14="http://schemas.microsoft.com/office/drawing/2010/main" val="0"/>
+              </a:ext>
+            </a:extLst>
+          </a:blip>
+          <a:stretch>
+            <a:fillRect/>
+          </a:stretch>
+        </p:blipFill>
+        <p:spPr>
+          <a:xfrm>
+            <a:off x="9385232" y="4780413"/>
+            <a:ext cx="371522" cy="375075"/>
+          </a:xfrm>
+          <a:prstGeom prst="rect">
+            <a:avLst/>
+          </a:prstGeom>
+        </p:spPr>
+      </p:pic>
+      <p:pic>
+        <p:nvPicPr>
+          <p:cNvPr id="36" name="Picture 35"/>
+          <p:cNvPicPr>
+            <a:picLocks noChangeAspect="1"/>
+          </p:cNvPicPr>
+          <p:nvPr/>
+        </p:nvPicPr>
+        <p:blipFill>
+          <a:blip r:embed="rId6" cstate="print">
+            <a:extLst>
+              <a:ext uri="{28A0092B-C50C-407E-A947-70E740481C1C}">
+                <a14:useLocalDpi xmlns:a14="http://schemas.microsoft.com/office/drawing/2010/main" val="0"/>
+              </a:ext>
+            </a:extLst>
+          </a:blip>
+          <a:stretch>
+            <a:fillRect/>
+          </a:stretch>
+        </p:blipFill>
+        <p:spPr>
+          <a:xfrm>
+            <a:off x="7895739" y="4843833"/>
+            <a:ext cx="466579" cy="375075"/>
+          </a:xfrm>
+          <a:prstGeom prst="rect">
+            <a:avLst/>
+          </a:prstGeom>
+        </p:spPr>
+      </p:pic>
+      <p:pic>
+        <p:nvPicPr>
+          <p:cNvPr id="37" name="Picture 36"/>
+          <p:cNvPicPr>
+            <a:picLocks noChangeAspect="1"/>
+          </p:cNvPicPr>
+          <p:nvPr/>
+        </p:nvPicPr>
+        <p:blipFill>
+          <a:blip r:embed="rId7" cstate="print">
+            <a:extLst>
+              <a:ext uri="{28A0092B-C50C-407E-A947-70E740481C1C}">
+                <a14:useLocalDpi xmlns:a14="http://schemas.microsoft.com/office/drawing/2010/main" val="0"/>
+              </a:ext>
+            </a:extLst>
+          </a:blip>
+          <a:stretch>
+            <a:fillRect/>
+          </a:stretch>
+        </p:blipFill>
+        <p:spPr>
+          <a:xfrm>
+            <a:off x="7188800" y="4825933"/>
+            <a:ext cx="422871" cy="372587"/>
+          </a:xfrm>
+          <a:prstGeom prst="rect">
+            <a:avLst/>
+          </a:prstGeom>
+        </p:spPr>
+      </p:pic>
+      <p:pic>
+        <p:nvPicPr>
+          <p:cNvPr id="38" name="Picture 37"/>
+          <p:cNvPicPr>
+            <a:picLocks noChangeAspect="1"/>
+          </p:cNvPicPr>
+          <p:nvPr/>
+        </p:nvPicPr>
+        <p:blipFill>
+          <a:blip r:embed="rId8" cstate="print">
+            <a:extLst>
+              <a:ext uri="{28A0092B-C50C-407E-A947-70E740481C1C}">
+                <a14:useLocalDpi xmlns:a14="http://schemas.microsoft.com/office/drawing/2010/main" val="0"/>
+              </a:ext>
+            </a:extLst>
+          </a:blip>
+          <a:stretch>
+            <a:fillRect/>
+          </a:stretch>
+        </p:blipFill>
+        <p:spPr>
+          <a:xfrm>
+            <a:off x="8634585" y="4825188"/>
+            <a:ext cx="456193" cy="375075"/>
+          </a:xfrm>
+          <a:prstGeom prst="rect">
+            <a:avLst/>
+          </a:prstGeom>
+        </p:spPr>
+      </p:pic>
+      <p:pic>
+        <p:nvPicPr>
+          <p:cNvPr id="39" name="Picture 38"/>
+          <p:cNvPicPr>
+            <a:picLocks noChangeAspect="1"/>
+          </p:cNvPicPr>
+          <p:nvPr/>
+        </p:nvPicPr>
+        <p:blipFill>
+          <a:blip r:embed="rId9" cstate="print">
+            <a:extLst>
+              <a:ext uri="{28A0092B-C50C-407E-A947-70E740481C1C}">
+                <a14:useLocalDpi xmlns:a14="http://schemas.microsoft.com/office/drawing/2010/main" val="0"/>
+              </a:ext>
+            </a:extLst>
+          </a:blip>
+          <a:stretch>
+            <a:fillRect/>
+          </a:stretch>
+        </p:blipFill>
+        <p:spPr>
+          <a:xfrm flipH="1">
+            <a:off x="5432524" y="4897063"/>
+            <a:ext cx="425272" cy="363268"/>
+          </a:xfrm>
+          <a:prstGeom prst="rect">
+            <a:avLst/>
+          </a:prstGeom>
+        </p:spPr>
+      </p:pic>
+      <p:pic>
+        <p:nvPicPr>
+          <p:cNvPr id="40" name="Picture 39"/>
+          <p:cNvPicPr>
+            <a:picLocks noChangeAspect="1"/>
+          </p:cNvPicPr>
+          <p:nvPr/>
+        </p:nvPicPr>
+        <p:blipFill>
+          <a:blip r:embed="rId9" cstate="print">
+            <a:extLst>
+              <a:ext uri="{28A0092B-C50C-407E-A947-70E740481C1C}">
+                <a14:useLocalDpi xmlns:a14="http://schemas.microsoft.com/office/drawing/2010/main" val="0"/>
+              </a:ext>
+            </a:extLst>
+          </a:blip>
+          <a:stretch>
+            <a:fillRect/>
+          </a:stretch>
+        </p:blipFill>
+        <p:spPr>
+          <a:xfrm flipH="1">
+            <a:off x="11527675" y="4843833"/>
+            <a:ext cx="425272" cy="363268"/>
           </a:xfrm>
           <a:prstGeom prst="rect">
             <a:avLst/>

</xml_diff>

<commit_message>
tweaking figs, still need to fix 2b
</commit_message>
<xml_diff>
--- a/output/plots/Presentation1.pptx
+++ b/output/plots/Presentation1.pptx
@@ -245,7 +245,7 @@
           <a:p>
             <a:fld id="{916B8C92-D5E3-4480-8685-D57BEE386DE2}" type="datetimeFigureOut">
               <a:rPr lang="en-US" smtClean="0"/>
-              <a:t>11/15/2016</a:t>
+              <a:t>11/16/2016</a:t>
             </a:fld>
             <a:endParaRPr lang="en-US"/>
           </a:p>
@@ -415,7 +415,7 @@
           <a:p>
             <a:fld id="{916B8C92-D5E3-4480-8685-D57BEE386DE2}" type="datetimeFigureOut">
               <a:rPr lang="en-US" smtClean="0"/>
-              <a:t>11/15/2016</a:t>
+              <a:t>11/16/2016</a:t>
             </a:fld>
             <a:endParaRPr lang="en-US"/>
           </a:p>
@@ -595,7 +595,7 @@
           <a:p>
             <a:fld id="{916B8C92-D5E3-4480-8685-D57BEE386DE2}" type="datetimeFigureOut">
               <a:rPr lang="en-US" smtClean="0"/>
-              <a:t>11/15/2016</a:t>
+              <a:t>11/16/2016</a:t>
             </a:fld>
             <a:endParaRPr lang="en-US"/>
           </a:p>
@@ -765,7 +765,7 @@
           <a:p>
             <a:fld id="{916B8C92-D5E3-4480-8685-D57BEE386DE2}" type="datetimeFigureOut">
               <a:rPr lang="en-US" smtClean="0"/>
-              <a:t>11/15/2016</a:t>
+              <a:t>11/16/2016</a:t>
             </a:fld>
             <a:endParaRPr lang="en-US"/>
           </a:p>
@@ -1011,7 +1011,7 @@
           <a:p>
             <a:fld id="{916B8C92-D5E3-4480-8685-D57BEE386DE2}" type="datetimeFigureOut">
               <a:rPr lang="en-US" smtClean="0"/>
-              <a:t>11/15/2016</a:t>
+              <a:t>11/16/2016</a:t>
             </a:fld>
             <a:endParaRPr lang="en-US"/>
           </a:p>
@@ -1243,7 +1243,7 @@
           <a:p>
             <a:fld id="{916B8C92-D5E3-4480-8685-D57BEE386DE2}" type="datetimeFigureOut">
               <a:rPr lang="en-US" smtClean="0"/>
-              <a:t>11/15/2016</a:t>
+              <a:t>11/16/2016</a:t>
             </a:fld>
             <a:endParaRPr lang="en-US"/>
           </a:p>
@@ -1610,7 +1610,7 @@
           <a:p>
             <a:fld id="{916B8C92-D5E3-4480-8685-D57BEE386DE2}" type="datetimeFigureOut">
               <a:rPr lang="en-US" smtClean="0"/>
-              <a:t>11/15/2016</a:t>
+              <a:t>11/16/2016</a:t>
             </a:fld>
             <a:endParaRPr lang="en-US"/>
           </a:p>
@@ -1728,7 +1728,7 @@
           <a:p>
             <a:fld id="{916B8C92-D5E3-4480-8685-D57BEE386DE2}" type="datetimeFigureOut">
               <a:rPr lang="en-US" smtClean="0"/>
-              <a:t>11/15/2016</a:t>
+              <a:t>11/16/2016</a:t>
             </a:fld>
             <a:endParaRPr lang="en-US"/>
           </a:p>
@@ -1823,7 +1823,7 @@
           <a:p>
             <a:fld id="{916B8C92-D5E3-4480-8685-D57BEE386DE2}" type="datetimeFigureOut">
               <a:rPr lang="en-US" smtClean="0"/>
-              <a:t>11/15/2016</a:t>
+              <a:t>11/16/2016</a:t>
             </a:fld>
             <a:endParaRPr lang="en-US"/>
           </a:p>
@@ -2100,7 +2100,7 @@
           <a:p>
             <a:fld id="{916B8C92-D5E3-4480-8685-D57BEE386DE2}" type="datetimeFigureOut">
               <a:rPr lang="en-US" smtClean="0"/>
-              <a:t>11/15/2016</a:t>
+              <a:t>11/16/2016</a:t>
             </a:fld>
             <a:endParaRPr lang="en-US"/>
           </a:p>
@@ -2353,7 +2353,7 @@
           <a:p>
             <a:fld id="{916B8C92-D5E3-4480-8685-D57BEE386DE2}" type="datetimeFigureOut">
               <a:rPr lang="en-US" smtClean="0"/>
-              <a:t>11/15/2016</a:t>
+              <a:t>11/16/2016</a:t>
             </a:fld>
             <a:endParaRPr lang="en-US"/>
           </a:p>
@@ -2566,7 +2566,7 @@
           <a:p>
             <a:fld id="{916B8C92-D5E3-4480-8685-D57BEE386DE2}" type="datetimeFigureOut">
               <a:rPr lang="en-US" smtClean="0"/>
-              <a:t>11/15/2016</a:t>
+              <a:t>11/16/2016</a:t>
             </a:fld>
             <a:endParaRPr lang="en-US"/>
           </a:p>
@@ -3497,7 +3497,7 @@
       </p:grpSpPr>
       <p:pic>
         <p:nvPicPr>
-          <p:cNvPr id="4" name="Picture 3"/>
+          <p:cNvPr id="2" name="Picture 1"/>
           <p:cNvPicPr>
             <a:picLocks noChangeAspect="1"/>
           </p:cNvPicPr>
@@ -3511,434 +3511,449 @@
         </p:blipFill>
         <p:spPr>
           <a:xfrm>
-            <a:off x="1511559" y="0"/>
-            <a:ext cx="9044181" cy="6776975"/>
+            <a:off x="1663042" y="108065"/>
+            <a:ext cx="8854230" cy="6749935"/>
           </a:xfrm>
           <a:prstGeom prst="rect">
             <a:avLst/>
           </a:prstGeom>
         </p:spPr>
       </p:pic>
-      <p:pic>
-        <p:nvPicPr>
-          <p:cNvPr id="12" name="Picture 11"/>
-          <p:cNvPicPr>
-            <a:picLocks noChangeAspect="1"/>
-          </p:cNvPicPr>
+      <p:grpSp>
+        <p:nvGrpSpPr>
+          <p:cNvPr id="3" name="Group 2"/>
+          <p:cNvGrpSpPr/>
           <p:nvPr/>
-        </p:nvPicPr>
-        <p:blipFill>
-          <a:blip r:embed="rId3" cstate="print">
-            <a:extLst>
-              <a:ext uri="{28A0092B-C50C-407E-A947-70E740481C1C}">
-                <a14:useLocalDpi xmlns:a14="http://schemas.microsoft.com/office/drawing/2010/main" val="0"/>
-              </a:ext>
-            </a:extLst>
-          </a:blip>
-          <a:stretch>
-            <a:fillRect/>
-          </a:stretch>
-        </p:blipFill>
-        <p:spPr>
+        </p:nvGrpSpPr>
+        <p:grpSpPr>
           <a:xfrm>
-            <a:off x="4031625" y="6134687"/>
-            <a:ext cx="325640" cy="161565"/>
-          </a:xfrm>
-          <a:prstGeom prst="rect">
-            <a:avLst/>
-          </a:prstGeom>
-        </p:spPr>
-      </p:pic>
-      <p:pic>
-        <p:nvPicPr>
-          <p:cNvPr id="13" name="Picture 12"/>
-          <p:cNvPicPr>
-            <a:picLocks noChangeAspect="1"/>
-          </p:cNvPicPr>
-          <p:nvPr/>
-        </p:nvPicPr>
-        <p:blipFill>
-          <a:blip r:embed="rId4" cstate="print">
-            <a:extLst>
-              <a:ext uri="{28A0092B-C50C-407E-A947-70E740481C1C}">
-                <a14:useLocalDpi xmlns:a14="http://schemas.microsoft.com/office/drawing/2010/main" val="0"/>
-              </a:ext>
-            </a:extLst>
-          </a:blip>
-          <a:stretch>
-            <a:fillRect/>
-          </a:stretch>
-        </p:blipFill>
-        <p:spPr>
-          <a:xfrm>
-            <a:off x="4881605" y="6121809"/>
-            <a:ext cx="306915" cy="187009"/>
-          </a:xfrm>
-          <a:prstGeom prst="rect">
-            <a:avLst/>
-          </a:prstGeom>
-        </p:spPr>
-      </p:pic>
-      <p:pic>
-        <p:nvPicPr>
-          <p:cNvPr id="14" name="Picture 13"/>
-          <p:cNvPicPr>
-            <a:picLocks noChangeAspect="1"/>
-          </p:cNvPicPr>
-          <p:nvPr/>
-        </p:nvPicPr>
-        <p:blipFill>
-          <a:blip r:embed="rId5" cstate="print">
-            <a:extLst>
-              <a:ext uri="{28A0092B-C50C-407E-A947-70E740481C1C}">
-                <a14:useLocalDpi xmlns:a14="http://schemas.microsoft.com/office/drawing/2010/main" val="0"/>
-              </a:ext>
-            </a:extLst>
-          </a:blip>
-          <a:stretch>
-            <a:fillRect/>
-          </a:stretch>
-        </p:blipFill>
-        <p:spPr>
-          <a:xfrm>
-            <a:off x="3661985" y="6102516"/>
-            <a:ext cx="223459" cy="225596"/>
-          </a:xfrm>
-          <a:prstGeom prst="rect">
-            <a:avLst/>
-          </a:prstGeom>
-        </p:spPr>
-      </p:pic>
-      <p:pic>
-        <p:nvPicPr>
-          <p:cNvPr id="15" name="Picture 14"/>
-          <p:cNvPicPr>
-            <a:picLocks noChangeAspect="1"/>
-          </p:cNvPicPr>
-          <p:nvPr/>
-        </p:nvPicPr>
-        <p:blipFill>
-          <a:blip r:embed="rId6" cstate="print">
-            <a:extLst>
-              <a:ext uri="{28A0092B-C50C-407E-A947-70E740481C1C}">
-                <a14:useLocalDpi xmlns:a14="http://schemas.microsoft.com/office/drawing/2010/main" val="0"/>
-              </a:ext>
-            </a:extLst>
-          </a:blip>
-          <a:stretch>
-            <a:fillRect/>
-          </a:stretch>
-        </p:blipFill>
-        <p:spPr>
-          <a:xfrm>
-            <a:off x="5313497" y="6117565"/>
-            <a:ext cx="280633" cy="225596"/>
-          </a:xfrm>
-          <a:prstGeom prst="rect">
-            <a:avLst/>
-          </a:prstGeom>
-        </p:spPr>
-      </p:pic>
-      <p:pic>
-        <p:nvPicPr>
-          <p:cNvPr id="16" name="Picture 15"/>
-          <p:cNvPicPr>
-            <a:picLocks noChangeAspect="1"/>
-          </p:cNvPicPr>
-          <p:nvPr/>
-        </p:nvPicPr>
-        <p:blipFill>
-          <a:blip r:embed="rId7" cstate="print">
-            <a:extLst>
-              <a:ext uri="{28A0092B-C50C-407E-A947-70E740481C1C}">
-                <a14:useLocalDpi xmlns:a14="http://schemas.microsoft.com/office/drawing/2010/main" val="0"/>
-              </a:ext>
-            </a:extLst>
-          </a:blip>
-          <a:stretch>
-            <a:fillRect/>
-          </a:stretch>
-        </p:blipFill>
-        <p:spPr>
-          <a:xfrm>
-            <a:off x="3261460" y="6115811"/>
-            <a:ext cx="254344" cy="224100"/>
-          </a:xfrm>
-          <a:prstGeom prst="rect">
-            <a:avLst/>
-          </a:prstGeom>
-        </p:spPr>
-      </p:pic>
-      <p:pic>
-        <p:nvPicPr>
-          <p:cNvPr id="17" name="Picture 16"/>
-          <p:cNvPicPr>
-            <a:picLocks noChangeAspect="1"/>
-          </p:cNvPicPr>
-          <p:nvPr/>
-        </p:nvPicPr>
-        <p:blipFill>
-          <a:blip r:embed="rId8" cstate="print">
-            <a:extLst>
-              <a:ext uri="{28A0092B-C50C-407E-A947-70E740481C1C}">
-                <a14:useLocalDpi xmlns:a14="http://schemas.microsoft.com/office/drawing/2010/main" val="0"/>
-              </a:ext>
-            </a:extLst>
-          </a:blip>
-          <a:stretch>
-            <a:fillRect/>
-          </a:stretch>
-        </p:blipFill>
-        <p:spPr>
-          <a:xfrm>
-            <a:off x="4482242" y="6117351"/>
-            <a:ext cx="274386" cy="225596"/>
-          </a:xfrm>
-          <a:prstGeom prst="rect">
-            <a:avLst/>
-          </a:prstGeom>
-        </p:spPr>
-      </p:pic>
-      <p:pic>
-        <p:nvPicPr>
-          <p:cNvPr id="18" name="Picture 17"/>
-          <p:cNvPicPr>
-            <a:picLocks noChangeAspect="1"/>
-          </p:cNvPicPr>
-          <p:nvPr/>
-        </p:nvPicPr>
-        <p:blipFill>
-          <a:blip r:embed="rId9" cstate="print">
-            <a:extLst>
-              <a:ext uri="{28A0092B-C50C-407E-A947-70E740481C1C}">
-                <a14:useLocalDpi xmlns:a14="http://schemas.microsoft.com/office/drawing/2010/main" val="0"/>
-              </a:ext>
-            </a:extLst>
-          </a:blip>
-          <a:stretch>
-            <a:fillRect/>
-          </a:stretch>
-        </p:blipFill>
-        <p:spPr>
-          <a:xfrm flipH="1">
-            <a:off x="2855131" y="6115811"/>
-            <a:ext cx="255789" cy="218495"/>
-          </a:xfrm>
-          <a:prstGeom prst="rect">
-            <a:avLst/>
-          </a:prstGeom>
-        </p:spPr>
-      </p:pic>
-      <p:pic>
-        <p:nvPicPr>
-          <p:cNvPr id="19" name="Picture 18"/>
-          <p:cNvPicPr>
-            <a:picLocks noChangeAspect="1"/>
-          </p:cNvPicPr>
-          <p:nvPr/>
-        </p:nvPicPr>
-        <p:blipFill>
-          <a:blip r:embed="rId3" cstate="print">
-            <a:extLst>
-              <a:ext uri="{28A0092B-C50C-407E-A947-70E740481C1C}">
-                <a14:useLocalDpi xmlns:a14="http://schemas.microsoft.com/office/drawing/2010/main" val="0"/>
-              </a:ext>
-            </a:extLst>
-          </a:blip>
-          <a:stretch>
-            <a:fillRect/>
-          </a:stretch>
-        </p:blipFill>
-        <p:spPr>
-          <a:xfrm>
-            <a:off x="8717412" y="6140292"/>
-            <a:ext cx="325640" cy="161565"/>
-          </a:xfrm>
-          <a:prstGeom prst="rect">
-            <a:avLst/>
-          </a:prstGeom>
-        </p:spPr>
-      </p:pic>
-      <p:pic>
-        <p:nvPicPr>
-          <p:cNvPr id="20" name="Picture 19"/>
-          <p:cNvPicPr>
-            <a:picLocks noChangeAspect="1"/>
-          </p:cNvPicPr>
-          <p:nvPr/>
-        </p:nvPicPr>
-        <p:blipFill>
-          <a:blip r:embed="rId4" cstate="print">
-            <a:extLst>
-              <a:ext uri="{28A0092B-C50C-407E-A947-70E740481C1C}">
-                <a14:useLocalDpi xmlns:a14="http://schemas.microsoft.com/office/drawing/2010/main" val="0"/>
-              </a:ext>
-            </a:extLst>
-          </a:blip>
-          <a:stretch>
-            <a:fillRect/>
-          </a:stretch>
-        </p:blipFill>
-        <p:spPr>
-          <a:xfrm>
-            <a:off x="9567392" y="6127414"/>
-            <a:ext cx="306915" cy="187009"/>
-          </a:xfrm>
-          <a:prstGeom prst="rect">
-            <a:avLst/>
-          </a:prstGeom>
-        </p:spPr>
-      </p:pic>
-      <p:pic>
-        <p:nvPicPr>
-          <p:cNvPr id="21" name="Picture 20"/>
-          <p:cNvPicPr>
-            <a:picLocks noChangeAspect="1"/>
-          </p:cNvPicPr>
-          <p:nvPr/>
-        </p:nvPicPr>
-        <p:blipFill>
-          <a:blip r:embed="rId5" cstate="print">
-            <a:extLst>
-              <a:ext uri="{28A0092B-C50C-407E-A947-70E740481C1C}">
-                <a14:useLocalDpi xmlns:a14="http://schemas.microsoft.com/office/drawing/2010/main" val="0"/>
-              </a:ext>
-            </a:extLst>
-          </a:blip>
-          <a:stretch>
-            <a:fillRect/>
-          </a:stretch>
-        </p:blipFill>
-        <p:spPr>
-          <a:xfrm>
-            <a:off x="8347772" y="6108121"/>
-            <a:ext cx="223459" cy="225596"/>
-          </a:xfrm>
-          <a:prstGeom prst="rect">
-            <a:avLst/>
-          </a:prstGeom>
-        </p:spPr>
-      </p:pic>
-      <p:pic>
-        <p:nvPicPr>
-          <p:cNvPr id="22" name="Picture 21"/>
-          <p:cNvPicPr>
-            <a:picLocks noChangeAspect="1"/>
-          </p:cNvPicPr>
-          <p:nvPr/>
-        </p:nvPicPr>
-        <p:blipFill>
-          <a:blip r:embed="rId6" cstate="print">
-            <a:extLst>
-              <a:ext uri="{28A0092B-C50C-407E-A947-70E740481C1C}">
-                <a14:useLocalDpi xmlns:a14="http://schemas.microsoft.com/office/drawing/2010/main" val="0"/>
-              </a:ext>
-            </a:extLst>
-          </a:blip>
-          <a:stretch>
-            <a:fillRect/>
-          </a:stretch>
-        </p:blipFill>
-        <p:spPr>
-          <a:xfrm>
-            <a:off x="9999284" y="6123170"/>
-            <a:ext cx="280633" cy="225596"/>
-          </a:xfrm>
-          <a:prstGeom prst="rect">
-            <a:avLst/>
-          </a:prstGeom>
-        </p:spPr>
-      </p:pic>
-      <p:pic>
-        <p:nvPicPr>
-          <p:cNvPr id="23" name="Picture 22"/>
-          <p:cNvPicPr>
-            <a:picLocks noChangeAspect="1"/>
-          </p:cNvPicPr>
-          <p:nvPr/>
-        </p:nvPicPr>
-        <p:blipFill>
-          <a:blip r:embed="rId7" cstate="print">
-            <a:extLst>
-              <a:ext uri="{28A0092B-C50C-407E-A947-70E740481C1C}">
-                <a14:useLocalDpi xmlns:a14="http://schemas.microsoft.com/office/drawing/2010/main" val="0"/>
-              </a:ext>
-            </a:extLst>
-          </a:blip>
-          <a:stretch>
-            <a:fillRect/>
-          </a:stretch>
-        </p:blipFill>
-        <p:spPr>
-          <a:xfrm>
-            <a:off x="7947247" y="6121416"/>
-            <a:ext cx="254344" cy="224100"/>
-          </a:xfrm>
-          <a:prstGeom prst="rect">
-            <a:avLst/>
-          </a:prstGeom>
-        </p:spPr>
-      </p:pic>
-      <p:pic>
-        <p:nvPicPr>
-          <p:cNvPr id="24" name="Picture 23"/>
-          <p:cNvPicPr>
-            <a:picLocks noChangeAspect="1"/>
-          </p:cNvPicPr>
-          <p:nvPr/>
-        </p:nvPicPr>
-        <p:blipFill>
-          <a:blip r:embed="rId8" cstate="print">
-            <a:extLst>
-              <a:ext uri="{28A0092B-C50C-407E-A947-70E740481C1C}">
-                <a14:useLocalDpi xmlns:a14="http://schemas.microsoft.com/office/drawing/2010/main" val="0"/>
-              </a:ext>
-            </a:extLst>
-          </a:blip>
-          <a:stretch>
-            <a:fillRect/>
-          </a:stretch>
-        </p:blipFill>
-        <p:spPr>
-          <a:xfrm>
-            <a:off x="9168029" y="6122956"/>
-            <a:ext cx="274386" cy="225596"/>
-          </a:xfrm>
-          <a:prstGeom prst="rect">
-            <a:avLst/>
-          </a:prstGeom>
-        </p:spPr>
-      </p:pic>
-      <p:pic>
-        <p:nvPicPr>
-          <p:cNvPr id="25" name="Picture 24"/>
-          <p:cNvPicPr>
-            <a:picLocks noChangeAspect="1"/>
-          </p:cNvPicPr>
-          <p:nvPr/>
-        </p:nvPicPr>
-        <p:blipFill>
-          <a:blip r:embed="rId9" cstate="print">
-            <a:extLst>
-              <a:ext uri="{28A0092B-C50C-407E-A947-70E740481C1C}">
-                <a14:useLocalDpi xmlns:a14="http://schemas.microsoft.com/office/drawing/2010/main" val="0"/>
-              </a:ext>
-            </a:extLst>
-          </a:blip>
-          <a:stretch>
-            <a:fillRect/>
-          </a:stretch>
-        </p:blipFill>
-        <p:spPr>
-          <a:xfrm flipH="1">
-            <a:off x="7540918" y="6121416"/>
-            <a:ext cx="255789" cy="218495"/>
-          </a:xfrm>
-          <a:prstGeom prst="rect">
-            <a:avLst/>
-          </a:prstGeom>
-        </p:spPr>
-      </p:pic>
+            <a:off x="2887074" y="6066646"/>
+            <a:ext cx="7359592" cy="243895"/>
+            <a:chOff x="2887074" y="6066646"/>
+            <a:chExt cx="7359592" cy="243895"/>
+          </a:xfrm>
+        </p:grpSpPr>
+        <p:pic>
+          <p:nvPicPr>
+            <p:cNvPr id="12" name="Picture 11"/>
+            <p:cNvPicPr>
+              <a:picLocks noChangeAspect="1"/>
+            </p:cNvPicPr>
+            <p:nvPr/>
+          </p:nvPicPr>
+          <p:blipFill>
+            <a:blip r:embed="rId3" cstate="print">
+              <a:extLst>
+                <a:ext uri="{28A0092B-C50C-407E-A947-70E740481C1C}">
+                  <a14:useLocalDpi xmlns:a14="http://schemas.microsoft.com/office/drawing/2010/main" val="0"/>
+                </a:ext>
+              </a:extLst>
+            </a:blip>
+            <a:stretch>
+              <a:fillRect/>
+            </a:stretch>
+          </p:blipFill>
+          <p:spPr>
+            <a:xfrm>
+              <a:off x="4063568" y="6102067"/>
+              <a:ext cx="325640" cy="161565"/>
+            </a:xfrm>
+            <a:prstGeom prst="rect">
+              <a:avLst/>
+            </a:prstGeom>
+          </p:spPr>
+        </p:pic>
+        <p:pic>
+          <p:nvPicPr>
+            <p:cNvPr id="13" name="Picture 12"/>
+            <p:cNvPicPr>
+              <a:picLocks noChangeAspect="1"/>
+            </p:cNvPicPr>
+            <p:nvPr/>
+          </p:nvPicPr>
+          <p:blipFill>
+            <a:blip r:embed="rId4" cstate="print">
+              <a:extLst>
+                <a:ext uri="{28A0092B-C50C-407E-A947-70E740481C1C}">
+                  <a14:useLocalDpi xmlns:a14="http://schemas.microsoft.com/office/drawing/2010/main" val="0"/>
+                </a:ext>
+              </a:extLst>
+            </a:blip>
+            <a:stretch>
+              <a:fillRect/>
+            </a:stretch>
+          </p:blipFill>
+          <p:spPr>
+            <a:xfrm>
+              <a:off x="4913548" y="6089189"/>
+              <a:ext cx="306915" cy="187009"/>
+            </a:xfrm>
+            <a:prstGeom prst="rect">
+              <a:avLst/>
+            </a:prstGeom>
+          </p:spPr>
+        </p:pic>
+        <p:pic>
+          <p:nvPicPr>
+            <p:cNvPr id="14" name="Picture 13"/>
+            <p:cNvPicPr>
+              <a:picLocks noChangeAspect="1"/>
+            </p:cNvPicPr>
+            <p:nvPr/>
+          </p:nvPicPr>
+          <p:blipFill>
+            <a:blip r:embed="rId5" cstate="print">
+              <a:extLst>
+                <a:ext uri="{28A0092B-C50C-407E-A947-70E740481C1C}">
+                  <a14:useLocalDpi xmlns:a14="http://schemas.microsoft.com/office/drawing/2010/main" val="0"/>
+                </a:ext>
+              </a:extLst>
+            </a:blip>
+            <a:stretch>
+              <a:fillRect/>
+            </a:stretch>
+          </p:blipFill>
+          <p:spPr>
+            <a:xfrm>
+              <a:off x="3693928" y="6069896"/>
+              <a:ext cx="223459" cy="225596"/>
+            </a:xfrm>
+            <a:prstGeom prst="rect">
+              <a:avLst/>
+            </a:prstGeom>
+          </p:spPr>
+        </p:pic>
+        <p:pic>
+          <p:nvPicPr>
+            <p:cNvPr id="15" name="Picture 14"/>
+            <p:cNvPicPr>
+              <a:picLocks noChangeAspect="1"/>
+            </p:cNvPicPr>
+            <p:nvPr/>
+          </p:nvPicPr>
+          <p:blipFill>
+            <a:blip r:embed="rId6" cstate="print">
+              <a:extLst>
+                <a:ext uri="{28A0092B-C50C-407E-A947-70E740481C1C}">
+                  <a14:useLocalDpi xmlns:a14="http://schemas.microsoft.com/office/drawing/2010/main" val="0"/>
+                </a:ext>
+              </a:extLst>
+            </a:blip>
+            <a:stretch>
+              <a:fillRect/>
+            </a:stretch>
+          </p:blipFill>
+          <p:spPr>
+            <a:xfrm>
+              <a:off x="5345440" y="6084945"/>
+              <a:ext cx="280633" cy="225596"/>
+            </a:xfrm>
+            <a:prstGeom prst="rect">
+              <a:avLst/>
+            </a:prstGeom>
+          </p:spPr>
+        </p:pic>
+        <p:pic>
+          <p:nvPicPr>
+            <p:cNvPr id="16" name="Picture 15"/>
+            <p:cNvPicPr>
+              <a:picLocks noChangeAspect="1"/>
+            </p:cNvPicPr>
+            <p:nvPr/>
+          </p:nvPicPr>
+          <p:blipFill>
+            <a:blip r:embed="rId7" cstate="print">
+              <a:extLst>
+                <a:ext uri="{28A0092B-C50C-407E-A947-70E740481C1C}">
+                  <a14:useLocalDpi xmlns:a14="http://schemas.microsoft.com/office/drawing/2010/main" val="0"/>
+                </a:ext>
+              </a:extLst>
+            </a:blip>
+            <a:stretch>
+              <a:fillRect/>
+            </a:stretch>
+          </p:blipFill>
+          <p:spPr>
+            <a:xfrm>
+              <a:off x="3293403" y="6083191"/>
+              <a:ext cx="254344" cy="224100"/>
+            </a:xfrm>
+            <a:prstGeom prst="rect">
+              <a:avLst/>
+            </a:prstGeom>
+          </p:spPr>
+        </p:pic>
+        <p:pic>
+          <p:nvPicPr>
+            <p:cNvPr id="17" name="Picture 16"/>
+            <p:cNvPicPr>
+              <a:picLocks noChangeAspect="1"/>
+            </p:cNvPicPr>
+            <p:nvPr/>
+          </p:nvPicPr>
+          <p:blipFill>
+            <a:blip r:embed="rId8" cstate="print">
+              <a:extLst>
+                <a:ext uri="{28A0092B-C50C-407E-A947-70E740481C1C}">
+                  <a14:useLocalDpi xmlns:a14="http://schemas.microsoft.com/office/drawing/2010/main" val="0"/>
+                </a:ext>
+              </a:extLst>
+            </a:blip>
+            <a:stretch>
+              <a:fillRect/>
+            </a:stretch>
+          </p:blipFill>
+          <p:spPr>
+            <a:xfrm>
+              <a:off x="4514185" y="6084731"/>
+              <a:ext cx="274386" cy="225596"/>
+            </a:xfrm>
+            <a:prstGeom prst="rect">
+              <a:avLst/>
+            </a:prstGeom>
+          </p:spPr>
+        </p:pic>
+        <p:pic>
+          <p:nvPicPr>
+            <p:cNvPr id="18" name="Picture 17"/>
+            <p:cNvPicPr>
+              <a:picLocks noChangeAspect="1"/>
+            </p:cNvPicPr>
+            <p:nvPr/>
+          </p:nvPicPr>
+          <p:blipFill>
+            <a:blip r:embed="rId9" cstate="print">
+              <a:extLst>
+                <a:ext uri="{28A0092B-C50C-407E-A947-70E740481C1C}">
+                  <a14:useLocalDpi xmlns:a14="http://schemas.microsoft.com/office/drawing/2010/main" val="0"/>
+                </a:ext>
+              </a:extLst>
+            </a:blip>
+            <a:stretch>
+              <a:fillRect/>
+            </a:stretch>
+          </p:blipFill>
+          <p:spPr>
+            <a:xfrm flipH="1">
+              <a:off x="2887074" y="6083191"/>
+              <a:ext cx="255789" cy="218495"/>
+            </a:xfrm>
+            <a:prstGeom prst="rect">
+              <a:avLst/>
+            </a:prstGeom>
+          </p:spPr>
+        </p:pic>
+        <p:pic>
+          <p:nvPicPr>
+            <p:cNvPr id="19" name="Picture 18"/>
+            <p:cNvPicPr>
+              <a:picLocks noChangeAspect="1"/>
+            </p:cNvPicPr>
+            <p:nvPr/>
+          </p:nvPicPr>
+          <p:blipFill>
+            <a:blip r:embed="rId3" cstate="print">
+              <a:extLst>
+                <a:ext uri="{28A0092B-C50C-407E-A947-70E740481C1C}">
+                  <a14:useLocalDpi xmlns:a14="http://schemas.microsoft.com/office/drawing/2010/main" val="0"/>
+                </a:ext>
+              </a:extLst>
+            </a:blip>
+            <a:stretch>
+              <a:fillRect/>
+            </a:stretch>
+          </p:blipFill>
+          <p:spPr>
+            <a:xfrm>
+              <a:off x="8684161" y="6098817"/>
+              <a:ext cx="325640" cy="161565"/>
+            </a:xfrm>
+            <a:prstGeom prst="rect">
+              <a:avLst/>
+            </a:prstGeom>
+          </p:spPr>
+        </p:pic>
+        <p:pic>
+          <p:nvPicPr>
+            <p:cNvPr id="20" name="Picture 19"/>
+            <p:cNvPicPr>
+              <a:picLocks noChangeAspect="1"/>
+            </p:cNvPicPr>
+            <p:nvPr/>
+          </p:nvPicPr>
+          <p:blipFill>
+            <a:blip r:embed="rId4" cstate="print">
+              <a:extLst>
+                <a:ext uri="{28A0092B-C50C-407E-A947-70E740481C1C}">
+                  <a14:useLocalDpi xmlns:a14="http://schemas.microsoft.com/office/drawing/2010/main" val="0"/>
+                </a:ext>
+              </a:extLst>
+            </a:blip>
+            <a:stretch>
+              <a:fillRect/>
+            </a:stretch>
+          </p:blipFill>
+          <p:spPr>
+            <a:xfrm>
+              <a:off x="9534141" y="6085939"/>
+              <a:ext cx="306915" cy="187009"/>
+            </a:xfrm>
+            <a:prstGeom prst="rect">
+              <a:avLst/>
+            </a:prstGeom>
+          </p:spPr>
+        </p:pic>
+        <p:pic>
+          <p:nvPicPr>
+            <p:cNvPr id="21" name="Picture 20"/>
+            <p:cNvPicPr>
+              <a:picLocks noChangeAspect="1"/>
+            </p:cNvPicPr>
+            <p:nvPr/>
+          </p:nvPicPr>
+          <p:blipFill>
+            <a:blip r:embed="rId5" cstate="print">
+              <a:extLst>
+                <a:ext uri="{28A0092B-C50C-407E-A947-70E740481C1C}">
+                  <a14:useLocalDpi xmlns:a14="http://schemas.microsoft.com/office/drawing/2010/main" val="0"/>
+                </a:ext>
+              </a:extLst>
+            </a:blip>
+            <a:stretch>
+              <a:fillRect/>
+            </a:stretch>
+          </p:blipFill>
+          <p:spPr>
+            <a:xfrm>
+              <a:off x="8314521" y="6066646"/>
+              <a:ext cx="223459" cy="225596"/>
+            </a:xfrm>
+            <a:prstGeom prst="rect">
+              <a:avLst/>
+            </a:prstGeom>
+          </p:spPr>
+        </p:pic>
+        <p:pic>
+          <p:nvPicPr>
+            <p:cNvPr id="22" name="Picture 21"/>
+            <p:cNvPicPr>
+              <a:picLocks noChangeAspect="1"/>
+            </p:cNvPicPr>
+            <p:nvPr/>
+          </p:nvPicPr>
+          <p:blipFill>
+            <a:blip r:embed="rId6" cstate="print">
+              <a:extLst>
+                <a:ext uri="{28A0092B-C50C-407E-A947-70E740481C1C}">
+                  <a14:useLocalDpi xmlns:a14="http://schemas.microsoft.com/office/drawing/2010/main" val="0"/>
+                </a:ext>
+              </a:extLst>
+            </a:blip>
+            <a:stretch>
+              <a:fillRect/>
+            </a:stretch>
+          </p:blipFill>
+          <p:spPr>
+            <a:xfrm>
+              <a:off x="9966033" y="6081695"/>
+              <a:ext cx="280633" cy="225596"/>
+            </a:xfrm>
+            <a:prstGeom prst="rect">
+              <a:avLst/>
+            </a:prstGeom>
+          </p:spPr>
+        </p:pic>
+        <p:pic>
+          <p:nvPicPr>
+            <p:cNvPr id="23" name="Picture 22"/>
+            <p:cNvPicPr>
+              <a:picLocks noChangeAspect="1"/>
+            </p:cNvPicPr>
+            <p:nvPr/>
+          </p:nvPicPr>
+          <p:blipFill>
+            <a:blip r:embed="rId7" cstate="print">
+              <a:extLst>
+                <a:ext uri="{28A0092B-C50C-407E-A947-70E740481C1C}">
+                  <a14:useLocalDpi xmlns:a14="http://schemas.microsoft.com/office/drawing/2010/main" val="0"/>
+                </a:ext>
+              </a:extLst>
+            </a:blip>
+            <a:stretch>
+              <a:fillRect/>
+            </a:stretch>
+          </p:blipFill>
+          <p:spPr>
+            <a:xfrm>
+              <a:off x="7913996" y="6079941"/>
+              <a:ext cx="254344" cy="224100"/>
+            </a:xfrm>
+            <a:prstGeom prst="rect">
+              <a:avLst/>
+            </a:prstGeom>
+          </p:spPr>
+        </p:pic>
+        <p:pic>
+          <p:nvPicPr>
+            <p:cNvPr id="24" name="Picture 23"/>
+            <p:cNvPicPr>
+              <a:picLocks noChangeAspect="1"/>
+            </p:cNvPicPr>
+            <p:nvPr/>
+          </p:nvPicPr>
+          <p:blipFill>
+            <a:blip r:embed="rId8" cstate="print">
+              <a:extLst>
+                <a:ext uri="{28A0092B-C50C-407E-A947-70E740481C1C}">
+                  <a14:useLocalDpi xmlns:a14="http://schemas.microsoft.com/office/drawing/2010/main" val="0"/>
+                </a:ext>
+              </a:extLst>
+            </a:blip>
+            <a:stretch>
+              <a:fillRect/>
+            </a:stretch>
+          </p:blipFill>
+          <p:spPr>
+            <a:xfrm>
+              <a:off x="9134778" y="6081481"/>
+              <a:ext cx="274386" cy="225596"/>
+            </a:xfrm>
+            <a:prstGeom prst="rect">
+              <a:avLst/>
+            </a:prstGeom>
+          </p:spPr>
+        </p:pic>
+        <p:pic>
+          <p:nvPicPr>
+            <p:cNvPr id="25" name="Picture 24"/>
+            <p:cNvPicPr>
+              <a:picLocks noChangeAspect="1"/>
+            </p:cNvPicPr>
+            <p:nvPr/>
+          </p:nvPicPr>
+          <p:blipFill>
+            <a:blip r:embed="rId9" cstate="print">
+              <a:extLst>
+                <a:ext uri="{28A0092B-C50C-407E-A947-70E740481C1C}">
+                  <a14:useLocalDpi xmlns:a14="http://schemas.microsoft.com/office/drawing/2010/main" val="0"/>
+                </a:ext>
+              </a:extLst>
+            </a:blip>
+            <a:stretch>
+              <a:fillRect/>
+            </a:stretch>
+          </p:blipFill>
+          <p:spPr>
+            <a:xfrm flipH="1">
+              <a:off x="7507667" y="6079941"/>
+              <a:ext cx="255789" cy="218495"/>
+            </a:xfrm>
+            <a:prstGeom prst="rect">
+              <a:avLst/>
+            </a:prstGeom>
+          </p:spPr>
+        </p:pic>
+      </p:grpSp>
     </p:spTree>
     <p:extLst>
       <p:ext uri="{BB962C8B-B14F-4D97-AF65-F5344CB8AC3E}">

</xml_diff>

<commit_message>
corrected ordering issue in CT factor taxa names
</commit_message>
<xml_diff>
--- a/output/plots/Presentation1.pptx
+++ b/output/plots/Presentation1.pptx
@@ -245,7 +245,7 @@
           <a:p>
             <a:fld id="{916B8C92-D5E3-4480-8685-D57BEE386DE2}" type="datetimeFigureOut">
               <a:rPr lang="en-US" smtClean="0"/>
-              <a:t>11/16/2016</a:t>
+              <a:t>11/22/2016</a:t>
             </a:fld>
             <a:endParaRPr lang="en-US"/>
           </a:p>
@@ -415,7 +415,7 @@
           <a:p>
             <a:fld id="{916B8C92-D5E3-4480-8685-D57BEE386DE2}" type="datetimeFigureOut">
               <a:rPr lang="en-US" smtClean="0"/>
-              <a:t>11/16/2016</a:t>
+              <a:t>11/22/2016</a:t>
             </a:fld>
             <a:endParaRPr lang="en-US"/>
           </a:p>
@@ -595,7 +595,7 @@
           <a:p>
             <a:fld id="{916B8C92-D5E3-4480-8685-D57BEE386DE2}" type="datetimeFigureOut">
               <a:rPr lang="en-US" smtClean="0"/>
-              <a:t>11/16/2016</a:t>
+              <a:t>11/22/2016</a:t>
             </a:fld>
             <a:endParaRPr lang="en-US"/>
           </a:p>
@@ -765,7 +765,7 @@
           <a:p>
             <a:fld id="{916B8C92-D5E3-4480-8685-D57BEE386DE2}" type="datetimeFigureOut">
               <a:rPr lang="en-US" smtClean="0"/>
-              <a:t>11/16/2016</a:t>
+              <a:t>11/22/2016</a:t>
             </a:fld>
             <a:endParaRPr lang="en-US"/>
           </a:p>
@@ -1011,7 +1011,7 @@
           <a:p>
             <a:fld id="{916B8C92-D5E3-4480-8685-D57BEE386DE2}" type="datetimeFigureOut">
               <a:rPr lang="en-US" smtClean="0"/>
-              <a:t>11/16/2016</a:t>
+              <a:t>11/22/2016</a:t>
             </a:fld>
             <a:endParaRPr lang="en-US"/>
           </a:p>
@@ -1243,7 +1243,7 @@
           <a:p>
             <a:fld id="{916B8C92-D5E3-4480-8685-D57BEE386DE2}" type="datetimeFigureOut">
               <a:rPr lang="en-US" smtClean="0"/>
-              <a:t>11/16/2016</a:t>
+              <a:t>11/22/2016</a:t>
             </a:fld>
             <a:endParaRPr lang="en-US"/>
           </a:p>
@@ -1610,7 +1610,7 @@
           <a:p>
             <a:fld id="{916B8C92-D5E3-4480-8685-D57BEE386DE2}" type="datetimeFigureOut">
               <a:rPr lang="en-US" smtClean="0"/>
-              <a:t>11/16/2016</a:t>
+              <a:t>11/22/2016</a:t>
             </a:fld>
             <a:endParaRPr lang="en-US"/>
           </a:p>
@@ -1728,7 +1728,7 @@
           <a:p>
             <a:fld id="{916B8C92-D5E3-4480-8685-D57BEE386DE2}" type="datetimeFigureOut">
               <a:rPr lang="en-US" smtClean="0"/>
-              <a:t>11/16/2016</a:t>
+              <a:t>11/22/2016</a:t>
             </a:fld>
             <a:endParaRPr lang="en-US"/>
           </a:p>
@@ -1823,7 +1823,7 @@
           <a:p>
             <a:fld id="{916B8C92-D5E3-4480-8685-D57BEE386DE2}" type="datetimeFigureOut">
               <a:rPr lang="en-US" smtClean="0"/>
-              <a:t>11/16/2016</a:t>
+              <a:t>11/22/2016</a:t>
             </a:fld>
             <a:endParaRPr lang="en-US"/>
           </a:p>
@@ -2100,7 +2100,7 @@
           <a:p>
             <a:fld id="{916B8C92-D5E3-4480-8685-D57BEE386DE2}" type="datetimeFigureOut">
               <a:rPr lang="en-US" smtClean="0"/>
-              <a:t>11/16/2016</a:t>
+              <a:t>11/22/2016</a:t>
             </a:fld>
             <a:endParaRPr lang="en-US"/>
           </a:p>
@@ -2353,7 +2353,7 @@
           <a:p>
             <a:fld id="{916B8C92-D5E3-4480-8685-D57BEE386DE2}" type="datetimeFigureOut">
               <a:rPr lang="en-US" smtClean="0"/>
-              <a:t>11/16/2016</a:t>
+              <a:t>11/22/2016</a:t>
             </a:fld>
             <a:endParaRPr lang="en-US"/>
           </a:p>
@@ -2566,7 +2566,7 @@
           <a:p>
             <a:fld id="{916B8C92-D5E3-4480-8685-D57BEE386DE2}" type="datetimeFigureOut">
               <a:rPr lang="en-US" smtClean="0"/>
-              <a:t>11/16/2016</a:t>
+              <a:t>11/22/2016</a:t>
             </a:fld>
             <a:endParaRPr lang="en-US"/>
           </a:p>
@@ -3984,49 +3984,6 @@
           <a:chExt cx="0" cy="0"/>
         </a:xfrm>
       </p:grpSpPr>
-      <p:sp>
-        <p:nvSpPr>
-          <p:cNvPr id="41" name="Rectangle 40"/>
-          <p:cNvSpPr/>
-          <p:nvPr/>
-        </p:nvSpPr>
-        <p:spPr>
-          <a:xfrm>
-            <a:off x="3088433" y="5164914"/>
-            <a:ext cx="671804" cy="284164"/>
-          </a:xfrm>
-          <a:prstGeom prst="rect">
-            <a:avLst/>
-          </a:prstGeom>
-          <a:solidFill>
-            <a:schemeClr val="bg1"/>
-          </a:solidFill>
-        </p:spPr>
-        <p:style>
-          <a:lnRef idx="2">
-            <a:schemeClr val="accent1">
-              <a:shade val="50000"/>
-            </a:schemeClr>
-          </a:lnRef>
-          <a:fillRef idx="1">
-            <a:schemeClr val="accent1"/>
-          </a:fillRef>
-          <a:effectRef idx="0">
-            <a:schemeClr val="accent1"/>
-          </a:effectRef>
-          <a:fontRef idx="minor">
-            <a:schemeClr val="lt1"/>
-          </a:fontRef>
-        </p:style>
-        <p:txBody>
-          <a:bodyPr rtlCol="0" anchor="ctr"/>
-          <a:lstStyle/>
-          <a:p>
-            <a:pPr algn="ctr"/>
-            <a:endParaRPr lang="en-US"/>
-          </a:p>
-        </p:txBody>
-      </p:sp>
       <p:pic>
         <p:nvPicPr>
           <p:cNvPr id="2" name="Picture 1"/>
@@ -4043,434 +4000,449 @@
         </p:blipFill>
         <p:spPr>
           <a:xfrm>
-            <a:off x="4340" y="1138844"/>
-            <a:ext cx="12187660" cy="4443324"/>
+            <a:off x="-1" y="969965"/>
+            <a:ext cx="12192001" cy="4878645"/>
           </a:xfrm>
           <a:prstGeom prst="rect">
             <a:avLst/>
           </a:prstGeom>
         </p:spPr>
       </p:pic>
-      <p:pic>
-        <p:nvPicPr>
-          <p:cNvPr id="6" name="Picture 5"/>
-          <p:cNvPicPr>
-            <a:picLocks noChangeAspect="1"/>
-          </p:cNvPicPr>
+      <p:grpSp>
+        <p:nvGrpSpPr>
+          <p:cNvPr id="5" name="Group 4"/>
+          <p:cNvGrpSpPr/>
           <p:nvPr/>
-        </p:nvPicPr>
-        <p:blipFill>
-          <a:blip r:embed="rId3" cstate="print">
-            <a:extLst>
-              <a:ext uri="{28A0092B-C50C-407E-A947-70E740481C1C}">
-                <a14:useLocalDpi xmlns:a14="http://schemas.microsoft.com/office/drawing/2010/main" val="0"/>
-              </a:ext>
-            </a:extLst>
-          </a:blip>
-          <a:stretch>
-            <a:fillRect/>
-          </a:stretch>
-        </p:blipFill>
-        <p:spPr>
+        </p:nvGrpSpPr>
+        <p:grpSpPr>
           <a:xfrm>
-            <a:off x="3860375" y="4950875"/>
-            <a:ext cx="541407" cy="268617"/>
+            <a:off x="1059886" y="4797038"/>
+            <a:ext cx="10941738" cy="501885"/>
+            <a:chOff x="1068199" y="4780413"/>
+            <a:chExt cx="10941738" cy="501885"/>
           </a:xfrm>
-          <a:prstGeom prst="rect">
-            <a:avLst/>
-          </a:prstGeom>
-        </p:spPr>
-      </p:pic>
-      <p:pic>
-        <p:nvPicPr>
-          <p:cNvPr id="7" name="Picture 6"/>
-          <p:cNvPicPr>
-            <a:picLocks noChangeAspect="1"/>
-          </p:cNvPicPr>
-          <p:nvPr/>
-        </p:nvPicPr>
-        <p:blipFill>
-          <a:blip r:embed="rId4" cstate="print">
-            <a:extLst>
-              <a:ext uri="{28A0092B-C50C-407E-A947-70E740481C1C}">
-                <a14:useLocalDpi xmlns:a14="http://schemas.microsoft.com/office/drawing/2010/main" val="0"/>
-              </a:ext>
-            </a:extLst>
-          </a:blip>
-          <a:stretch>
-            <a:fillRect/>
-          </a:stretch>
-        </p:blipFill>
-        <p:spPr>
-          <a:xfrm>
-            <a:off x="4589043" y="4907807"/>
-            <a:ext cx="510273" cy="310919"/>
-          </a:xfrm>
-          <a:prstGeom prst="rect">
-            <a:avLst/>
-          </a:prstGeom>
-        </p:spPr>
-      </p:pic>
-      <p:pic>
-        <p:nvPicPr>
-          <p:cNvPr id="9" name="Picture 8"/>
-          <p:cNvPicPr>
-            <a:picLocks noChangeAspect="1"/>
-          </p:cNvPicPr>
-          <p:nvPr/>
-        </p:nvPicPr>
-        <p:blipFill>
-          <a:blip r:embed="rId5" cstate="print">
-            <a:extLst>
-              <a:ext uri="{28A0092B-C50C-407E-A947-70E740481C1C}">
-                <a14:useLocalDpi xmlns:a14="http://schemas.microsoft.com/office/drawing/2010/main" val="0"/>
-              </a:ext>
-            </a:extLst>
-          </a:blip>
-          <a:stretch>
-            <a:fillRect/>
-          </a:stretch>
-        </p:blipFill>
-        <p:spPr>
-          <a:xfrm>
-            <a:off x="3203119" y="4844417"/>
-            <a:ext cx="371522" cy="375075"/>
-          </a:xfrm>
-          <a:prstGeom prst="rect">
-            <a:avLst/>
-          </a:prstGeom>
-        </p:spPr>
-      </p:pic>
-      <p:pic>
-        <p:nvPicPr>
-          <p:cNvPr id="10" name="Picture 9"/>
-          <p:cNvPicPr>
-            <a:picLocks noChangeAspect="1"/>
-          </p:cNvPicPr>
-          <p:nvPr/>
-        </p:nvPicPr>
-        <p:blipFill>
-          <a:blip r:embed="rId6" cstate="print">
-            <a:extLst>
-              <a:ext uri="{28A0092B-C50C-407E-A947-70E740481C1C}">
-                <a14:useLocalDpi xmlns:a14="http://schemas.microsoft.com/office/drawing/2010/main" val="0"/>
-              </a:ext>
-            </a:extLst>
-          </a:blip>
-          <a:stretch>
-            <a:fillRect/>
-          </a:stretch>
-        </p:blipFill>
-        <p:spPr>
-          <a:xfrm>
-            <a:off x="1706433" y="4897645"/>
-            <a:ext cx="466579" cy="375075"/>
-          </a:xfrm>
-          <a:prstGeom prst="rect">
-            <a:avLst/>
-          </a:prstGeom>
-        </p:spPr>
-      </p:pic>
-      <p:pic>
-        <p:nvPicPr>
-          <p:cNvPr id="11" name="Picture 10"/>
-          <p:cNvPicPr>
-            <a:picLocks noChangeAspect="1"/>
-          </p:cNvPicPr>
-          <p:nvPr/>
-        </p:nvPicPr>
-        <p:blipFill>
-          <a:blip r:embed="rId7" cstate="print">
-            <a:extLst>
-              <a:ext uri="{28A0092B-C50C-407E-A947-70E740481C1C}">
-                <a14:useLocalDpi xmlns:a14="http://schemas.microsoft.com/office/drawing/2010/main" val="0"/>
-              </a:ext>
-            </a:extLst>
-          </a:blip>
-          <a:stretch>
-            <a:fillRect/>
-          </a:stretch>
-        </p:blipFill>
-        <p:spPr>
-          <a:xfrm>
-            <a:off x="999494" y="4879745"/>
-            <a:ext cx="422871" cy="372587"/>
-          </a:xfrm>
-          <a:prstGeom prst="rect">
-            <a:avLst/>
-          </a:prstGeom>
-        </p:spPr>
-      </p:pic>
-      <p:pic>
-        <p:nvPicPr>
-          <p:cNvPr id="3" name="Picture 2"/>
-          <p:cNvPicPr>
-            <a:picLocks noChangeAspect="1"/>
-          </p:cNvPicPr>
-          <p:nvPr/>
-        </p:nvPicPr>
-        <p:blipFill>
-          <a:blip r:embed="rId8" cstate="print">
-            <a:extLst>
-              <a:ext uri="{28A0092B-C50C-407E-A947-70E740481C1C}">
-                <a14:useLocalDpi xmlns:a14="http://schemas.microsoft.com/office/drawing/2010/main" val="0"/>
-              </a:ext>
-            </a:extLst>
-          </a:blip>
-          <a:stretch>
-            <a:fillRect/>
-          </a:stretch>
-        </p:blipFill>
-        <p:spPr>
-          <a:xfrm>
-            <a:off x="2445279" y="4879000"/>
-            <a:ext cx="456193" cy="375075"/>
-          </a:xfrm>
-          <a:prstGeom prst="rect">
-            <a:avLst/>
-          </a:prstGeom>
-        </p:spPr>
-      </p:pic>
-      <p:pic>
-        <p:nvPicPr>
-          <p:cNvPr id="33" name="Picture 32"/>
-          <p:cNvPicPr>
-            <a:picLocks noChangeAspect="1"/>
-          </p:cNvPicPr>
-          <p:nvPr/>
-        </p:nvPicPr>
-        <p:blipFill>
-          <a:blip r:embed="rId3" cstate="print">
-            <a:extLst>
-              <a:ext uri="{28A0092B-C50C-407E-A947-70E740481C1C}">
-                <a14:useLocalDpi xmlns:a14="http://schemas.microsoft.com/office/drawing/2010/main" val="0"/>
-              </a:ext>
-            </a:extLst>
-          </a:blip>
-          <a:stretch>
-            <a:fillRect/>
-          </a:stretch>
-        </p:blipFill>
-        <p:spPr>
-          <a:xfrm>
-            <a:off x="10049681" y="4897063"/>
-            <a:ext cx="541407" cy="268617"/>
-          </a:xfrm>
-          <a:prstGeom prst="rect">
-            <a:avLst/>
-          </a:prstGeom>
-        </p:spPr>
-      </p:pic>
-      <p:pic>
-        <p:nvPicPr>
-          <p:cNvPr id="34" name="Picture 33"/>
-          <p:cNvPicPr>
-            <a:picLocks noChangeAspect="1"/>
-          </p:cNvPicPr>
-          <p:nvPr/>
-        </p:nvPicPr>
-        <p:blipFill>
-          <a:blip r:embed="rId4" cstate="print">
-            <a:extLst>
-              <a:ext uri="{28A0092B-C50C-407E-A947-70E740481C1C}">
-                <a14:useLocalDpi xmlns:a14="http://schemas.microsoft.com/office/drawing/2010/main" val="0"/>
-              </a:ext>
-            </a:extLst>
-          </a:blip>
-          <a:stretch>
-            <a:fillRect/>
-          </a:stretch>
-        </p:blipFill>
-        <p:spPr>
-          <a:xfrm>
-            <a:off x="10778349" y="4853995"/>
-            <a:ext cx="510273" cy="310919"/>
-          </a:xfrm>
-          <a:prstGeom prst="rect">
-            <a:avLst/>
-          </a:prstGeom>
-        </p:spPr>
-      </p:pic>
-      <p:pic>
-        <p:nvPicPr>
-          <p:cNvPr id="35" name="Picture 34"/>
-          <p:cNvPicPr>
-            <a:picLocks noChangeAspect="1"/>
-          </p:cNvPicPr>
-          <p:nvPr/>
-        </p:nvPicPr>
-        <p:blipFill>
-          <a:blip r:embed="rId5" cstate="print">
-            <a:extLst>
-              <a:ext uri="{28A0092B-C50C-407E-A947-70E740481C1C}">
-                <a14:useLocalDpi xmlns:a14="http://schemas.microsoft.com/office/drawing/2010/main" val="0"/>
-              </a:ext>
-            </a:extLst>
-          </a:blip>
-          <a:stretch>
-            <a:fillRect/>
-          </a:stretch>
-        </p:blipFill>
-        <p:spPr>
-          <a:xfrm>
-            <a:off x="9385232" y="4780413"/>
-            <a:ext cx="371522" cy="375075"/>
-          </a:xfrm>
-          <a:prstGeom prst="rect">
-            <a:avLst/>
-          </a:prstGeom>
-        </p:spPr>
-      </p:pic>
-      <p:pic>
-        <p:nvPicPr>
-          <p:cNvPr id="36" name="Picture 35"/>
-          <p:cNvPicPr>
-            <a:picLocks noChangeAspect="1"/>
-          </p:cNvPicPr>
-          <p:nvPr/>
-        </p:nvPicPr>
-        <p:blipFill>
-          <a:blip r:embed="rId6" cstate="print">
-            <a:extLst>
-              <a:ext uri="{28A0092B-C50C-407E-A947-70E740481C1C}">
-                <a14:useLocalDpi xmlns:a14="http://schemas.microsoft.com/office/drawing/2010/main" val="0"/>
-              </a:ext>
-            </a:extLst>
-          </a:blip>
-          <a:stretch>
-            <a:fillRect/>
-          </a:stretch>
-        </p:blipFill>
-        <p:spPr>
-          <a:xfrm>
-            <a:off x="7895739" y="4843833"/>
-            <a:ext cx="466579" cy="375075"/>
-          </a:xfrm>
-          <a:prstGeom prst="rect">
-            <a:avLst/>
-          </a:prstGeom>
-        </p:spPr>
-      </p:pic>
-      <p:pic>
-        <p:nvPicPr>
-          <p:cNvPr id="37" name="Picture 36"/>
-          <p:cNvPicPr>
-            <a:picLocks noChangeAspect="1"/>
-          </p:cNvPicPr>
-          <p:nvPr/>
-        </p:nvPicPr>
-        <p:blipFill>
-          <a:blip r:embed="rId7" cstate="print">
-            <a:extLst>
-              <a:ext uri="{28A0092B-C50C-407E-A947-70E740481C1C}">
-                <a14:useLocalDpi xmlns:a14="http://schemas.microsoft.com/office/drawing/2010/main" val="0"/>
-              </a:ext>
-            </a:extLst>
-          </a:blip>
-          <a:stretch>
-            <a:fillRect/>
-          </a:stretch>
-        </p:blipFill>
-        <p:spPr>
-          <a:xfrm>
-            <a:off x="7188800" y="4825933"/>
-            <a:ext cx="422871" cy="372587"/>
-          </a:xfrm>
-          <a:prstGeom prst="rect">
-            <a:avLst/>
-          </a:prstGeom>
-        </p:spPr>
-      </p:pic>
-      <p:pic>
-        <p:nvPicPr>
-          <p:cNvPr id="38" name="Picture 37"/>
-          <p:cNvPicPr>
-            <a:picLocks noChangeAspect="1"/>
-          </p:cNvPicPr>
-          <p:nvPr/>
-        </p:nvPicPr>
-        <p:blipFill>
-          <a:blip r:embed="rId8" cstate="print">
-            <a:extLst>
-              <a:ext uri="{28A0092B-C50C-407E-A947-70E740481C1C}">
-                <a14:useLocalDpi xmlns:a14="http://schemas.microsoft.com/office/drawing/2010/main" val="0"/>
-              </a:ext>
-            </a:extLst>
-          </a:blip>
-          <a:stretch>
-            <a:fillRect/>
-          </a:stretch>
-        </p:blipFill>
-        <p:spPr>
-          <a:xfrm>
-            <a:off x="8634585" y="4825188"/>
-            <a:ext cx="456193" cy="375075"/>
-          </a:xfrm>
-          <a:prstGeom prst="rect">
-            <a:avLst/>
-          </a:prstGeom>
-        </p:spPr>
-      </p:pic>
-      <p:pic>
-        <p:nvPicPr>
-          <p:cNvPr id="39" name="Picture 38"/>
-          <p:cNvPicPr>
-            <a:picLocks noChangeAspect="1"/>
-          </p:cNvPicPr>
-          <p:nvPr/>
-        </p:nvPicPr>
-        <p:blipFill>
-          <a:blip r:embed="rId9" cstate="print">
-            <a:extLst>
-              <a:ext uri="{28A0092B-C50C-407E-A947-70E740481C1C}">
-                <a14:useLocalDpi xmlns:a14="http://schemas.microsoft.com/office/drawing/2010/main" val="0"/>
-              </a:ext>
-            </a:extLst>
-          </a:blip>
-          <a:stretch>
-            <a:fillRect/>
-          </a:stretch>
-        </p:blipFill>
-        <p:spPr>
-          <a:xfrm flipH="1">
-            <a:off x="5432524" y="4897063"/>
-            <a:ext cx="425272" cy="363268"/>
-          </a:xfrm>
-          <a:prstGeom prst="rect">
-            <a:avLst/>
-          </a:prstGeom>
-        </p:spPr>
-      </p:pic>
-      <p:pic>
-        <p:nvPicPr>
-          <p:cNvPr id="40" name="Picture 39"/>
-          <p:cNvPicPr>
-            <a:picLocks noChangeAspect="1"/>
-          </p:cNvPicPr>
-          <p:nvPr/>
-        </p:nvPicPr>
-        <p:blipFill>
-          <a:blip r:embed="rId9" cstate="print">
-            <a:extLst>
-              <a:ext uri="{28A0092B-C50C-407E-A947-70E740481C1C}">
-                <a14:useLocalDpi xmlns:a14="http://schemas.microsoft.com/office/drawing/2010/main" val="0"/>
-              </a:ext>
-            </a:extLst>
-          </a:blip>
-          <a:stretch>
-            <a:fillRect/>
-          </a:stretch>
-        </p:blipFill>
-        <p:spPr>
-          <a:xfrm flipH="1">
-            <a:off x="11527675" y="4843833"/>
-            <a:ext cx="425272" cy="363268"/>
-          </a:xfrm>
-          <a:prstGeom prst="rect">
-            <a:avLst/>
-          </a:prstGeom>
-        </p:spPr>
-      </p:pic>
+        </p:grpSpPr>
+        <p:pic>
+          <p:nvPicPr>
+            <p:cNvPr id="6" name="Picture 5"/>
+            <p:cNvPicPr>
+              <a:picLocks noChangeAspect="1"/>
+            </p:cNvPicPr>
+            <p:nvPr/>
+          </p:nvPicPr>
+          <p:blipFill>
+            <a:blip r:embed="rId3" cstate="print">
+              <a:extLst>
+                <a:ext uri="{28A0092B-C50C-407E-A947-70E740481C1C}">
+                  <a14:useLocalDpi xmlns:a14="http://schemas.microsoft.com/office/drawing/2010/main" val="0"/>
+                </a:ext>
+              </a:extLst>
+            </a:blip>
+            <a:stretch>
+              <a:fillRect/>
+            </a:stretch>
+          </p:blipFill>
+          <p:spPr>
+            <a:xfrm>
+              <a:off x="3929080" y="4960453"/>
+              <a:ext cx="541407" cy="268617"/>
+            </a:xfrm>
+            <a:prstGeom prst="rect">
+              <a:avLst/>
+            </a:prstGeom>
+          </p:spPr>
+        </p:pic>
+        <p:pic>
+          <p:nvPicPr>
+            <p:cNvPr id="7" name="Picture 6"/>
+            <p:cNvPicPr>
+              <a:picLocks noChangeAspect="1"/>
+            </p:cNvPicPr>
+            <p:nvPr/>
+          </p:nvPicPr>
+          <p:blipFill>
+            <a:blip r:embed="rId4" cstate="print">
+              <a:extLst>
+                <a:ext uri="{28A0092B-C50C-407E-A947-70E740481C1C}">
+                  <a14:useLocalDpi xmlns:a14="http://schemas.microsoft.com/office/drawing/2010/main" val="0"/>
+                </a:ext>
+              </a:extLst>
+            </a:blip>
+            <a:stretch>
+              <a:fillRect/>
+            </a:stretch>
+          </p:blipFill>
+          <p:spPr>
+            <a:xfrm>
+              <a:off x="4657748" y="4917385"/>
+              <a:ext cx="510273" cy="310919"/>
+            </a:xfrm>
+            <a:prstGeom prst="rect">
+              <a:avLst/>
+            </a:prstGeom>
+          </p:spPr>
+        </p:pic>
+        <p:pic>
+          <p:nvPicPr>
+            <p:cNvPr id="9" name="Picture 8"/>
+            <p:cNvPicPr>
+              <a:picLocks noChangeAspect="1"/>
+            </p:cNvPicPr>
+            <p:nvPr/>
+          </p:nvPicPr>
+          <p:blipFill>
+            <a:blip r:embed="rId5" cstate="print">
+              <a:extLst>
+                <a:ext uri="{28A0092B-C50C-407E-A947-70E740481C1C}">
+                  <a14:useLocalDpi xmlns:a14="http://schemas.microsoft.com/office/drawing/2010/main" val="0"/>
+                </a:ext>
+              </a:extLst>
+            </a:blip>
+            <a:stretch>
+              <a:fillRect/>
+            </a:stretch>
+          </p:blipFill>
+          <p:spPr>
+            <a:xfrm>
+              <a:off x="3271824" y="4853995"/>
+              <a:ext cx="371522" cy="375075"/>
+            </a:xfrm>
+            <a:prstGeom prst="rect">
+              <a:avLst/>
+            </a:prstGeom>
+          </p:spPr>
+        </p:pic>
+        <p:pic>
+          <p:nvPicPr>
+            <p:cNvPr id="10" name="Picture 9"/>
+            <p:cNvPicPr>
+              <a:picLocks noChangeAspect="1"/>
+            </p:cNvPicPr>
+            <p:nvPr/>
+          </p:nvPicPr>
+          <p:blipFill>
+            <a:blip r:embed="rId6" cstate="print">
+              <a:extLst>
+                <a:ext uri="{28A0092B-C50C-407E-A947-70E740481C1C}">
+                  <a14:useLocalDpi xmlns:a14="http://schemas.microsoft.com/office/drawing/2010/main" val="0"/>
+                </a:ext>
+              </a:extLst>
+            </a:blip>
+            <a:stretch>
+              <a:fillRect/>
+            </a:stretch>
+          </p:blipFill>
+          <p:spPr>
+            <a:xfrm>
+              <a:off x="1775138" y="4907223"/>
+              <a:ext cx="466579" cy="375075"/>
+            </a:xfrm>
+            <a:prstGeom prst="rect">
+              <a:avLst/>
+            </a:prstGeom>
+          </p:spPr>
+        </p:pic>
+        <p:pic>
+          <p:nvPicPr>
+            <p:cNvPr id="11" name="Picture 10"/>
+            <p:cNvPicPr>
+              <a:picLocks noChangeAspect="1"/>
+            </p:cNvPicPr>
+            <p:nvPr/>
+          </p:nvPicPr>
+          <p:blipFill>
+            <a:blip r:embed="rId7" cstate="print">
+              <a:extLst>
+                <a:ext uri="{28A0092B-C50C-407E-A947-70E740481C1C}">
+                  <a14:useLocalDpi xmlns:a14="http://schemas.microsoft.com/office/drawing/2010/main" val="0"/>
+                </a:ext>
+              </a:extLst>
+            </a:blip>
+            <a:stretch>
+              <a:fillRect/>
+            </a:stretch>
+          </p:blipFill>
+          <p:spPr>
+            <a:xfrm>
+              <a:off x="1068199" y="4889323"/>
+              <a:ext cx="422871" cy="372587"/>
+            </a:xfrm>
+            <a:prstGeom prst="rect">
+              <a:avLst/>
+            </a:prstGeom>
+          </p:spPr>
+        </p:pic>
+        <p:pic>
+          <p:nvPicPr>
+            <p:cNvPr id="3" name="Picture 2"/>
+            <p:cNvPicPr>
+              <a:picLocks noChangeAspect="1"/>
+            </p:cNvPicPr>
+            <p:nvPr/>
+          </p:nvPicPr>
+          <p:blipFill>
+            <a:blip r:embed="rId8" cstate="print">
+              <a:extLst>
+                <a:ext uri="{28A0092B-C50C-407E-A947-70E740481C1C}">
+                  <a14:useLocalDpi xmlns:a14="http://schemas.microsoft.com/office/drawing/2010/main" val="0"/>
+                </a:ext>
+              </a:extLst>
+            </a:blip>
+            <a:stretch>
+              <a:fillRect/>
+            </a:stretch>
+          </p:blipFill>
+          <p:spPr>
+            <a:xfrm>
+              <a:off x="2513984" y="4888578"/>
+              <a:ext cx="456193" cy="375075"/>
+            </a:xfrm>
+            <a:prstGeom prst="rect">
+              <a:avLst/>
+            </a:prstGeom>
+          </p:spPr>
+        </p:pic>
+        <p:pic>
+          <p:nvPicPr>
+            <p:cNvPr id="33" name="Picture 32"/>
+            <p:cNvPicPr>
+              <a:picLocks noChangeAspect="1"/>
+            </p:cNvPicPr>
+            <p:nvPr/>
+          </p:nvPicPr>
+          <p:blipFill>
+            <a:blip r:embed="rId3" cstate="print">
+              <a:extLst>
+                <a:ext uri="{28A0092B-C50C-407E-A947-70E740481C1C}">
+                  <a14:useLocalDpi xmlns:a14="http://schemas.microsoft.com/office/drawing/2010/main" val="0"/>
+                </a:ext>
+              </a:extLst>
+            </a:blip>
+            <a:stretch>
+              <a:fillRect/>
+            </a:stretch>
+          </p:blipFill>
+          <p:spPr>
+            <a:xfrm>
+              <a:off x="10049681" y="4897063"/>
+              <a:ext cx="541407" cy="268617"/>
+            </a:xfrm>
+            <a:prstGeom prst="rect">
+              <a:avLst/>
+            </a:prstGeom>
+          </p:spPr>
+        </p:pic>
+        <p:pic>
+          <p:nvPicPr>
+            <p:cNvPr id="34" name="Picture 33"/>
+            <p:cNvPicPr>
+              <a:picLocks noChangeAspect="1"/>
+            </p:cNvPicPr>
+            <p:nvPr/>
+          </p:nvPicPr>
+          <p:blipFill>
+            <a:blip r:embed="rId4" cstate="print">
+              <a:extLst>
+                <a:ext uri="{28A0092B-C50C-407E-A947-70E740481C1C}">
+                  <a14:useLocalDpi xmlns:a14="http://schemas.microsoft.com/office/drawing/2010/main" val="0"/>
+                </a:ext>
+              </a:extLst>
+            </a:blip>
+            <a:stretch>
+              <a:fillRect/>
+            </a:stretch>
+          </p:blipFill>
+          <p:spPr>
+            <a:xfrm>
+              <a:off x="10778349" y="4853995"/>
+              <a:ext cx="510273" cy="310919"/>
+            </a:xfrm>
+            <a:prstGeom prst="rect">
+              <a:avLst/>
+            </a:prstGeom>
+          </p:spPr>
+        </p:pic>
+        <p:pic>
+          <p:nvPicPr>
+            <p:cNvPr id="35" name="Picture 34"/>
+            <p:cNvPicPr>
+              <a:picLocks noChangeAspect="1"/>
+            </p:cNvPicPr>
+            <p:nvPr/>
+          </p:nvPicPr>
+          <p:blipFill>
+            <a:blip r:embed="rId5" cstate="print">
+              <a:extLst>
+                <a:ext uri="{28A0092B-C50C-407E-A947-70E740481C1C}">
+                  <a14:useLocalDpi xmlns:a14="http://schemas.microsoft.com/office/drawing/2010/main" val="0"/>
+                </a:ext>
+              </a:extLst>
+            </a:blip>
+            <a:stretch>
+              <a:fillRect/>
+            </a:stretch>
+          </p:blipFill>
+          <p:spPr>
+            <a:xfrm>
+              <a:off x="9385232" y="4780413"/>
+              <a:ext cx="371522" cy="375075"/>
+            </a:xfrm>
+            <a:prstGeom prst="rect">
+              <a:avLst/>
+            </a:prstGeom>
+          </p:spPr>
+        </p:pic>
+        <p:pic>
+          <p:nvPicPr>
+            <p:cNvPr id="36" name="Picture 35"/>
+            <p:cNvPicPr>
+              <a:picLocks noChangeAspect="1"/>
+            </p:cNvPicPr>
+            <p:nvPr/>
+          </p:nvPicPr>
+          <p:blipFill>
+            <a:blip r:embed="rId6" cstate="print">
+              <a:extLst>
+                <a:ext uri="{28A0092B-C50C-407E-A947-70E740481C1C}">
+                  <a14:useLocalDpi xmlns:a14="http://schemas.microsoft.com/office/drawing/2010/main" val="0"/>
+                </a:ext>
+              </a:extLst>
+            </a:blip>
+            <a:stretch>
+              <a:fillRect/>
+            </a:stretch>
+          </p:blipFill>
+          <p:spPr>
+            <a:xfrm>
+              <a:off x="7895739" y="4843833"/>
+              <a:ext cx="466579" cy="375075"/>
+            </a:xfrm>
+            <a:prstGeom prst="rect">
+              <a:avLst/>
+            </a:prstGeom>
+          </p:spPr>
+        </p:pic>
+        <p:pic>
+          <p:nvPicPr>
+            <p:cNvPr id="37" name="Picture 36"/>
+            <p:cNvPicPr>
+              <a:picLocks noChangeAspect="1"/>
+            </p:cNvPicPr>
+            <p:nvPr/>
+          </p:nvPicPr>
+          <p:blipFill>
+            <a:blip r:embed="rId7" cstate="print">
+              <a:extLst>
+                <a:ext uri="{28A0092B-C50C-407E-A947-70E740481C1C}">
+                  <a14:useLocalDpi xmlns:a14="http://schemas.microsoft.com/office/drawing/2010/main" val="0"/>
+                </a:ext>
+              </a:extLst>
+            </a:blip>
+            <a:stretch>
+              <a:fillRect/>
+            </a:stretch>
+          </p:blipFill>
+          <p:spPr>
+            <a:xfrm>
+              <a:off x="7188800" y="4825933"/>
+              <a:ext cx="422871" cy="372587"/>
+            </a:xfrm>
+            <a:prstGeom prst="rect">
+              <a:avLst/>
+            </a:prstGeom>
+          </p:spPr>
+        </p:pic>
+        <p:pic>
+          <p:nvPicPr>
+            <p:cNvPr id="38" name="Picture 37"/>
+            <p:cNvPicPr>
+              <a:picLocks noChangeAspect="1"/>
+            </p:cNvPicPr>
+            <p:nvPr/>
+          </p:nvPicPr>
+          <p:blipFill>
+            <a:blip r:embed="rId8" cstate="print">
+              <a:extLst>
+                <a:ext uri="{28A0092B-C50C-407E-A947-70E740481C1C}">
+                  <a14:useLocalDpi xmlns:a14="http://schemas.microsoft.com/office/drawing/2010/main" val="0"/>
+                </a:ext>
+              </a:extLst>
+            </a:blip>
+            <a:stretch>
+              <a:fillRect/>
+            </a:stretch>
+          </p:blipFill>
+          <p:spPr>
+            <a:xfrm>
+              <a:off x="8634585" y="4825188"/>
+              <a:ext cx="456193" cy="375075"/>
+            </a:xfrm>
+            <a:prstGeom prst="rect">
+              <a:avLst/>
+            </a:prstGeom>
+          </p:spPr>
+        </p:pic>
+        <p:pic>
+          <p:nvPicPr>
+            <p:cNvPr id="39" name="Picture 38"/>
+            <p:cNvPicPr>
+              <a:picLocks noChangeAspect="1"/>
+            </p:cNvPicPr>
+            <p:nvPr/>
+          </p:nvPicPr>
+          <p:blipFill>
+            <a:blip r:embed="rId9" cstate="print">
+              <a:extLst>
+                <a:ext uri="{28A0092B-C50C-407E-A947-70E740481C1C}">
+                  <a14:useLocalDpi xmlns:a14="http://schemas.microsoft.com/office/drawing/2010/main" val="0"/>
+                </a:ext>
+              </a:extLst>
+            </a:blip>
+            <a:stretch>
+              <a:fillRect/>
+            </a:stretch>
+          </p:blipFill>
+          <p:spPr>
+            <a:xfrm flipH="1">
+              <a:off x="5443752" y="4907223"/>
+              <a:ext cx="425272" cy="363268"/>
+            </a:xfrm>
+            <a:prstGeom prst="rect">
+              <a:avLst/>
+            </a:prstGeom>
+          </p:spPr>
+        </p:pic>
+        <p:pic>
+          <p:nvPicPr>
+            <p:cNvPr id="40" name="Picture 39"/>
+            <p:cNvPicPr>
+              <a:picLocks noChangeAspect="1"/>
+            </p:cNvPicPr>
+            <p:nvPr/>
+          </p:nvPicPr>
+          <p:blipFill>
+            <a:blip r:embed="rId9" cstate="print">
+              <a:extLst>
+                <a:ext uri="{28A0092B-C50C-407E-A947-70E740481C1C}">
+                  <a14:useLocalDpi xmlns:a14="http://schemas.microsoft.com/office/drawing/2010/main" val="0"/>
+                </a:ext>
+              </a:extLst>
+            </a:blip>
+            <a:stretch>
+              <a:fillRect/>
+            </a:stretch>
+          </p:blipFill>
+          <p:spPr>
+            <a:xfrm flipH="1">
+              <a:off x="11584665" y="4843833"/>
+              <a:ext cx="425272" cy="363268"/>
+            </a:xfrm>
+            <a:prstGeom prst="rect">
+              <a:avLst/>
+            </a:prstGeom>
+          </p:spPr>
+        </p:pic>
+      </p:grpSp>
     </p:spTree>
     <p:extLst>
       <p:ext uri="{BB962C8B-B14F-4D97-AF65-F5344CB8AC3E}">

</xml_diff>

<commit_message>
reran plots for CT paper
</commit_message>
<xml_diff>
--- a/output/plots/Presentation1.pptx
+++ b/output/plots/Presentation1.pptx
@@ -199,7 +199,7 @@
           <a:p>
             <a:fld id="{7FA21820-D199-4D82-91AF-C50B1D3B111A}" type="datetimeFigureOut">
               <a:rPr lang="en-US" smtClean="0"/>
-              <a:t>11/28/2016</a:t>
+              <a:t>1/29/2017</a:t>
             </a:fld>
             <a:endParaRPr lang="en-US"/>
           </a:p>
@@ -757,7 +757,7 @@
           <a:p>
             <a:fld id="{916B8C92-D5E3-4480-8685-D57BEE386DE2}" type="datetimeFigureOut">
               <a:rPr lang="en-US" smtClean="0"/>
-              <a:t>11/28/2016</a:t>
+              <a:t>1/29/2017</a:t>
             </a:fld>
             <a:endParaRPr lang="en-US"/>
           </a:p>
@@ -927,7 +927,7 @@
           <a:p>
             <a:fld id="{916B8C92-D5E3-4480-8685-D57BEE386DE2}" type="datetimeFigureOut">
               <a:rPr lang="en-US" smtClean="0"/>
-              <a:t>11/28/2016</a:t>
+              <a:t>1/29/2017</a:t>
             </a:fld>
             <a:endParaRPr lang="en-US"/>
           </a:p>
@@ -1107,7 +1107,7 @@
           <a:p>
             <a:fld id="{916B8C92-D5E3-4480-8685-D57BEE386DE2}" type="datetimeFigureOut">
               <a:rPr lang="en-US" smtClean="0"/>
-              <a:t>11/28/2016</a:t>
+              <a:t>1/29/2017</a:t>
             </a:fld>
             <a:endParaRPr lang="en-US"/>
           </a:p>
@@ -1277,7 +1277,7 @@
           <a:p>
             <a:fld id="{916B8C92-D5E3-4480-8685-D57BEE386DE2}" type="datetimeFigureOut">
               <a:rPr lang="en-US" smtClean="0"/>
-              <a:t>11/28/2016</a:t>
+              <a:t>1/29/2017</a:t>
             </a:fld>
             <a:endParaRPr lang="en-US"/>
           </a:p>
@@ -1523,7 +1523,7 @@
           <a:p>
             <a:fld id="{916B8C92-D5E3-4480-8685-D57BEE386DE2}" type="datetimeFigureOut">
               <a:rPr lang="en-US" smtClean="0"/>
-              <a:t>11/28/2016</a:t>
+              <a:t>1/29/2017</a:t>
             </a:fld>
             <a:endParaRPr lang="en-US"/>
           </a:p>
@@ -1755,7 +1755,7 @@
           <a:p>
             <a:fld id="{916B8C92-D5E3-4480-8685-D57BEE386DE2}" type="datetimeFigureOut">
               <a:rPr lang="en-US" smtClean="0"/>
-              <a:t>11/28/2016</a:t>
+              <a:t>1/29/2017</a:t>
             </a:fld>
             <a:endParaRPr lang="en-US"/>
           </a:p>
@@ -2122,7 +2122,7 @@
           <a:p>
             <a:fld id="{916B8C92-D5E3-4480-8685-D57BEE386DE2}" type="datetimeFigureOut">
               <a:rPr lang="en-US" smtClean="0"/>
-              <a:t>11/28/2016</a:t>
+              <a:t>1/29/2017</a:t>
             </a:fld>
             <a:endParaRPr lang="en-US"/>
           </a:p>
@@ -2240,7 +2240,7 @@
           <a:p>
             <a:fld id="{916B8C92-D5E3-4480-8685-D57BEE386DE2}" type="datetimeFigureOut">
               <a:rPr lang="en-US" smtClean="0"/>
-              <a:t>11/28/2016</a:t>
+              <a:t>1/29/2017</a:t>
             </a:fld>
             <a:endParaRPr lang="en-US"/>
           </a:p>
@@ -2335,7 +2335,7 @@
           <a:p>
             <a:fld id="{916B8C92-D5E3-4480-8685-D57BEE386DE2}" type="datetimeFigureOut">
               <a:rPr lang="en-US" smtClean="0"/>
-              <a:t>11/28/2016</a:t>
+              <a:t>1/29/2017</a:t>
             </a:fld>
             <a:endParaRPr lang="en-US"/>
           </a:p>
@@ -2612,7 +2612,7 @@
           <a:p>
             <a:fld id="{916B8C92-D5E3-4480-8685-D57BEE386DE2}" type="datetimeFigureOut">
               <a:rPr lang="en-US" smtClean="0"/>
-              <a:t>11/28/2016</a:t>
+              <a:t>1/29/2017</a:t>
             </a:fld>
             <a:endParaRPr lang="en-US"/>
           </a:p>
@@ -2865,7 +2865,7 @@
           <a:p>
             <a:fld id="{916B8C92-D5E3-4480-8685-D57BEE386DE2}" type="datetimeFigureOut">
               <a:rPr lang="en-US" smtClean="0"/>
-              <a:t>11/28/2016</a:t>
+              <a:t>1/29/2017</a:t>
             </a:fld>
             <a:endParaRPr lang="en-US"/>
           </a:p>
@@ -3078,7 +3078,7 @@
           <a:p>
             <a:fld id="{916B8C92-D5E3-4480-8685-D57BEE386DE2}" type="datetimeFigureOut">
               <a:rPr lang="en-US" smtClean="0"/>
-              <a:t>11/28/2016</a:t>
+              <a:t>1/29/2017</a:t>
             </a:fld>
             <a:endParaRPr lang="en-US"/>
           </a:p>
@@ -3949,7 +3949,7 @@
       </p:graphicFrame>
       <p:pic>
         <p:nvPicPr>
-          <p:cNvPr id="3" name="Picture 2"/>
+          <p:cNvPr id="5" name="Picture 4"/>
           <p:cNvPicPr>
             <a:picLocks noChangeAspect="1"/>
           </p:cNvPicPr>
@@ -3962,9 +3962,9 @@
           </a:stretch>
         </p:blipFill>
         <p:spPr>
-          <a:xfrm flipH="1">
-            <a:off x="2106381" y="2615612"/>
-            <a:ext cx="338435" cy="303018"/>
+          <a:xfrm>
+            <a:off x="2046589" y="2588903"/>
+            <a:ext cx="422129" cy="329727"/>
           </a:xfrm>
           <a:prstGeom prst="rect">
             <a:avLst/>
@@ -4001,44 +4001,44 @@
           <a:chExt cx="0" cy="0"/>
         </a:xfrm>
       </p:grpSpPr>
-      <p:pic>
-        <p:nvPicPr>
-          <p:cNvPr id="2" name="Picture 1"/>
-          <p:cNvPicPr>
-            <a:picLocks noChangeAspect="1"/>
-          </p:cNvPicPr>
-          <p:nvPr/>
-        </p:nvPicPr>
-        <p:blipFill>
-          <a:blip r:embed="rId2"/>
-          <a:stretch>
-            <a:fillRect/>
-          </a:stretch>
-        </p:blipFill>
-        <p:spPr>
-          <a:xfrm>
-            <a:off x="1698211" y="108065"/>
-            <a:ext cx="8854230" cy="6749935"/>
-          </a:xfrm>
-          <a:prstGeom prst="rect">
-            <a:avLst/>
-          </a:prstGeom>
-        </p:spPr>
-      </p:pic>
       <p:grpSp>
         <p:nvGrpSpPr>
-          <p:cNvPr id="4" name="Group 3"/>
+          <p:cNvPr id="6" name="Group 5"/>
           <p:cNvGrpSpPr/>
           <p:nvPr/>
         </p:nvGrpSpPr>
         <p:grpSpPr>
           <a:xfrm>
-            <a:off x="2922243" y="6066646"/>
-            <a:ext cx="7329465" cy="243895"/>
-            <a:chOff x="2887074" y="6066646"/>
-            <a:chExt cx="7329465" cy="243895"/>
+            <a:off x="1497043" y="108065"/>
+            <a:ext cx="8854230" cy="6749935"/>
+            <a:chOff x="1698211" y="108065"/>
+            <a:chExt cx="8854230" cy="6749935"/>
           </a:xfrm>
         </p:grpSpPr>
+        <p:pic>
+          <p:nvPicPr>
+            <p:cNvPr id="2" name="Picture 1"/>
+            <p:cNvPicPr>
+              <a:picLocks noChangeAspect="1"/>
+            </p:cNvPicPr>
+            <p:nvPr/>
+          </p:nvPicPr>
+          <p:blipFill>
+            <a:blip r:embed="rId2"/>
+            <a:stretch>
+              <a:fillRect/>
+            </a:stretch>
+          </p:blipFill>
+          <p:spPr>
+            <a:xfrm>
+              <a:off x="1698211" y="108065"/>
+              <a:ext cx="8854230" cy="6749935"/>
+            </a:xfrm>
+            <a:prstGeom prst="rect">
+              <a:avLst/>
+            </a:prstGeom>
+          </p:spPr>
+        </p:pic>
         <p:grpSp>
           <p:nvGrpSpPr>
             <p:cNvPr id="3" name="Group 2"/>
@@ -4047,7 +4047,7 @@
           </p:nvGrpSpPr>
           <p:grpSpPr>
             <a:xfrm>
-              <a:off x="2887074" y="6066646"/>
+              <a:off x="2922243" y="6066646"/>
               <a:ext cx="7329465" cy="243895"/>
               <a:chOff x="2887074" y="6066646"/>
               <a:chExt cx="7329465" cy="243895"/>
@@ -4416,7 +4416,7 @@
         </p:grpSp>
         <p:pic>
           <p:nvPicPr>
-            <p:cNvPr id="26" name="Picture 25"/>
+            <p:cNvPr id="20" name="Picture 19"/>
             <p:cNvPicPr>
               <a:picLocks noChangeAspect="1"/>
             </p:cNvPicPr>
@@ -4429,9 +4429,9 @@
             </a:stretch>
           </p:blipFill>
           <p:spPr>
-            <a:xfrm flipH="1">
-              <a:off x="4939111" y="6066646"/>
-              <a:ext cx="255789" cy="229021"/>
+            <a:xfrm>
+              <a:off x="4935207" y="6066646"/>
+              <a:ext cx="302061" cy="235941"/>
             </a:xfrm>
             <a:prstGeom prst="rect">
               <a:avLst/>
@@ -4440,7 +4440,7 @@
         </p:pic>
         <p:pic>
           <p:nvPicPr>
-            <p:cNvPr id="27" name="Picture 26"/>
+            <p:cNvPr id="28" name="Picture 27"/>
             <p:cNvPicPr>
               <a:picLocks noChangeAspect="1"/>
             </p:cNvPicPr>
@@ -4453,9 +4453,9 @@
             </a:stretch>
           </p:blipFill>
           <p:spPr>
-            <a:xfrm flipH="1">
-              <a:off x="9573295" y="6069615"/>
-              <a:ext cx="255789" cy="229021"/>
+            <a:xfrm>
+              <a:off x="9553073" y="6079941"/>
+              <a:ext cx="302061" cy="235941"/>
             </a:xfrm>
             <a:prstGeom prst="rect">
               <a:avLst/>
@@ -4495,15 +4495,15 @@
       </p:grpSpPr>
       <p:grpSp>
         <p:nvGrpSpPr>
-          <p:cNvPr id="8" name="Group 7"/>
+          <p:cNvPr id="13" name="Group 12"/>
           <p:cNvGrpSpPr/>
           <p:nvPr/>
         </p:nvGrpSpPr>
         <p:grpSpPr>
           <a:xfrm>
-            <a:off x="-1" y="969965"/>
+            <a:off x="-1" y="956538"/>
             <a:ext cx="12192001" cy="4878645"/>
-            <a:chOff x="-1" y="969965"/>
+            <a:chOff x="-1" y="956538"/>
             <a:chExt cx="12192001" cy="4878645"/>
           </a:xfrm>
         </p:grpSpPr>
@@ -4523,7 +4523,7 @@
           </p:blipFill>
           <p:spPr>
             <a:xfrm>
-              <a:off x="-1" y="969965"/>
+              <a:off x="-1" y="956538"/>
               <a:ext cx="12192001" cy="4878645"/>
             </a:xfrm>
             <a:prstGeom prst="rect">
@@ -4533,16 +4533,16 @@
         </p:pic>
         <p:grpSp>
           <p:nvGrpSpPr>
-            <p:cNvPr id="4" name="Group 3"/>
+            <p:cNvPr id="7" name="Group 6"/>
             <p:cNvGrpSpPr/>
             <p:nvPr/>
           </p:nvGrpSpPr>
           <p:grpSpPr>
             <a:xfrm>
-              <a:off x="1059886" y="4797038"/>
-              <a:ext cx="10941738" cy="501885"/>
-              <a:chOff x="1059886" y="4797038"/>
-              <a:chExt cx="10941738" cy="501885"/>
+              <a:off x="1060421" y="4857193"/>
+              <a:ext cx="4738636" cy="440150"/>
+              <a:chOff x="1060421" y="4857193"/>
+              <a:chExt cx="4738636" cy="440150"/>
             </a:xfrm>
           </p:grpSpPr>
           <p:grpSp>
@@ -4553,10 +4553,10 @@
             </p:nvGrpSpPr>
             <p:grpSpPr>
               <a:xfrm>
-                <a:off x="1059886" y="4797038"/>
-                <a:ext cx="10941738" cy="501885"/>
-                <a:chOff x="1068199" y="4780413"/>
-                <a:chExt cx="10941738" cy="501885"/>
+                <a:off x="1060421" y="4857193"/>
+                <a:ext cx="4074922" cy="440150"/>
+                <a:chOff x="1068734" y="4840568"/>
+                <a:chExt cx="4074922" cy="440150"/>
               </a:xfrm>
             </p:grpSpPr>
             <p:pic>
@@ -4581,7 +4581,7 @@
               </p:blipFill>
               <p:spPr>
                 <a:xfrm>
-                  <a:off x="3929080" y="4960453"/>
+                  <a:off x="2436997" y="4958871"/>
                   <a:ext cx="541407" cy="268617"/>
                 </a:xfrm>
                 <a:prstGeom prst="rect">
@@ -4611,7 +4611,7 @@
               </p:blipFill>
               <p:spPr>
                 <a:xfrm>
-                  <a:off x="3271824" y="4853995"/>
+                  <a:off x="3271824" y="4840568"/>
                   <a:ext cx="371522" cy="375075"/>
                 </a:xfrm>
                 <a:prstGeom prst="rect">
@@ -4641,7 +4641,7 @@
               </p:blipFill>
               <p:spPr>
                 <a:xfrm>
-                  <a:off x="1775138" y="4907223"/>
+                  <a:off x="1775138" y="4893796"/>
                   <a:ext cx="466579" cy="375075"/>
                 </a:xfrm>
                 <a:prstGeom prst="rect">
@@ -4671,7 +4671,7 @@
               </p:blipFill>
               <p:spPr>
                 <a:xfrm>
-                  <a:off x="1068199" y="4889323"/>
+                  <a:off x="3971293" y="4861143"/>
                   <a:ext cx="422871" cy="372587"/>
                 </a:xfrm>
                 <a:prstGeom prst="rect">
@@ -4701,157 +4701,7 @@
               </p:blipFill>
               <p:spPr>
                 <a:xfrm>
-                  <a:off x="2513984" y="4888578"/>
-                  <a:ext cx="456193" cy="375075"/>
-                </a:xfrm>
-                <a:prstGeom prst="rect">
-                  <a:avLst/>
-                </a:prstGeom>
-              </p:spPr>
-            </p:pic>
-            <p:pic>
-              <p:nvPicPr>
-                <p:cNvPr id="33" name="Picture 32"/>
-                <p:cNvPicPr>
-                  <a:picLocks noChangeAspect="1"/>
-                </p:cNvPicPr>
-                <p:nvPr/>
-              </p:nvPicPr>
-              <p:blipFill>
-                <a:blip r:embed="rId3" cstate="print">
-                  <a:extLst>
-                    <a:ext uri="{28A0092B-C50C-407E-A947-70E740481C1C}">
-                      <a14:useLocalDpi xmlns:a14="http://schemas.microsoft.com/office/drawing/2010/main" val="0"/>
-                    </a:ext>
-                  </a:extLst>
-                </a:blip>
-                <a:stretch>
-                  <a:fillRect/>
-                </a:stretch>
-              </p:blipFill>
-              <p:spPr>
-                <a:xfrm>
-                  <a:off x="10049681" y="4897063"/>
-                  <a:ext cx="541407" cy="268617"/>
-                </a:xfrm>
-                <a:prstGeom prst="rect">
-                  <a:avLst/>
-                </a:prstGeom>
-              </p:spPr>
-            </p:pic>
-            <p:pic>
-              <p:nvPicPr>
-                <p:cNvPr id="35" name="Picture 34"/>
-                <p:cNvPicPr>
-                  <a:picLocks noChangeAspect="1"/>
-                </p:cNvPicPr>
-                <p:nvPr/>
-              </p:nvPicPr>
-              <p:blipFill>
-                <a:blip r:embed="rId4" cstate="print">
-                  <a:extLst>
-                    <a:ext uri="{28A0092B-C50C-407E-A947-70E740481C1C}">
-                      <a14:useLocalDpi xmlns:a14="http://schemas.microsoft.com/office/drawing/2010/main" val="0"/>
-                    </a:ext>
-                  </a:extLst>
-                </a:blip>
-                <a:stretch>
-                  <a:fillRect/>
-                </a:stretch>
-              </p:blipFill>
-              <p:spPr>
-                <a:xfrm>
-                  <a:off x="9385232" y="4780413"/>
-                  <a:ext cx="371522" cy="375075"/>
-                </a:xfrm>
-                <a:prstGeom prst="rect">
-                  <a:avLst/>
-                </a:prstGeom>
-              </p:spPr>
-            </p:pic>
-            <p:pic>
-              <p:nvPicPr>
-                <p:cNvPr id="36" name="Picture 35"/>
-                <p:cNvPicPr>
-                  <a:picLocks noChangeAspect="1"/>
-                </p:cNvPicPr>
-                <p:nvPr/>
-              </p:nvPicPr>
-              <p:blipFill>
-                <a:blip r:embed="rId5" cstate="print">
-                  <a:extLst>
-                    <a:ext uri="{28A0092B-C50C-407E-A947-70E740481C1C}">
-                      <a14:useLocalDpi xmlns:a14="http://schemas.microsoft.com/office/drawing/2010/main" val="0"/>
-                    </a:ext>
-                  </a:extLst>
-                </a:blip>
-                <a:stretch>
-                  <a:fillRect/>
-                </a:stretch>
-              </p:blipFill>
-              <p:spPr>
-                <a:xfrm>
-                  <a:off x="7895739" y="4843833"/>
-                  <a:ext cx="466579" cy="375075"/>
-                </a:xfrm>
-                <a:prstGeom prst="rect">
-                  <a:avLst/>
-                </a:prstGeom>
-              </p:spPr>
-            </p:pic>
-            <p:pic>
-              <p:nvPicPr>
-                <p:cNvPr id="37" name="Picture 36"/>
-                <p:cNvPicPr>
-                  <a:picLocks noChangeAspect="1"/>
-                </p:cNvPicPr>
-                <p:nvPr/>
-              </p:nvPicPr>
-              <p:blipFill>
-                <a:blip r:embed="rId6" cstate="print">
-                  <a:extLst>
-                    <a:ext uri="{28A0092B-C50C-407E-A947-70E740481C1C}">
-                      <a14:useLocalDpi xmlns:a14="http://schemas.microsoft.com/office/drawing/2010/main" val="0"/>
-                    </a:ext>
-                  </a:extLst>
-                </a:blip>
-                <a:stretch>
-                  <a:fillRect/>
-                </a:stretch>
-              </p:blipFill>
-              <p:spPr>
-                <a:xfrm>
-                  <a:off x="7188800" y="4825933"/>
-                  <a:ext cx="422871" cy="372587"/>
-                </a:xfrm>
-                <a:prstGeom prst="rect">
-                  <a:avLst/>
-                </a:prstGeom>
-              </p:spPr>
-            </p:pic>
-            <p:pic>
-              <p:nvPicPr>
-                <p:cNvPr id="38" name="Picture 37"/>
-                <p:cNvPicPr>
-                  <a:picLocks noChangeAspect="1"/>
-                </p:cNvPicPr>
-                <p:nvPr/>
-              </p:nvPicPr>
-              <p:blipFill>
-                <a:blip r:embed="rId7" cstate="print">
-                  <a:extLst>
-                    <a:ext uri="{28A0092B-C50C-407E-A947-70E740481C1C}">
-                      <a14:useLocalDpi xmlns:a14="http://schemas.microsoft.com/office/drawing/2010/main" val="0"/>
-                    </a:ext>
-                  </a:extLst>
-                </a:blip>
-                <a:stretch>
-                  <a:fillRect/>
-                </a:stretch>
-              </p:blipFill>
-              <p:spPr>
-                <a:xfrm>
-                  <a:off x="8634585" y="4825188"/>
+                  <a:off x="1068734" y="4905643"/>
                   <a:ext cx="456193" cy="375075"/>
                 </a:xfrm>
                 <a:prstGeom prst="rect">
@@ -4881,8 +4731,92 @@
               </p:blipFill>
               <p:spPr>
                 <a:xfrm flipH="1">
-                  <a:off x="5443752" y="4907223"/>
+                  <a:off x="4718384" y="4865802"/>
                   <a:ext cx="425272" cy="363268"/>
+                </a:xfrm>
+                <a:prstGeom prst="rect">
+                  <a:avLst/>
+                </a:prstGeom>
+              </p:spPr>
+            </p:pic>
+          </p:grpSp>
+          <p:pic>
+            <p:nvPicPr>
+              <p:cNvPr id="20" name="Picture 19"/>
+              <p:cNvPicPr>
+                <a:picLocks noChangeAspect="1"/>
+              </p:cNvPicPr>
+              <p:nvPr/>
+            </p:nvPicPr>
+            <p:blipFill>
+              <a:blip r:embed="rId9"/>
+              <a:stretch>
+                <a:fillRect/>
+              </a:stretch>
+            </p:blipFill>
+            <p:spPr>
+              <a:xfrm>
+                <a:off x="5402183" y="4935695"/>
+                <a:ext cx="396874" cy="310000"/>
+              </a:xfrm>
+              <a:prstGeom prst="rect">
+                <a:avLst/>
+              </a:prstGeom>
+            </p:spPr>
+          </p:pic>
+        </p:grpSp>
+        <p:grpSp>
+          <p:nvGrpSpPr>
+            <p:cNvPr id="22" name="Group 21"/>
+            <p:cNvGrpSpPr/>
+            <p:nvPr/>
+          </p:nvGrpSpPr>
+          <p:grpSpPr>
+            <a:xfrm>
+              <a:off x="7147629" y="4803963"/>
+              <a:ext cx="4738636" cy="440150"/>
+              <a:chOff x="1060421" y="4857193"/>
+              <a:chExt cx="4738636" cy="440150"/>
+            </a:xfrm>
+          </p:grpSpPr>
+          <p:grpSp>
+            <p:nvGrpSpPr>
+              <p:cNvPr id="23" name="Group 22"/>
+              <p:cNvGrpSpPr/>
+              <p:nvPr/>
+            </p:nvGrpSpPr>
+            <p:grpSpPr>
+              <a:xfrm>
+                <a:off x="1060421" y="4857193"/>
+                <a:ext cx="4074922" cy="440150"/>
+                <a:chOff x="1068734" y="4840568"/>
+                <a:chExt cx="4074922" cy="440150"/>
+              </a:xfrm>
+            </p:grpSpPr>
+            <p:pic>
+              <p:nvPicPr>
+                <p:cNvPr id="25" name="Picture 24"/>
+                <p:cNvPicPr>
+                  <a:picLocks noChangeAspect="1"/>
+                </p:cNvPicPr>
+                <p:nvPr/>
+              </p:nvPicPr>
+              <p:blipFill>
+                <a:blip r:embed="rId3" cstate="print">
+                  <a:extLst>
+                    <a:ext uri="{28A0092B-C50C-407E-A947-70E740481C1C}">
+                      <a14:useLocalDpi xmlns:a14="http://schemas.microsoft.com/office/drawing/2010/main" val="0"/>
+                    </a:ext>
+                  </a:extLst>
+                </a:blip>
+                <a:stretch>
+                  <a:fillRect/>
+                </a:stretch>
+              </p:blipFill>
+              <p:spPr>
+                <a:xfrm>
+                  <a:off x="2436997" y="4958871"/>
+                  <a:ext cx="541407" cy="268617"/>
                 </a:xfrm>
                 <a:prstGeom prst="rect">
                   <a:avLst/>
@@ -4891,7 +4825,127 @@
             </p:pic>
             <p:pic>
               <p:nvPicPr>
-                <p:cNvPr id="40" name="Picture 39"/>
+                <p:cNvPr id="26" name="Picture 25"/>
+                <p:cNvPicPr>
+                  <a:picLocks noChangeAspect="1"/>
+                </p:cNvPicPr>
+                <p:nvPr/>
+              </p:nvPicPr>
+              <p:blipFill>
+                <a:blip r:embed="rId4" cstate="print">
+                  <a:extLst>
+                    <a:ext uri="{28A0092B-C50C-407E-A947-70E740481C1C}">
+                      <a14:useLocalDpi xmlns:a14="http://schemas.microsoft.com/office/drawing/2010/main" val="0"/>
+                    </a:ext>
+                  </a:extLst>
+                </a:blip>
+                <a:stretch>
+                  <a:fillRect/>
+                </a:stretch>
+              </p:blipFill>
+              <p:spPr>
+                <a:xfrm>
+                  <a:off x="3271824" y="4840568"/>
+                  <a:ext cx="371522" cy="375075"/>
+                </a:xfrm>
+                <a:prstGeom prst="rect">
+                  <a:avLst/>
+                </a:prstGeom>
+              </p:spPr>
+            </p:pic>
+            <p:pic>
+              <p:nvPicPr>
+                <p:cNvPr id="27" name="Picture 26"/>
+                <p:cNvPicPr>
+                  <a:picLocks noChangeAspect="1"/>
+                </p:cNvPicPr>
+                <p:nvPr/>
+              </p:nvPicPr>
+              <p:blipFill>
+                <a:blip r:embed="rId5" cstate="print">
+                  <a:extLst>
+                    <a:ext uri="{28A0092B-C50C-407E-A947-70E740481C1C}">
+                      <a14:useLocalDpi xmlns:a14="http://schemas.microsoft.com/office/drawing/2010/main" val="0"/>
+                    </a:ext>
+                  </a:extLst>
+                </a:blip>
+                <a:stretch>
+                  <a:fillRect/>
+                </a:stretch>
+              </p:blipFill>
+              <p:spPr>
+                <a:xfrm>
+                  <a:off x="1775138" y="4893796"/>
+                  <a:ext cx="466579" cy="375075"/>
+                </a:xfrm>
+                <a:prstGeom prst="rect">
+                  <a:avLst/>
+                </a:prstGeom>
+              </p:spPr>
+            </p:pic>
+            <p:pic>
+              <p:nvPicPr>
+                <p:cNvPr id="28" name="Picture 27"/>
+                <p:cNvPicPr>
+                  <a:picLocks noChangeAspect="1"/>
+                </p:cNvPicPr>
+                <p:nvPr/>
+              </p:nvPicPr>
+              <p:blipFill>
+                <a:blip r:embed="rId6" cstate="print">
+                  <a:extLst>
+                    <a:ext uri="{28A0092B-C50C-407E-A947-70E740481C1C}">
+                      <a14:useLocalDpi xmlns:a14="http://schemas.microsoft.com/office/drawing/2010/main" val="0"/>
+                    </a:ext>
+                  </a:extLst>
+                </a:blip>
+                <a:stretch>
+                  <a:fillRect/>
+                </a:stretch>
+              </p:blipFill>
+              <p:spPr>
+                <a:xfrm>
+                  <a:off x="3971293" y="4861143"/>
+                  <a:ext cx="422871" cy="372587"/>
+                </a:xfrm>
+                <a:prstGeom prst="rect">
+                  <a:avLst/>
+                </a:prstGeom>
+              </p:spPr>
+            </p:pic>
+            <p:pic>
+              <p:nvPicPr>
+                <p:cNvPr id="29" name="Picture 28"/>
+                <p:cNvPicPr>
+                  <a:picLocks noChangeAspect="1"/>
+                </p:cNvPicPr>
+                <p:nvPr/>
+              </p:nvPicPr>
+              <p:blipFill>
+                <a:blip r:embed="rId7" cstate="print">
+                  <a:extLst>
+                    <a:ext uri="{28A0092B-C50C-407E-A947-70E740481C1C}">
+                      <a14:useLocalDpi xmlns:a14="http://schemas.microsoft.com/office/drawing/2010/main" val="0"/>
+                    </a:ext>
+                  </a:extLst>
+                </a:blip>
+                <a:stretch>
+                  <a:fillRect/>
+                </a:stretch>
+              </p:blipFill>
+              <p:spPr>
+                <a:xfrm>
+                  <a:off x="1068734" y="4905643"/>
+                  <a:ext cx="456193" cy="375075"/>
+                </a:xfrm>
+                <a:prstGeom prst="rect">
+                  <a:avLst/>
+                </a:prstGeom>
+              </p:spPr>
+            </p:pic>
+            <p:pic>
+              <p:nvPicPr>
+                <p:cNvPr id="30" name="Picture 29"/>
                 <p:cNvPicPr>
                   <a:picLocks noChangeAspect="1"/>
                 </p:cNvPicPr>
@@ -4911,7 +4965,7 @@
               </p:blipFill>
               <p:spPr>
                 <a:xfrm flipH="1">
-                  <a:off x="11584665" y="4843833"/>
+                  <a:off x="4718384" y="4865802"/>
                   <a:ext cx="425272" cy="363268"/>
                 </a:xfrm>
                 <a:prstGeom prst="rect">
@@ -4922,7 +4976,7 @@
           </p:grpSp>
           <p:pic>
             <p:nvPicPr>
-              <p:cNvPr id="18" name="Picture 17"/>
+              <p:cNvPr id="24" name="Picture 23"/>
               <p:cNvPicPr>
                 <a:picLocks noChangeAspect="1"/>
               </p:cNvPicPr>
@@ -4935,9 +4989,9 @@
               </a:stretch>
             </p:blipFill>
             <p:spPr>
-              <a:xfrm flipH="1">
-                <a:off x="4742618" y="4977078"/>
-                <a:ext cx="336691" cy="301457"/>
+              <a:xfrm>
+                <a:off x="5402183" y="4935695"/>
+                <a:ext cx="396874" cy="310000"/>
               </a:xfrm>
               <a:prstGeom prst="rect">
                 <a:avLst/>
@@ -4945,30 +4999,6 @@
             </p:spPr>
           </p:pic>
         </p:grpSp>
-        <p:pic>
-          <p:nvPicPr>
-            <p:cNvPr id="19" name="Picture 18"/>
-            <p:cNvPicPr>
-              <a:picLocks noChangeAspect="1"/>
-            </p:cNvPicPr>
-            <p:nvPr/>
-          </p:nvPicPr>
-          <p:blipFill>
-            <a:blip r:embed="rId9"/>
-            <a:stretch>
-              <a:fillRect/>
-            </a:stretch>
-          </p:blipFill>
-          <p:spPr>
-            <a:xfrm flipH="1">
-              <a:off x="10881849" y="4919168"/>
-              <a:ext cx="336691" cy="301457"/>
-            </a:xfrm>
-            <a:prstGeom prst="rect">
-              <a:avLst/>
-            </a:prstGeom>
-          </p:spPr>
-        </p:pic>
       </p:grpSp>
     </p:spTree>
     <p:extLst>

</xml_diff>

<commit_message>
removed duplicate bbs lat longs
</commit_message>
<xml_diff>
--- a/output/plots/Presentation1.pptx
+++ b/output/plots/Presentation1.pptx
@@ -199,7 +199,7 @@
           <a:p>
             <a:fld id="{7FA21820-D199-4D82-91AF-C50B1D3B111A}" type="datetimeFigureOut">
               <a:rPr lang="en-US" smtClean="0"/>
-              <a:t>1/29/2017</a:t>
+              <a:t>1/30/2017</a:t>
             </a:fld>
             <a:endParaRPr lang="en-US"/>
           </a:p>
@@ -757,7 +757,7 @@
           <a:p>
             <a:fld id="{916B8C92-D5E3-4480-8685-D57BEE386DE2}" type="datetimeFigureOut">
               <a:rPr lang="en-US" smtClean="0"/>
-              <a:t>1/29/2017</a:t>
+              <a:t>1/30/2017</a:t>
             </a:fld>
             <a:endParaRPr lang="en-US"/>
           </a:p>
@@ -927,7 +927,7 @@
           <a:p>
             <a:fld id="{916B8C92-D5E3-4480-8685-D57BEE386DE2}" type="datetimeFigureOut">
               <a:rPr lang="en-US" smtClean="0"/>
-              <a:t>1/29/2017</a:t>
+              <a:t>1/30/2017</a:t>
             </a:fld>
             <a:endParaRPr lang="en-US"/>
           </a:p>
@@ -1107,7 +1107,7 @@
           <a:p>
             <a:fld id="{916B8C92-D5E3-4480-8685-D57BEE386DE2}" type="datetimeFigureOut">
               <a:rPr lang="en-US" smtClean="0"/>
-              <a:t>1/29/2017</a:t>
+              <a:t>1/30/2017</a:t>
             </a:fld>
             <a:endParaRPr lang="en-US"/>
           </a:p>
@@ -1277,7 +1277,7 @@
           <a:p>
             <a:fld id="{916B8C92-D5E3-4480-8685-D57BEE386DE2}" type="datetimeFigureOut">
               <a:rPr lang="en-US" smtClean="0"/>
-              <a:t>1/29/2017</a:t>
+              <a:t>1/30/2017</a:t>
             </a:fld>
             <a:endParaRPr lang="en-US"/>
           </a:p>
@@ -1523,7 +1523,7 @@
           <a:p>
             <a:fld id="{916B8C92-D5E3-4480-8685-D57BEE386DE2}" type="datetimeFigureOut">
               <a:rPr lang="en-US" smtClean="0"/>
-              <a:t>1/29/2017</a:t>
+              <a:t>1/30/2017</a:t>
             </a:fld>
             <a:endParaRPr lang="en-US"/>
           </a:p>
@@ -1755,7 +1755,7 @@
           <a:p>
             <a:fld id="{916B8C92-D5E3-4480-8685-D57BEE386DE2}" type="datetimeFigureOut">
               <a:rPr lang="en-US" smtClean="0"/>
-              <a:t>1/29/2017</a:t>
+              <a:t>1/30/2017</a:t>
             </a:fld>
             <a:endParaRPr lang="en-US"/>
           </a:p>
@@ -2122,7 +2122,7 @@
           <a:p>
             <a:fld id="{916B8C92-D5E3-4480-8685-D57BEE386DE2}" type="datetimeFigureOut">
               <a:rPr lang="en-US" smtClean="0"/>
-              <a:t>1/29/2017</a:t>
+              <a:t>1/30/2017</a:t>
             </a:fld>
             <a:endParaRPr lang="en-US"/>
           </a:p>
@@ -2240,7 +2240,7 @@
           <a:p>
             <a:fld id="{916B8C92-D5E3-4480-8685-D57BEE386DE2}" type="datetimeFigureOut">
               <a:rPr lang="en-US" smtClean="0"/>
-              <a:t>1/29/2017</a:t>
+              <a:t>1/30/2017</a:t>
             </a:fld>
             <a:endParaRPr lang="en-US"/>
           </a:p>
@@ -2335,7 +2335,7 @@
           <a:p>
             <a:fld id="{916B8C92-D5E3-4480-8685-D57BEE386DE2}" type="datetimeFigureOut">
               <a:rPr lang="en-US" smtClean="0"/>
-              <a:t>1/29/2017</a:t>
+              <a:t>1/30/2017</a:t>
             </a:fld>
             <a:endParaRPr lang="en-US"/>
           </a:p>
@@ -2612,7 +2612,7 @@
           <a:p>
             <a:fld id="{916B8C92-D5E3-4480-8685-D57BEE386DE2}" type="datetimeFigureOut">
               <a:rPr lang="en-US" smtClean="0"/>
-              <a:t>1/29/2017</a:t>
+              <a:t>1/30/2017</a:t>
             </a:fld>
             <a:endParaRPr lang="en-US"/>
           </a:p>
@@ -2865,7 +2865,7 @@
           <a:p>
             <a:fld id="{916B8C92-D5E3-4480-8685-D57BEE386DE2}" type="datetimeFigureOut">
               <a:rPr lang="en-US" smtClean="0"/>
-              <a:t>1/29/2017</a:t>
+              <a:t>1/30/2017</a:t>
             </a:fld>
             <a:endParaRPr lang="en-US"/>
           </a:p>
@@ -3078,7 +3078,7 @@
           <a:p>
             <a:fld id="{916B8C92-D5E3-4480-8685-D57BEE386DE2}" type="datetimeFigureOut">
               <a:rPr lang="en-US" smtClean="0"/>
-              <a:t>1/29/2017</a:t>
+              <a:t>1/30/2017</a:t>
             </a:fld>
             <a:endParaRPr lang="en-US"/>
           </a:p>
@@ -4003,21 +4003,21 @@
       </p:grpSpPr>
       <p:grpSp>
         <p:nvGrpSpPr>
-          <p:cNvPr id="6" name="Group 5"/>
+          <p:cNvPr id="7" name="Group 6"/>
           <p:cNvGrpSpPr/>
           <p:nvPr/>
         </p:nvGrpSpPr>
         <p:grpSpPr>
           <a:xfrm>
-            <a:off x="1497043" y="108065"/>
-            <a:ext cx="8854230" cy="6749935"/>
-            <a:chOff x="1698211" y="108065"/>
-            <a:chExt cx="8854230" cy="6749935"/>
+            <a:off x="1291276" y="119864"/>
+            <a:ext cx="9003587" cy="6196018"/>
+            <a:chOff x="1291276" y="119864"/>
+            <a:chExt cx="9003587" cy="6196018"/>
           </a:xfrm>
         </p:grpSpPr>
         <p:pic>
           <p:nvPicPr>
-            <p:cNvPr id="2" name="Picture 1"/>
+            <p:cNvPr id="4" name="Picture 3"/>
             <p:cNvPicPr>
               <a:picLocks noChangeAspect="1"/>
             </p:cNvPicPr>
@@ -4031,8 +4031,8 @@
           </p:blipFill>
           <p:spPr>
             <a:xfrm>
-              <a:off x="1698211" y="108065"/>
-              <a:ext cx="8854230" cy="6749935"/>
+              <a:off x="1291276" y="119864"/>
+              <a:ext cx="9003587" cy="6196018"/>
             </a:xfrm>
             <a:prstGeom prst="rect">
               <a:avLst/>
@@ -4041,372 +4041,411 @@
         </p:pic>
         <p:grpSp>
           <p:nvGrpSpPr>
-            <p:cNvPr id="3" name="Group 2"/>
+            <p:cNvPr id="5" name="Group 4"/>
             <p:cNvGrpSpPr/>
             <p:nvPr/>
           </p:nvGrpSpPr>
           <p:grpSpPr>
             <a:xfrm>
-              <a:off x="2922243" y="6066646"/>
+              <a:off x="2721075" y="6066646"/>
               <a:ext cx="7329465" cy="243895"/>
-              <a:chOff x="2887074" y="6066646"/>
+              <a:chOff x="2721075" y="6066646"/>
               <a:chExt cx="7329465" cy="243895"/>
             </a:xfrm>
           </p:grpSpPr>
+          <p:grpSp>
+            <p:nvGrpSpPr>
+              <p:cNvPr id="3" name="Group 2"/>
+              <p:cNvGrpSpPr/>
+              <p:nvPr/>
+            </p:nvGrpSpPr>
+            <p:grpSpPr>
+              <a:xfrm>
+                <a:off x="2721075" y="6066646"/>
+                <a:ext cx="7329465" cy="243895"/>
+                <a:chOff x="2887074" y="6066646"/>
+                <a:chExt cx="7329465" cy="243895"/>
+              </a:xfrm>
+            </p:grpSpPr>
+            <p:pic>
+              <p:nvPicPr>
+                <p:cNvPr id="12" name="Picture 11"/>
+                <p:cNvPicPr>
+                  <a:picLocks noChangeAspect="1"/>
+                </p:cNvPicPr>
+                <p:nvPr/>
+              </p:nvPicPr>
+              <p:blipFill>
+                <a:blip r:embed="rId3" cstate="print">
+                  <a:extLst>
+                    <a:ext uri="{28A0092B-C50C-407E-A947-70E740481C1C}">
+                      <a14:useLocalDpi xmlns:a14="http://schemas.microsoft.com/office/drawing/2010/main" val="0"/>
+                    </a:ext>
+                  </a:extLst>
+                </a:blip>
+                <a:stretch>
+                  <a:fillRect/>
+                </a:stretch>
+              </p:blipFill>
+              <p:spPr>
+                <a:xfrm>
+                  <a:off x="4063568" y="6102067"/>
+                  <a:ext cx="325640" cy="161565"/>
+                </a:xfrm>
+                <a:prstGeom prst="rect">
+                  <a:avLst/>
+                </a:prstGeom>
+              </p:spPr>
+            </p:pic>
+            <p:pic>
+              <p:nvPicPr>
+                <p:cNvPr id="14" name="Picture 13"/>
+                <p:cNvPicPr>
+                  <a:picLocks noChangeAspect="1"/>
+                </p:cNvPicPr>
+                <p:nvPr/>
+              </p:nvPicPr>
+              <p:blipFill>
+                <a:blip r:embed="rId4" cstate="print">
+                  <a:extLst>
+                    <a:ext uri="{28A0092B-C50C-407E-A947-70E740481C1C}">
+                      <a14:useLocalDpi xmlns:a14="http://schemas.microsoft.com/office/drawing/2010/main" val="0"/>
+                    </a:ext>
+                  </a:extLst>
+                </a:blip>
+                <a:stretch>
+                  <a:fillRect/>
+                </a:stretch>
+              </p:blipFill>
+              <p:spPr>
+                <a:xfrm>
+                  <a:off x="3693928" y="6069896"/>
+                  <a:ext cx="223459" cy="225596"/>
+                </a:xfrm>
+                <a:prstGeom prst="rect">
+                  <a:avLst/>
+                </a:prstGeom>
+              </p:spPr>
+            </p:pic>
+            <p:pic>
+              <p:nvPicPr>
+                <p:cNvPr id="15" name="Picture 14"/>
+                <p:cNvPicPr>
+                  <a:picLocks noChangeAspect="1"/>
+                </p:cNvPicPr>
+                <p:nvPr/>
+              </p:nvPicPr>
+              <p:blipFill>
+                <a:blip r:embed="rId5" cstate="print">
+                  <a:extLst>
+                    <a:ext uri="{28A0092B-C50C-407E-A947-70E740481C1C}">
+                      <a14:useLocalDpi xmlns:a14="http://schemas.microsoft.com/office/drawing/2010/main" val="0"/>
+                    </a:ext>
+                  </a:extLst>
+                </a:blip>
+                <a:stretch>
+                  <a:fillRect/>
+                </a:stretch>
+              </p:blipFill>
+              <p:spPr>
+                <a:xfrm>
+                  <a:off x="5345440" y="6084945"/>
+                  <a:ext cx="280633" cy="225596"/>
+                </a:xfrm>
+                <a:prstGeom prst="rect">
+                  <a:avLst/>
+                </a:prstGeom>
+              </p:spPr>
+            </p:pic>
+            <p:pic>
+              <p:nvPicPr>
+                <p:cNvPr id="16" name="Picture 15"/>
+                <p:cNvPicPr>
+                  <a:picLocks noChangeAspect="1"/>
+                </p:cNvPicPr>
+                <p:nvPr/>
+              </p:nvPicPr>
+              <p:blipFill>
+                <a:blip r:embed="rId6" cstate="print">
+                  <a:extLst>
+                    <a:ext uri="{28A0092B-C50C-407E-A947-70E740481C1C}">
+                      <a14:useLocalDpi xmlns:a14="http://schemas.microsoft.com/office/drawing/2010/main" val="0"/>
+                    </a:ext>
+                  </a:extLst>
+                </a:blip>
+                <a:stretch>
+                  <a:fillRect/>
+                </a:stretch>
+              </p:blipFill>
+              <p:spPr>
+                <a:xfrm>
+                  <a:off x="3293403" y="6083191"/>
+                  <a:ext cx="254344" cy="224100"/>
+                </a:xfrm>
+                <a:prstGeom prst="rect">
+                  <a:avLst/>
+                </a:prstGeom>
+              </p:spPr>
+            </p:pic>
+            <p:pic>
+              <p:nvPicPr>
+                <p:cNvPr id="17" name="Picture 16"/>
+                <p:cNvPicPr>
+                  <a:picLocks noChangeAspect="1"/>
+                </p:cNvPicPr>
+                <p:nvPr/>
+              </p:nvPicPr>
+              <p:blipFill>
+                <a:blip r:embed="rId7" cstate="print">
+                  <a:extLst>
+                    <a:ext uri="{28A0092B-C50C-407E-A947-70E740481C1C}">
+                      <a14:useLocalDpi xmlns:a14="http://schemas.microsoft.com/office/drawing/2010/main" val="0"/>
+                    </a:ext>
+                  </a:extLst>
+                </a:blip>
+                <a:stretch>
+                  <a:fillRect/>
+                </a:stretch>
+              </p:blipFill>
+              <p:spPr>
+                <a:xfrm>
+                  <a:off x="4514185" y="6084731"/>
+                  <a:ext cx="274386" cy="225596"/>
+                </a:xfrm>
+                <a:prstGeom prst="rect">
+                  <a:avLst/>
+                </a:prstGeom>
+              </p:spPr>
+            </p:pic>
+            <p:pic>
+              <p:nvPicPr>
+                <p:cNvPr id="18" name="Picture 17"/>
+                <p:cNvPicPr>
+                  <a:picLocks noChangeAspect="1"/>
+                </p:cNvPicPr>
+                <p:nvPr/>
+              </p:nvPicPr>
+              <p:blipFill>
+                <a:blip r:embed="rId8" cstate="print">
+                  <a:extLst>
+                    <a:ext uri="{28A0092B-C50C-407E-A947-70E740481C1C}">
+                      <a14:useLocalDpi xmlns:a14="http://schemas.microsoft.com/office/drawing/2010/main" val="0"/>
+                    </a:ext>
+                  </a:extLst>
+                </a:blip>
+                <a:stretch>
+                  <a:fillRect/>
+                </a:stretch>
+              </p:blipFill>
+              <p:spPr>
+                <a:xfrm flipH="1">
+                  <a:off x="2887074" y="6083191"/>
+                  <a:ext cx="255789" cy="218495"/>
+                </a:xfrm>
+                <a:prstGeom prst="rect">
+                  <a:avLst/>
+                </a:prstGeom>
+              </p:spPr>
+            </p:pic>
+            <p:pic>
+              <p:nvPicPr>
+                <p:cNvPr id="19" name="Picture 18"/>
+                <p:cNvPicPr>
+                  <a:picLocks noChangeAspect="1"/>
+                </p:cNvPicPr>
+                <p:nvPr/>
+              </p:nvPicPr>
+              <p:blipFill>
+                <a:blip r:embed="rId3" cstate="print">
+                  <a:extLst>
+                    <a:ext uri="{28A0092B-C50C-407E-A947-70E740481C1C}">
+                      <a14:useLocalDpi xmlns:a14="http://schemas.microsoft.com/office/drawing/2010/main" val="0"/>
+                    </a:ext>
+                  </a:extLst>
+                </a:blip>
+                <a:stretch>
+                  <a:fillRect/>
+                </a:stretch>
+              </p:blipFill>
+              <p:spPr>
+                <a:xfrm>
+                  <a:off x="8684161" y="6098817"/>
+                  <a:ext cx="325640" cy="161565"/>
+                </a:xfrm>
+                <a:prstGeom prst="rect">
+                  <a:avLst/>
+                </a:prstGeom>
+              </p:spPr>
+            </p:pic>
+            <p:pic>
+              <p:nvPicPr>
+                <p:cNvPr id="21" name="Picture 20"/>
+                <p:cNvPicPr>
+                  <a:picLocks noChangeAspect="1"/>
+                </p:cNvPicPr>
+                <p:nvPr/>
+              </p:nvPicPr>
+              <p:blipFill>
+                <a:blip r:embed="rId4" cstate="print">
+                  <a:extLst>
+                    <a:ext uri="{28A0092B-C50C-407E-A947-70E740481C1C}">
+                      <a14:useLocalDpi xmlns:a14="http://schemas.microsoft.com/office/drawing/2010/main" val="0"/>
+                    </a:ext>
+                  </a:extLst>
+                </a:blip>
+                <a:stretch>
+                  <a:fillRect/>
+                </a:stretch>
+              </p:blipFill>
+              <p:spPr>
+                <a:xfrm>
+                  <a:off x="8314521" y="6066646"/>
+                  <a:ext cx="223459" cy="225596"/>
+                </a:xfrm>
+                <a:prstGeom prst="rect">
+                  <a:avLst/>
+                </a:prstGeom>
+              </p:spPr>
+            </p:pic>
+            <p:pic>
+              <p:nvPicPr>
+                <p:cNvPr id="22" name="Picture 21"/>
+                <p:cNvPicPr>
+                  <a:picLocks noChangeAspect="1"/>
+                </p:cNvPicPr>
+                <p:nvPr/>
+              </p:nvPicPr>
+              <p:blipFill>
+                <a:blip r:embed="rId5" cstate="print">
+                  <a:extLst>
+                    <a:ext uri="{28A0092B-C50C-407E-A947-70E740481C1C}">
+                      <a14:useLocalDpi xmlns:a14="http://schemas.microsoft.com/office/drawing/2010/main" val="0"/>
+                    </a:ext>
+                  </a:extLst>
+                </a:blip>
+                <a:stretch>
+                  <a:fillRect/>
+                </a:stretch>
+              </p:blipFill>
+              <p:spPr>
+                <a:xfrm>
+                  <a:off x="9935906" y="6073040"/>
+                  <a:ext cx="280633" cy="225596"/>
+                </a:xfrm>
+                <a:prstGeom prst="rect">
+                  <a:avLst/>
+                </a:prstGeom>
+              </p:spPr>
+            </p:pic>
+            <p:pic>
+              <p:nvPicPr>
+                <p:cNvPr id="23" name="Picture 22"/>
+                <p:cNvPicPr>
+                  <a:picLocks noChangeAspect="1"/>
+                </p:cNvPicPr>
+                <p:nvPr/>
+              </p:nvPicPr>
+              <p:blipFill>
+                <a:blip r:embed="rId6" cstate="print">
+                  <a:extLst>
+                    <a:ext uri="{28A0092B-C50C-407E-A947-70E740481C1C}">
+                      <a14:useLocalDpi xmlns:a14="http://schemas.microsoft.com/office/drawing/2010/main" val="0"/>
+                    </a:ext>
+                  </a:extLst>
+                </a:blip>
+                <a:stretch>
+                  <a:fillRect/>
+                </a:stretch>
+              </p:blipFill>
+              <p:spPr>
+                <a:xfrm>
+                  <a:off x="7913996" y="6079941"/>
+                  <a:ext cx="254344" cy="224100"/>
+                </a:xfrm>
+                <a:prstGeom prst="rect">
+                  <a:avLst/>
+                </a:prstGeom>
+              </p:spPr>
+            </p:pic>
+            <p:pic>
+              <p:nvPicPr>
+                <p:cNvPr id="24" name="Picture 23"/>
+                <p:cNvPicPr>
+                  <a:picLocks noChangeAspect="1"/>
+                </p:cNvPicPr>
+                <p:nvPr/>
+              </p:nvPicPr>
+              <p:blipFill>
+                <a:blip r:embed="rId7" cstate="print">
+                  <a:extLst>
+                    <a:ext uri="{28A0092B-C50C-407E-A947-70E740481C1C}">
+                      <a14:useLocalDpi xmlns:a14="http://schemas.microsoft.com/office/drawing/2010/main" val="0"/>
+                    </a:ext>
+                  </a:extLst>
+                </a:blip>
+                <a:stretch>
+                  <a:fillRect/>
+                </a:stretch>
+              </p:blipFill>
+              <p:spPr>
+                <a:xfrm>
+                  <a:off x="9134778" y="6081481"/>
+                  <a:ext cx="274386" cy="225596"/>
+                </a:xfrm>
+                <a:prstGeom prst="rect">
+                  <a:avLst/>
+                </a:prstGeom>
+              </p:spPr>
+            </p:pic>
+            <p:pic>
+              <p:nvPicPr>
+                <p:cNvPr id="25" name="Picture 24"/>
+                <p:cNvPicPr>
+                  <a:picLocks noChangeAspect="1"/>
+                </p:cNvPicPr>
+                <p:nvPr/>
+              </p:nvPicPr>
+              <p:blipFill>
+                <a:blip r:embed="rId8" cstate="print">
+                  <a:extLst>
+                    <a:ext uri="{28A0092B-C50C-407E-A947-70E740481C1C}">
+                      <a14:useLocalDpi xmlns:a14="http://schemas.microsoft.com/office/drawing/2010/main" val="0"/>
+                    </a:ext>
+                  </a:extLst>
+                </a:blip>
+                <a:stretch>
+                  <a:fillRect/>
+                </a:stretch>
+              </p:blipFill>
+              <p:spPr>
+                <a:xfrm flipH="1">
+                  <a:off x="7507667" y="6079941"/>
+                  <a:ext cx="255789" cy="218495"/>
+                </a:xfrm>
+                <a:prstGeom prst="rect">
+                  <a:avLst/>
+                </a:prstGeom>
+              </p:spPr>
+            </p:pic>
+          </p:grpSp>
           <p:pic>
             <p:nvPicPr>
-              <p:cNvPr id="12" name="Picture 11"/>
+              <p:cNvPr id="20" name="Picture 19"/>
               <p:cNvPicPr>
                 <a:picLocks noChangeAspect="1"/>
               </p:cNvPicPr>
               <p:nvPr/>
             </p:nvPicPr>
             <p:blipFill>
-              <a:blip r:embed="rId3" cstate="print">
-                <a:extLst>
-                  <a:ext uri="{28A0092B-C50C-407E-A947-70E740481C1C}">
-                    <a14:useLocalDpi xmlns:a14="http://schemas.microsoft.com/office/drawing/2010/main" val="0"/>
-                  </a:ext>
-                </a:extLst>
-              </a:blip>
+              <a:blip r:embed="rId9"/>
               <a:stretch>
                 <a:fillRect/>
               </a:stretch>
             </p:blipFill>
             <p:spPr>
               <a:xfrm>
-                <a:off x="4063568" y="6102067"/>
-                <a:ext cx="325640" cy="161565"/>
-              </a:xfrm>
-              <a:prstGeom prst="rect">
-                <a:avLst/>
-              </a:prstGeom>
-            </p:spPr>
-          </p:pic>
-          <p:pic>
-            <p:nvPicPr>
-              <p:cNvPr id="14" name="Picture 13"/>
-              <p:cNvPicPr>
-                <a:picLocks noChangeAspect="1"/>
-              </p:cNvPicPr>
-              <p:nvPr/>
-            </p:nvPicPr>
-            <p:blipFill>
-              <a:blip r:embed="rId4" cstate="print">
-                <a:extLst>
-                  <a:ext uri="{28A0092B-C50C-407E-A947-70E740481C1C}">
-                    <a14:useLocalDpi xmlns:a14="http://schemas.microsoft.com/office/drawing/2010/main" val="0"/>
-                  </a:ext>
-                </a:extLst>
-              </a:blip>
-              <a:stretch>
-                <a:fillRect/>
-              </a:stretch>
-            </p:blipFill>
-            <p:spPr>
-              <a:xfrm>
-                <a:off x="3693928" y="6069896"/>
-                <a:ext cx="223459" cy="225596"/>
-              </a:xfrm>
-              <a:prstGeom prst="rect">
-                <a:avLst/>
-              </a:prstGeom>
-            </p:spPr>
-          </p:pic>
-          <p:pic>
-            <p:nvPicPr>
-              <p:cNvPr id="15" name="Picture 14"/>
-              <p:cNvPicPr>
-                <a:picLocks noChangeAspect="1"/>
-              </p:cNvPicPr>
-              <p:nvPr/>
-            </p:nvPicPr>
-            <p:blipFill>
-              <a:blip r:embed="rId5" cstate="print">
-                <a:extLst>
-                  <a:ext uri="{28A0092B-C50C-407E-A947-70E740481C1C}">
-                    <a14:useLocalDpi xmlns:a14="http://schemas.microsoft.com/office/drawing/2010/main" val="0"/>
-                  </a:ext>
-                </a:extLst>
-              </a:blip>
-              <a:stretch>
-                <a:fillRect/>
-              </a:stretch>
-            </p:blipFill>
-            <p:spPr>
-              <a:xfrm>
-                <a:off x="5345440" y="6084945"/>
-                <a:ext cx="280633" cy="225596"/>
-              </a:xfrm>
-              <a:prstGeom prst="rect">
-                <a:avLst/>
-              </a:prstGeom>
-            </p:spPr>
-          </p:pic>
-          <p:pic>
-            <p:nvPicPr>
-              <p:cNvPr id="16" name="Picture 15"/>
-              <p:cNvPicPr>
-                <a:picLocks noChangeAspect="1"/>
-              </p:cNvPicPr>
-              <p:nvPr/>
-            </p:nvPicPr>
-            <p:blipFill>
-              <a:blip r:embed="rId6" cstate="print">
-                <a:extLst>
-                  <a:ext uri="{28A0092B-C50C-407E-A947-70E740481C1C}">
-                    <a14:useLocalDpi xmlns:a14="http://schemas.microsoft.com/office/drawing/2010/main" val="0"/>
-                  </a:ext>
-                </a:extLst>
-              </a:blip>
-              <a:stretch>
-                <a:fillRect/>
-              </a:stretch>
-            </p:blipFill>
-            <p:spPr>
-              <a:xfrm>
-                <a:off x="3293403" y="6083191"/>
-                <a:ext cx="254344" cy="224100"/>
-              </a:xfrm>
-              <a:prstGeom prst="rect">
-                <a:avLst/>
-              </a:prstGeom>
-            </p:spPr>
-          </p:pic>
-          <p:pic>
-            <p:nvPicPr>
-              <p:cNvPr id="17" name="Picture 16"/>
-              <p:cNvPicPr>
-                <a:picLocks noChangeAspect="1"/>
-              </p:cNvPicPr>
-              <p:nvPr/>
-            </p:nvPicPr>
-            <p:blipFill>
-              <a:blip r:embed="rId7" cstate="print">
-                <a:extLst>
-                  <a:ext uri="{28A0092B-C50C-407E-A947-70E740481C1C}">
-                    <a14:useLocalDpi xmlns:a14="http://schemas.microsoft.com/office/drawing/2010/main" val="0"/>
-                  </a:ext>
-                </a:extLst>
-              </a:blip>
-              <a:stretch>
-                <a:fillRect/>
-              </a:stretch>
-            </p:blipFill>
-            <p:spPr>
-              <a:xfrm>
-                <a:off x="4514185" y="6084731"/>
-                <a:ext cx="274386" cy="225596"/>
-              </a:xfrm>
-              <a:prstGeom prst="rect">
-                <a:avLst/>
-              </a:prstGeom>
-            </p:spPr>
-          </p:pic>
-          <p:pic>
-            <p:nvPicPr>
-              <p:cNvPr id="18" name="Picture 17"/>
-              <p:cNvPicPr>
-                <a:picLocks noChangeAspect="1"/>
-              </p:cNvPicPr>
-              <p:nvPr/>
-            </p:nvPicPr>
-            <p:blipFill>
-              <a:blip r:embed="rId8" cstate="print">
-                <a:extLst>
-                  <a:ext uri="{28A0092B-C50C-407E-A947-70E740481C1C}">
-                    <a14:useLocalDpi xmlns:a14="http://schemas.microsoft.com/office/drawing/2010/main" val="0"/>
-                  </a:ext>
-                </a:extLst>
-              </a:blip>
-              <a:stretch>
-                <a:fillRect/>
-              </a:stretch>
-            </p:blipFill>
-            <p:spPr>
-              <a:xfrm flipH="1">
-                <a:off x="2887074" y="6083191"/>
-                <a:ext cx="255789" cy="218495"/>
-              </a:xfrm>
-              <a:prstGeom prst="rect">
-                <a:avLst/>
-              </a:prstGeom>
-            </p:spPr>
-          </p:pic>
-          <p:pic>
-            <p:nvPicPr>
-              <p:cNvPr id="19" name="Picture 18"/>
-              <p:cNvPicPr>
-                <a:picLocks noChangeAspect="1"/>
-              </p:cNvPicPr>
-              <p:nvPr/>
-            </p:nvPicPr>
-            <p:blipFill>
-              <a:blip r:embed="rId3" cstate="print">
-                <a:extLst>
-                  <a:ext uri="{28A0092B-C50C-407E-A947-70E740481C1C}">
-                    <a14:useLocalDpi xmlns:a14="http://schemas.microsoft.com/office/drawing/2010/main" val="0"/>
-                  </a:ext>
-                </a:extLst>
-              </a:blip>
-              <a:stretch>
-                <a:fillRect/>
-              </a:stretch>
-            </p:blipFill>
-            <p:spPr>
-              <a:xfrm>
-                <a:off x="8684161" y="6098817"/>
-                <a:ext cx="325640" cy="161565"/>
-              </a:xfrm>
-              <a:prstGeom prst="rect">
-                <a:avLst/>
-              </a:prstGeom>
-            </p:spPr>
-          </p:pic>
-          <p:pic>
-            <p:nvPicPr>
-              <p:cNvPr id="21" name="Picture 20"/>
-              <p:cNvPicPr>
-                <a:picLocks noChangeAspect="1"/>
-              </p:cNvPicPr>
-              <p:nvPr/>
-            </p:nvPicPr>
-            <p:blipFill>
-              <a:blip r:embed="rId4" cstate="print">
-                <a:extLst>
-                  <a:ext uri="{28A0092B-C50C-407E-A947-70E740481C1C}">
-                    <a14:useLocalDpi xmlns:a14="http://schemas.microsoft.com/office/drawing/2010/main" val="0"/>
-                  </a:ext>
-                </a:extLst>
-              </a:blip>
-              <a:stretch>
-                <a:fillRect/>
-              </a:stretch>
-            </p:blipFill>
-            <p:spPr>
-              <a:xfrm>
-                <a:off x="8314521" y="6066646"/>
-                <a:ext cx="223459" cy="225596"/>
-              </a:xfrm>
-              <a:prstGeom prst="rect">
-                <a:avLst/>
-              </a:prstGeom>
-            </p:spPr>
-          </p:pic>
-          <p:pic>
-            <p:nvPicPr>
-              <p:cNvPr id="22" name="Picture 21"/>
-              <p:cNvPicPr>
-                <a:picLocks noChangeAspect="1"/>
-              </p:cNvPicPr>
-              <p:nvPr/>
-            </p:nvPicPr>
-            <p:blipFill>
-              <a:blip r:embed="rId5" cstate="print">
-                <a:extLst>
-                  <a:ext uri="{28A0092B-C50C-407E-A947-70E740481C1C}">
-                    <a14:useLocalDpi xmlns:a14="http://schemas.microsoft.com/office/drawing/2010/main" val="0"/>
-                  </a:ext>
-                </a:extLst>
-              </a:blip>
-              <a:stretch>
-                <a:fillRect/>
-              </a:stretch>
-            </p:blipFill>
-            <p:spPr>
-              <a:xfrm>
-                <a:off x="9935906" y="6073040"/>
-                <a:ext cx="280633" cy="225596"/>
-              </a:xfrm>
-              <a:prstGeom prst="rect">
-                <a:avLst/>
-              </a:prstGeom>
-            </p:spPr>
-          </p:pic>
-          <p:pic>
-            <p:nvPicPr>
-              <p:cNvPr id="23" name="Picture 22"/>
-              <p:cNvPicPr>
-                <a:picLocks noChangeAspect="1"/>
-              </p:cNvPicPr>
-              <p:nvPr/>
-            </p:nvPicPr>
-            <p:blipFill>
-              <a:blip r:embed="rId6" cstate="print">
-                <a:extLst>
-                  <a:ext uri="{28A0092B-C50C-407E-A947-70E740481C1C}">
-                    <a14:useLocalDpi xmlns:a14="http://schemas.microsoft.com/office/drawing/2010/main" val="0"/>
-                  </a:ext>
-                </a:extLst>
-              </a:blip>
-              <a:stretch>
-                <a:fillRect/>
-              </a:stretch>
-            </p:blipFill>
-            <p:spPr>
-              <a:xfrm>
-                <a:off x="7913996" y="6079941"/>
-                <a:ext cx="254344" cy="224100"/>
-              </a:xfrm>
-              <a:prstGeom prst="rect">
-                <a:avLst/>
-              </a:prstGeom>
-            </p:spPr>
-          </p:pic>
-          <p:pic>
-            <p:nvPicPr>
-              <p:cNvPr id="24" name="Picture 23"/>
-              <p:cNvPicPr>
-                <a:picLocks noChangeAspect="1"/>
-              </p:cNvPicPr>
-              <p:nvPr/>
-            </p:nvPicPr>
-            <p:blipFill>
-              <a:blip r:embed="rId7" cstate="print">
-                <a:extLst>
-                  <a:ext uri="{28A0092B-C50C-407E-A947-70E740481C1C}">
-                    <a14:useLocalDpi xmlns:a14="http://schemas.microsoft.com/office/drawing/2010/main" val="0"/>
-                  </a:ext>
-                </a:extLst>
-              </a:blip>
-              <a:stretch>
-                <a:fillRect/>
-              </a:stretch>
-            </p:blipFill>
-            <p:spPr>
-              <a:xfrm>
-                <a:off x="9134778" y="6081481"/>
-                <a:ext cx="274386" cy="225596"/>
-              </a:xfrm>
-              <a:prstGeom prst="rect">
-                <a:avLst/>
-              </a:prstGeom>
-            </p:spPr>
-          </p:pic>
-          <p:pic>
-            <p:nvPicPr>
-              <p:cNvPr id="25" name="Picture 24"/>
-              <p:cNvPicPr>
-                <a:picLocks noChangeAspect="1"/>
-              </p:cNvPicPr>
-              <p:nvPr/>
-            </p:nvPicPr>
-            <p:blipFill>
-              <a:blip r:embed="rId8" cstate="print">
-                <a:extLst>
-                  <a:ext uri="{28A0092B-C50C-407E-A947-70E740481C1C}">
-                    <a14:useLocalDpi xmlns:a14="http://schemas.microsoft.com/office/drawing/2010/main" val="0"/>
-                  </a:ext>
-                </a:extLst>
-              </a:blip>
-              <a:stretch>
-                <a:fillRect/>
-              </a:stretch>
-            </p:blipFill>
-            <p:spPr>
-              <a:xfrm flipH="1">
-                <a:off x="7507667" y="6079941"/>
-                <a:ext cx="255789" cy="218495"/>
+                <a:off x="4734039" y="6066646"/>
+                <a:ext cx="302061" cy="235941"/>
               </a:xfrm>
               <a:prstGeom prst="rect">
                 <a:avLst/>
@@ -4414,55 +4453,31 @@
             </p:spPr>
           </p:pic>
         </p:grpSp>
-        <p:pic>
-          <p:nvPicPr>
-            <p:cNvPr id="20" name="Picture 19"/>
-            <p:cNvPicPr>
-              <a:picLocks noChangeAspect="1"/>
-            </p:cNvPicPr>
-            <p:nvPr/>
-          </p:nvPicPr>
-          <p:blipFill>
-            <a:blip r:embed="rId9"/>
-            <a:stretch>
-              <a:fillRect/>
-            </a:stretch>
-          </p:blipFill>
-          <p:spPr>
-            <a:xfrm>
-              <a:off x="4935207" y="6066646"/>
-              <a:ext cx="302061" cy="235941"/>
-            </a:xfrm>
-            <a:prstGeom prst="rect">
-              <a:avLst/>
-            </a:prstGeom>
-          </p:spPr>
-        </p:pic>
-        <p:pic>
-          <p:nvPicPr>
-            <p:cNvPr id="28" name="Picture 27"/>
-            <p:cNvPicPr>
-              <a:picLocks noChangeAspect="1"/>
-            </p:cNvPicPr>
-            <p:nvPr/>
-          </p:nvPicPr>
-          <p:blipFill>
-            <a:blip r:embed="rId9"/>
-            <a:stretch>
-              <a:fillRect/>
-            </a:stretch>
-          </p:blipFill>
-          <p:spPr>
-            <a:xfrm>
-              <a:off x="9553073" y="6079941"/>
-              <a:ext cx="302061" cy="235941"/>
-            </a:xfrm>
-            <a:prstGeom prst="rect">
-              <a:avLst/>
-            </a:prstGeom>
-          </p:spPr>
-        </p:pic>
       </p:grpSp>
+      <p:pic>
+        <p:nvPicPr>
+          <p:cNvPr id="28" name="Picture 27"/>
+          <p:cNvPicPr>
+            <a:picLocks noChangeAspect="1"/>
+          </p:cNvPicPr>
+          <p:nvPr/>
+        </p:nvPicPr>
+        <p:blipFill>
+          <a:blip r:embed="rId9"/>
+          <a:stretch>
+            <a:fillRect/>
+          </a:stretch>
+        </p:blipFill>
+        <p:spPr>
+          <a:xfrm>
+            <a:off x="9351905" y="6079941"/>
+            <a:ext cx="302061" cy="235941"/>
+          </a:xfrm>
+          <a:prstGeom prst="rect">
+            <a:avLst/>
+          </a:prstGeom>
+        </p:spPr>
+      </p:pic>
     </p:spTree>
     <p:extLst>
       <p:ext uri="{BB962C8B-B14F-4D97-AF65-F5344CB8AC3E}">

</xml_diff>

<commit_message>
redid fi 2a and 2b with updated bbs data
</commit_message>
<xml_diff>
--- a/output/plots/Presentation1.pptx
+++ b/output/plots/Presentation1.pptx
@@ -199,7 +199,7 @@
           <a:p>
             <a:fld id="{7FA21820-D199-4D82-91AF-C50B1D3B111A}" type="datetimeFigureOut">
               <a:rPr lang="en-US" smtClean="0"/>
-              <a:t>1/30/2017</a:t>
+              <a:t>2/1/2017</a:t>
             </a:fld>
             <a:endParaRPr lang="en-US"/>
           </a:p>
@@ -757,7 +757,7 @@
           <a:p>
             <a:fld id="{916B8C92-D5E3-4480-8685-D57BEE386DE2}" type="datetimeFigureOut">
               <a:rPr lang="en-US" smtClean="0"/>
-              <a:t>1/30/2017</a:t>
+              <a:t>2/1/2017</a:t>
             </a:fld>
             <a:endParaRPr lang="en-US"/>
           </a:p>
@@ -927,7 +927,7 @@
           <a:p>
             <a:fld id="{916B8C92-D5E3-4480-8685-D57BEE386DE2}" type="datetimeFigureOut">
               <a:rPr lang="en-US" smtClean="0"/>
-              <a:t>1/30/2017</a:t>
+              <a:t>2/1/2017</a:t>
             </a:fld>
             <a:endParaRPr lang="en-US"/>
           </a:p>
@@ -1107,7 +1107,7 @@
           <a:p>
             <a:fld id="{916B8C92-D5E3-4480-8685-D57BEE386DE2}" type="datetimeFigureOut">
               <a:rPr lang="en-US" smtClean="0"/>
-              <a:t>1/30/2017</a:t>
+              <a:t>2/1/2017</a:t>
             </a:fld>
             <a:endParaRPr lang="en-US"/>
           </a:p>
@@ -1277,7 +1277,7 @@
           <a:p>
             <a:fld id="{916B8C92-D5E3-4480-8685-D57BEE386DE2}" type="datetimeFigureOut">
               <a:rPr lang="en-US" smtClean="0"/>
-              <a:t>1/30/2017</a:t>
+              <a:t>2/1/2017</a:t>
             </a:fld>
             <a:endParaRPr lang="en-US"/>
           </a:p>
@@ -1523,7 +1523,7 @@
           <a:p>
             <a:fld id="{916B8C92-D5E3-4480-8685-D57BEE386DE2}" type="datetimeFigureOut">
               <a:rPr lang="en-US" smtClean="0"/>
-              <a:t>1/30/2017</a:t>
+              <a:t>2/1/2017</a:t>
             </a:fld>
             <a:endParaRPr lang="en-US"/>
           </a:p>
@@ -1755,7 +1755,7 @@
           <a:p>
             <a:fld id="{916B8C92-D5E3-4480-8685-D57BEE386DE2}" type="datetimeFigureOut">
               <a:rPr lang="en-US" smtClean="0"/>
-              <a:t>1/30/2017</a:t>
+              <a:t>2/1/2017</a:t>
             </a:fld>
             <a:endParaRPr lang="en-US"/>
           </a:p>
@@ -2122,7 +2122,7 @@
           <a:p>
             <a:fld id="{916B8C92-D5E3-4480-8685-D57BEE386DE2}" type="datetimeFigureOut">
               <a:rPr lang="en-US" smtClean="0"/>
-              <a:t>1/30/2017</a:t>
+              <a:t>2/1/2017</a:t>
             </a:fld>
             <a:endParaRPr lang="en-US"/>
           </a:p>
@@ -2240,7 +2240,7 @@
           <a:p>
             <a:fld id="{916B8C92-D5E3-4480-8685-D57BEE386DE2}" type="datetimeFigureOut">
               <a:rPr lang="en-US" smtClean="0"/>
-              <a:t>1/30/2017</a:t>
+              <a:t>2/1/2017</a:t>
             </a:fld>
             <a:endParaRPr lang="en-US"/>
           </a:p>
@@ -2335,7 +2335,7 @@
           <a:p>
             <a:fld id="{916B8C92-D5E3-4480-8685-D57BEE386DE2}" type="datetimeFigureOut">
               <a:rPr lang="en-US" smtClean="0"/>
-              <a:t>1/30/2017</a:t>
+              <a:t>2/1/2017</a:t>
             </a:fld>
             <a:endParaRPr lang="en-US"/>
           </a:p>
@@ -2612,7 +2612,7 @@
           <a:p>
             <a:fld id="{916B8C92-D5E3-4480-8685-D57BEE386DE2}" type="datetimeFigureOut">
               <a:rPr lang="en-US" smtClean="0"/>
-              <a:t>1/30/2017</a:t>
+              <a:t>2/1/2017</a:t>
             </a:fld>
             <a:endParaRPr lang="en-US"/>
           </a:p>
@@ -2865,7 +2865,7 @@
           <a:p>
             <a:fld id="{916B8C92-D5E3-4480-8685-D57BEE386DE2}" type="datetimeFigureOut">
               <a:rPr lang="en-US" smtClean="0"/>
-              <a:t>1/30/2017</a:t>
+              <a:t>2/1/2017</a:t>
             </a:fld>
             <a:endParaRPr lang="en-US"/>
           </a:p>
@@ -3078,7 +3078,7 @@
           <a:p>
             <a:fld id="{916B8C92-D5E3-4480-8685-D57BEE386DE2}" type="datetimeFigureOut">
               <a:rPr lang="en-US" smtClean="0"/>
-              <a:t>1/30/2017</a:t>
+              <a:t>2/1/2017</a:t>
             </a:fld>
             <a:endParaRPr lang="en-US"/>
           </a:p>
@@ -4510,21 +4510,21 @@
       </p:grpSpPr>
       <p:grpSp>
         <p:nvGrpSpPr>
-          <p:cNvPr id="13" name="Group 12"/>
+          <p:cNvPr id="8" name="Group 7"/>
           <p:cNvGrpSpPr/>
           <p:nvPr/>
         </p:nvGrpSpPr>
         <p:grpSpPr>
           <a:xfrm>
-            <a:off x="-1" y="956538"/>
-            <a:ext cx="12192001" cy="4878645"/>
-            <a:chOff x="-1" y="956538"/>
-            <a:chExt cx="12192001" cy="4878645"/>
+            <a:off x="125417" y="1268964"/>
+            <a:ext cx="11908632" cy="4320831"/>
+            <a:chOff x="125417" y="1268964"/>
+            <a:chExt cx="11908632" cy="4320831"/>
           </a:xfrm>
         </p:grpSpPr>
         <p:pic>
           <p:nvPicPr>
-            <p:cNvPr id="2" name="Picture 1"/>
+            <p:cNvPr id="4" name="Picture 3"/>
             <p:cNvPicPr>
               <a:picLocks noChangeAspect="1"/>
             </p:cNvPicPr>
@@ -4538,8 +4538,8 @@
           </p:blipFill>
           <p:spPr>
             <a:xfrm>
-              <a:off x="-1" y="956538"/>
-              <a:ext cx="12192001" cy="4878645"/>
+              <a:off x="125417" y="1268964"/>
+              <a:ext cx="11908632" cy="4320831"/>
             </a:xfrm>
             <a:prstGeom prst="rect">
               <a:avLst/>

</xml_diff>

<commit_message>
working on figures/model output
</commit_message>
<xml_diff>
--- a/output/plots/Presentation1.pptx
+++ b/output/plots/Presentation1.pptx
@@ -5,12 +5,13 @@
     <p:sldMasterId id="2147483648" r:id="rId1"/>
   </p:sldMasterIdLst>
   <p:notesMasterIdLst>
-    <p:notesMasterId r:id="rId5"/>
+    <p:notesMasterId r:id="rId6"/>
   </p:notesMasterIdLst>
   <p:sldIdLst>
     <p:sldId id="258" r:id="rId2"/>
     <p:sldId id="257" r:id="rId3"/>
-    <p:sldId id="256" r:id="rId4"/>
+    <p:sldId id="259" r:id="rId4"/>
+    <p:sldId id="256" r:id="rId5"/>
   </p:sldIdLst>
   <p:sldSz cx="12192000" cy="6858000"/>
   <p:notesSz cx="6858000" cy="9144000"/>
@@ -4003,7 +4004,7 @@
       </p:grpSpPr>
       <p:grpSp>
         <p:nvGrpSpPr>
-          <p:cNvPr id="7" name="Group 6"/>
+          <p:cNvPr id="2" name="Group 1"/>
           <p:cNvGrpSpPr/>
           <p:nvPr/>
         </p:nvGrpSpPr>
@@ -4015,47 +4016,47 @@
             <a:chExt cx="9003587" cy="6196018"/>
           </a:xfrm>
         </p:grpSpPr>
-        <p:pic>
-          <p:nvPicPr>
-            <p:cNvPr id="4" name="Picture 3"/>
-            <p:cNvPicPr>
-              <a:picLocks noChangeAspect="1"/>
-            </p:cNvPicPr>
-            <p:nvPr/>
-          </p:nvPicPr>
-          <p:blipFill>
-            <a:blip r:embed="rId2"/>
-            <a:stretch>
-              <a:fillRect/>
-            </a:stretch>
-          </p:blipFill>
-          <p:spPr>
-            <a:xfrm>
-              <a:off x="1291276" y="119864"/>
-              <a:ext cx="9003587" cy="6196018"/>
-            </a:xfrm>
-            <a:prstGeom prst="rect">
-              <a:avLst/>
-            </a:prstGeom>
-          </p:spPr>
-        </p:pic>
         <p:grpSp>
           <p:nvGrpSpPr>
-            <p:cNvPr id="5" name="Group 4"/>
+            <p:cNvPr id="7" name="Group 6"/>
             <p:cNvGrpSpPr/>
             <p:nvPr/>
           </p:nvGrpSpPr>
           <p:grpSpPr>
             <a:xfrm>
-              <a:off x="2721075" y="6066646"/>
-              <a:ext cx="7329465" cy="243895"/>
-              <a:chOff x="2721075" y="6066646"/>
-              <a:chExt cx="7329465" cy="243895"/>
+              <a:off x="1291276" y="119864"/>
+              <a:ext cx="9003587" cy="6196018"/>
+              <a:chOff x="1291276" y="119864"/>
+              <a:chExt cx="9003587" cy="6196018"/>
             </a:xfrm>
           </p:grpSpPr>
+          <p:pic>
+            <p:nvPicPr>
+              <p:cNvPr id="4" name="Picture 3"/>
+              <p:cNvPicPr>
+                <a:picLocks noChangeAspect="1"/>
+              </p:cNvPicPr>
+              <p:nvPr/>
+            </p:nvPicPr>
+            <p:blipFill>
+              <a:blip r:embed="rId2"/>
+              <a:stretch>
+                <a:fillRect/>
+              </a:stretch>
+            </p:blipFill>
+            <p:spPr>
+              <a:xfrm>
+                <a:off x="1291276" y="119864"/>
+                <a:ext cx="9003587" cy="6196018"/>
+              </a:xfrm>
+              <a:prstGeom prst="rect">
+                <a:avLst/>
+              </a:prstGeom>
+            </p:spPr>
+          </p:pic>
           <p:grpSp>
             <p:nvGrpSpPr>
-              <p:cNvPr id="3" name="Group 2"/>
+              <p:cNvPr id="5" name="Group 4"/>
               <p:cNvGrpSpPr/>
               <p:nvPr/>
             </p:nvGrpSpPr>
@@ -4063,364 +4064,403 @@
               <a:xfrm>
                 <a:off x="2721075" y="6066646"/>
                 <a:ext cx="7329465" cy="243895"/>
-                <a:chOff x="2887074" y="6066646"/>
+                <a:chOff x="2721075" y="6066646"/>
                 <a:chExt cx="7329465" cy="243895"/>
               </a:xfrm>
             </p:grpSpPr>
+            <p:grpSp>
+              <p:nvGrpSpPr>
+                <p:cNvPr id="3" name="Group 2"/>
+                <p:cNvGrpSpPr/>
+                <p:nvPr/>
+              </p:nvGrpSpPr>
+              <p:grpSpPr>
+                <a:xfrm>
+                  <a:off x="2721075" y="6066646"/>
+                  <a:ext cx="7329465" cy="243895"/>
+                  <a:chOff x="2887074" y="6066646"/>
+                  <a:chExt cx="7329465" cy="243895"/>
+                </a:xfrm>
+              </p:grpSpPr>
+              <p:pic>
+                <p:nvPicPr>
+                  <p:cNvPr id="12" name="Picture 11"/>
+                  <p:cNvPicPr>
+                    <a:picLocks noChangeAspect="1"/>
+                  </p:cNvPicPr>
+                  <p:nvPr/>
+                </p:nvPicPr>
+                <p:blipFill>
+                  <a:blip r:embed="rId3" cstate="print">
+                    <a:extLst>
+                      <a:ext uri="{28A0092B-C50C-407E-A947-70E740481C1C}">
+                        <a14:useLocalDpi xmlns:a14="http://schemas.microsoft.com/office/drawing/2010/main" val="0"/>
+                      </a:ext>
+                    </a:extLst>
+                  </a:blip>
+                  <a:stretch>
+                    <a:fillRect/>
+                  </a:stretch>
+                </p:blipFill>
+                <p:spPr>
+                  <a:xfrm>
+                    <a:off x="4063568" y="6102067"/>
+                    <a:ext cx="325640" cy="161565"/>
+                  </a:xfrm>
+                  <a:prstGeom prst="rect">
+                    <a:avLst/>
+                  </a:prstGeom>
+                </p:spPr>
+              </p:pic>
+              <p:pic>
+                <p:nvPicPr>
+                  <p:cNvPr id="14" name="Picture 13"/>
+                  <p:cNvPicPr>
+                    <a:picLocks noChangeAspect="1"/>
+                  </p:cNvPicPr>
+                  <p:nvPr/>
+                </p:nvPicPr>
+                <p:blipFill>
+                  <a:blip r:embed="rId4" cstate="print">
+                    <a:extLst>
+                      <a:ext uri="{28A0092B-C50C-407E-A947-70E740481C1C}">
+                        <a14:useLocalDpi xmlns:a14="http://schemas.microsoft.com/office/drawing/2010/main" val="0"/>
+                      </a:ext>
+                    </a:extLst>
+                  </a:blip>
+                  <a:stretch>
+                    <a:fillRect/>
+                  </a:stretch>
+                </p:blipFill>
+                <p:spPr>
+                  <a:xfrm>
+                    <a:off x="3693928" y="6069896"/>
+                    <a:ext cx="223459" cy="225596"/>
+                  </a:xfrm>
+                  <a:prstGeom prst="rect">
+                    <a:avLst/>
+                  </a:prstGeom>
+                </p:spPr>
+              </p:pic>
+              <p:pic>
+                <p:nvPicPr>
+                  <p:cNvPr id="15" name="Picture 14"/>
+                  <p:cNvPicPr>
+                    <a:picLocks noChangeAspect="1"/>
+                  </p:cNvPicPr>
+                  <p:nvPr/>
+                </p:nvPicPr>
+                <p:blipFill>
+                  <a:blip r:embed="rId5" cstate="print">
+                    <a:extLst>
+                      <a:ext uri="{28A0092B-C50C-407E-A947-70E740481C1C}">
+                        <a14:useLocalDpi xmlns:a14="http://schemas.microsoft.com/office/drawing/2010/main" val="0"/>
+                      </a:ext>
+                    </a:extLst>
+                  </a:blip>
+                  <a:stretch>
+                    <a:fillRect/>
+                  </a:stretch>
+                </p:blipFill>
+                <p:spPr>
+                  <a:xfrm>
+                    <a:off x="5345440" y="6084945"/>
+                    <a:ext cx="280633" cy="225596"/>
+                  </a:xfrm>
+                  <a:prstGeom prst="rect">
+                    <a:avLst/>
+                  </a:prstGeom>
+                </p:spPr>
+              </p:pic>
+              <p:pic>
+                <p:nvPicPr>
+                  <p:cNvPr id="16" name="Picture 15"/>
+                  <p:cNvPicPr>
+                    <a:picLocks noChangeAspect="1"/>
+                  </p:cNvPicPr>
+                  <p:nvPr/>
+                </p:nvPicPr>
+                <p:blipFill>
+                  <a:blip r:embed="rId6" cstate="print">
+                    <a:extLst>
+                      <a:ext uri="{28A0092B-C50C-407E-A947-70E740481C1C}">
+                        <a14:useLocalDpi xmlns:a14="http://schemas.microsoft.com/office/drawing/2010/main" val="0"/>
+                      </a:ext>
+                    </a:extLst>
+                  </a:blip>
+                  <a:stretch>
+                    <a:fillRect/>
+                  </a:stretch>
+                </p:blipFill>
+                <p:spPr>
+                  <a:xfrm>
+                    <a:off x="3293403" y="6083191"/>
+                    <a:ext cx="254344" cy="224100"/>
+                  </a:xfrm>
+                  <a:prstGeom prst="rect">
+                    <a:avLst/>
+                  </a:prstGeom>
+                </p:spPr>
+              </p:pic>
+              <p:pic>
+                <p:nvPicPr>
+                  <p:cNvPr id="17" name="Picture 16"/>
+                  <p:cNvPicPr>
+                    <a:picLocks noChangeAspect="1"/>
+                  </p:cNvPicPr>
+                  <p:nvPr/>
+                </p:nvPicPr>
+                <p:blipFill>
+                  <a:blip r:embed="rId7" cstate="print">
+                    <a:extLst>
+                      <a:ext uri="{28A0092B-C50C-407E-A947-70E740481C1C}">
+                        <a14:useLocalDpi xmlns:a14="http://schemas.microsoft.com/office/drawing/2010/main" val="0"/>
+                      </a:ext>
+                    </a:extLst>
+                  </a:blip>
+                  <a:stretch>
+                    <a:fillRect/>
+                  </a:stretch>
+                </p:blipFill>
+                <p:spPr>
+                  <a:xfrm>
+                    <a:off x="4514185" y="6084731"/>
+                    <a:ext cx="274386" cy="225596"/>
+                  </a:xfrm>
+                  <a:prstGeom prst="rect">
+                    <a:avLst/>
+                  </a:prstGeom>
+                </p:spPr>
+              </p:pic>
+              <p:pic>
+                <p:nvPicPr>
+                  <p:cNvPr id="18" name="Picture 17"/>
+                  <p:cNvPicPr>
+                    <a:picLocks noChangeAspect="1"/>
+                  </p:cNvPicPr>
+                  <p:nvPr/>
+                </p:nvPicPr>
+                <p:blipFill>
+                  <a:blip r:embed="rId8" cstate="print">
+                    <a:extLst>
+                      <a:ext uri="{28A0092B-C50C-407E-A947-70E740481C1C}">
+                        <a14:useLocalDpi xmlns:a14="http://schemas.microsoft.com/office/drawing/2010/main" val="0"/>
+                      </a:ext>
+                    </a:extLst>
+                  </a:blip>
+                  <a:stretch>
+                    <a:fillRect/>
+                  </a:stretch>
+                </p:blipFill>
+                <p:spPr>
+                  <a:xfrm flipH="1">
+                    <a:off x="2887074" y="6083191"/>
+                    <a:ext cx="255789" cy="218495"/>
+                  </a:xfrm>
+                  <a:prstGeom prst="rect">
+                    <a:avLst/>
+                  </a:prstGeom>
+                </p:spPr>
+              </p:pic>
+              <p:pic>
+                <p:nvPicPr>
+                  <p:cNvPr id="19" name="Picture 18"/>
+                  <p:cNvPicPr>
+                    <a:picLocks noChangeAspect="1"/>
+                  </p:cNvPicPr>
+                  <p:nvPr/>
+                </p:nvPicPr>
+                <p:blipFill>
+                  <a:blip r:embed="rId3" cstate="print">
+                    <a:extLst>
+                      <a:ext uri="{28A0092B-C50C-407E-A947-70E740481C1C}">
+                        <a14:useLocalDpi xmlns:a14="http://schemas.microsoft.com/office/drawing/2010/main" val="0"/>
+                      </a:ext>
+                    </a:extLst>
+                  </a:blip>
+                  <a:stretch>
+                    <a:fillRect/>
+                  </a:stretch>
+                </p:blipFill>
+                <p:spPr>
+                  <a:xfrm>
+                    <a:off x="8684161" y="6098817"/>
+                    <a:ext cx="325640" cy="161565"/>
+                  </a:xfrm>
+                  <a:prstGeom prst="rect">
+                    <a:avLst/>
+                  </a:prstGeom>
+                </p:spPr>
+              </p:pic>
+              <p:pic>
+                <p:nvPicPr>
+                  <p:cNvPr id="21" name="Picture 20"/>
+                  <p:cNvPicPr>
+                    <a:picLocks noChangeAspect="1"/>
+                  </p:cNvPicPr>
+                  <p:nvPr/>
+                </p:nvPicPr>
+                <p:blipFill>
+                  <a:blip r:embed="rId4" cstate="print">
+                    <a:extLst>
+                      <a:ext uri="{28A0092B-C50C-407E-A947-70E740481C1C}">
+                        <a14:useLocalDpi xmlns:a14="http://schemas.microsoft.com/office/drawing/2010/main" val="0"/>
+                      </a:ext>
+                    </a:extLst>
+                  </a:blip>
+                  <a:stretch>
+                    <a:fillRect/>
+                  </a:stretch>
+                </p:blipFill>
+                <p:spPr>
+                  <a:xfrm>
+                    <a:off x="8314521" y="6066646"/>
+                    <a:ext cx="223459" cy="225596"/>
+                  </a:xfrm>
+                  <a:prstGeom prst="rect">
+                    <a:avLst/>
+                  </a:prstGeom>
+                </p:spPr>
+              </p:pic>
+              <p:pic>
+                <p:nvPicPr>
+                  <p:cNvPr id="22" name="Picture 21"/>
+                  <p:cNvPicPr>
+                    <a:picLocks noChangeAspect="1"/>
+                  </p:cNvPicPr>
+                  <p:nvPr/>
+                </p:nvPicPr>
+                <p:blipFill>
+                  <a:blip r:embed="rId5" cstate="print">
+                    <a:extLst>
+                      <a:ext uri="{28A0092B-C50C-407E-A947-70E740481C1C}">
+                        <a14:useLocalDpi xmlns:a14="http://schemas.microsoft.com/office/drawing/2010/main" val="0"/>
+                      </a:ext>
+                    </a:extLst>
+                  </a:blip>
+                  <a:stretch>
+                    <a:fillRect/>
+                  </a:stretch>
+                </p:blipFill>
+                <p:spPr>
+                  <a:xfrm>
+                    <a:off x="9935906" y="6073040"/>
+                    <a:ext cx="280633" cy="225596"/>
+                  </a:xfrm>
+                  <a:prstGeom prst="rect">
+                    <a:avLst/>
+                  </a:prstGeom>
+                </p:spPr>
+              </p:pic>
+              <p:pic>
+                <p:nvPicPr>
+                  <p:cNvPr id="23" name="Picture 22"/>
+                  <p:cNvPicPr>
+                    <a:picLocks noChangeAspect="1"/>
+                  </p:cNvPicPr>
+                  <p:nvPr/>
+                </p:nvPicPr>
+                <p:blipFill>
+                  <a:blip r:embed="rId6" cstate="print">
+                    <a:extLst>
+                      <a:ext uri="{28A0092B-C50C-407E-A947-70E740481C1C}">
+                        <a14:useLocalDpi xmlns:a14="http://schemas.microsoft.com/office/drawing/2010/main" val="0"/>
+                      </a:ext>
+                    </a:extLst>
+                  </a:blip>
+                  <a:stretch>
+                    <a:fillRect/>
+                  </a:stretch>
+                </p:blipFill>
+                <p:spPr>
+                  <a:xfrm>
+                    <a:off x="7913996" y="6079941"/>
+                    <a:ext cx="254344" cy="224100"/>
+                  </a:xfrm>
+                  <a:prstGeom prst="rect">
+                    <a:avLst/>
+                  </a:prstGeom>
+                </p:spPr>
+              </p:pic>
+              <p:pic>
+                <p:nvPicPr>
+                  <p:cNvPr id="24" name="Picture 23"/>
+                  <p:cNvPicPr>
+                    <a:picLocks noChangeAspect="1"/>
+                  </p:cNvPicPr>
+                  <p:nvPr/>
+                </p:nvPicPr>
+                <p:blipFill>
+                  <a:blip r:embed="rId7" cstate="print">
+                    <a:extLst>
+                      <a:ext uri="{28A0092B-C50C-407E-A947-70E740481C1C}">
+                        <a14:useLocalDpi xmlns:a14="http://schemas.microsoft.com/office/drawing/2010/main" val="0"/>
+                      </a:ext>
+                    </a:extLst>
+                  </a:blip>
+                  <a:stretch>
+                    <a:fillRect/>
+                  </a:stretch>
+                </p:blipFill>
+                <p:spPr>
+                  <a:xfrm>
+                    <a:off x="9134778" y="6081481"/>
+                    <a:ext cx="274386" cy="225596"/>
+                  </a:xfrm>
+                  <a:prstGeom prst="rect">
+                    <a:avLst/>
+                  </a:prstGeom>
+                </p:spPr>
+              </p:pic>
+              <p:pic>
+                <p:nvPicPr>
+                  <p:cNvPr id="25" name="Picture 24"/>
+                  <p:cNvPicPr>
+                    <a:picLocks noChangeAspect="1"/>
+                  </p:cNvPicPr>
+                  <p:nvPr/>
+                </p:nvPicPr>
+                <p:blipFill>
+                  <a:blip r:embed="rId8" cstate="print">
+                    <a:extLst>
+                      <a:ext uri="{28A0092B-C50C-407E-A947-70E740481C1C}">
+                        <a14:useLocalDpi xmlns:a14="http://schemas.microsoft.com/office/drawing/2010/main" val="0"/>
+                      </a:ext>
+                    </a:extLst>
+                  </a:blip>
+                  <a:stretch>
+                    <a:fillRect/>
+                  </a:stretch>
+                </p:blipFill>
+                <p:spPr>
+                  <a:xfrm flipH="1">
+                    <a:off x="7507667" y="6079941"/>
+                    <a:ext cx="255789" cy="218495"/>
+                  </a:xfrm>
+                  <a:prstGeom prst="rect">
+                    <a:avLst/>
+                  </a:prstGeom>
+                </p:spPr>
+              </p:pic>
+            </p:grpSp>
             <p:pic>
               <p:nvPicPr>
-                <p:cNvPr id="12" name="Picture 11"/>
+                <p:cNvPr id="20" name="Picture 19"/>
                 <p:cNvPicPr>
                   <a:picLocks noChangeAspect="1"/>
                 </p:cNvPicPr>
                 <p:nvPr/>
               </p:nvPicPr>
               <p:blipFill>
-                <a:blip r:embed="rId3" cstate="print">
-                  <a:extLst>
-                    <a:ext uri="{28A0092B-C50C-407E-A947-70E740481C1C}">
-                      <a14:useLocalDpi xmlns:a14="http://schemas.microsoft.com/office/drawing/2010/main" val="0"/>
-                    </a:ext>
-                  </a:extLst>
-                </a:blip>
+                <a:blip r:embed="rId9"/>
                 <a:stretch>
                   <a:fillRect/>
                 </a:stretch>
               </p:blipFill>
               <p:spPr>
                 <a:xfrm>
-                  <a:off x="4063568" y="6102067"/>
-                  <a:ext cx="325640" cy="161565"/>
-                </a:xfrm>
-                <a:prstGeom prst="rect">
-                  <a:avLst/>
-                </a:prstGeom>
-              </p:spPr>
-            </p:pic>
-            <p:pic>
-              <p:nvPicPr>
-                <p:cNvPr id="14" name="Picture 13"/>
-                <p:cNvPicPr>
-                  <a:picLocks noChangeAspect="1"/>
-                </p:cNvPicPr>
-                <p:nvPr/>
-              </p:nvPicPr>
-              <p:blipFill>
-                <a:blip r:embed="rId4" cstate="print">
-                  <a:extLst>
-                    <a:ext uri="{28A0092B-C50C-407E-A947-70E740481C1C}">
-                      <a14:useLocalDpi xmlns:a14="http://schemas.microsoft.com/office/drawing/2010/main" val="0"/>
-                    </a:ext>
-                  </a:extLst>
-                </a:blip>
-                <a:stretch>
-                  <a:fillRect/>
-                </a:stretch>
-              </p:blipFill>
-              <p:spPr>
-                <a:xfrm>
-                  <a:off x="3693928" y="6069896"/>
-                  <a:ext cx="223459" cy="225596"/>
-                </a:xfrm>
-                <a:prstGeom prst="rect">
-                  <a:avLst/>
-                </a:prstGeom>
-              </p:spPr>
-            </p:pic>
-            <p:pic>
-              <p:nvPicPr>
-                <p:cNvPr id="15" name="Picture 14"/>
-                <p:cNvPicPr>
-                  <a:picLocks noChangeAspect="1"/>
-                </p:cNvPicPr>
-                <p:nvPr/>
-              </p:nvPicPr>
-              <p:blipFill>
-                <a:blip r:embed="rId5" cstate="print">
-                  <a:extLst>
-                    <a:ext uri="{28A0092B-C50C-407E-A947-70E740481C1C}">
-                      <a14:useLocalDpi xmlns:a14="http://schemas.microsoft.com/office/drawing/2010/main" val="0"/>
-                    </a:ext>
-                  </a:extLst>
-                </a:blip>
-                <a:stretch>
-                  <a:fillRect/>
-                </a:stretch>
-              </p:blipFill>
-              <p:spPr>
-                <a:xfrm>
-                  <a:off x="5345440" y="6084945"/>
-                  <a:ext cx="280633" cy="225596"/>
-                </a:xfrm>
-                <a:prstGeom prst="rect">
-                  <a:avLst/>
-                </a:prstGeom>
-              </p:spPr>
-            </p:pic>
-            <p:pic>
-              <p:nvPicPr>
-                <p:cNvPr id="16" name="Picture 15"/>
-                <p:cNvPicPr>
-                  <a:picLocks noChangeAspect="1"/>
-                </p:cNvPicPr>
-                <p:nvPr/>
-              </p:nvPicPr>
-              <p:blipFill>
-                <a:blip r:embed="rId6" cstate="print">
-                  <a:extLst>
-                    <a:ext uri="{28A0092B-C50C-407E-A947-70E740481C1C}">
-                      <a14:useLocalDpi xmlns:a14="http://schemas.microsoft.com/office/drawing/2010/main" val="0"/>
-                    </a:ext>
-                  </a:extLst>
-                </a:blip>
-                <a:stretch>
-                  <a:fillRect/>
-                </a:stretch>
-              </p:blipFill>
-              <p:spPr>
-                <a:xfrm>
-                  <a:off x="3293403" y="6083191"/>
-                  <a:ext cx="254344" cy="224100"/>
-                </a:xfrm>
-                <a:prstGeom prst="rect">
-                  <a:avLst/>
-                </a:prstGeom>
-              </p:spPr>
-            </p:pic>
-            <p:pic>
-              <p:nvPicPr>
-                <p:cNvPr id="17" name="Picture 16"/>
-                <p:cNvPicPr>
-                  <a:picLocks noChangeAspect="1"/>
-                </p:cNvPicPr>
-                <p:nvPr/>
-              </p:nvPicPr>
-              <p:blipFill>
-                <a:blip r:embed="rId7" cstate="print">
-                  <a:extLst>
-                    <a:ext uri="{28A0092B-C50C-407E-A947-70E740481C1C}">
-                      <a14:useLocalDpi xmlns:a14="http://schemas.microsoft.com/office/drawing/2010/main" val="0"/>
-                    </a:ext>
-                  </a:extLst>
-                </a:blip>
-                <a:stretch>
-                  <a:fillRect/>
-                </a:stretch>
-              </p:blipFill>
-              <p:spPr>
-                <a:xfrm>
-                  <a:off x="4514185" y="6084731"/>
-                  <a:ext cx="274386" cy="225596"/>
-                </a:xfrm>
-                <a:prstGeom prst="rect">
-                  <a:avLst/>
-                </a:prstGeom>
-              </p:spPr>
-            </p:pic>
-            <p:pic>
-              <p:nvPicPr>
-                <p:cNvPr id="18" name="Picture 17"/>
-                <p:cNvPicPr>
-                  <a:picLocks noChangeAspect="1"/>
-                </p:cNvPicPr>
-                <p:nvPr/>
-              </p:nvPicPr>
-              <p:blipFill>
-                <a:blip r:embed="rId8" cstate="print">
-                  <a:extLst>
-                    <a:ext uri="{28A0092B-C50C-407E-A947-70E740481C1C}">
-                      <a14:useLocalDpi xmlns:a14="http://schemas.microsoft.com/office/drawing/2010/main" val="0"/>
-                    </a:ext>
-                  </a:extLst>
-                </a:blip>
-                <a:stretch>
-                  <a:fillRect/>
-                </a:stretch>
-              </p:blipFill>
-              <p:spPr>
-                <a:xfrm flipH="1">
-                  <a:off x="2887074" y="6083191"/>
-                  <a:ext cx="255789" cy="218495"/>
-                </a:xfrm>
-                <a:prstGeom prst="rect">
-                  <a:avLst/>
-                </a:prstGeom>
-              </p:spPr>
-            </p:pic>
-            <p:pic>
-              <p:nvPicPr>
-                <p:cNvPr id="19" name="Picture 18"/>
-                <p:cNvPicPr>
-                  <a:picLocks noChangeAspect="1"/>
-                </p:cNvPicPr>
-                <p:nvPr/>
-              </p:nvPicPr>
-              <p:blipFill>
-                <a:blip r:embed="rId3" cstate="print">
-                  <a:extLst>
-                    <a:ext uri="{28A0092B-C50C-407E-A947-70E740481C1C}">
-                      <a14:useLocalDpi xmlns:a14="http://schemas.microsoft.com/office/drawing/2010/main" val="0"/>
-                    </a:ext>
-                  </a:extLst>
-                </a:blip>
-                <a:stretch>
-                  <a:fillRect/>
-                </a:stretch>
-              </p:blipFill>
-              <p:spPr>
-                <a:xfrm>
-                  <a:off x="8684161" y="6098817"/>
-                  <a:ext cx="325640" cy="161565"/>
-                </a:xfrm>
-                <a:prstGeom prst="rect">
-                  <a:avLst/>
-                </a:prstGeom>
-              </p:spPr>
-            </p:pic>
-            <p:pic>
-              <p:nvPicPr>
-                <p:cNvPr id="21" name="Picture 20"/>
-                <p:cNvPicPr>
-                  <a:picLocks noChangeAspect="1"/>
-                </p:cNvPicPr>
-                <p:nvPr/>
-              </p:nvPicPr>
-              <p:blipFill>
-                <a:blip r:embed="rId4" cstate="print">
-                  <a:extLst>
-                    <a:ext uri="{28A0092B-C50C-407E-A947-70E740481C1C}">
-                      <a14:useLocalDpi xmlns:a14="http://schemas.microsoft.com/office/drawing/2010/main" val="0"/>
-                    </a:ext>
-                  </a:extLst>
-                </a:blip>
-                <a:stretch>
-                  <a:fillRect/>
-                </a:stretch>
-              </p:blipFill>
-              <p:spPr>
-                <a:xfrm>
-                  <a:off x="8314521" y="6066646"/>
-                  <a:ext cx="223459" cy="225596"/>
-                </a:xfrm>
-                <a:prstGeom prst="rect">
-                  <a:avLst/>
-                </a:prstGeom>
-              </p:spPr>
-            </p:pic>
-            <p:pic>
-              <p:nvPicPr>
-                <p:cNvPr id="22" name="Picture 21"/>
-                <p:cNvPicPr>
-                  <a:picLocks noChangeAspect="1"/>
-                </p:cNvPicPr>
-                <p:nvPr/>
-              </p:nvPicPr>
-              <p:blipFill>
-                <a:blip r:embed="rId5" cstate="print">
-                  <a:extLst>
-                    <a:ext uri="{28A0092B-C50C-407E-A947-70E740481C1C}">
-                      <a14:useLocalDpi xmlns:a14="http://schemas.microsoft.com/office/drawing/2010/main" val="0"/>
-                    </a:ext>
-                  </a:extLst>
-                </a:blip>
-                <a:stretch>
-                  <a:fillRect/>
-                </a:stretch>
-              </p:blipFill>
-              <p:spPr>
-                <a:xfrm>
-                  <a:off x="9935906" y="6073040"/>
-                  <a:ext cx="280633" cy="225596"/>
-                </a:xfrm>
-                <a:prstGeom prst="rect">
-                  <a:avLst/>
-                </a:prstGeom>
-              </p:spPr>
-            </p:pic>
-            <p:pic>
-              <p:nvPicPr>
-                <p:cNvPr id="23" name="Picture 22"/>
-                <p:cNvPicPr>
-                  <a:picLocks noChangeAspect="1"/>
-                </p:cNvPicPr>
-                <p:nvPr/>
-              </p:nvPicPr>
-              <p:blipFill>
-                <a:blip r:embed="rId6" cstate="print">
-                  <a:extLst>
-                    <a:ext uri="{28A0092B-C50C-407E-A947-70E740481C1C}">
-                      <a14:useLocalDpi xmlns:a14="http://schemas.microsoft.com/office/drawing/2010/main" val="0"/>
-                    </a:ext>
-                  </a:extLst>
-                </a:blip>
-                <a:stretch>
-                  <a:fillRect/>
-                </a:stretch>
-              </p:blipFill>
-              <p:spPr>
-                <a:xfrm>
-                  <a:off x="7913996" y="6079941"/>
-                  <a:ext cx="254344" cy="224100"/>
-                </a:xfrm>
-                <a:prstGeom prst="rect">
-                  <a:avLst/>
-                </a:prstGeom>
-              </p:spPr>
-            </p:pic>
-            <p:pic>
-              <p:nvPicPr>
-                <p:cNvPr id="24" name="Picture 23"/>
-                <p:cNvPicPr>
-                  <a:picLocks noChangeAspect="1"/>
-                </p:cNvPicPr>
-                <p:nvPr/>
-              </p:nvPicPr>
-              <p:blipFill>
-                <a:blip r:embed="rId7" cstate="print">
-                  <a:extLst>
-                    <a:ext uri="{28A0092B-C50C-407E-A947-70E740481C1C}">
-                      <a14:useLocalDpi xmlns:a14="http://schemas.microsoft.com/office/drawing/2010/main" val="0"/>
-                    </a:ext>
-                  </a:extLst>
-                </a:blip>
-                <a:stretch>
-                  <a:fillRect/>
-                </a:stretch>
-              </p:blipFill>
-              <p:spPr>
-                <a:xfrm>
-                  <a:off x="9134778" y="6081481"/>
-                  <a:ext cx="274386" cy="225596"/>
-                </a:xfrm>
-                <a:prstGeom prst="rect">
-                  <a:avLst/>
-                </a:prstGeom>
-              </p:spPr>
-            </p:pic>
-            <p:pic>
-              <p:nvPicPr>
-                <p:cNvPr id="25" name="Picture 24"/>
-                <p:cNvPicPr>
-                  <a:picLocks noChangeAspect="1"/>
-                </p:cNvPicPr>
-                <p:nvPr/>
-              </p:nvPicPr>
-              <p:blipFill>
-                <a:blip r:embed="rId8" cstate="print">
-                  <a:extLst>
-                    <a:ext uri="{28A0092B-C50C-407E-A947-70E740481C1C}">
-                      <a14:useLocalDpi xmlns:a14="http://schemas.microsoft.com/office/drawing/2010/main" val="0"/>
-                    </a:ext>
-                  </a:extLst>
-                </a:blip>
-                <a:stretch>
-                  <a:fillRect/>
-                </a:stretch>
-              </p:blipFill>
-              <p:spPr>
-                <a:xfrm flipH="1">
-                  <a:off x="7507667" y="6079941"/>
-                  <a:ext cx="255789" cy="218495"/>
+                  <a:off x="4734039" y="6066646"/>
+                  <a:ext cx="302061" cy="235941"/>
                 </a:xfrm>
                 <a:prstGeom prst="rect">
                   <a:avLst/>
@@ -4428,56 +4468,32 @@
               </p:spPr>
             </p:pic>
           </p:grpSp>
-          <p:pic>
-            <p:nvPicPr>
-              <p:cNvPr id="20" name="Picture 19"/>
-              <p:cNvPicPr>
-                <a:picLocks noChangeAspect="1"/>
-              </p:cNvPicPr>
-              <p:nvPr/>
-            </p:nvPicPr>
-            <p:blipFill>
-              <a:blip r:embed="rId9"/>
-              <a:stretch>
-                <a:fillRect/>
-              </a:stretch>
-            </p:blipFill>
-            <p:spPr>
-              <a:xfrm>
-                <a:off x="4734039" y="6066646"/>
-                <a:ext cx="302061" cy="235941"/>
-              </a:xfrm>
-              <a:prstGeom prst="rect">
-                <a:avLst/>
-              </a:prstGeom>
-            </p:spPr>
-          </p:pic>
         </p:grpSp>
+        <p:pic>
+          <p:nvPicPr>
+            <p:cNvPr id="28" name="Picture 27"/>
+            <p:cNvPicPr>
+              <a:picLocks noChangeAspect="1"/>
+            </p:cNvPicPr>
+            <p:nvPr/>
+          </p:nvPicPr>
+          <p:blipFill>
+            <a:blip r:embed="rId9"/>
+            <a:stretch>
+              <a:fillRect/>
+            </a:stretch>
+          </p:blipFill>
+          <p:spPr>
+            <a:xfrm>
+              <a:off x="9351905" y="6079941"/>
+              <a:ext cx="302061" cy="235941"/>
+            </a:xfrm>
+            <a:prstGeom prst="rect">
+              <a:avLst/>
+            </a:prstGeom>
+          </p:spPr>
+        </p:pic>
       </p:grpSp>
-      <p:pic>
-        <p:nvPicPr>
-          <p:cNvPr id="28" name="Picture 27"/>
-          <p:cNvPicPr>
-            <a:picLocks noChangeAspect="1"/>
-          </p:cNvPicPr>
-          <p:nvPr/>
-        </p:nvPicPr>
-        <p:blipFill>
-          <a:blip r:embed="rId9"/>
-          <a:stretch>
-            <a:fillRect/>
-          </a:stretch>
-        </p:blipFill>
-        <p:spPr>
-          <a:xfrm>
-            <a:off x="9351905" y="6079941"/>
-            <a:ext cx="302061" cy="235941"/>
-          </a:xfrm>
-          <a:prstGeom prst="rect">
-            <a:avLst/>
-          </a:prstGeom>
-        </p:spPr>
-      </p:pic>
     </p:spTree>
     <p:extLst>
       <p:ext uri="{BB962C8B-B14F-4D97-AF65-F5344CB8AC3E}">
@@ -4510,15 +4526,546 @@
       </p:grpSpPr>
       <p:grpSp>
         <p:nvGrpSpPr>
+          <p:cNvPr id="22" name="Group 21"/>
+          <p:cNvGrpSpPr/>
+          <p:nvPr/>
+        </p:nvGrpSpPr>
+        <p:grpSpPr>
+          <a:xfrm>
+            <a:off x="402796" y="1022472"/>
+            <a:ext cx="11114026" cy="4082530"/>
+            <a:chOff x="402796" y="1022472"/>
+            <a:chExt cx="11114026" cy="4082530"/>
+          </a:xfrm>
+        </p:grpSpPr>
+        <p:pic>
+          <p:nvPicPr>
+            <p:cNvPr id="4" name="Picture 3"/>
+            <p:cNvPicPr>
+              <a:picLocks noChangeAspect="1"/>
+            </p:cNvPicPr>
+            <p:nvPr/>
+          </p:nvPicPr>
+          <p:blipFill>
+            <a:blip r:embed="rId2"/>
+            <a:stretch>
+              <a:fillRect/>
+            </a:stretch>
+          </p:blipFill>
+          <p:spPr>
+            <a:xfrm>
+              <a:off x="5975270" y="1022472"/>
+              <a:ext cx="5541552" cy="3716582"/>
+            </a:xfrm>
+            <a:prstGeom prst="rect">
+              <a:avLst/>
+            </a:prstGeom>
+          </p:spPr>
+        </p:pic>
+        <p:pic>
+          <p:nvPicPr>
+            <p:cNvPr id="5" name="Picture 4"/>
+            <p:cNvPicPr>
+              <a:picLocks noChangeAspect="1"/>
+            </p:cNvPicPr>
+            <p:nvPr/>
+          </p:nvPicPr>
+          <p:blipFill>
+            <a:blip r:embed="rId3"/>
+            <a:stretch>
+              <a:fillRect/>
+            </a:stretch>
+          </p:blipFill>
+          <p:spPr>
+            <a:xfrm>
+              <a:off x="402796" y="1160584"/>
+              <a:ext cx="5510030" cy="3578470"/>
+            </a:xfrm>
+            <a:prstGeom prst="rect">
+              <a:avLst/>
+            </a:prstGeom>
+          </p:spPr>
+        </p:pic>
+        <p:grpSp>
+          <p:nvGrpSpPr>
+            <p:cNvPr id="13" name="Group 12"/>
+            <p:cNvGrpSpPr/>
+            <p:nvPr/>
+          </p:nvGrpSpPr>
+          <p:grpSpPr>
+            <a:xfrm>
+              <a:off x="1208531" y="4730332"/>
+              <a:ext cx="4277869" cy="362793"/>
+              <a:chOff x="1208531" y="4730332"/>
+              <a:chExt cx="4277869" cy="362793"/>
+            </a:xfrm>
+          </p:grpSpPr>
+          <p:pic>
+            <p:nvPicPr>
+              <p:cNvPr id="6" name="Picture 5"/>
+              <p:cNvPicPr>
+                <a:picLocks noChangeAspect="1"/>
+              </p:cNvPicPr>
+              <p:nvPr/>
+            </p:nvPicPr>
+            <p:blipFill>
+              <a:blip r:embed="rId4" cstate="print">
+                <a:extLst>
+                  <a:ext uri="{28A0092B-C50C-407E-A947-70E740481C1C}">
+                    <a14:useLocalDpi xmlns:a14="http://schemas.microsoft.com/office/drawing/2010/main" val="0"/>
+                  </a:ext>
+                </a:extLst>
+              </a:blip>
+              <a:stretch>
+                <a:fillRect/>
+              </a:stretch>
+            </p:blipFill>
+            <p:spPr>
+              <a:xfrm>
+                <a:off x="3064661" y="4790213"/>
+                <a:ext cx="486164" cy="241208"/>
+              </a:xfrm>
+              <a:prstGeom prst="rect">
+                <a:avLst/>
+              </a:prstGeom>
+            </p:spPr>
+          </p:pic>
+          <p:pic>
+            <p:nvPicPr>
+              <p:cNvPr id="7" name="Picture 6"/>
+              <p:cNvPicPr>
+                <a:picLocks noChangeAspect="1"/>
+              </p:cNvPicPr>
+              <p:nvPr/>
+            </p:nvPicPr>
+            <p:blipFill>
+              <a:blip r:embed="rId5" cstate="print">
+                <a:extLst>
+                  <a:ext uri="{28A0092B-C50C-407E-A947-70E740481C1C}">
+                    <a14:useLocalDpi xmlns:a14="http://schemas.microsoft.com/office/drawing/2010/main" val="0"/>
+                  </a:ext>
+                </a:extLst>
+              </a:blip>
+              <a:stretch>
+                <a:fillRect/>
+              </a:stretch>
+            </p:blipFill>
+            <p:spPr>
+              <a:xfrm>
+                <a:off x="2455268" y="4741271"/>
+                <a:ext cx="333613" cy="336803"/>
+              </a:xfrm>
+              <a:prstGeom prst="rect">
+                <a:avLst/>
+              </a:prstGeom>
+            </p:spPr>
+          </p:pic>
+          <p:pic>
+            <p:nvPicPr>
+              <p:cNvPr id="8" name="Picture 7"/>
+              <p:cNvPicPr>
+                <a:picLocks noChangeAspect="1"/>
+              </p:cNvPicPr>
+              <p:nvPr/>
+            </p:nvPicPr>
+            <p:blipFill>
+              <a:blip r:embed="rId6" cstate="print">
+                <a:extLst>
+                  <a:ext uri="{28A0092B-C50C-407E-A947-70E740481C1C}">
+                    <a14:useLocalDpi xmlns:a14="http://schemas.microsoft.com/office/drawing/2010/main" val="0"/>
+                  </a:ext>
+                </a:extLst>
+              </a:blip>
+              <a:stretch>
+                <a:fillRect/>
+              </a:stretch>
+            </p:blipFill>
+            <p:spPr>
+              <a:xfrm>
+                <a:off x="5067429" y="4756321"/>
+                <a:ext cx="418971" cy="336804"/>
+              </a:xfrm>
+              <a:prstGeom prst="rect">
+                <a:avLst/>
+              </a:prstGeom>
+            </p:spPr>
+          </p:pic>
+          <p:pic>
+            <p:nvPicPr>
+              <p:cNvPr id="9" name="Picture 8"/>
+              <p:cNvPicPr>
+                <a:picLocks noChangeAspect="1"/>
+              </p:cNvPicPr>
+              <p:nvPr/>
+            </p:nvPicPr>
+            <p:blipFill>
+              <a:blip r:embed="rId7" cstate="print">
+                <a:extLst>
+                  <a:ext uri="{28A0092B-C50C-407E-A947-70E740481C1C}">
+                    <a14:useLocalDpi xmlns:a14="http://schemas.microsoft.com/office/drawing/2010/main" val="0"/>
+                  </a:ext>
+                </a:extLst>
+              </a:blip>
+              <a:stretch>
+                <a:fillRect/>
+              </a:stretch>
+            </p:blipFill>
+            <p:spPr>
+              <a:xfrm>
+                <a:off x="1799765" y="4756321"/>
+                <a:ext cx="379723" cy="334570"/>
+              </a:xfrm>
+              <a:prstGeom prst="rect">
+                <a:avLst/>
+              </a:prstGeom>
+            </p:spPr>
+          </p:pic>
+          <p:pic>
+            <p:nvPicPr>
+              <p:cNvPr id="10" name="Picture 9"/>
+              <p:cNvPicPr>
+                <a:picLocks noChangeAspect="1"/>
+              </p:cNvPicPr>
+              <p:nvPr/>
+            </p:nvPicPr>
+            <p:blipFill>
+              <a:blip r:embed="rId8" cstate="print">
+                <a:extLst>
+                  <a:ext uri="{28A0092B-C50C-407E-A947-70E740481C1C}">
+                    <a14:useLocalDpi xmlns:a14="http://schemas.microsoft.com/office/drawing/2010/main" val="0"/>
+                  </a:ext>
+                </a:extLst>
+              </a:blip>
+              <a:stretch>
+                <a:fillRect/>
+              </a:stretch>
+            </p:blipFill>
+            <p:spPr>
+              <a:xfrm>
+                <a:off x="3735884" y="4737314"/>
+                <a:ext cx="409645" cy="336804"/>
+              </a:xfrm>
+              <a:prstGeom prst="rect">
+                <a:avLst/>
+              </a:prstGeom>
+            </p:spPr>
+          </p:pic>
+          <p:pic>
+            <p:nvPicPr>
+              <p:cNvPr id="11" name="Picture 10"/>
+              <p:cNvPicPr>
+                <a:picLocks noChangeAspect="1"/>
+              </p:cNvPicPr>
+              <p:nvPr/>
+            </p:nvPicPr>
+            <p:blipFill>
+              <a:blip r:embed="rId9" cstate="print">
+                <a:extLst>
+                  <a:ext uri="{28A0092B-C50C-407E-A947-70E740481C1C}">
+                    <a14:useLocalDpi xmlns:a14="http://schemas.microsoft.com/office/drawing/2010/main" val="0"/>
+                  </a:ext>
+                </a:extLst>
+              </a:blip>
+              <a:stretch>
+                <a:fillRect/>
+              </a:stretch>
+            </p:blipFill>
+            <p:spPr>
+              <a:xfrm flipH="1">
+                <a:off x="1208531" y="4739054"/>
+                <a:ext cx="381880" cy="326202"/>
+              </a:xfrm>
+              <a:prstGeom prst="rect">
+                <a:avLst/>
+              </a:prstGeom>
+            </p:spPr>
+          </p:pic>
+          <p:pic>
+            <p:nvPicPr>
+              <p:cNvPr id="12" name="Picture 11"/>
+              <p:cNvPicPr>
+                <a:picLocks noChangeAspect="1"/>
+              </p:cNvPicPr>
+              <p:nvPr/>
+            </p:nvPicPr>
+            <p:blipFill>
+              <a:blip r:embed="rId10"/>
+              <a:stretch>
+                <a:fillRect/>
+              </a:stretch>
+            </p:blipFill>
+            <p:spPr>
+              <a:xfrm>
+                <a:off x="4356135" y="4730332"/>
+                <a:ext cx="450962" cy="352248"/>
+              </a:xfrm>
+              <a:prstGeom prst="rect">
+                <a:avLst/>
+              </a:prstGeom>
+            </p:spPr>
+          </p:pic>
+        </p:grpSp>
+        <p:grpSp>
+          <p:nvGrpSpPr>
+            <p:cNvPr id="14" name="Group 13"/>
+            <p:cNvGrpSpPr/>
+            <p:nvPr/>
+          </p:nvGrpSpPr>
+          <p:grpSpPr>
+            <a:xfrm>
+              <a:off x="6777683" y="4742209"/>
+              <a:ext cx="4277869" cy="362793"/>
+              <a:chOff x="1208531" y="4730332"/>
+              <a:chExt cx="4277869" cy="362793"/>
+            </a:xfrm>
+          </p:grpSpPr>
+          <p:pic>
+            <p:nvPicPr>
+              <p:cNvPr id="15" name="Picture 14"/>
+              <p:cNvPicPr>
+                <a:picLocks noChangeAspect="1"/>
+              </p:cNvPicPr>
+              <p:nvPr/>
+            </p:nvPicPr>
+            <p:blipFill>
+              <a:blip r:embed="rId4" cstate="print">
+                <a:extLst>
+                  <a:ext uri="{28A0092B-C50C-407E-A947-70E740481C1C}">
+                    <a14:useLocalDpi xmlns:a14="http://schemas.microsoft.com/office/drawing/2010/main" val="0"/>
+                  </a:ext>
+                </a:extLst>
+              </a:blip>
+              <a:stretch>
+                <a:fillRect/>
+              </a:stretch>
+            </p:blipFill>
+            <p:spPr>
+              <a:xfrm>
+                <a:off x="3064661" y="4790213"/>
+                <a:ext cx="486164" cy="241208"/>
+              </a:xfrm>
+              <a:prstGeom prst="rect">
+                <a:avLst/>
+              </a:prstGeom>
+            </p:spPr>
+          </p:pic>
+          <p:pic>
+            <p:nvPicPr>
+              <p:cNvPr id="16" name="Picture 15"/>
+              <p:cNvPicPr>
+                <a:picLocks noChangeAspect="1"/>
+              </p:cNvPicPr>
+              <p:nvPr/>
+            </p:nvPicPr>
+            <p:blipFill>
+              <a:blip r:embed="rId5" cstate="print">
+                <a:extLst>
+                  <a:ext uri="{28A0092B-C50C-407E-A947-70E740481C1C}">
+                    <a14:useLocalDpi xmlns:a14="http://schemas.microsoft.com/office/drawing/2010/main" val="0"/>
+                  </a:ext>
+                </a:extLst>
+              </a:blip>
+              <a:stretch>
+                <a:fillRect/>
+              </a:stretch>
+            </p:blipFill>
+            <p:spPr>
+              <a:xfrm>
+                <a:off x="2455268" y="4741271"/>
+                <a:ext cx="333613" cy="336803"/>
+              </a:xfrm>
+              <a:prstGeom prst="rect">
+                <a:avLst/>
+              </a:prstGeom>
+            </p:spPr>
+          </p:pic>
+          <p:pic>
+            <p:nvPicPr>
+              <p:cNvPr id="17" name="Picture 16"/>
+              <p:cNvPicPr>
+                <a:picLocks noChangeAspect="1"/>
+              </p:cNvPicPr>
+              <p:nvPr/>
+            </p:nvPicPr>
+            <p:blipFill>
+              <a:blip r:embed="rId6" cstate="print">
+                <a:extLst>
+                  <a:ext uri="{28A0092B-C50C-407E-A947-70E740481C1C}">
+                    <a14:useLocalDpi xmlns:a14="http://schemas.microsoft.com/office/drawing/2010/main" val="0"/>
+                  </a:ext>
+                </a:extLst>
+              </a:blip>
+              <a:stretch>
+                <a:fillRect/>
+              </a:stretch>
+            </p:blipFill>
+            <p:spPr>
+              <a:xfrm>
+                <a:off x="5067429" y="4756321"/>
+                <a:ext cx="418971" cy="336804"/>
+              </a:xfrm>
+              <a:prstGeom prst="rect">
+                <a:avLst/>
+              </a:prstGeom>
+            </p:spPr>
+          </p:pic>
+          <p:pic>
+            <p:nvPicPr>
+              <p:cNvPr id="18" name="Picture 17"/>
+              <p:cNvPicPr>
+                <a:picLocks noChangeAspect="1"/>
+              </p:cNvPicPr>
+              <p:nvPr/>
+            </p:nvPicPr>
+            <p:blipFill>
+              <a:blip r:embed="rId7" cstate="print">
+                <a:extLst>
+                  <a:ext uri="{28A0092B-C50C-407E-A947-70E740481C1C}">
+                    <a14:useLocalDpi xmlns:a14="http://schemas.microsoft.com/office/drawing/2010/main" val="0"/>
+                  </a:ext>
+                </a:extLst>
+              </a:blip>
+              <a:stretch>
+                <a:fillRect/>
+              </a:stretch>
+            </p:blipFill>
+            <p:spPr>
+              <a:xfrm>
+                <a:off x="1799765" y="4756321"/>
+                <a:ext cx="379723" cy="334570"/>
+              </a:xfrm>
+              <a:prstGeom prst="rect">
+                <a:avLst/>
+              </a:prstGeom>
+            </p:spPr>
+          </p:pic>
+          <p:pic>
+            <p:nvPicPr>
+              <p:cNvPr id="19" name="Picture 18"/>
+              <p:cNvPicPr>
+                <a:picLocks noChangeAspect="1"/>
+              </p:cNvPicPr>
+              <p:nvPr/>
+            </p:nvPicPr>
+            <p:blipFill>
+              <a:blip r:embed="rId8" cstate="print">
+                <a:extLst>
+                  <a:ext uri="{28A0092B-C50C-407E-A947-70E740481C1C}">
+                    <a14:useLocalDpi xmlns:a14="http://schemas.microsoft.com/office/drawing/2010/main" val="0"/>
+                  </a:ext>
+                </a:extLst>
+              </a:blip>
+              <a:stretch>
+                <a:fillRect/>
+              </a:stretch>
+            </p:blipFill>
+            <p:spPr>
+              <a:xfrm>
+                <a:off x="3735884" y="4737314"/>
+                <a:ext cx="409645" cy="336804"/>
+              </a:xfrm>
+              <a:prstGeom prst="rect">
+                <a:avLst/>
+              </a:prstGeom>
+            </p:spPr>
+          </p:pic>
+          <p:pic>
+            <p:nvPicPr>
+              <p:cNvPr id="20" name="Picture 19"/>
+              <p:cNvPicPr>
+                <a:picLocks noChangeAspect="1"/>
+              </p:cNvPicPr>
+              <p:nvPr/>
+            </p:nvPicPr>
+            <p:blipFill>
+              <a:blip r:embed="rId9" cstate="print">
+                <a:extLst>
+                  <a:ext uri="{28A0092B-C50C-407E-A947-70E740481C1C}">
+                    <a14:useLocalDpi xmlns:a14="http://schemas.microsoft.com/office/drawing/2010/main" val="0"/>
+                  </a:ext>
+                </a:extLst>
+              </a:blip>
+              <a:stretch>
+                <a:fillRect/>
+              </a:stretch>
+            </p:blipFill>
+            <p:spPr>
+              <a:xfrm flipH="1">
+                <a:off x="1208531" y="4739054"/>
+                <a:ext cx="381880" cy="326202"/>
+              </a:xfrm>
+              <a:prstGeom prst="rect">
+                <a:avLst/>
+              </a:prstGeom>
+            </p:spPr>
+          </p:pic>
+          <p:pic>
+            <p:nvPicPr>
+              <p:cNvPr id="21" name="Picture 20"/>
+              <p:cNvPicPr>
+                <a:picLocks noChangeAspect="1"/>
+              </p:cNvPicPr>
+              <p:nvPr/>
+            </p:nvPicPr>
+            <p:blipFill>
+              <a:blip r:embed="rId10"/>
+              <a:stretch>
+                <a:fillRect/>
+              </a:stretch>
+            </p:blipFill>
+            <p:spPr>
+              <a:xfrm>
+                <a:off x="4356135" y="4730332"/>
+                <a:ext cx="450962" cy="352248"/>
+              </a:xfrm>
+              <a:prstGeom prst="rect">
+                <a:avLst/>
+              </a:prstGeom>
+            </p:spPr>
+          </p:pic>
+        </p:grpSp>
+      </p:grpSp>
+    </p:spTree>
+    <p:extLst>
+      <p:ext uri="{BB962C8B-B14F-4D97-AF65-F5344CB8AC3E}">
+        <p14:creationId xmlns:p14="http://schemas.microsoft.com/office/powerpoint/2010/main" val="332487937"/>
+      </p:ext>
+    </p:extLst>
+  </p:cSld>
+  <p:clrMapOvr>
+    <a:masterClrMapping/>
+  </p:clrMapOvr>
+</p:sld>
+</file>
+
+<file path=ppt/slides/slide4.xml><?xml version="1.0" encoding="utf-8"?>
+<p:sld xmlns:a="http://schemas.openxmlformats.org/drawingml/2006/main" xmlns:r="http://schemas.openxmlformats.org/officeDocument/2006/relationships" xmlns:p="http://schemas.openxmlformats.org/presentationml/2006/main">
+  <p:cSld>
+    <p:spTree>
+      <p:nvGrpSpPr>
+        <p:cNvPr id="1" name=""/>
+        <p:cNvGrpSpPr/>
+        <p:nvPr/>
+      </p:nvGrpSpPr>
+      <p:grpSpPr>
+        <a:xfrm>
+          <a:off x="0" y="0"/>
+          <a:ext cx="0" cy="0"/>
+          <a:chOff x="0" y="0"/>
+          <a:chExt cx="0" cy="0"/>
+        </a:xfrm>
+      </p:grpSpPr>
+      <p:grpSp>
+        <p:nvGrpSpPr>
           <p:cNvPr id="8" name="Group 7"/>
           <p:cNvGrpSpPr/>
           <p:nvPr/>
         </p:nvGrpSpPr>
         <p:grpSpPr>
           <a:xfrm>
-            <a:off x="125417" y="1268964"/>
+            <a:off x="97985" y="1201890"/>
             <a:ext cx="11908632" cy="4320831"/>
-            <a:chOff x="125417" y="1268964"/>
+            <a:chOff x="97985" y="1201890"/>
             <a:chExt cx="11908632" cy="4320831"/>
           </a:xfrm>
         </p:grpSpPr>
@@ -4538,7 +5085,7 @@
           </p:blipFill>
           <p:spPr>
             <a:xfrm>
-              <a:off x="125417" y="1268964"/>
+              <a:off x="97985" y="1201890"/>
               <a:ext cx="11908632" cy="4320831"/>
             </a:xfrm>
             <a:prstGeom prst="rect">
@@ -4548,213 +5095,198 @@
         </p:pic>
         <p:grpSp>
           <p:nvGrpSpPr>
-            <p:cNvPr id="7" name="Group 6"/>
+            <p:cNvPr id="2" name="Group 1"/>
             <p:cNvGrpSpPr/>
             <p:nvPr/>
           </p:nvGrpSpPr>
           <p:grpSpPr>
             <a:xfrm>
-              <a:off x="1060421" y="4857193"/>
-              <a:ext cx="4738636" cy="440150"/>
-              <a:chOff x="1060421" y="4857193"/>
-              <a:chExt cx="4738636" cy="440150"/>
+              <a:off x="1032989" y="4782853"/>
+              <a:ext cx="4738636" cy="471890"/>
+              <a:chOff x="1032989" y="4782853"/>
+              <a:chExt cx="4738636" cy="471890"/>
             </a:xfrm>
           </p:grpSpPr>
-          <p:grpSp>
-            <p:nvGrpSpPr>
-              <p:cNvPr id="5" name="Group 4"/>
-              <p:cNvGrpSpPr/>
+          <p:pic>
+            <p:nvPicPr>
+              <p:cNvPr id="6" name="Picture 5"/>
+              <p:cNvPicPr>
+                <a:picLocks noChangeAspect="1"/>
+              </p:cNvPicPr>
               <p:nvPr/>
-            </p:nvGrpSpPr>
-            <p:grpSpPr>
+            </p:nvPicPr>
+            <p:blipFill>
+              <a:blip r:embed="rId3" cstate="print">
+                <a:extLst>
+                  <a:ext uri="{28A0092B-C50C-407E-A947-70E740481C1C}">
+                    <a14:useLocalDpi xmlns:a14="http://schemas.microsoft.com/office/drawing/2010/main" val="0"/>
+                  </a:ext>
+                </a:extLst>
+              </a:blip>
+              <a:stretch>
+                <a:fillRect/>
+              </a:stretch>
+            </p:blipFill>
+            <p:spPr>
               <a:xfrm>
-                <a:off x="1060421" y="4857193"/>
-                <a:ext cx="4074922" cy="440150"/>
-                <a:chOff x="1068734" y="4840568"/>
-                <a:chExt cx="4074922" cy="440150"/>
+                <a:off x="1761029" y="4932898"/>
+                <a:ext cx="541407" cy="268617"/>
               </a:xfrm>
-            </p:grpSpPr>
-            <p:pic>
-              <p:nvPicPr>
-                <p:cNvPr id="6" name="Picture 5"/>
-                <p:cNvPicPr>
-                  <a:picLocks noChangeAspect="1"/>
-                </p:cNvPicPr>
-                <p:nvPr/>
-              </p:nvPicPr>
-              <p:blipFill>
-                <a:blip r:embed="rId3" cstate="print">
-                  <a:extLst>
-                    <a:ext uri="{28A0092B-C50C-407E-A947-70E740481C1C}">
-                      <a14:useLocalDpi xmlns:a14="http://schemas.microsoft.com/office/drawing/2010/main" val="0"/>
-                    </a:ext>
-                  </a:extLst>
-                </a:blip>
-                <a:stretch>
-                  <a:fillRect/>
-                </a:stretch>
-              </p:blipFill>
-              <p:spPr>
-                <a:xfrm>
-                  <a:off x="2436997" y="4958871"/>
-                  <a:ext cx="541407" cy="268617"/>
-                </a:xfrm>
-                <a:prstGeom prst="rect">
-                  <a:avLst/>
-                </a:prstGeom>
-              </p:spPr>
-            </p:pic>
-            <p:pic>
-              <p:nvPicPr>
-                <p:cNvPr id="9" name="Picture 8"/>
-                <p:cNvPicPr>
-                  <a:picLocks noChangeAspect="1"/>
-                </p:cNvPicPr>
-                <p:nvPr/>
-              </p:nvPicPr>
-              <p:blipFill>
-                <a:blip r:embed="rId4" cstate="print">
-                  <a:extLst>
-                    <a:ext uri="{28A0092B-C50C-407E-A947-70E740481C1C}">
-                      <a14:useLocalDpi xmlns:a14="http://schemas.microsoft.com/office/drawing/2010/main" val="0"/>
-                    </a:ext>
-                  </a:extLst>
-                </a:blip>
-                <a:stretch>
-                  <a:fillRect/>
-                </a:stretch>
-              </p:blipFill>
-              <p:spPr>
-                <a:xfrm>
-                  <a:off x="3271824" y="4840568"/>
-                  <a:ext cx="371522" cy="375075"/>
-                </a:xfrm>
-                <a:prstGeom prst="rect">
-                  <a:avLst/>
-                </a:prstGeom>
-              </p:spPr>
-            </p:pic>
-            <p:pic>
-              <p:nvPicPr>
-                <p:cNvPr id="10" name="Picture 9"/>
-                <p:cNvPicPr>
-                  <a:picLocks noChangeAspect="1"/>
-                </p:cNvPicPr>
-                <p:nvPr/>
-              </p:nvPicPr>
-              <p:blipFill>
-                <a:blip r:embed="rId5" cstate="print">
-                  <a:extLst>
-                    <a:ext uri="{28A0092B-C50C-407E-A947-70E740481C1C}">
-                      <a14:useLocalDpi xmlns:a14="http://schemas.microsoft.com/office/drawing/2010/main" val="0"/>
-                    </a:ext>
-                  </a:extLst>
-                </a:blip>
-                <a:stretch>
-                  <a:fillRect/>
-                </a:stretch>
-              </p:blipFill>
-              <p:spPr>
-                <a:xfrm>
-                  <a:off x="1775138" y="4893796"/>
-                  <a:ext cx="466579" cy="375075"/>
-                </a:xfrm>
-                <a:prstGeom prst="rect">
-                  <a:avLst/>
-                </a:prstGeom>
-              </p:spPr>
-            </p:pic>
-            <p:pic>
-              <p:nvPicPr>
-                <p:cNvPr id="11" name="Picture 10"/>
-                <p:cNvPicPr>
-                  <a:picLocks noChangeAspect="1"/>
-                </p:cNvPicPr>
-                <p:nvPr/>
-              </p:nvPicPr>
-              <p:blipFill>
-                <a:blip r:embed="rId6" cstate="print">
-                  <a:extLst>
-                    <a:ext uri="{28A0092B-C50C-407E-A947-70E740481C1C}">
-                      <a14:useLocalDpi xmlns:a14="http://schemas.microsoft.com/office/drawing/2010/main" val="0"/>
-                    </a:ext>
-                  </a:extLst>
-                </a:blip>
-                <a:stretch>
-                  <a:fillRect/>
-                </a:stretch>
-              </p:blipFill>
-              <p:spPr>
-                <a:xfrm>
-                  <a:off x="3971293" y="4861143"/>
-                  <a:ext cx="422871" cy="372587"/>
-                </a:xfrm>
-                <a:prstGeom prst="rect">
-                  <a:avLst/>
-                </a:prstGeom>
-              </p:spPr>
-            </p:pic>
-            <p:pic>
-              <p:nvPicPr>
-                <p:cNvPr id="3" name="Picture 2"/>
-                <p:cNvPicPr>
-                  <a:picLocks noChangeAspect="1"/>
-                </p:cNvPicPr>
-                <p:nvPr/>
-              </p:nvPicPr>
-              <p:blipFill>
-                <a:blip r:embed="rId7" cstate="print">
-                  <a:extLst>
-                    <a:ext uri="{28A0092B-C50C-407E-A947-70E740481C1C}">
-                      <a14:useLocalDpi xmlns:a14="http://schemas.microsoft.com/office/drawing/2010/main" val="0"/>
-                    </a:ext>
-                  </a:extLst>
-                </a:blip>
-                <a:stretch>
-                  <a:fillRect/>
-                </a:stretch>
-              </p:blipFill>
-              <p:spPr>
-                <a:xfrm>
-                  <a:off x="1068734" y="4905643"/>
-                  <a:ext cx="456193" cy="375075"/>
-                </a:xfrm>
-                <a:prstGeom prst="rect">
-                  <a:avLst/>
-                </a:prstGeom>
-              </p:spPr>
-            </p:pic>
-            <p:pic>
-              <p:nvPicPr>
-                <p:cNvPr id="39" name="Picture 38"/>
-                <p:cNvPicPr>
-                  <a:picLocks noChangeAspect="1"/>
-                </p:cNvPicPr>
-                <p:nvPr/>
-              </p:nvPicPr>
-              <p:blipFill>
-                <a:blip r:embed="rId8" cstate="print">
-                  <a:extLst>
-                    <a:ext uri="{28A0092B-C50C-407E-A947-70E740481C1C}">
-                      <a14:useLocalDpi xmlns:a14="http://schemas.microsoft.com/office/drawing/2010/main" val="0"/>
-                    </a:ext>
-                  </a:extLst>
-                </a:blip>
-                <a:stretch>
-                  <a:fillRect/>
-                </a:stretch>
-              </p:blipFill>
-              <p:spPr>
-                <a:xfrm flipH="1">
-                  <a:off x="4718384" y="4865802"/>
-                  <a:ext cx="425272" cy="363268"/>
-                </a:xfrm>
-                <a:prstGeom prst="rect">
-                  <a:avLst/>
-                </a:prstGeom>
-              </p:spPr>
-            </p:pic>
-          </p:grpSp>
+              <a:prstGeom prst="rect">
+                <a:avLst/>
+              </a:prstGeom>
+            </p:spPr>
+          </p:pic>
+          <p:pic>
+            <p:nvPicPr>
+              <p:cNvPr id="9" name="Picture 8"/>
+              <p:cNvPicPr>
+                <a:picLocks noChangeAspect="1"/>
+              </p:cNvPicPr>
+              <p:nvPr/>
+            </p:nvPicPr>
+            <p:blipFill>
+              <a:blip r:embed="rId4" cstate="print">
+                <a:extLst>
+                  <a:ext uri="{28A0092B-C50C-407E-A947-70E740481C1C}">
+                    <a14:useLocalDpi xmlns:a14="http://schemas.microsoft.com/office/drawing/2010/main" val="0"/>
+                  </a:ext>
+                </a:extLst>
+              </a:blip>
+              <a:stretch>
+                <a:fillRect/>
+              </a:stretch>
+            </p:blipFill>
+            <p:spPr>
+              <a:xfrm>
+                <a:off x="3244448" y="4782853"/>
+                <a:ext cx="371522" cy="375075"/>
+              </a:xfrm>
+              <a:prstGeom prst="rect">
+                <a:avLst/>
+              </a:prstGeom>
+            </p:spPr>
+          </p:pic>
+          <p:pic>
+            <p:nvPicPr>
+              <p:cNvPr id="10" name="Picture 9"/>
+              <p:cNvPicPr>
+                <a:picLocks noChangeAspect="1"/>
+              </p:cNvPicPr>
+              <p:nvPr/>
+            </p:nvPicPr>
+            <p:blipFill>
+              <a:blip r:embed="rId5" cstate="print">
+                <a:extLst>
+                  <a:ext uri="{28A0092B-C50C-407E-A947-70E740481C1C}">
+                    <a14:useLocalDpi xmlns:a14="http://schemas.microsoft.com/office/drawing/2010/main" val="0"/>
+                  </a:ext>
+                </a:extLst>
+              </a:blip>
+              <a:stretch>
+                <a:fillRect/>
+              </a:stretch>
+            </p:blipFill>
+            <p:spPr>
+              <a:xfrm>
+                <a:off x="2523564" y="4879668"/>
+                <a:ext cx="466579" cy="375075"/>
+              </a:xfrm>
+              <a:prstGeom prst="rect">
+                <a:avLst/>
+              </a:prstGeom>
+            </p:spPr>
+          </p:pic>
+          <p:pic>
+            <p:nvPicPr>
+              <p:cNvPr id="11" name="Picture 10"/>
+              <p:cNvPicPr>
+                <a:picLocks noChangeAspect="1"/>
+              </p:cNvPicPr>
+              <p:nvPr/>
+            </p:nvPicPr>
+            <p:blipFill>
+              <a:blip r:embed="rId6" cstate="print">
+                <a:extLst>
+                  <a:ext uri="{28A0092B-C50C-407E-A947-70E740481C1C}">
+                    <a14:useLocalDpi xmlns:a14="http://schemas.microsoft.com/office/drawing/2010/main" val="0"/>
+                  </a:ext>
+                </a:extLst>
+              </a:blip>
+              <a:stretch>
+                <a:fillRect/>
+              </a:stretch>
+            </p:blipFill>
+            <p:spPr>
+              <a:xfrm>
+                <a:off x="3935548" y="4810694"/>
+                <a:ext cx="422871" cy="372587"/>
+              </a:xfrm>
+              <a:prstGeom prst="rect">
+                <a:avLst/>
+              </a:prstGeom>
+            </p:spPr>
+          </p:pic>
+          <p:pic>
+            <p:nvPicPr>
+              <p:cNvPr id="3" name="Picture 2"/>
+              <p:cNvPicPr>
+                <a:picLocks noChangeAspect="1"/>
+              </p:cNvPicPr>
+              <p:nvPr/>
+            </p:nvPicPr>
+            <p:blipFill>
+              <a:blip r:embed="rId7" cstate="print">
+                <a:extLst>
+                  <a:ext uri="{28A0092B-C50C-407E-A947-70E740481C1C}">
+                    <a14:useLocalDpi xmlns:a14="http://schemas.microsoft.com/office/drawing/2010/main" val="0"/>
+                  </a:ext>
+                </a:extLst>
+              </a:blip>
+              <a:stretch>
+                <a:fillRect/>
+              </a:stretch>
+            </p:blipFill>
+            <p:spPr>
+              <a:xfrm>
+                <a:off x="1032989" y="4855194"/>
+                <a:ext cx="456193" cy="375075"/>
+              </a:xfrm>
+              <a:prstGeom prst="rect">
+                <a:avLst/>
+              </a:prstGeom>
+            </p:spPr>
+          </p:pic>
+          <p:pic>
+            <p:nvPicPr>
+              <p:cNvPr id="39" name="Picture 38"/>
+              <p:cNvPicPr>
+                <a:picLocks noChangeAspect="1"/>
+              </p:cNvPicPr>
+              <p:nvPr/>
+            </p:nvPicPr>
+            <p:blipFill>
+              <a:blip r:embed="rId8" cstate="print">
+                <a:extLst>
+                  <a:ext uri="{28A0092B-C50C-407E-A947-70E740481C1C}">
+                    <a14:useLocalDpi xmlns:a14="http://schemas.microsoft.com/office/drawing/2010/main" val="0"/>
+                  </a:ext>
+                </a:extLst>
+              </a:blip>
+              <a:stretch>
+                <a:fillRect/>
+              </a:stretch>
+            </p:blipFill>
+            <p:spPr>
+              <a:xfrm flipH="1">
+                <a:off x="4682639" y="4815353"/>
+                <a:ext cx="425272" cy="363268"/>
+              </a:xfrm>
+              <a:prstGeom prst="rect">
+                <a:avLst/>
+              </a:prstGeom>
+            </p:spPr>
+          </p:pic>
           <p:pic>
             <p:nvPicPr>
               <p:cNvPr id="20" name="Picture 19"/>
@@ -4771,7 +5303,7 @@
             </p:blipFill>
             <p:spPr>
               <a:xfrm>
-                <a:off x="5402183" y="4935695"/>
+                <a:off x="5374751" y="4868621"/>
                 <a:ext cx="396874" cy="310000"/>
               </a:xfrm>
               <a:prstGeom prst="rect">
@@ -4782,216 +5314,201 @@
         </p:grpSp>
         <p:grpSp>
           <p:nvGrpSpPr>
-            <p:cNvPr id="22" name="Group 21"/>
+            <p:cNvPr id="25" name="Group 24"/>
             <p:cNvGrpSpPr/>
             <p:nvPr/>
           </p:nvGrpSpPr>
           <p:grpSpPr>
             <a:xfrm>
-              <a:off x="7147629" y="4803963"/>
-              <a:ext cx="4738636" cy="440150"/>
-              <a:chOff x="1060421" y="4857193"/>
-              <a:chExt cx="4738636" cy="440150"/>
+              <a:off x="7074125" y="4706731"/>
+              <a:ext cx="4738636" cy="471890"/>
+              <a:chOff x="1032989" y="4782853"/>
+              <a:chExt cx="4738636" cy="471890"/>
             </a:xfrm>
           </p:grpSpPr>
-          <p:grpSp>
-            <p:nvGrpSpPr>
-              <p:cNvPr id="23" name="Group 22"/>
-              <p:cNvGrpSpPr/>
-              <p:nvPr/>
-            </p:nvGrpSpPr>
-            <p:grpSpPr>
-              <a:xfrm>
-                <a:off x="1060421" y="4857193"/>
-                <a:ext cx="4074922" cy="440150"/>
-                <a:chOff x="1068734" y="4840568"/>
-                <a:chExt cx="4074922" cy="440150"/>
-              </a:xfrm>
-            </p:grpSpPr>
-            <p:pic>
-              <p:nvPicPr>
-                <p:cNvPr id="25" name="Picture 24"/>
-                <p:cNvPicPr>
-                  <a:picLocks noChangeAspect="1"/>
-                </p:cNvPicPr>
-                <p:nvPr/>
-              </p:nvPicPr>
-              <p:blipFill>
-                <a:blip r:embed="rId3" cstate="print">
-                  <a:extLst>
-                    <a:ext uri="{28A0092B-C50C-407E-A947-70E740481C1C}">
-                      <a14:useLocalDpi xmlns:a14="http://schemas.microsoft.com/office/drawing/2010/main" val="0"/>
-                    </a:ext>
-                  </a:extLst>
-                </a:blip>
-                <a:stretch>
-                  <a:fillRect/>
-                </a:stretch>
-              </p:blipFill>
-              <p:spPr>
-                <a:xfrm>
-                  <a:off x="2436997" y="4958871"/>
-                  <a:ext cx="541407" cy="268617"/>
-                </a:xfrm>
-                <a:prstGeom prst="rect">
-                  <a:avLst/>
-                </a:prstGeom>
-              </p:spPr>
-            </p:pic>
-            <p:pic>
-              <p:nvPicPr>
-                <p:cNvPr id="26" name="Picture 25"/>
-                <p:cNvPicPr>
-                  <a:picLocks noChangeAspect="1"/>
-                </p:cNvPicPr>
-                <p:nvPr/>
-              </p:nvPicPr>
-              <p:blipFill>
-                <a:blip r:embed="rId4" cstate="print">
-                  <a:extLst>
-                    <a:ext uri="{28A0092B-C50C-407E-A947-70E740481C1C}">
-                      <a14:useLocalDpi xmlns:a14="http://schemas.microsoft.com/office/drawing/2010/main" val="0"/>
-                    </a:ext>
-                  </a:extLst>
-                </a:blip>
-                <a:stretch>
-                  <a:fillRect/>
-                </a:stretch>
-              </p:blipFill>
-              <p:spPr>
-                <a:xfrm>
-                  <a:off x="3271824" y="4840568"/>
-                  <a:ext cx="371522" cy="375075"/>
-                </a:xfrm>
-                <a:prstGeom prst="rect">
-                  <a:avLst/>
-                </a:prstGeom>
-              </p:spPr>
-            </p:pic>
-            <p:pic>
-              <p:nvPicPr>
-                <p:cNvPr id="27" name="Picture 26"/>
-                <p:cNvPicPr>
-                  <a:picLocks noChangeAspect="1"/>
-                </p:cNvPicPr>
-                <p:nvPr/>
-              </p:nvPicPr>
-              <p:blipFill>
-                <a:blip r:embed="rId5" cstate="print">
-                  <a:extLst>
-                    <a:ext uri="{28A0092B-C50C-407E-A947-70E740481C1C}">
-                      <a14:useLocalDpi xmlns:a14="http://schemas.microsoft.com/office/drawing/2010/main" val="0"/>
-                    </a:ext>
-                  </a:extLst>
-                </a:blip>
-                <a:stretch>
-                  <a:fillRect/>
-                </a:stretch>
-              </p:blipFill>
-              <p:spPr>
-                <a:xfrm>
-                  <a:off x="1775138" y="4893796"/>
-                  <a:ext cx="466579" cy="375075"/>
-                </a:xfrm>
-                <a:prstGeom prst="rect">
-                  <a:avLst/>
-                </a:prstGeom>
-              </p:spPr>
-            </p:pic>
-            <p:pic>
-              <p:nvPicPr>
-                <p:cNvPr id="28" name="Picture 27"/>
-                <p:cNvPicPr>
-                  <a:picLocks noChangeAspect="1"/>
-                </p:cNvPicPr>
-                <p:nvPr/>
-              </p:nvPicPr>
-              <p:blipFill>
-                <a:blip r:embed="rId6" cstate="print">
-                  <a:extLst>
-                    <a:ext uri="{28A0092B-C50C-407E-A947-70E740481C1C}">
-                      <a14:useLocalDpi xmlns:a14="http://schemas.microsoft.com/office/drawing/2010/main" val="0"/>
-                    </a:ext>
-                  </a:extLst>
-                </a:blip>
-                <a:stretch>
-                  <a:fillRect/>
-                </a:stretch>
-              </p:blipFill>
-              <p:spPr>
-                <a:xfrm>
-                  <a:off x="3971293" y="4861143"/>
-                  <a:ext cx="422871" cy="372587"/>
-                </a:xfrm>
-                <a:prstGeom prst="rect">
-                  <a:avLst/>
-                </a:prstGeom>
-              </p:spPr>
-            </p:pic>
-            <p:pic>
-              <p:nvPicPr>
-                <p:cNvPr id="29" name="Picture 28"/>
-                <p:cNvPicPr>
-                  <a:picLocks noChangeAspect="1"/>
-                </p:cNvPicPr>
-                <p:nvPr/>
-              </p:nvPicPr>
-              <p:blipFill>
-                <a:blip r:embed="rId7" cstate="print">
-                  <a:extLst>
-                    <a:ext uri="{28A0092B-C50C-407E-A947-70E740481C1C}">
-                      <a14:useLocalDpi xmlns:a14="http://schemas.microsoft.com/office/drawing/2010/main" val="0"/>
-                    </a:ext>
-                  </a:extLst>
-                </a:blip>
-                <a:stretch>
-                  <a:fillRect/>
-                </a:stretch>
-              </p:blipFill>
-              <p:spPr>
-                <a:xfrm>
-                  <a:off x="1068734" y="4905643"/>
-                  <a:ext cx="456193" cy="375075"/>
-                </a:xfrm>
-                <a:prstGeom prst="rect">
-                  <a:avLst/>
-                </a:prstGeom>
-              </p:spPr>
-            </p:pic>
-            <p:pic>
-              <p:nvPicPr>
-                <p:cNvPr id="30" name="Picture 29"/>
-                <p:cNvPicPr>
-                  <a:picLocks noChangeAspect="1"/>
-                </p:cNvPicPr>
-                <p:nvPr/>
-              </p:nvPicPr>
-              <p:blipFill>
-                <a:blip r:embed="rId8" cstate="print">
-                  <a:extLst>
-                    <a:ext uri="{28A0092B-C50C-407E-A947-70E740481C1C}">
-                      <a14:useLocalDpi xmlns:a14="http://schemas.microsoft.com/office/drawing/2010/main" val="0"/>
-                    </a:ext>
-                  </a:extLst>
-                </a:blip>
-                <a:stretch>
-                  <a:fillRect/>
-                </a:stretch>
-              </p:blipFill>
-              <p:spPr>
-                <a:xfrm flipH="1">
-                  <a:off x="4718384" y="4865802"/>
-                  <a:ext cx="425272" cy="363268"/>
-                </a:xfrm>
-                <a:prstGeom prst="rect">
-                  <a:avLst/>
-                </a:prstGeom>
-              </p:spPr>
-            </p:pic>
-          </p:grpSp>
           <p:pic>
             <p:nvPicPr>
-              <p:cNvPr id="24" name="Picture 23"/>
+              <p:cNvPr id="27" name="Picture 26"/>
+              <p:cNvPicPr>
+                <a:picLocks noChangeAspect="1"/>
+              </p:cNvPicPr>
+              <p:nvPr/>
+            </p:nvPicPr>
+            <p:blipFill>
+              <a:blip r:embed="rId3" cstate="print">
+                <a:extLst>
+                  <a:ext uri="{28A0092B-C50C-407E-A947-70E740481C1C}">
+                    <a14:useLocalDpi xmlns:a14="http://schemas.microsoft.com/office/drawing/2010/main" val="0"/>
+                  </a:ext>
+                </a:extLst>
+              </a:blip>
+              <a:stretch>
+                <a:fillRect/>
+              </a:stretch>
+            </p:blipFill>
+            <p:spPr>
+              <a:xfrm>
+                <a:off x="1761029" y="4932898"/>
+                <a:ext cx="541407" cy="268617"/>
+              </a:xfrm>
+              <a:prstGeom prst="rect">
+                <a:avLst/>
+              </a:prstGeom>
+            </p:spPr>
+          </p:pic>
+          <p:pic>
+            <p:nvPicPr>
+              <p:cNvPr id="33" name="Picture 32"/>
+              <p:cNvPicPr>
+                <a:picLocks noChangeAspect="1"/>
+              </p:cNvPicPr>
+              <p:nvPr/>
+            </p:nvPicPr>
+            <p:blipFill>
+              <a:blip r:embed="rId4" cstate="print">
+                <a:extLst>
+                  <a:ext uri="{28A0092B-C50C-407E-A947-70E740481C1C}">
+                    <a14:useLocalDpi xmlns:a14="http://schemas.microsoft.com/office/drawing/2010/main" val="0"/>
+                  </a:ext>
+                </a:extLst>
+              </a:blip>
+              <a:stretch>
+                <a:fillRect/>
+              </a:stretch>
+            </p:blipFill>
+            <p:spPr>
+              <a:xfrm>
+                <a:off x="3244448" y="4782853"/>
+                <a:ext cx="371522" cy="375075"/>
+              </a:xfrm>
+              <a:prstGeom prst="rect">
+                <a:avLst/>
+              </a:prstGeom>
+            </p:spPr>
+          </p:pic>
+          <p:pic>
+            <p:nvPicPr>
+              <p:cNvPr id="34" name="Picture 33"/>
+              <p:cNvPicPr>
+                <a:picLocks noChangeAspect="1"/>
+              </p:cNvPicPr>
+              <p:nvPr/>
+            </p:nvPicPr>
+            <p:blipFill>
+              <a:blip r:embed="rId5" cstate="print">
+                <a:extLst>
+                  <a:ext uri="{28A0092B-C50C-407E-A947-70E740481C1C}">
+                    <a14:useLocalDpi xmlns:a14="http://schemas.microsoft.com/office/drawing/2010/main" val="0"/>
+                  </a:ext>
+                </a:extLst>
+              </a:blip>
+              <a:stretch>
+                <a:fillRect/>
+              </a:stretch>
+            </p:blipFill>
+            <p:spPr>
+              <a:xfrm>
+                <a:off x="2523564" y="4879668"/>
+                <a:ext cx="466579" cy="375075"/>
+              </a:xfrm>
+              <a:prstGeom prst="rect">
+                <a:avLst/>
+              </a:prstGeom>
+            </p:spPr>
+          </p:pic>
+          <p:pic>
+            <p:nvPicPr>
+              <p:cNvPr id="35" name="Picture 34"/>
+              <p:cNvPicPr>
+                <a:picLocks noChangeAspect="1"/>
+              </p:cNvPicPr>
+              <p:nvPr/>
+            </p:nvPicPr>
+            <p:blipFill>
+              <a:blip r:embed="rId6" cstate="print">
+                <a:extLst>
+                  <a:ext uri="{28A0092B-C50C-407E-A947-70E740481C1C}">
+                    <a14:useLocalDpi xmlns:a14="http://schemas.microsoft.com/office/drawing/2010/main" val="0"/>
+                  </a:ext>
+                </a:extLst>
+              </a:blip>
+              <a:stretch>
+                <a:fillRect/>
+              </a:stretch>
+            </p:blipFill>
+            <p:spPr>
+              <a:xfrm>
+                <a:off x="3935548" y="4810694"/>
+                <a:ext cx="422871" cy="372587"/>
+              </a:xfrm>
+              <a:prstGeom prst="rect">
+                <a:avLst/>
+              </a:prstGeom>
+            </p:spPr>
+          </p:pic>
+          <p:pic>
+            <p:nvPicPr>
+              <p:cNvPr id="36" name="Picture 35"/>
+              <p:cNvPicPr>
+                <a:picLocks noChangeAspect="1"/>
+              </p:cNvPicPr>
+              <p:nvPr/>
+            </p:nvPicPr>
+            <p:blipFill>
+              <a:blip r:embed="rId7" cstate="print">
+                <a:extLst>
+                  <a:ext uri="{28A0092B-C50C-407E-A947-70E740481C1C}">
+                    <a14:useLocalDpi xmlns:a14="http://schemas.microsoft.com/office/drawing/2010/main" val="0"/>
+                  </a:ext>
+                </a:extLst>
+              </a:blip>
+              <a:stretch>
+                <a:fillRect/>
+              </a:stretch>
+            </p:blipFill>
+            <p:spPr>
+              <a:xfrm>
+                <a:off x="1032989" y="4855194"/>
+                <a:ext cx="456193" cy="375075"/>
+              </a:xfrm>
+              <a:prstGeom prst="rect">
+                <a:avLst/>
+              </a:prstGeom>
+            </p:spPr>
+          </p:pic>
+          <p:pic>
+            <p:nvPicPr>
+              <p:cNvPr id="37" name="Picture 36"/>
+              <p:cNvPicPr>
+                <a:picLocks noChangeAspect="1"/>
+              </p:cNvPicPr>
+              <p:nvPr/>
+            </p:nvPicPr>
+            <p:blipFill>
+              <a:blip r:embed="rId8" cstate="print">
+                <a:extLst>
+                  <a:ext uri="{28A0092B-C50C-407E-A947-70E740481C1C}">
+                    <a14:useLocalDpi xmlns:a14="http://schemas.microsoft.com/office/drawing/2010/main" val="0"/>
+                  </a:ext>
+                </a:extLst>
+              </a:blip>
+              <a:stretch>
+                <a:fillRect/>
+              </a:stretch>
+            </p:blipFill>
+            <p:spPr>
+              <a:xfrm flipH="1">
+                <a:off x="4682639" y="4815353"/>
+                <a:ext cx="425272" cy="363268"/>
+              </a:xfrm>
+              <a:prstGeom prst="rect">
+                <a:avLst/>
+              </a:prstGeom>
+            </p:spPr>
+          </p:pic>
+          <p:pic>
+            <p:nvPicPr>
+              <p:cNvPr id="38" name="Picture 37"/>
               <p:cNvPicPr>
                 <a:picLocks noChangeAspect="1"/>
               </p:cNvPicPr>
@@ -5005,7 +5522,7 @@
             </p:blipFill>
             <p:spPr>
               <a:xfrm>
-                <a:off x="5402183" y="4935695"/>
+                <a:off x="5374751" y="4868621"/>
                 <a:ext cx="396874" cy="310000"/>
               </a:xfrm>
               <a:prstGeom prst="rect">

</xml_diff>

<commit_message>
fixed fig 2a for paper
</commit_message>
<xml_diff>
--- a/output/plots/Presentation1.pptx
+++ b/output/plots/Presentation1.pptx
@@ -5,13 +5,14 @@
     <p:sldMasterId id="2147483648" r:id="rId1"/>
   </p:sldMasterIdLst>
   <p:notesMasterIdLst>
-    <p:notesMasterId r:id="rId6"/>
+    <p:notesMasterId r:id="rId7"/>
   </p:notesMasterIdLst>
   <p:sldIdLst>
     <p:sldId id="258" r:id="rId2"/>
     <p:sldId id="257" r:id="rId3"/>
     <p:sldId id="259" r:id="rId4"/>
-    <p:sldId id="256" r:id="rId5"/>
+    <p:sldId id="260" r:id="rId5"/>
+    <p:sldId id="256" r:id="rId6"/>
   </p:sldIdLst>
   <p:sldSz cx="12192000" cy="6858000"/>
   <p:notesSz cx="6858000" cy="9144000"/>
@@ -200,7 +201,7 @@
           <a:p>
             <a:fld id="{7FA21820-D199-4D82-91AF-C50B1D3B111A}" type="datetimeFigureOut">
               <a:rPr lang="en-US" smtClean="0"/>
-              <a:t>2/1/2017</a:t>
+              <a:t>2/2/2017</a:t>
             </a:fld>
             <a:endParaRPr lang="en-US"/>
           </a:p>
@@ -525,36 +526,100 @@
           <a:p>
             <a:r>
               <a:rPr lang="en-US" dirty="0" smtClean="0"/>
-              <a:t>Tree – created by Edward</a:t>
-            </a:r>
-            <a:r>
-              <a:rPr lang="en-US" baseline="0" dirty="0" smtClean="0"/>
-              <a:t> Boatman</a:t>
+              <a:t>Tree – created by </a:t>
+            </a:r>
+            <a:r>
+              <a:rPr lang="en-US" sz="1200" b="0" i="0" u="none" strike="noStrike" kern="1200" dirty="0" err="1" smtClean="0">
+                <a:solidFill>
+                  <a:schemeClr val="tx1"/>
+                </a:solidFill>
+                <a:effectLst/>
+                <a:latin typeface="+mn-lt"/>
+                <a:ea typeface="+mn-ea"/>
+                <a:cs typeface="+mn-cs"/>
+                <a:hlinkClick r:id="rId3"/>
+              </a:rPr>
+              <a:t>Delwar</a:t>
+            </a:r>
+            <a:r>
+              <a:rPr lang="en-US" sz="1200" b="0" i="0" u="none" strike="noStrike" kern="1200" dirty="0" smtClean="0">
+                <a:solidFill>
+                  <a:schemeClr val="tx1"/>
+                </a:solidFill>
+                <a:effectLst/>
+                <a:latin typeface="+mn-lt"/>
+                <a:ea typeface="+mn-ea"/>
+                <a:cs typeface="+mn-cs"/>
+                <a:hlinkClick r:id="rId3"/>
+              </a:rPr>
+              <a:t> Hossain</a:t>
+            </a:r>
+            <a:r>
+              <a:rPr lang="en-US" sz="1200" b="0" i="0" kern="1200" dirty="0" smtClean="0">
+                <a:solidFill>
+                  <a:schemeClr val="tx1"/>
+                </a:solidFill>
+                <a:effectLst/>
+                <a:latin typeface="+mn-lt"/>
+                <a:ea typeface="+mn-ea"/>
+                <a:cs typeface="+mn-cs"/>
+              </a:rPr>
+              <a:t>,</a:t>
             </a:r>
           </a:p>
           <a:p>
             <a:r>
               <a:rPr lang="en-US" dirty="0" smtClean="0"/>
-              <a:t>Deer – created by </a:t>
-            </a:r>
-            <a:r>
-              <a:rPr lang="en-US" dirty="0" err="1" smtClean="0"/>
-              <a:t>sagit</a:t>
+              <a:t>Deer </a:t>
             </a:r>
             <a:r>
               <a:rPr lang="en-US" dirty="0" smtClean="0"/>
-              <a:t> </a:t>
-            </a:r>
-            <a:r>
-              <a:rPr lang="en-US" dirty="0" err="1" smtClean="0"/>
-              <a:t>milshtein</a:t>
-            </a:r>
-            <a:endParaRPr lang="en-US" dirty="0" smtClean="0"/>
+              <a:t>– created by </a:t>
+            </a:r>
+            <a:r>
+              <a:rPr lang="en-US" sz="1200" b="0" i="0" u="none" strike="noStrike" kern="1200" dirty="0" smtClean="0">
+                <a:solidFill>
+                  <a:schemeClr val="tx1"/>
+                </a:solidFill>
+                <a:effectLst/>
+                <a:latin typeface="+mn-lt"/>
+                <a:ea typeface="+mn-ea"/>
+                <a:cs typeface="+mn-cs"/>
+                <a:hlinkClick r:id="rId4"/>
+              </a:rPr>
+              <a:t>Francisca </a:t>
+            </a:r>
+            <a:r>
+              <a:rPr lang="en-US" sz="1200" b="0" i="0" u="none" strike="noStrike" kern="1200" dirty="0" err="1" smtClean="0">
+                <a:solidFill>
+                  <a:schemeClr val="tx1"/>
+                </a:solidFill>
+                <a:effectLst/>
+                <a:latin typeface="+mn-lt"/>
+                <a:ea typeface="+mn-ea"/>
+                <a:cs typeface="+mn-cs"/>
+                <a:hlinkClick r:id="rId4"/>
+              </a:rPr>
+              <a:t>Arévalo</a:t>
+            </a:r>
+            <a:endParaRPr lang="en-US" sz="1200" b="0" i="0" u="none" strike="noStrike" kern="1200" dirty="0" smtClean="0">
+              <a:solidFill>
+                <a:schemeClr val="tx1"/>
+              </a:solidFill>
+              <a:effectLst/>
+              <a:latin typeface="+mn-lt"/>
+              <a:ea typeface="+mn-ea"/>
+              <a:cs typeface="+mn-cs"/>
+            </a:endParaRPr>
           </a:p>
           <a:p>
             <a:r>
               <a:rPr lang="en-US" dirty="0" smtClean="0"/>
-              <a:t>Fish – created by Iconic</a:t>
+              <a:t>Fish </a:t>
+            </a:r>
+            <a:r>
+              <a:rPr lang="en-US" dirty="0" smtClean="0"/>
+              <a:t>– created by Iconic</a:t>
             </a:r>
           </a:p>
           <a:p>
@@ -758,7 +823,7 @@
           <a:p>
             <a:fld id="{916B8C92-D5E3-4480-8685-D57BEE386DE2}" type="datetimeFigureOut">
               <a:rPr lang="en-US" smtClean="0"/>
-              <a:t>2/1/2017</a:t>
+              <a:t>2/2/2017</a:t>
             </a:fld>
             <a:endParaRPr lang="en-US"/>
           </a:p>
@@ -928,7 +993,7 @@
           <a:p>
             <a:fld id="{916B8C92-D5E3-4480-8685-D57BEE386DE2}" type="datetimeFigureOut">
               <a:rPr lang="en-US" smtClean="0"/>
-              <a:t>2/1/2017</a:t>
+              <a:t>2/2/2017</a:t>
             </a:fld>
             <a:endParaRPr lang="en-US"/>
           </a:p>
@@ -1108,7 +1173,7 @@
           <a:p>
             <a:fld id="{916B8C92-D5E3-4480-8685-D57BEE386DE2}" type="datetimeFigureOut">
               <a:rPr lang="en-US" smtClean="0"/>
-              <a:t>2/1/2017</a:t>
+              <a:t>2/2/2017</a:t>
             </a:fld>
             <a:endParaRPr lang="en-US"/>
           </a:p>
@@ -1278,7 +1343,7 @@
           <a:p>
             <a:fld id="{916B8C92-D5E3-4480-8685-D57BEE386DE2}" type="datetimeFigureOut">
               <a:rPr lang="en-US" smtClean="0"/>
-              <a:t>2/1/2017</a:t>
+              <a:t>2/2/2017</a:t>
             </a:fld>
             <a:endParaRPr lang="en-US"/>
           </a:p>
@@ -1524,7 +1589,7 @@
           <a:p>
             <a:fld id="{916B8C92-D5E3-4480-8685-D57BEE386DE2}" type="datetimeFigureOut">
               <a:rPr lang="en-US" smtClean="0"/>
-              <a:t>2/1/2017</a:t>
+              <a:t>2/2/2017</a:t>
             </a:fld>
             <a:endParaRPr lang="en-US"/>
           </a:p>
@@ -1756,7 +1821,7 @@
           <a:p>
             <a:fld id="{916B8C92-D5E3-4480-8685-D57BEE386DE2}" type="datetimeFigureOut">
               <a:rPr lang="en-US" smtClean="0"/>
-              <a:t>2/1/2017</a:t>
+              <a:t>2/2/2017</a:t>
             </a:fld>
             <a:endParaRPr lang="en-US"/>
           </a:p>
@@ -2123,7 +2188,7 @@
           <a:p>
             <a:fld id="{916B8C92-D5E3-4480-8685-D57BEE386DE2}" type="datetimeFigureOut">
               <a:rPr lang="en-US" smtClean="0"/>
-              <a:t>2/1/2017</a:t>
+              <a:t>2/2/2017</a:t>
             </a:fld>
             <a:endParaRPr lang="en-US"/>
           </a:p>
@@ -2241,7 +2306,7 @@
           <a:p>
             <a:fld id="{916B8C92-D5E3-4480-8685-D57BEE386DE2}" type="datetimeFigureOut">
               <a:rPr lang="en-US" smtClean="0"/>
-              <a:t>2/1/2017</a:t>
+              <a:t>2/2/2017</a:t>
             </a:fld>
             <a:endParaRPr lang="en-US"/>
           </a:p>
@@ -2336,7 +2401,7 @@
           <a:p>
             <a:fld id="{916B8C92-D5E3-4480-8685-D57BEE386DE2}" type="datetimeFigureOut">
               <a:rPr lang="en-US" smtClean="0"/>
-              <a:t>2/1/2017</a:t>
+              <a:t>2/2/2017</a:t>
             </a:fld>
             <a:endParaRPr lang="en-US"/>
           </a:p>
@@ -2613,7 +2678,7 @@
           <a:p>
             <a:fld id="{916B8C92-D5E3-4480-8685-D57BEE386DE2}" type="datetimeFigureOut">
               <a:rPr lang="en-US" smtClean="0"/>
-              <a:t>2/1/2017</a:t>
+              <a:t>2/2/2017</a:t>
             </a:fld>
             <a:endParaRPr lang="en-US"/>
           </a:p>
@@ -2866,7 +2931,7 @@
           <a:p>
             <a:fld id="{916B8C92-D5E3-4480-8685-D57BEE386DE2}" type="datetimeFigureOut">
               <a:rPr lang="en-US" smtClean="0"/>
-              <a:t>2/1/2017</a:t>
+              <a:t>2/2/2017</a:t>
             </a:fld>
             <a:endParaRPr lang="en-US"/>
           </a:p>
@@ -3079,7 +3144,7 @@
           <a:p>
             <a:fld id="{916B8C92-D5E3-4480-8685-D57BEE386DE2}" type="datetimeFigureOut">
               <a:rPr lang="en-US" smtClean="0"/>
-              <a:t>2/1/2017</a:t>
+              <a:t>2/2/2017</a:t>
             </a:fld>
             <a:endParaRPr lang="en-US"/>
           </a:p>
@@ -3484,209 +3549,6 @@
           <a:chExt cx="0" cy="0"/>
         </a:xfrm>
       </p:grpSpPr>
-      <p:pic>
-        <p:nvPicPr>
-          <p:cNvPr id="4" name="Picture 3"/>
-          <p:cNvPicPr>
-            <a:picLocks noChangeAspect="1"/>
-          </p:cNvPicPr>
-          <p:nvPr/>
-        </p:nvPicPr>
-        <p:blipFill>
-          <a:blip r:embed="rId3" cstate="print">
-            <a:extLst>
-              <a:ext uri="{28A0092B-C50C-407E-A947-70E740481C1C}">
-                <a14:useLocalDpi xmlns:a14="http://schemas.microsoft.com/office/drawing/2010/main" val="0"/>
-              </a:ext>
-            </a:extLst>
-          </a:blip>
-          <a:stretch>
-            <a:fillRect/>
-          </a:stretch>
-        </p:blipFill>
-        <p:spPr>
-          <a:xfrm>
-            <a:off x="2032000" y="1906033"/>
-            <a:ext cx="465551" cy="230981"/>
-          </a:xfrm>
-          <a:prstGeom prst="rect">
-            <a:avLst/>
-          </a:prstGeom>
-        </p:spPr>
-      </p:pic>
-      <p:sp>
-        <p:nvSpPr>
-          <p:cNvPr id="2" name="Title 1"/>
-          <p:cNvSpPr>
-            <a:spLocks noGrp="1"/>
-          </p:cNvSpPr>
-          <p:nvPr>
-            <p:ph type="title"/>
-          </p:nvPr>
-        </p:nvSpPr>
-        <p:spPr/>
-        <p:txBody>
-          <a:bodyPr/>
-          <a:lstStyle/>
-          <a:p>
-            <a:r>
-              <a:rPr lang="en-US" dirty="0" smtClean="0"/>
-              <a:t>Key</a:t>
-            </a:r>
-            <a:endParaRPr lang="en-US" dirty="0"/>
-          </a:p>
-        </p:txBody>
-      </p:sp>
-      <p:pic>
-        <p:nvPicPr>
-          <p:cNvPr id="6" name="Picture 5"/>
-          <p:cNvPicPr>
-            <a:picLocks noChangeAspect="1"/>
-          </p:cNvPicPr>
-          <p:nvPr/>
-        </p:nvPicPr>
-        <p:blipFill>
-          <a:blip r:embed="rId4" cstate="print">
-            <a:extLst>
-              <a:ext uri="{28A0092B-C50C-407E-A947-70E740481C1C}">
-                <a14:useLocalDpi xmlns:a14="http://schemas.microsoft.com/office/drawing/2010/main" val="0"/>
-              </a:ext>
-            </a:extLst>
-          </a:blip>
-          <a:stretch>
-            <a:fillRect/>
-          </a:stretch>
-        </p:blipFill>
-        <p:spPr>
-          <a:xfrm>
-            <a:off x="2078833" y="1499893"/>
-            <a:ext cx="279903" cy="282580"/>
-          </a:xfrm>
-          <a:prstGeom prst="rect">
-            <a:avLst/>
-          </a:prstGeom>
-        </p:spPr>
-      </p:pic>
-      <p:pic>
-        <p:nvPicPr>
-          <p:cNvPr id="7" name="Picture 6"/>
-          <p:cNvPicPr>
-            <a:picLocks noChangeAspect="1"/>
-          </p:cNvPicPr>
-          <p:nvPr/>
-        </p:nvPicPr>
-        <p:blipFill>
-          <a:blip r:embed="rId5" cstate="print">
-            <a:extLst>
-              <a:ext uri="{28A0092B-C50C-407E-A947-70E740481C1C}">
-                <a14:useLocalDpi xmlns:a14="http://schemas.microsoft.com/office/drawing/2010/main" val="0"/>
-              </a:ext>
-            </a:extLst>
-          </a:blip>
-          <a:stretch>
-            <a:fillRect/>
-          </a:stretch>
-        </p:blipFill>
-        <p:spPr>
-          <a:xfrm>
-            <a:off x="2069651" y="2970153"/>
-            <a:ext cx="370436" cy="297787"/>
-          </a:xfrm>
-          <a:prstGeom prst="rect">
-            <a:avLst/>
-          </a:prstGeom>
-        </p:spPr>
-      </p:pic>
-      <p:pic>
-        <p:nvPicPr>
-          <p:cNvPr id="8" name="Picture 7"/>
-          <p:cNvPicPr>
-            <a:picLocks noChangeAspect="1"/>
-          </p:cNvPicPr>
-          <p:nvPr/>
-        </p:nvPicPr>
-        <p:blipFill>
-          <a:blip r:embed="rId6" cstate="print">
-            <a:extLst>
-              <a:ext uri="{28A0092B-C50C-407E-A947-70E740481C1C}">
-                <a14:useLocalDpi xmlns:a14="http://schemas.microsoft.com/office/drawing/2010/main" val="0"/>
-              </a:ext>
-            </a:extLst>
-          </a:blip>
-          <a:stretch>
-            <a:fillRect/>
-          </a:stretch>
-        </p:blipFill>
-        <p:spPr>
-          <a:xfrm>
-            <a:off x="2080256" y="1132645"/>
-            <a:ext cx="323395" cy="284940"/>
-          </a:xfrm>
-          <a:prstGeom prst="rect">
-            <a:avLst/>
-          </a:prstGeom>
-        </p:spPr>
-      </p:pic>
-      <p:pic>
-        <p:nvPicPr>
-          <p:cNvPr id="9" name="Picture 8"/>
-          <p:cNvPicPr>
-            <a:picLocks noChangeAspect="1"/>
-          </p:cNvPicPr>
-          <p:nvPr/>
-        </p:nvPicPr>
-        <p:blipFill>
-          <a:blip r:embed="rId7" cstate="print">
-            <a:extLst>
-              <a:ext uri="{28A0092B-C50C-407E-A947-70E740481C1C}">
-                <a14:useLocalDpi xmlns:a14="http://schemas.microsoft.com/office/drawing/2010/main" val="0"/>
-              </a:ext>
-            </a:extLst>
-          </a:blip>
-          <a:stretch>
-            <a:fillRect/>
-          </a:stretch>
-        </p:blipFill>
-        <p:spPr>
-          <a:xfrm>
-            <a:off x="2078832" y="2237652"/>
-            <a:ext cx="395345" cy="325047"/>
-          </a:xfrm>
-          <a:prstGeom prst="rect">
-            <a:avLst/>
-          </a:prstGeom>
-        </p:spPr>
-      </p:pic>
-      <p:pic>
-        <p:nvPicPr>
-          <p:cNvPr id="10" name="Picture 9"/>
-          <p:cNvPicPr>
-            <a:picLocks noChangeAspect="1"/>
-          </p:cNvPicPr>
-          <p:nvPr/>
-        </p:nvPicPr>
-        <p:blipFill>
-          <a:blip r:embed="rId8" cstate="print">
-            <a:extLst>
-              <a:ext uri="{28A0092B-C50C-407E-A947-70E740481C1C}">
-                <a14:useLocalDpi xmlns:a14="http://schemas.microsoft.com/office/drawing/2010/main" val="0"/>
-              </a:ext>
-            </a:extLst>
-          </a:blip>
-          <a:stretch>
-            <a:fillRect/>
-          </a:stretch>
-        </p:blipFill>
-        <p:spPr>
-          <a:xfrm flipH="1">
-            <a:off x="2080256" y="733268"/>
-            <a:ext cx="386064" cy="329776"/>
-          </a:xfrm>
-          <a:prstGeom prst="rect">
-            <a:avLst/>
-          </a:prstGeom>
-        </p:spPr>
-      </p:pic>
       <p:graphicFrame>
         <p:nvGraphicFramePr>
           <p:cNvPr id="12" name="Table 11"/>
@@ -3696,7 +3558,7 @@
           <p:nvPr>
             <p:extLst>
               <p:ext uri="{D42A27DB-BD31-4B8C-83A1-F6EECF244321}">
-                <p14:modId xmlns:p14="http://schemas.microsoft.com/office/powerpoint/2010/main" val="615093270"/>
+                <p14:modId xmlns:p14="http://schemas.microsoft.com/office/powerpoint/2010/main" val="2414905249"/>
               </p:ext>
             </p:extLst>
           </p:nvPr>
@@ -3950,7 +3812,203 @@
       </p:graphicFrame>
       <p:pic>
         <p:nvPicPr>
+          <p:cNvPr id="4" name="Picture 3"/>
+          <p:cNvPicPr>
+            <a:picLocks noChangeAspect="1"/>
+          </p:cNvPicPr>
+          <p:nvPr/>
+        </p:nvPicPr>
+        <p:blipFill>
+          <a:blip r:embed="rId3" cstate="print">
+            <a:extLst>
+              <a:ext uri="{28A0092B-C50C-407E-A947-70E740481C1C}">
+                <a14:useLocalDpi xmlns:a14="http://schemas.microsoft.com/office/drawing/2010/main" val="0"/>
+              </a:ext>
+            </a:extLst>
+          </a:blip>
+          <a:stretch>
+            <a:fillRect/>
+          </a:stretch>
+        </p:blipFill>
+        <p:spPr>
+          <a:xfrm>
+            <a:off x="2045043" y="1924865"/>
+            <a:ext cx="429134" cy="212913"/>
+          </a:xfrm>
+          <a:prstGeom prst="rect">
+            <a:avLst/>
+          </a:prstGeom>
+        </p:spPr>
+      </p:pic>
+      <p:sp>
+        <p:nvSpPr>
+          <p:cNvPr id="2" name="Title 1"/>
+          <p:cNvSpPr>
+            <a:spLocks noGrp="1"/>
+          </p:cNvSpPr>
+          <p:nvPr>
+            <p:ph type="title"/>
+          </p:nvPr>
+        </p:nvSpPr>
+        <p:spPr>
+          <a:xfrm>
+            <a:off x="10354235" y="60801"/>
+            <a:ext cx="1380392" cy="1325563"/>
+          </a:xfrm>
+        </p:spPr>
+        <p:txBody>
+          <a:bodyPr/>
+          <a:lstStyle/>
+          <a:p>
+            <a:r>
+              <a:rPr lang="en-US" dirty="0" smtClean="0"/>
+              <a:t>Key</a:t>
+            </a:r>
+            <a:endParaRPr lang="en-US" dirty="0"/>
+          </a:p>
+        </p:txBody>
+      </p:sp>
+      <p:pic>
+        <p:nvPicPr>
+          <p:cNvPr id="7" name="Picture 6"/>
+          <p:cNvPicPr>
+            <a:picLocks noChangeAspect="1"/>
+          </p:cNvPicPr>
+          <p:nvPr/>
+        </p:nvPicPr>
+        <p:blipFill>
+          <a:blip r:embed="rId4" cstate="print">
+            <a:extLst>
+              <a:ext uri="{28A0092B-C50C-407E-A947-70E740481C1C}">
+                <a14:useLocalDpi xmlns:a14="http://schemas.microsoft.com/office/drawing/2010/main" val="0"/>
+              </a:ext>
+            </a:extLst>
+          </a:blip>
+          <a:stretch>
+            <a:fillRect/>
+          </a:stretch>
+        </p:blipFill>
+        <p:spPr>
+          <a:xfrm>
+            <a:off x="2069651" y="2970153"/>
+            <a:ext cx="370436" cy="297787"/>
+          </a:xfrm>
+          <a:prstGeom prst="rect">
+            <a:avLst/>
+          </a:prstGeom>
+        </p:spPr>
+      </p:pic>
+      <p:pic>
+        <p:nvPicPr>
+          <p:cNvPr id="9" name="Picture 8"/>
+          <p:cNvPicPr>
+            <a:picLocks noChangeAspect="1"/>
+          </p:cNvPicPr>
+          <p:nvPr/>
+        </p:nvPicPr>
+        <p:blipFill>
+          <a:blip r:embed="rId5" cstate="print">
+            <a:extLst>
+              <a:ext uri="{28A0092B-C50C-407E-A947-70E740481C1C}">
+                <a14:useLocalDpi xmlns:a14="http://schemas.microsoft.com/office/drawing/2010/main" val="0"/>
+              </a:ext>
+            </a:extLst>
+          </a:blip>
+          <a:stretch>
+            <a:fillRect/>
+          </a:stretch>
+        </p:blipFill>
+        <p:spPr>
+          <a:xfrm>
+            <a:off x="2078832" y="2237652"/>
+            <a:ext cx="395345" cy="325047"/>
+          </a:xfrm>
+          <a:prstGeom prst="rect">
+            <a:avLst/>
+          </a:prstGeom>
+        </p:spPr>
+      </p:pic>
+      <p:pic>
+        <p:nvPicPr>
+          <p:cNvPr id="10" name="Picture 9"/>
+          <p:cNvPicPr>
+            <a:picLocks noChangeAspect="1"/>
+          </p:cNvPicPr>
+          <p:nvPr/>
+        </p:nvPicPr>
+        <p:blipFill>
+          <a:blip r:embed="rId6" cstate="print">
+            <a:extLst>
+              <a:ext uri="{28A0092B-C50C-407E-A947-70E740481C1C}">
+                <a14:useLocalDpi xmlns:a14="http://schemas.microsoft.com/office/drawing/2010/main" val="0"/>
+              </a:ext>
+            </a:extLst>
+          </a:blip>
+          <a:stretch>
+            <a:fillRect/>
+          </a:stretch>
+        </p:blipFill>
+        <p:spPr>
+          <a:xfrm flipH="1">
+            <a:off x="2080256" y="733268"/>
+            <a:ext cx="386064" cy="329776"/>
+          </a:xfrm>
+          <a:prstGeom prst="rect">
+            <a:avLst/>
+          </a:prstGeom>
+        </p:spPr>
+      </p:pic>
+      <p:pic>
+        <p:nvPicPr>
           <p:cNvPr id="5" name="Picture 4"/>
+          <p:cNvPicPr>
+            <a:picLocks noChangeAspect="1"/>
+          </p:cNvPicPr>
+          <p:nvPr/>
+        </p:nvPicPr>
+        <p:blipFill>
+          <a:blip r:embed="rId7"/>
+          <a:stretch>
+            <a:fillRect/>
+          </a:stretch>
+        </p:blipFill>
+        <p:spPr>
+          <a:xfrm>
+            <a:off x="2046589" y="2588903"/>
+            <a:ext cx="422129" cy="329727"/>
+          </a:xfrm>
+          <a:prstGeom prst="rect">
+            <a:avLst/>
+          </a:prstGeom>
+        </p:spPr>
+      </p:pic>
+      <p:pic>
+        <p:nvPicPr>
+          <p:cNvPr id="3" name="Picture 2"/>
+          <p:cNvPicPr>
+            <a:picLocks noChangeAspect="1"/>
+          </p:cNvPicPr>
+          <p:nvPr/>
+        </p:nvPicPr>
+        <p:blipFill>
+          <a:blip r:embed="rId8"/>
+          <a:stretch>
+            <a:fillRect/>
+          </a:stretch>
+        </p:blipFill>
+        <p:spPr>
+          <a:xfrm>
+            <a:off x="2046589" y="1149269"/>
+            <a:ext cx="446039" cy="268449"/>
+          </a:xfrm>
+          <a:prstGeom prst="rect">
+            <a:avLst/>
+          </a:prstGeom>
+        </p:spPr>
+      </p:pic>
+      <p:pic>
+        <p:nvPicPr>
+          <p:cNvPr id="11" name="Picture 10"/>
           <p:cNvPicPr>
             <a:picLocks noChangeAspect="1"/>
           </p:cNvPicPr>
@@ -3964,8 +4022,8 @@
         </p:blipFill>
         <p:spPr>
           <a:xfrm>
-            <a:off x="2046589" y="2588903"/>
-            <a:ext cx="422129" cy="329727"/>
+            <a:off x="2060381" y="1551359"/>
+            <a:ext cx="413796" cy="244918"/>
           </a:xfrm>
           <a:prstGeom prst="rect">
             <a:avLst/>
@@ -4002,465 +4060,186 @@
           <a:chExt cx="0" cy="0"/>
         </a:xfrm>
       </p:grpSpPr>
+      <p:pic>
+        <p:nvPicPr>
+          <p:cNvPr id="4" name="Picture 3"/>
+          <p:cNvPicPr>
+            <a:picLocks noChangeAspect="1"/>
+          </p:cNvPicPr>
+          <p:nvPr/>
+        </p:nvPicPr>
+        <p:blipFill>
+          <a:blip r:embed="rId2"/>
+          <a:stretch>
+            <a:fillRect/>
+          </a:stretch>
+        </p:blipFill>
+        <p:spPr>
+          <a:xfrm>
+            <a:off x="1291276" y="119864"/>
+            <a:ext cx="9003587" cy="6196018"/>
+          </a:xfrm>
+          <a:prstGeom prst="rect">
+            <a:avLst/>
+          </a:prstGeom>
+        </p:spPr>
+      </p:pic>
       <p:grpSp>
         <p:nvGrpSpPr>
-          <p:cNvPr id="2" name="Group 1"/>
+          <p:cNvPr id="6" name="Group 5"/>
           <p:cNvGrpSpPr/>
           <p:nvPr/>
         </p:nvGrpSpPr>
         <p:grpSpPr>
           <a:xfrm>
-            <a:off x="1291276" y="119864"/>
-            <a:ext cx="9003587" cy="6196018"/>
-            <a:chOff x="1291276" y="119864"/>
-            <a:chExt cx="9003587" cy="6196018"/>
+            <a:off x="2721075" y="6066646"/>
+            <a:ext cx="2738999" cy="243895"/>
+            <a:chOff x="2721075" y="6066646"/>
+            <a:chExt cx="2738999" cy="243895"/>
           </a:xfrm>
         </p:grpSpPr>
         <p:grpSp>
           <p:nvGrpSpPr>
-            <p:cNvPr id="7" name="Group 6"/>
+            <p:cNvPr id="5" name="Group 4"/>
             <p:cNvGrpSpPr/>
             <p:nvPr/>
           </p:nvGrpSpPr>
           <p:grpSpPr>
             <a:xfrm>
-              <a:off x="1291276" y="119864"/>
-              <a:ext cx="9003587" cy="6196018"/>
-              <a:chOff x="1291276" y="119864"/>
-              <a:chExt cx="9003587" cy="6196018"/>
+              <a:off x="2721075" y="6066646"/>
+              <a:ext cx="2738999" cy="243895"/>
+              <a:chOff x="2721075" y="6066646"/>
+              <a:chExt cx="2738999" cy="243895"/>
             </a:xfrm>
           </p:grpSpPr>
-          <p:pic>
-            <p:nvPicPr>
-              <p:cNvPr id="4" name="Picture 3"/>
-              <p:cNvPicPr>
-                <a:picLocks noChangeAspect="1"/>
-              </p:cNvPicPr>
-              <p:nvPr/>
-            </p:nvPicPr>
-            <p:blipFill>
-              <a:blip r:embed="rId2"/>
-              <a:stretch>
-                <a:fillRect/>
-              </a:stretch>
-            </p:blipFill>
-            <p:spPr>
-              <a:xfrm>
-                <a:off x="1291276" y="119864"/>
-                <a:ext cx="9003587" cy="6196018"/>
-              </a:xfrm>
-              <a:prstGeom prst="rect">
-                <a:avLst/>
-              </a:prstGeom>
-            </p:spPr>
-          </p:pic>
           <p:grpSp>
             <p:nvGrpSpPr>
-              <p:cNvPr id="5" name="Group 4"/>
+              <p:cNvPr id="3" name="Group 2"/>
               <p:cNvGrpSpPr/>
               <p:nvPr/>
             </p:nvGrpSpPr>
             <p:grpSpPr>
               <a:xfrm>
-                <a:off x="2721075" y="6066646"/>
-                <a:ext cx="7329465" cy="243895"/>
-                <a:chOff x="2721075" y="6066646"/>
-                <a:chExt cx="7329465" cy="243895"/>
+                <a:off x="2721075" y="6083191"/>
+                <a:ext cx="2738999" cy="227350"/>
+                <a:chOff x="2887074" y="6083191"/>
+                <a:chExt cx="2738999" cy="227350"/>
               </a:xfrm>
             </p:grpSpPr>
-            <p:grpSp>
-              <p:nvGrpSpPr>
-                <p:cNvPr id="3" name="Group 2"/>
-                <p:cNvGrpSpPr/>
-                <p:nvPr/>
-              </p:nvGrpSpPr>
-              <p:grpSpPr>
-                <a:xfrm>
-                  <a:off x="2721075" y="6066646"/>
-                  <a:ext cx="7329465" cy="243895"/>
-                  <a:chOff x="2887074" y="6066646"/>
-                  <a:chExt cx="7329465" cy="243895"/>
-                </a:xfrm>
-              </p:grpSpPr>
-              <p:pic>
-                <p:nvPicPr>
-                  <p:cNvPr id="12" name="Picture 11"/>
-                  <p:cNvPicPr>
-                    <a:picLocks noChangeAspect="1"/>
-                  </p:cNvPicPr>
-                  <p:nvPr/>
-                </p:nvPicPr>
-                <p:blipFill>
-                  <a:blip r:embed="rId3" cstate="print">
-                    <a:extLst>
-                      <a:ext uri="{28A0092B-C50C-407E-A947-70E740481C1C}">
-                        <a14:useLocalDpi xmlns:a14="http://schemas.microsoft.com/office/drawing/2010/main" val="0"/>
-                      </a:ext>
-                    </a:extLst>
-                  </a:blip>
-                  <a:stretch>
-                    <a:fillRect/>
-                  </a:stretch>
-                </p:blipFill>
-                <p:spPr>
-                  <a:xfrm>
-                    <a:off x="4063568" y="6102067"/>
-                    <a:ext cx="325640" cy="161565"/>
-                  </a:xfrm>
-                  <a:prstGeom prst="rect">
-                    <a:avLst/>
-                  </a:prstGeom>
-                </p:spPr>
-              </p:pic>
-              <p:pic>
-                <p:nvPicPr>
-                  <p:cNvPr id="14" name="Picture 13"/>
-                  <p:cNvPicPr>
-                    <a:picLocks noChangeAspect="1"/>
-                  </p:cNvPicPr>
-                  <p:nvPr/>
-                </p:nvPicPr>
-                <p:blipFill>
-                  <a:blip r:embed="rId4" cstate="print">
-                    <a:extLst>
-                      <a:ext uri="{28A0092B-C50C-407E-A947-70E740481C1C}">
-                        <a14:useLocalDpi xmlns:a14="http://schemas.microsoft.com/office/drawing/2010/main" val="0"/>
-                      </a:ext>
-                    </a:extLst>
-                  </a:blip>
-                  <a:stretch>
-                    <a:fillRect/>
-                  </a:stretch>
-                </p:blipFill>
-                <p:spPr>
-                  <a:xfrm>
-                    <a:off x="3693928" y="6069896"/>
-                    <a:ext cx="223459" cy="225596"/>
-                  </a:xfrm>
-                  <a:prstGeom prst="rect">
-                    <a:avLst/>
-                  </a:prstGeom>
-                </p:spPr>
-              </p:pic>
-              <p:pic>
-                <p:nvPicPr>
-                  <p:cNvPr id="15" name="Picture 14"/>
-                  <p:cNvPicPr>
-                    <a:picLocks noChangeAspect="1"/>
-                  </p:cNvPicPr>
-                  <p:nvPr/>
-                </p:nvPicPr>
-                <p:blipFill>
-                  <a:blip r:embed="rId5" cstate="print">
-                    <a:extLst>
-                      <a:ext uri="{28A0092B-C50C-407E-A947-70E740481C1C}">
-                        <a14:useLocalDpi xmlns:a14="http://schemas.microsoft.com/office/drawing/2010/main" val="0"/>
-                      </a:ext>
-                    </a:extLst>
-                  </a:blip>
-                  <a:stretch>
-                    <a:fillRect/>
-                  </a:stretch>
-                </p:blipFill>
-                <p:spPr>
-                  <a:xfrm>
-                    <a:off x="5345440" y="6084945"/>
-                    <a:ext cx="280633" cy="225596"/>
-                  </a:xfrm>
-                  <a:prstGeom prst="rect">
-                    <a:avLst/>
-                  </a:prstGeom>
-                </p:spPr>
-              </p:pic>
-              <p:pic>
-                <p:nvPicPr>
-                  <p:cNvPr id="16" name="Picture 15"/>
-                  <p:cNvPicPr>
-                    <a:picLocks noChangeAspect="1"/>
-                  </p:cNvPicPr>
-                  <p:nvPr/>
-                </p:nvPicPr>
-                <p:blipFill>
-                  <a:blip r:embed="rId6" cstate="print">
-                    <a:extLst>
-                      <a:ext uri="{28A0092B-C50C-407E-A947-70E740481C1C}">
-                        <a14:useLocalDpi xmlns:a14="http://schemas.microsoft.com/office/drawing/2010/main" val="0"/>
-                      </a:ext>
-                    </a:extLst>
-                  </a:blip>
-                  <a:stretch>
-                    <a:fillRect/>
-                  </a:stretch>
-                </p:blipFill>
-                <p:spPr>
-                  <a:xfrm>
-                    <a:off x="3293403" y="6083191"/>
-                    <a:ext cx="254344" cy="224100"/>
-                  </a:xfrm>
-                  <a:prstGeom prst="rect">
-                    <a:avLst/>
-                  </a:prstGeom>
-                </p:spPr>
-              </p:pic>
-              <p:pic>
-                <p:nvPicPr>
-                  <p:cNvPr id="17" name="Picture 16"/>
-                  <p:cNvPicPr>
-                    <a:picLocks noChangeAspect="1"/>
-                  </p:cNvPicPr>
-                  <p:nvPr/>
-                </p:nvPicPr>
-                <p:blipFill>
-                  <a:blip r:embed="rId7" cstate="print">
-                    <a:extLst>
-                      <a:ext uri="{28A0092B-C50C-407E-A947-70E740481C1C}">
-                        <a14:useLocalDpi xmlns:a14="http://schemas.microsoft.com/office/drawing/2010/main" val="0"/>
-                      </a:ext>
-                    </a:extLst>
-                  </a:blip>
-                  <a:stretch>
-                    <a:fillRect/>
-                  </a:stretch>
-                </p:blipFill>
-                <p:spPr>
-                  <a:xfrm>
-                    <a:off x="4514185" y="6084731"/>
-                    <a:ext cx="274386" cy="225596"/>
-                  </a:xfrm>
-                  <a:prstGeom prst="rect">
-                    <a:avLst/>
-                  </a:prstGeom>
-                </p:spPr>
-              </p:pic>
-              <p:pic>
-                <p:nvPicPr>
-                  <p:cNvPr id="18" name="Picture 17"/>
-                  <p:cNvPicPr>
-                    <a:picLocks noChangeAspect="1"/>
-                  </p:cNvPicPr>
-                  <p:nvPr/>
-                </p:nvPicPr>
-                <p:blipFill>
-                  <a:blip r:embed="rId8" cstate="print">
-                    <a:extLst>
-                      <a:ext uri="{28A0092B-C50C-407E-A947-70E740481C1C}">
-                        <a14:useLocalDpi xmlns:a14="http://schemas.microsoft.com/office/drawing/2010/main" val="0"/>
-                      </a:ext>
-                    </a:extLst>
-                  </a:blip>
-                  <a:stretch>
-                    <a:fillRect/>
-                  </a:stretch>
-                </p:blipFill>
-                <p:spPr>
-                  <a:xfrm flipH="1">
-                    <a:off x="2887074" y="6083191"/>
-                    <a:ext cx="255789" cy="218495"/>
-                  </a:xfrm>
-                  <a:prstGeom prst="rect">
-                    <a:avLst/>
-                  </a:prstGeom>
-                </p:spPr>
-              </p:pic>
-              <p:pic>
-                <p:nvPicPr>
-                  <p:cNvPr id="19" name="Picture 18"/>
-                  <p:cNvPicPr>
-                    <a:picLocks noChangeAspect="1"/>
-                  </p:cNvPicPr>
-                  <p:nvPr/>
-                </p:nvPicPr>
-                <p:blipFill>
-                  <a:blip r:embed="rId3" cstate="print">
-                    <a:extLst>
-                      <a:ext uri="{28A0092B-C50C-407E-A947-70E740481C1C}">
-                        <a14:useLocalDpi xmlns:a14="http://schemas.microsoft.com/office/drawing/2010/main" val="0"/>
-                      </a:ext>
-                    </a:extLst>
-                  </a:blip>
-                  <a:stretch>
-                    <a:fillRect/>
-                  </a:stretch>
-                </p:blipFill>
-                <p:spPr>
-                  <a:xfrm>
-                    <a:off x="8684161" y="6098817"/>
-                    <a:ext cx="325640" cy="161565"/>
-                  </a:xfrm>
-                  <a:prstGeom prst="rect">
-                    <a:avLst/>
-                  </a:prstGeom>
-                </p:spPr>
-              </p:pic>
-              <p:pic>
-                <p:nvPicPr>
-                  <p:cNvPr id="21" name="Picture 20"/>
-                  <p:cNvPicPr>
-                    <a:picLocks noChangeAspect="1"/>
-                  </p:cNvPicPr>
-                  <p:nvPr/>
-                </p:nvPicPr>
-                <p:blipFill>
-                  <a:blip r:embed="rId4" cstate="print">
-                    <a:extLst>
-                      <a:ext uri="{28A0092B-C50C-407E-A947-70E740481C1C}">
-                        <a14:useLocalDpi xmlns:a14="http://schemas.microsoft.com/office/drawing/2010/main" val="0"/>
-                      </a:ext>
-                    </a:extLst>
-                  </a:blip>
-                  <a:stretch>
-                    <a:fillRect/>
-                  </a:stretch>
-                </p:blipFill>
-                <p:spPr>
-                  <a:xfrm>
-                    <a:off x="8314521" y="6066646"/>
-                    <a:ext cx="223459" cy="225596"/>
-                  </a:xfrm>
-                  <a:prstGeom prst="rect">
-                    <a:avLst/>
-                  </a:prstGeom>
-                </p:spPr>
-              </p:pic>
-              <p:pic>
-                <p:nvPicPr>
-                  <p:cNvPr id="22" name="Picture 21"/>
-                  <p:cNvPicPr>
-                    <a:picLocks noChangeAspect="1"/>
-                  </p:cNvPicPr>
-                  <p:nvPr/>
-                </p:nvPicPr>
-                <p:blipFill>
-                  <a:blip r:embed="rId5" cstate="print">
-                    <a:extLst>
-                      <a:ext uri="{28A0092B-C50C-407E-A947-70E740481C1C}">
-                        <a14:useLocalDpi xmlns:a14="http://schemas.microsoft.com/office/drawing/2010/main" val="0"/>
-                      </a:ext>
-                    </a:extLst>
-                  </a:blip>
-                  <a:stretch>
-                    <a:fillRect/>
-                  </a:stretch>
-                </p:blipFill>
-                <p:spPr>
-                  <a:xfrm>
-                    <a:off x="9935906" y="6073040"/>
-                    <a:ext cx="280633" cy="225596"/>
-                  </a:xfrm>
-                  <a:prstGeom prst="rect">
-                    <a:avLst/>
-                  </a:prstGeom>
-                </p:spPr>
-              </p:pic>
-              <p:pic>
-                <p:nvPicPr>
-                  <p:cNvPr id="23" name="Picture 22"/>
-                  <p:cNvPicPr>
-                    <a:picLocks noChangeAspect="1"/>
-                  </p:cNvPicPr>
-                  <p:nvPr/>
-                </p:nvPicPr>
-                <p:blipFill>
-                  <a:blip r:embed="rId6" cstate="print">
-                    <a:extLst>
-                      <a:ext uri="{28A0092B-C50C-407E-A947-70E740481C1C}">
-                        <a14:useLocalDpi xmlns:a14="http://schemas.microsoft.com/office/drawing/2010/main" val="0"/>
-                      </a:ext>
-                    </a:extLst>
-                  </a:blip>
-                  <a:stretch>
-                    <a:fillRect/>
-                  </a:stretch>
-                </p:blipFill>
-                <p:spPr>
-                  <a:xfrm>
-                    <a:off x="7913996" y="6079941"/>
-                    <a:ext cx="254344" cy="224100"/>
-                  </a:xfrm>
-                  <a:prstGeom prst="rect">
-                    <a:avLst/>
-                  </a:prstGeom>
-                </p:spPr>
-              </p:pic>
-              <p:pic>
-                <p:nvPicPr>
-                  <p:cNvPr id="24" name="Picture 23"/>
-                  <p:cNvPicPr>
-                    <a:picLocks noChangeAspect="1"/>
-                  </p:cNvPicPr>
-                  <p:nvPr/>
-                </p:nvPicPr>
-                <p:blipFill>
-                  <a:blip r:embed="rId7" cstate="print">
-                    <a:extLst>
-                      <a:ext uri="{28A0092B-C50C-407E-A947-70E740481C1C}">
-                        <a14:useLocalDpi xmlns:a14="http://schemas.microsoft.com/office/drawing/2010/main" val="0"/>
-                      </a:ext>
-                    </a:extLst>
-                  </a:blip>
-                  <a:stretch>
-                    <a:fillRect/>
-                  </a:stretch>
-                </p:blipFill>
-                <p:spPr>
-                  <a:xfrm>
-                    <a:off x="9134778" y="6081481"/>
-                    <a:ext cx="274386" cy="225596"/>
-                  </a:xfrm>
-                  <a:prstGeom prst="rect">
-                    <a:avLst/>
-                  </a:prstGeom>
-                </p:spPr>
-              </p:pic>
-              <p:pic>
-                <p:nvPicPr>
-                  <p:cNvPr id="25" name="Picture 24"/>
-                  <p:cNvPicPr>
-                    <a:picLocks noChangeAspect="1"/>
-                  </p:cNvPicPr>
-                  <p:nvPr/>
-                </p:nvPicPr>
-                <p:blipFill>
-                  <a:blip r:embed="rId8" cstate="print">
-                    <a:extLst>
-                      <a:ext uri="{28A0092B-C50C-407E-A947-70E740481C1C}">
-                        <a14:useLocalDpi xmlns:a14="http://schemas.microsoft.com/office/drawing/2010/main" val="0"/>
-                      </a:ext>
-                    </a:extLst>
-                  </a:blip>
-                  <a:stretch>
-                    <a:fillRect/>
-                  </a:stretch>
-                </p:blipFill>
-                <p:spPr>
-                  <a:xfrm flipH="1">
-                    <a:off x="7507667" y="6079941"/>
-                    <a:ext cx="255789" cy="218495"/>
-                  </a:xfrm>
-                  <a:prstGeom prst="rect">
-                    <a:avLst/>
-                  </a:prstGeom>
-                </p:spPr>
-              </p:pic>
-            </p:grpSp>
             <p:pic>
               <p:nvPicPr>
-                <p:cNvPr id="20" name="Picture 19"/>
+                <p:cNvPr id="12" name="Picture 11"/>
                 <p:cNvPicPr>
                   <a:picLocks noChangeAspect="1"/>
                 </p:cNvPicPr>
                 <p:nvPr/>
               </p:nvPicPr>
               <p:blipFill>
-                <a:blip r:embed="rId9"/>
+                <a:blip r:embed="rId3" cstate="print">
+                  <a:extLst>
+                    <a:ext uri="{28A0092B-C50C-407E-A947-70E740481C1C}">
+                      <a14:useLocalDpi xmlns:a14="http://schemas.microsoft.com/office/drawing/2010/main" val="0"/>
+                    </a:ext>
+                  </a:extLst>
+                </a:blip>
                 <a:stretch>
                   <a:fillRect/>
                 </a:stretch>
               </p:blipFill>
               <p:spPr>
                 <a:xfrm>
-                  <a:off x="4734039" y="6066646"/>
-                  <a:ext cx="302061" cy="235941"/>
+                  <a:off x="4079269" y="6103833"/>
+                  <a:ext cx="325640" cy="161565"/>
+                </a:xfrm>
+                <a:prstGeom prst="rect">
+                  <a:avLst/>
+                </a:prstGeom>
+              </p:spPr>
+            </p:pic>
+            <p:pic>
+              <p:nvPicPr>
+                <p:cNvPr id="15" name="Picture 14"/>
+                <p:cNvPicPr>
+                  <a:picLocks noChangeAspect="1"/>
+                </p:cNvPicPr>
+                <p:nvPr/>
+              </p:nvPicPr>
+              <p:blipFill>
+                <a:blip r:embed="rId4" cstate="print">
+                  <a:extLst>
+                    <a:ext uri="{28A0092B-C50C-407E-A947-70E740481C1C}">
+                      <a14:useLocalDpi xmlns:a14="http://schemas.microsoft.com/office/drawing/2010/main" val="0"/>
+                    </a:ext>
+                  </a:extLst>
+                </a:blip>
+                <a:stretch>
+                  <a:fillRect/>
+                </a:stretch>
+              </p:blipFill>
+              <p:spPr>
+                <a:xfrm>
+                  <a:off x="5345440" y="6084945"/>
+                  <a:ext cx="280633" cy="225596"/>
+                </a:xfrm>
+                <a:prstGeom prst="rect">
+                  <a:avLst/>
+                </a:prstGeom>
+              </p:spPr>
+            </p:pic>
+            <p:pic>
+              <p:nvPicPr>
+                <p:cNvPr id="17" name="Picture 16"/>
+                <p:cNvPicPr>
+                  <a:picLocks noChangeAspect="1"/>
+                </p:cNvPicPr>
+                <p:nvPr/>
+              </p:nvPicPr>
+              <p:blipFill>
+                <a:blip r:embed="rId5" cstate="print">
+                  <a:extLst>
+                    <a:ext uri="{28A0092B-C50C-407E-A947-70E740481C1C}">
+                      <a14:useLocalDpi xmlns:a14="http://schemas.microsoft.com/office/drawing/2010/main" val="0"/>
+                    </a:ext>
+                  </a:extLst>
+                </a:blip>
+                <a:stretch>
+                  <a:fillRect/>
+                </a:stretch>
+              </p:blipFill>
+              <p:spPr>
+                <a:xfrm>
+                  <a:off x="4515280" y="6084945"/>
+                  <a:ext cx="274386" cy="225596"/>
+                </a:xfrm>
+                <a:prstGeom prst="rect">
+                  <a:avLst/>
+                </a:prstGeom>
+              </p:spPr>
+            </p:pic>
+            <p:pic>
+              <p:nvPicPr>
+                <p:cNvPr id="18" name="Picture 17"/>
+                <p:cNvPicPr>
+                  <a:picLocks noChangeAspect="1"/>
+                </p:cNvPicPr>
+                <p:nvPr/>
+              </p:nvPicPr>
+              <p:blipFill>
+                <a:blip r:embed="rId6" cstate="print">
+                  <a:extLst>
+                    <a:ext uri="{28A0092B-C50C-407E-A947-70E740481C1C}">
+                      <a14:useLocalDpi xmlns:a14="http://schemas.microsoft.com/office/drawing/2010/main" val="0"/>
+                    </a:ext>
+                  </a:extLst>
+                </a:blip>
+                <a:stretch>
+                  <a:fillRect/>
+                </a:stretch>
+              </p:blipFill>
+              <p:spPr>
+                <a:xfrm flipH="1">
+                  <a:off x="2887074" y="6083191"/>
+                  <a:ext cx="255789" cy="218495"/>
                 </a:xfrm>
                 <a:prstGeom prst="rect">
                   <a:avLst/>
@@ -4468,10 +4247,58 @@
               </p:spPr>
             </p:pic>
           </p:grpSp>
+          <p:pic>
+            <p:nvPicPr>
+              <p:cNvPr id="20" name="Picture 19"/>
+              <p:cNvPicPr>
+                <a:picLocks noChangeAspect="1"/>
+              </p:cNvPicPr>
+              <p:nvPr/>
+            </p:nvPicPr>
+            <p:blipFill>
+              <a:blip r:embed="rId7"/>
+              <a:stretch>
+                <a:fillRect/>
+              </a:stretch>
+            </p:blipFill>
+            <p:spPr>
+              <a:xfrm>
+                <a:off x="4734039" y="6066646"/>
+                <a:ext cx="302061" cy="235941"/>
+              </a:xfrm>
+              <a:prstGeom prst="rect">
+                <a:avLst/>
+              </a:prstGeom>
+            </p:spPr>
+          </p:pic>
         </p:grpSp>
         <p:pic>
           <p:nvPicPr>
-            <p:cNvPr id="28" name="Picture 27"/>
+            <p:cNvPr id="26" name="Picture 25"/>
+            <p:cNvPicPr>
+              <a:picLocks noChangeAspect="1"/>
+            </p:cNvPicPr>
+            <p:nvPr/>
+          </p:nvPicPr>
+          <p:blipFill>
+            <a:blip r:embed="rId8"/>
+            <a:stretch>
+              <a:fillRect/>
+            </a:stretch>
+          </p:blipFill>
+          <p:spPr>
+            <a:xfrm>
+              <a:off x="3506696" y="6098817"/>
+              <a:ext cx="334903" cy="198223"/>
+            </a:xfrm>
+            <a:prstGeom prst="rect">
+              <a:avLst/>
+            </a:prstGeom>
+          </p:spPr>
+        </p:pic>
+        <p:pic>
+          <p:nvPicPr>
+            <p:cNvPr id="27" name="Picture 26"/>
             <p:cNvPicPr>
               <a:picLocks noChangeAspect="1"/>
             </p:cNvPicPr>
@@ -4485,8 +4312,245 @@
           </p:blipFill>
           <p:spPr>
             <a:xfrm>
-              <a:off x="9351905" y="6079941"/>
-              <a:ext cx="302061" cy="235941"/>
+              <a:off x="3107726" y="6098817"/>
+              <a:ext cx="327300" cy="196986"/>
+            </a:xfrm>
+            <a:prstGeom prst="rect">
+              <a:avLst/>
+            </a:prstGeom>
+          </p:spPr>
+        </p:pic>
+      </p:grpSp>
+      <p:grpSp>
+        <p:nvGrpSpPr>
+          <p:cNvPr id="29" name="Group 28"/>
+          <p:cNvGrpSpPr/>
+          <p:nvPr/>
+        </p:nvGrpSpPr>
+        <p:grpSpPr>
+          <a:xfrm>
+            <a:off x="7331035" y="6098817"/>
+            <a:ext cx="2738999" cy="243895"/>
+            <a:chOff x="2721075" y="6066646"/>
+            <a:chExt cx="2738999" cy="243895"/>
+          </a:xfrm>
+        </p:grpSpPr>
+        <p:grpSp>
+          <p:nvGrpSpPr>
+            <p:cNvPr id="30" name="Group 29"/>
+            <p:cNvGrpSpPr/>
+            <p:nvPr/>
+          </p:nvGrpSpPr>
+          <p:grpSpPr>
+            <a:xfrm>
+              <a:off x="2721075" y="6066646"/>
+              <a:ext cx="2738999" cy="243895"/>
+              <a:chOff x="2721075" y="6066646"/>
+              <a:chExt cx="2738999" cy="243895"/>
+            </a:xfrm>
+          </p:grpSpPr>
+          <p:grpSp>
+            <p:nvGrpSpPr>
+              <p:cNvPr id="33" name="Group 32"/>
+              <p:cNvGrpSpPr/>
+              <p:nvPr/>
+            </p:nvGrpSpPr>
+            <p:grpSpPr>
+              <a:xfrm>
+                <a:off x="2721075" y="6083191"/>
+                <a:ext cx="2738999" cy="227350"/>
+                <a:chOff x="2887074" y="6083191"/>
+                <a:chExt cx="2738999" cy="227350"/>
+              </a:xfrm>
+            </p:grpSpPr>
+            <p:pic>
+              <p:nvPicPr>
+                <p:cNvPr id="35" name="Picture 34"/>
+                <p:cNvPicPr>
+                  <a:picLocks noChangeAspect="1"/>
+                </p:cNvPicPr>
+                <p:nvPr/>
+              </p:nvPicPr>
+              <p:blipFill>
+                <a:blip r:embed="rId3" cstate="print">
+                  <a:extLst>
+                    <a:ext uri="{28A0092B-C50C-407E-A947-70E740481C1C}">
+                      <a14:useLocalDpi xmlns:a14="http://schemas.microsoft.com/office/drawing/2010/main" val="0"/>
+                    </a:ext>
+                  </a:extLst>
+                </a:blip>
+                <a:stretch>
+                  <a:fillRect/>
+                </a:stretch>
+              </p:blipFill>
+              <p:spPr>
+                <a:xfrm>
+                  <a:off x="4079269" y="6103833"/>
+                  <a:ext cx="325640" cy="161565"/>
+                </a:xfrm>
+                <a:prstGeom prst="rect">
+                  <a:avLst/>
+                </a:prstGeom>
+              </p:spPr>
+            </p:pic>
+            <p:pic>
+              <p:nvPicPr>
+                <p:cNvPr id="36" name="Picture 35"/>
+                <p:cNvPicPr>
+                  <a:picLocks noChangeAspect="1"/>
+                </p:cNvPicPr>
+                <p:nvPr/>
+              </p:nvPicPr>
+              <p:blipFill>
+                <a:blip r:embed="rId4" cstate="print">
+                  <a:extLst>
+                    <a:ext uri="{28A0092B-C50C-407E-A947-70E740481C1C}">
+                      <a14:useLocalDpi xmlns:a14="http://schemas.microsoft.com/office/drawing/2010/main" val="0"/>
+                    </a:ext>
+                  </a:extLst>
+                </a:blip>
+                <a:stretch>
+                  <a:fillRect/>
+                </a:stretch>
+              </p:blipFill>
+              <p:spPr>
+                <a:xfrm>
+                  <a:off x="5345440" y="6084945"/>
+                  <a:ext cx="280633" cy="225596"/>
+                </a:xfrm>
+                <a:prstGeom prst="rect">
+                  <a:avLst/>
+                </a:prstGeom>
+              </p:spPr>
+            </p:pic>
+            <p:pic>
+              <p:nvPicPr>
+                <p:cNvPr id="37" name="Picture 36"/>
+                <p:cNvPicPr>
+                  <a:picLocks noChangeAspect="1"/>
+                </p:cNvPicPr>
+                <p:nvPr/>
+              </p:nvPicPr>
+              <p:blipFill>
+                <a:blip r:embed="rId5" cstate="print">
+                  <a:extLst>
+                    <a:ext uri="{28A0092B-C50C-407E-A947-70E740481C1C}">
+                      <a14:useLocalDpi xmlns:a14="http://schemas.microsoft.com/office/drawing/2010/main" val="0"/>
+                    </a:ext>
+                  </a:extLst>
+                </a:blip>
+                <a:stretch>
+                  <a:fillRect/>
+                </a:stretch>
+              </p:blipFill>
+              <p:spPr>
+                <a:xfrm>
+                  <a:off x="4515280" y="6084945"/>
+                  <a:ext cx="274386" cy="225596"/>
+                </a:xfrm>
+                <a:prstGeom prst="rect">
+                  <a:avLst/>
+                </a:prstGeom>
+              </p:spPr>
+            </p:pic>
+            <p:pic>
+              <p:nvPicPr>
+                <p:cNvPr id="38" name="Picture 37"/>
+                <p:cNvPicPr>
+                  <a:picLocks noChangeAspect="1"/>
+                </p:cNvPicPr>
+                <p:nvPr/>
+              </p:nvPicPr>
+              <p:blipFill>
+                <a:blip r:embed="rId6" cstate="print">
+                  <a:extLst>
+                    <a:ext uri="{28A0092B-C50C-407E-A947-70E740481C1C}">
+                      <a14:useLocalDpi xmlns:a14="http://schemas.microsoft.com/office/drawing/2010/main" val="0"/>
+                    </a:ext>
+                  </a:extLst>
+                </a:blip>
+                <a:stretch>
+                  <a:fillRect/>
+                </a:stretch>
+              </p:blipFill>
+              <p:spPr>
+                <a:xfrm flipH="1">
+                  <a:off x="2887074" y="6083191"/>
+                  <a:ext cx="255789" cy="218495"/>
+                </a:xfrm>
+                <a:prstGeom prst="rect">
+                  <a:avLst/>
+                </a:prstGeom>
+              </p:spPr>
+            </p:pic>
+          </p:grpSp>
+          <p:pic>
+            <p:nvPicPr>
+              <p:cNvPr id="34" name="Picture 33"/>
+              <p:cNvPicPr>
+                <a:picLocks noChangeAspect="1"/>
+              </p:cNvPicPr>
+              <p:nvPr/>
+            </p:nvPicPr>
+            <p:blipFill>
+              <a:blip r:embed="rId7"/>
+              <a:stretch>
+                <a:fillRect/>
+              </a:stretch>
+            </p:blipFill>
+            <p:spPr>
+              <a:xfrm>
+                <a:off x="4734039" y="6066646"/>
+                <a:ext cx="302061" cy="235941"/>
+              </a:xfrm>
+              <a:prstGeom prst="rect">
+                <a:avLst/>
+              </a:prstGeom>
+            </p:spPr>
+          </p:pic>
+        </p:grpSp>
+        <p:pic>
+          <p:nvPicPr>
+            <p:cNvPr id="31" name="Picture 30"/>
+            <p:cNvPicPr>
+              <a:picLocks noChangeAspect="1"/>
+            </p:cNvPicPr>
+            <p:nvPr/>
+          </p:nvPicPr>
+          <p:blipFill>
+            <a:blip r:embed="rId8"/>
+            <a:stretch>
+              <a:fillRect/>
+            </a:stretch>
+          </p:blipFill>
+          <p:spPr>
+            <a:xfrm>
+              <a:off x="3506696" y="6098817"/>
+              <a:ext cx="334903" cy="198223"/>
+            </a:xfrm>
+            <a:prstGeom prst="rect">
+              <a:avLst/>
+            </a:prstGeom>
+          </p:spPr>
+        </p:pic>
+        <p:pic>
+          <p:nvPicPr>
+            <p:cNvPr id="32" name="Picture 31"/>
+            <p:cNvPicPr>
+              <a:picLocks noChangeAspect="1"/>
+            </p:cNvPicPr>
+            <p:nvPr/>
+          </p:nvPicPr>
+          <p:blipFill>
+            <a:blip r:embed="rId9"/>
+            <a:stretch>
+              <a:fillRect/>
+            </a:stretch>
+          </p:blipFill>
+          <p:spPr>
+            <a:xfrm>
+              <a:off x="3107726" y="6098817"/>
+              <a:ext cx="327300" cy="196986"/>
             </a:xfrm>
             <a:prstGeom prst="rect">
               <a:avLst/>
@@ -4533,9 +4597,9 @@
         <p:grpSpPr>
           <a:xfrm>
             <a:off x="402796" y="1022472"/>
-            <a:ext cx="11114026" cy="4082530"/>
+            <a:ext cx="11114026" cy="3716582"/>
             <a:chOff x="402796" y="1022472"/>
-            <a:chExt cx="11114026" cy="4082530"/>
+            <a:chExt cx="11114026" cy="3716582"/>
           </a:xfrm>
         </p:grpSpPr>
         <p:pic>
@@ -4586,218 +4650,188 @@
             </a:prstGeom>
           </p:spPr>
         </p:pic>
+      </p:grpSp>
+      <p:grpSp>
+        <p:nvGrpSpPr>
+          <p:cNvPr id="23" name="Group 22"/>
+          <p:cNvGrpSpPr/>
+          <p:nvPr/>
+        </p:nvGrpSpPr>
+        <p:grpSpPr>
+          <a:xfrm>
+            <a:off x="1211629" y="4687790"/>
+            <a:ext cx="4248393" cy="378945"/>
+            <a:chOff x="2721075" y="6066646"/>
+            <a:chExt cx="2738999" cy="243895"/>
+          </a:xfrm>
+        </p:grpSpPr>
         <p:grpSp>
           <p:nvGrpSpPr>
-            <p:cNvPr id="13" name="Group 12"/>
+            <p:cNvPr id="24" name="Group 23"/>
             <p:cNvGrpSpPr/>
             <p:nvPr/>
           </p:nvGrpSpPr>
           <p:grpSpPr>
             <a:xfrm>
-              <a:off x="1208531" y="4730332"/>
-              <a:ext cx="4277869" cy="362793"/>
-              <a:chOff x="1208531" y="4730332"/>
-              <a:chExt cx="4277869" cy="362793"/>
+              <a:off x="2721075" y="6066646"/>
+              <a:ext cx="2738999" cy="243895"/>
+              <a:chOff x="2721075" y="6066646"/>
+              <a:chExt cx="2738999" cy="243895"/>
             </a:xfrm>
           </p:grpSpPr>
+          <p:grpSp>
+            <p:nvGrpSpPr>
+              <p:cNvPr id="27" name="Group 26"/>
+              <p:cNvGrpSpPr/>
+              <p:nvPr/>
+            </p:nvGrpSpPr>
+            <p:grpSpPr>
+              <a:xfrm>
+                <a:off x="2721075" y="6083191"/>
+                <a:ext cx="2738999" cy="227350"/>
+                <a:chOff x="2887074" y="6083191"/>
+                <a:chExt cx="2738999" cy="227350"/>
+              </a:xfrm>
+            </p:grpSpPr>
+            <p:pic>
+              <p:nvPicPr>
+                <p:cNvPr id="29" name="Picture 28"/>
+                <p:cNvPicPr>
+                  <a:picLocks noChangeAspect="1"/>
+                </p:cNvPicPr>
+                <p:nvPr/>
+              </p:nvPicPr>
+              <p:blipFill>
+                <a:blip r:embed="rId4" cstate="print">
+                  <a:extLst>
+                    <a:ext uri="{28A0092B-C50C-407E-A947-70E740481C1C}">
+                      <a14:useLocalDpi xmlns:a14="http://schemas.microsoft.com/office/drawing/2010/main" val="0"/>
+                    </a:ext>
+                  </a:extLst>
+                </a:blip>
+                <a:stretch>
+                  <a:fillRect/>
+                </a:stretch>
+              </p:blipFill>
+              <p:spPr>
+                <a:xfrm>
+                  <a:off x="4079269" y="6103833"/>
+                  <a:ext cx="325640" cy="161565"/>
+                </a:xfrm>
+                <a:prstGeom prst="rect">
+                  <a:avLst/>
+                </a:prstGeom>
+              </p:spPr>
+            </p:pic>
+            <p:pic>
+              <p:nvPicPr>
+                <p:cNvPr id="30" name="Picture 29"/>
+                <p:cNvPicPr>
+                  <a:picLocks noChangeAspect="1"/>
+                </p:cNvPicPr>
+                <p:nvPr/>
+              </p:nvPicPr>
+              <p:blipFill>
+                <a:blip r:embed="rId5" cstate="print">
+                  <a:extLst>
+                    <a:ext uri="{28A0092B-C50C-407E-A947-70E740481C1C}">
+                      <a14:useLocalDpi xmlns:a14="http://schemas.microsoft.com/office/drawing/2010/main" val="0"/>
+                    </a:ext>
+                  </a:extLst>
+                </a:blip>
+                <a:stretch>
+                  <a:fillRect/>
+                </a:stretch>
+              </p:blipFill>
+              <p:spPr>
+                <a:xfrm>
+                  <a:off x="5345440" y="6084945"/>
+                  <a:ext cx="280633" cy="225596"/>
+                </a:xfrm>
+                <a:prstGeom prst="rect">
+                  <a:avLst/>
+                </a:prstGeom>
+              </p:spPr>
+            </p:pic>
+            <p:pic>
+              <p:nvPicPr>
+                <p:cNvPr id="31" name="Picture 30"/>
+                <p:cNvPicPr>
+                  <a:picLocks noChangeAspect="1"/>
+                </p:cNvPicPr>
+                <p:nvPr/>
+              </p:nvPicPr>
+              <p:blipFill>
+                <a:blip r:embed="rId6" cstate="print">
+                  <a:extLst>
+                    <a:ext uri="{28A0092B-C50C-407E-A947-70E740481C1C}">
+                      <a14:useLocalDpi xmlns:a14="http://schemas.microsoft.com/office/drawing/2010/main" val="0"/>
+                    </a:ext>
+                  </a:extLst>
+                </a:blip>
+                <a:stretch>
+                  <a:fillRect/>
+                </a:stretch>
+              </p:blipFill>
+              <p:spPr>
+                <a:xfrm>
+                  <a:off x="4515280" y="6084945"/>
+                  <a:ext cx="274386" cy="225596"/>
+                </a:xfrm>
+                <a:prstGeom prst="rect">
+                  <a:avLst/>
+                </a:prstGeom>
+              </p:spPr>
+            </p:pic>
+            <p:pic>
+              <p:nvPicPr>
+                <p:cNvPr id="32" name="Picture 31"/>
+                <p:cNvPicPr>
+                  <a:picLocks noChangeAspect="1"/>
+                </p:cNvPicPr>
+                <p:nvPr/>
+              </p:nvPicPr>
+              <p:blipFill>
+                <a:blip r:embed="rId7" cstate="print">
+                  <a:extLst>
+                    <a:ext uri="{28A0092B-C50C-407E-A947-70E740481C1C}">
+                      <a14:useLocalDpi xmlns:a14="http://schemas.microsoft.com/office/drawing/2010/main" val="0"/>
+                    </a:ext>
+                  </a:extLst>
+                </a:blip>
+                <a:stretch>
+                  <a:fillRect/>
+                </a:stretch>
+              </p:blipFill>
+              <p:spPr>
+                <a:xfrm flipH="1">
+                  <a:off x="2887074" y="6083191"/>
+                  <a:ext cx="255789" cy="218495"/>
+                </a:xfrm>
+                <a:prstGeom prst="rect">
+                  <a:avLst/>
+                </a:prstGeom>
+              </p:spPr>
+            </p:pic>
+          </p:grpSp>
           <p:pic>
             <p:nvPicPr>
-              <p:cNvPr id="6" name="Picture 5"/>
+              <p:cNvPr id="28" name="Picture 27"/>
               <p:cNvPicPr>
                 <a:picLocks noChangeAspect="1"/>
               </p:cNvPicPr>
               <p:nvPr/>
             </p:nvPicPr>
             <p:blipFill>
-              <a:blip r:embed="rId4" cstate="print">
-                <a:extLst>
-                  <a:ext uri="{28A0092B-C50C-407E-A947-70E740481C1C}">
-                    <a14:useLocalDpi xmlns:a14="http://schemas.microsoft.com/office/drawing/2010/main" val="0"/>
-                  </a:ext>
-                </a:extLst>
-              </a:blip>
+              <a:blip r:embed="rId8"/>
               <a:stretch>
                 <a:fillRect/>
               </a:stretch>
             </p:blipFill>
             <p:spPr>
               <a:xfrm>
-                <a:off x="3064661" y="4790213"/>
-                <a:ext cx="486164" cy="241208"/>
-              </a:xfrm>
-              <a:prstGeom prst="rect">
-                <a:avLst/>
-              </a:prstGeom>
-            </p:spPr>
-          </p:pic>
-          <p:pic>
-            <p:nvPicPr>
-              <p:cNvPr id="7" name="Picture 6"/>
-              <p:cNvPicPr>
-                <a:picLocks noChangeAspect="1"/>
-              </p:cNvPicPr>
-              <p:nvPr/>
-            </p:nvPicPr>
-            <p:blipFill>
-              <a:blip r:embed="rId5" cstate="print">
-                <a:extLst>
-                  <a:ext uri="{28A0092B-C50C-407E-A947-70E740481C1C}">
-                    <a14:useLocalDpi xmlns:a14="http://schemas.microsoft.com/office/drawing/2010/main" val="0"/>
-                  </a:ext>
-                </a:extLst>
-              </a:blip>
-              <a:stretch>
-                <a:fillRect/>
-              </a:stretch>
-            </p:blipFill>
-            <p:spPr>
-              <a:xfrm>
-                <a:off x="2455268" y="4741271"/>
-                <a:ext cx="333613" cy="336803"/>
-              </a:xfrm>
-              <a:prstGeom prst="rect">
-                <a:avLst/>
-              </a:prstGeom>
-            </p:spPr>
-          </p:pic>
-          <p:pic>
-            <p:nvPicPr>
-              <p:cNvPr id="8" name="Picture 7"/>
-              <p:cNvPicPr>
-                <a:picLocks noChangeAspect="1"/>
-              </p:cNvPicPr>
-              <p:nvPr/>
-            </p:nvPicPr>
-            <p:blipFill>
-              <a:blip r:embed="rId6" cstate="print">
-                <a:extLst>
-                  <a:ext uri="{28A0092B-C50C-407E-A947-70E740481C1C}">
-                    <a14:useLocalDpi xmlns:a14="http://schemas.microsoft.com/office/drawing/2010/main" val="0"/>
-                  </a:ext>
-                </a:extLst>
-              </a:blip>
-              <a:stretch>
-                <a:fillRect/>
-              </a:stretch>
-            </p:blipFill>
-            <p:spPr>
-              <a:xfrm>
-                <a:off x="5067429" y="4756321"/>
-                <a:ext cx="418971" cy="336804"/>
-              </a:xfrm>
-              <a:prstGeom prst="rect">
-                <a:avLst/>
-              </a:prstGeom>
-            </p:spPr>
-          </p:pic>
-          <p:pic>
-            <p:nvPicPr>
-              <p:cNvPr id="9" name="Picture 8"/>
-              <p:cNvPicPr>
-                <a:picLocks noChangeAspect="1"/>
-              </p:cNvPicPr>
-              <p:nvPr/>
-            </p:nvPicPr>
-            <p:blipFill>
-              <a:blip r:embed="rId7" cstate="print">
-                <a:extLst>
-                  <a:ext uri="{28A0092B-C50C-407E-A947-70E740481C1C}">
-                    <a14:useLocalDpi xmlns:a14="http://schemas.microsoft.com/office/drawing/2010/main" val="0"/>
-                  </a:ext>
-                </a:extLst>
-              </a:blip>
-              <a:stretch>
-                <a:fillRect/>
-              </a:stretch>
-            </p:blipFill>
-            <p:spPr>
-              <a:xfrm>
-                <a:off x="1799765" y="4756321"/>
-                <a:ext cx="379723" cy="334570"/>
-              </a:xfrm>
-              <a:prstGeom prst="rect">
-                <a:avLst/>
-              </a:prstGeom>
-            </p:spPr>
-          </p:pic>
-          <p:pic>
-            <p:nvPicPr>
-              <p:cNvPr id="10" name="Picture 9"/>
-              <p:cNvPicPr>
-                <a:picLocks noChangeAspect="1"/>
-              </p:cNvPicPr>
-              <p:nvPr/>
-            </p:nvPicPr>
-            <p:blipFill>
-              <a:blip r:embed="rId8" cstate="print">
-                <a:extLst>
-                  <a:ext uri="{28A0092B-C50C-407E-A947-70E740481C1C}">
-                    <a14:useLocalDpi xmlns:a14="http://schemas.microsoft.com/office/drawing/2010/main" val="0"/>
-                  </a:ext>
-                </a:extLst>
-              </a:blip>
-              <a:stretch>
-                <a:fillRect/>
-              </a:stretch>
-            </p:blipFill>
-            <p:spPr>
-              <a:xfrm>
-                <a:off x="3735884" y="4737314"/>
-                <a:ext cx="409645" cy="336804"/>
-              </a:xfrm>
-              <a:prstGeom prst="rect">
-                <a:avLst/>
-              </a:prstGeom>
-            </p:spPr>
-          </p:pic>
-          <p:pic>
-            <p:nvPicPr>
-              <p:cNvPr id="11" name="Picture 10"/>
-              <p:cNvPicPr>
-                <a:picLocks noChangeAspect="1"/>
-              </p:cNvPicPr>
-              <p:nvPr/>
-            </p:nvPicPr>
-            <p:blipFill>
-              <a:blip r:embed="rId9" cstate="print">
-                <a:extLst>
-                  <a:ext uri="{28A0092B-C50C-407E-A947-70E740481C1C}">
-                    <a14:useLocalDpi xmlns:a14="http://schemas.microsoft.com/office/drawing/2010/main" val="0"/>
-                  </a:ext>
-                </a:extLst>
-              </a:blip>
-              <a:stretch>
-                <a:fillRect/>
-              </a:stretch>
-            </p:blipFill>
-            <p:spPr>
-              <a:xfrm flipH="1">
-                <a:off x="1208531" y="4739054"/>
-                <a:ext cx="381880" cy="326202"/>
-              </a:xfrm>
-              <a:prstGeom prst="rect">
-                <a:avLst/>
-              </a:prstGeom>
-            </p:spPr>
-          </p:pic>
-          <p:pic>
-            <p:nvPicPr>
-              <p:cNvPr id="12" name="Picture 11"/>
-              <p:cNvPicPr>
-                <a:picLocks noChangeAspect="1"/>
-              </p:cNvPicPr>
-              <p:nvPr/>
-            </p:nvPicPr>
-            <p:blipFill>
-              <a:blip r:embed="rId10"/>
-              <a:stretch>
-                <a:fillRect/>
-              </a:stretch>
-            </p:blipFill>
-            <p:spPr>
-              <a:xfrm>
-                <a:off x="4356135" y="4730332"/>
-                <a:ext cx="450962" cy="352248"/>
+                <a:off x="4734039" y="6066646"/>
+                <a:ext cx="302061" cy="235941"/>
               </a:xfrm>
               <a:prstGeom prst="rect">
                 <a:avLst/>
@@ -4805,218 +4839,236 @@
             </p:spPr>
           </p:pic>
         </p:grpSp>
+        <p:pic>
+          <p:nvPicPr>
+            <p:cNvPr id="25" name="Picture 24"/>
+            <p:cNvPicPr>
+              <a:picLocks noChangeAspect="1"/>
+            </p:cNvPicPr>
+            <p:nvPr/>
+          </p:nvPicPr>
+          <p:blipFill>
+            <a:blip r:embed="rId9"/>
+            <a:stretch>
+              <a:fillRect/>
+            </a:stretch>
+          </p:blipFill>
+          <p:spPr>
+            <a:xfrm>
+              <a:off x="3506696" y="6098817"/>
+              <a:ext cx="334903" cy="198223"/>
+            </a:xfrm>
+            <a:prstGeom prst="rect">
+              <a:avLst/>
+            </a:prstGeom>
+          </p:spPr>
+        </p:pic>
+        <p:pic>
+          <p:nvPicPr>
+            <p:cNvPr id="26" name="Picture 25"/>
+            <p:cNvPicPr>
+              <a:picLocks noChangeAspect="1"/>
+            </p:cNvPicPr>
+            <p:nvPr/>
+          </p:nvPicPr>
+          <p:blipFill>
+            <a:blip r:embed="rId10"/>
+            <a:stretch>
+              <a:fillRect/>
+            </a:stretch>
+          </p:blipFill>
+          <p:spPr>
+            <a:xfrm>
+              <a:off x="3107726" y="6098817"/>
+              <a:ext cx="327300" cy="196986"/>
+            </a:xfrm>
+            <a:prstGeom prst="rect">
+              <a:avLst/>
+            </a:prstGeom>
+          </p:spPr>
+        </p:pic>
+      </p:grpSp>
+      <p:grpSp>
+        <p:nvGrpSpPr>
+          <p:cNvPr id="33" name="Group 32"/>
+          <p:cNvGrpSpPr/>
+          <p:nvPr/>
+        </p:nvGrpSpPr>
+        <p:grpSpPr>
+          <a:xfrm>
+            <a:off x="6788883" y="4745568"/>
+            <a:ext cx="4248393" cy="378945"/>
+            <a:chOff x="2721075" y="6066646"/>
+            <a:chExt cx="2738999" cy="243895"/>
+          </a:xfrm>
+        </p:grpSpPr>
         <p:grpSp>
           <p:nvGrpSpPr>
-            <p:cNvPr id="14" name="Group 13"/>
+            <p:cNvPr id="34" name="Group 33"/>
             <p:cNvGrpSpPr/>
             <p:nvPr/>
           </p:nvGrpSpPr>
           <p:grpSpPr>
             <a:xfrm>
-              <a:off x="6777683" y="4742209"/>
-              <a:ext cx="4277869" cy="362793"/>
-              <a:chOff x="1208531" y="4730332"/>
-              <a:chExt cx="4277869" cy="362793"/>
+              <a:off x="2721075" y="6066646"/>
+              <a:ext cx="2738999" cy="243895"/>
+              <a:chOff x="2721075" y="6066646"/>
+              <a:chExt cx="2738999" cy="243895"/>
             </a:xfrm>
           </p:grpSpPr>
+          <p:grpSp>
+            <p:nvGrpSpPr>
+              <p:cNvPr id="37" name="Group 36"/>
+              <p:cNvGrpSpPr/>
+              <p:nvPr/>
+            </p:nvGrpSpPr>
+            <p:grpSpPr>
+              <a:xfrm>
+                <a:off x="2721075" y="6083191"/>
+                <a:ext cx="2738999" cy="227350"/>
+                <a:chOff x="2887074" y="6083191"/>
+                <a:chExt cx="2738999" cy="227350"/>
+              </a:xfrm>
+            </p:grpSpPr>
+            <p:pic>
+              <p:nvPicPr>
+                <p:cNvPr id="39" name="Picture 38"/>
+                <p:cNvPicPr>
+                  <a:picLocks noChangeAspect="1"/>
+                </p:cNvPicPr>
+                <p:nvPr/>
+              </p:nvPicPr>
+              <p:blipFill>
+                <a:blip r:embed="rId4" cstate="print">
+                  <a:extLst>
+                    <a:ext uri="{28A0092B-C50C-407E-A947-70E740481C1C}">
+                      <a14:useLocalDpi xmlns:a14="http://schemas.microsoft.com/office/drawing/2010/main" val="0"/>
+                    </a:ext>
+                  </a:extLst>
+                </a:blip>
+                <a:stretch>
+                  <a:fillRect/>
+                </a:stretch>
+              </p:blipFill>
+              <p:spPr>
+                <a:xfrm>
+                  <a:off x="4079269" y="6103833"/>
+                  <a:ext cx="325640" cy="161565"/>
+                </a:xfrm>
+                <a:prstGeom prst="rect">
+                  <a:avLst/>
+                </a:prstGeom>
+              </p:spPr>
+            </p:pic>
+            <p:pic>
+              <p:nvPicPr>
+                <p:cNvPr id="40" name="Picture 39"/>
+                <p:cNvPicPr>
+                  <a:picLocks noChangeAspect="1"/>
+                </p:cNvPicPr>
+                <p:nvPr/>
+              </p:nvPicPr>
+              <p:blipFill>
+                <a:blip r:embed="rId5" cstate="print">
+                  <a:extLst>
+                    <a:ext uri="{28A0092B-C50C-407E-A947-70E740481C1C}">
+                      <a14:useLocalDpi xmlns:a14="http://schemas.microsoft.com/office/drawing/2010/main" val="0"/>
+                    </a:ext>
+                  </a:extLst>
+                </a:blip>
+                <a:stretch>
+                  <a:fillRect/>
+                </a:stretch>
+              </p:blipFill>
+              <p:spPr>
+                <a:xfrm>
+                  <a:off x="5345440" y="6084945"/>
+                  <a:ext cx="280633" cy="225596"/>
+                </a:xfrm>
+                <a:prstGeom prst="rect">
+                  <a:avLst/>
+                </a:prstGeom>
+              </p:spPr>
+            </p:pic>
+            <p:pic>
+              <p:nvPicPr>
+                <p:cNvPr id="41" name="Picture 40"/>
+                <p:cNvPicPr>
+                  <a:picLocks noChangeAspect="1"/>
+                </p:cNvPicPr>
+                <p:nvPr/>
+              </p:nvPicPr>
+              <p:blipFill>
+                <a:blip r:embed="rId6" cstate="print">
+                  <a:extLst>
+                    <a:ext uri="{28A0092B-C50C-407E-A947-70E740481C1C}">
+                      <a14:useLocalDpi xmlns:a14="http://schemas.microsoft.com/office/drawing/2010/main" val="0"/>
+                    </a:ext>
+                  </a:extLst>
+                </a:blip>
+                <a:stretch>
+                  <a:fillRect/>
+                </a:stretch>
+              </p:blipFill>
+              <p:spPr>
+                <a:xfrm>
+                  <a:off x="4515280" y="6084945"/>
+                  <a:ext cx="274386" cy="225596"/>
+                </a:xfrm>
+                <a:prstGeom prst="rect">
+                  <a:avLst/>
+                </a:prstGeom>
+              </p:spPr>
+            </p:pic>
+            <p:pic>
+              <p:nvPicPr>
+                <p:cNvPr id="42" name="Picture 41"/>
+                <p:cNvPicPr>
+                  <a:picLocks noChangeAspect="1"/>
+                </p:cNvPicPr>
+                <p:nvPr/>
+              </p:nvPicPr>
+              <p:blipFill>
+                <a:blip r:embed="rId7" cstate="print">
+                  <a:extLst>
+                    <a:ext uri="{28A0092B-C50C-407E-A947-70E740481C1C}">
+                      <a14:useLocalDpi xmlns:a14="http://schemas.microsoft.com/office/drawing/2010/main" val="0"/>
+                    </a:ext>
+                  </a:extLst>
+                </a:blip>
+                <a:stretch>
+                  <a:fillRect/>
+                </a:stretch>
+              </p:blipFill>
+              <p:spPr>
+                <a:xfrm flipH="1">
+                  <a:off x="2887074" y="6083191"/>
+                  <a:ext cx="255789" cy="218495"/>
+                </a:xfrm>
+                <a:prstGeom prst="rect">
+                  <a:avLst/>
+                </a:prstGeom>
+              </p:spPr>
+            </p:pic>
+          </p:grpSp>
           <p:pic>
             <p:nvPicPr>
-              <p:cNvPr id="15" name="Picture 14"/>
+              <p:cNvPr id="38" name="Picture 37"/>
               <p:cNvPicPr>
                 <a:picLocks noChangeAspect="1"/>
               </p:cNvPicPr>
               <p:nvPr/>
             </p:nvPicPr>
             <p:blipFill>
-              <a:blip r:embed="rId4" cstate="print">
-                <a:extLst>
-                  <a:ext uri="{28A0092B-C50C-407E-A947-70E740481C1C}">
-                    <a14:useLocalDpi xmlns:a14="http://schemas.microsoft.com/office/drawing/2010/main" val="0"/>
-                  </a:ext>
-                </a:extLst>
-              </a:blip>
+              <a:blip r:embed="rId8"/>
               <a:stretch>
                 <a:fillRect/>
               </a:stretch>
             </p:blipFill>
             <p:spPr>
               <a:xfrm>
-                <a:off x="3064661" y="4790213"/>
-                <a:ext cx="486164" cy="241208"/>
-              </a:xfrm>
-              <a:prstGeom prst="rect">
-                <a:avLst/>
-              </a:prstGeom>
-            </p:spPr>
-          </p:pic>
-          <p:pic>
-            <p:nvPicPr>
-              <p:cNvPr id="16" name="Picture 15"/>
-              <p:cNvPicPr>
-                <a:picLocks noChangeAspect="1"/>
-              </p:cNvPicPr>
-              <p:nvPr/>
-            </p:nvPicPr>
-            <p:blipFill>
-              <a:blip r:embed="rId5" cstate="print">
-                <a:extLst>
-                  <a:ext uri="{28A0092B-C50C-407E-A947-70E740481C1C}">
-                    <a14:useLocalDpi xmlns:a14="http://schemas.microsoft.com/office/drawing/2010/main" val="0"/>
-                  </a:ext>
-                </a:extLst>
-              </a:blip>
-              <a:stretch>
-                <a:fillRect/>
-              </a:stretch>
-            </p:blipFill>
-            <p:spPr>
-              <a:xfrm>
-                <a:off x="2455268" y="4741271"/>
-                <a:ext cx="333613" cy="336803"/>
-              </a:xfrm>
-              <a:prstGeom prst="rect">
-                <a:avLst/>
-              </a:prstGeom>
-            </p:spPr>
-          </p:pic>
-          <p:pic>
-            <p:nvPicPr>
-              <p:cNvPr id="17" name="Picture 16"/>
-              <p:cNvPicPr>
-                <a:picLocks noChangeAspect="1"/>
-              </p:cNvPicPr>
-              <p:nvPr/>
-            </p:nvPicPr>
-            <p:blipFill>
-              <a:blip r:embed="rId6" cstate="print">
-                <a:extLst>
-                  <a:ext uri="{28A0092B-C50C-407E-A947-70E740481C1C}">
-                    <a14:useLocalDpi xmlns:a14="http://schemas.microsoft.com/office/drawing/2010/main" val="0"/>
-                  </a:ext>
-                </a:extLst>
-              </a:blip>
-              <a:stretch>
-                <a:fillRect/>
-              </a:stretch>
-            </p:blipFill>
-            <p:spPr>
-              <a:xfrm>
-                <a:off x="5067429" y="4756321"/>
-                <a:ext cx="418971" cy="336804"/>
-              </a:xfrm>
-              <a:prstGeom prst="rect">
-                <a:avLst/>
-              </a:prstGeom>
-            </p:spPr>
-          </p:pic>
-          <p:pic>
-            <p:nvPicPr>
-              <p:cNvPr id="18" name="Picture 17"/>
-              <p:cNvPicPr>
-                <a:picLocks noChangeAspect="1"/>
-              </p:cNvPicPr>
-              <p:nvPr/>
-            </p:nvPicPr>
-            <p:blipFill>
-              <a:blip r:embed="rId7" cstate="print">
-                <a:extLst>
-                  <a:ext uri="{28A0092B-C50C-407E-A947-70E740481C1C}">
-                    <a14:useLocalDpi xmlns:a14="http://schemas.microsoft.com/office/drawing/2010/main" val="0"/>
-                  </a:ext>
-                </a:extLst>
-              </a:blip>
-              <a:stretch>
-                <a:fillRect/>
-              </a:stretch>
-            </p:blipFill>
-            <p:spPr>
-              <a:xfrm>
-                <a:off x="1799765" y="4756321"/>
-                <a:ext cx="379723" cy="334570"/>
-              </a:xfrm>
-              <a:prstGeom prst="rect">
-                <a:avLst/>
-              </a:prstGeom>
-            </p:spPr>
-          </p:pic>
-          <p:pic>
-            <p:nvPicPr>
-              <p:cNvPr id="19" name="Picture 18"/>
-              <p:cNvPicPr>
-                <a:picLocks noChangeAspect="1"/>
-              </p:cNvPicPr>
-              <p:nvPr/>
-            </p:nvPicPr>
-            <p:blipFill>
-              <a:blip r:embed="rId8" cstate="print">
-                <a:extLst>
-                  <a:ext uri="{28A0092B-C50C-407E-A947-70E740481C1C}">
-                    <a14:useLocalDpi xmlns:a14="http://schemas.microsoft.com/office/drawing/2010/main" val="0"/>
-                  </a:ext>
-                </a:extLst>
-              </a:blip>
-              <a:stretch>
-                <a:fillRect/>
-              </a:stretch>
-            </p:blipFill>
-            <p:spPr>
-              <a:xfrm>
-                <a:off x="3735884" y="4737314"/>
-                <a:ext cx="409645" cy="336804"/>
-              </a:xfrm>
-              <a:prstGeom prst="rect">
-                <a:avLst/>
-              </a:prstGeom>
-            </p:spPr>
-          </p:pic>
-          <p:pic>
-            <p:nvPicPr>
-              <p:cNvPr id="20" name="Picture 19"/>
-              <p:cNvPicPr>
-                <a:picLocks noChangeAspect="1"/>
-              </p:cNvPicPr>
-              <p:nvPr/>
-            </p:nvPicPr>
-            <p:blipFill>
-              <a:blip r:embed="rId9" cstate="print">
-                <a:extLst>
-                  <a:ext uri="{28A0092B-C50C-407E-A947-70E740481C1C}">
-                    <a14:useLocalDpi xmlns:a14="http://schemas.microsoft.com/office/drawing/2010/main" val="0"/>
-                  </a:ext>
-                </a:extLst>
-              </a:blip>
-              <a:stretch>
-                <a:fillRect/>
-              </a:stretch>
-            </p:blipFill>
-            <p:spPr>
-              <a:xfrm flipH="1">
-                <a:off x="1208531" y="4739054"/>
-                <a:ext cx="381880" cy="326202"/>
-              </a:xfrm>
-              <a:prstGeom prst="rect">
-                <a:avLst/>
-              </a:prstGeom>
-            </p:spPr>
-          </p:pic>
-          <p:pic>
-            <p:nvPicPr>
-              <p:cNvPr id="21" name="Picture 20"/>
-              <p:cNvPicPr>
-                <a:picLocks noChangeAspect="1"/>
-              </p:cNvPicPr>
-              <p:nvPr/>
-            </p:nvPicPr>
-            <p:blipFill>
-              <a:blip r:embed="rId10"/>
-              <a:stretch>
-                <a:fillRect/>
-              </a:stretch>
-            </p:blipFill>
-            <p:spPr>
-              <a:xfrm>
-                <a:off x="4356135" y="4730332"/>
-                <a:ext cx="450962" cy="352248"/>
+                <a:off x="4734039" y="6066646"/>
+                <a:ext cx="302061" cy="235941"/>
               </a:xfrm>
               <a:prstGeom prst="rect">
                 <a:avLst/>
@@ -5024,6 +5076,54 @@
             </p:spPr>
           </p:pic>
         </p:grpSp>
+        <p:pic>
+          <p:nvPicPr>
+            <p:cNvPr id="35" name="Picture 34"/>
+            <p:cNvPicPr>
+              <a:picLocks noChangeAspect="1"/>
+            </p:cNvPicPr>
+            <p:nvPr/>
+          </p:nvPicPr>
+          <p:blipFill>
+            <a:blip r:embed="rId9"/>
+            <a:stretch>
+              <a:fillRect/>
+            </a:stretch>
+          </p:blipFill>
+          <p:spPr>
+            <a:xfrm>
+              <a:off x="3506696" y="6098817"/>
+              <a:ext cx="334903" cy="198223"/>
+            </a:xfrm>
+            <a:prstGeom prst="rect">
+              <a:avLst/>
+            </a:prstGeom>
+          </p:spPr>
+        </p:pic>
+        <p:pic>
+          <p:nvPicPr>
+            <p:cNvPr id="36" name="Picture 35"/>
+            <p:cNvPicPr>
+              <a:picLocks noChangeAspect="1"/>
+            </p:cNvPicPr>
+            <p:nvPr/>
+          </p:nvPicPr>
+          <p:blipFill>
+            <a:blip r:embed="rId10"/>
+            <a:stretch>
+              <a:fillRect/>
+            </a:stretch>
+          </p:blipFill>
+          <p:spPr>
+            <a:xfrm>
+              <a:off x="3107726" y="6098817"/>
+              <a:ext cx="327300" cy="196986"/>
+            </a:xfrm>
+            <a:prstGeom prst="rect">
+              <a:avLst/>
+            </a:prstGeom>
+          </p:spPr>
+        </p:pic>
       </p:grpSp>
     </p:spTree>
     <p:extLst>
@@ -5039,6 +5139,297 @@
 </file>
 
 <file path=ppt/slides/slide4.xml><?xml version="1.0" encoding="utf-8"?>
+<p:sld xmlns:a="http://schemas.openxmlformats.org/drawingml/2006/main" xmlns:r="http://schemas.openxmlformats.org/officeDocument/2006/relationships" xmlns:p="http://schemas.openxmlformats.org/presentationml/2006/main">
+  <p:cSld>
+    <p:spTree>
+      <p:nvGrpSpPr>
+        <p:cNvPr id="1" name=""/>
+        <p:cNvGrpSpPr/>
+        <p:nvPr/>
+      </p:nvGrpSpPr>
+      <p:grpSpPr>
+        <a:xfrm>
+          <a:off x="0" y="0"/>
+          <a:ext cx="0" cy="0"/>
+          <a:chOff x="0" y="0"/>
+          <a:chExt cx="0" cy="0"/>
+        </a:xfrm>
+      </p:grpSpPr>
+      <p:pic>
+        <p:nvPicPr>
+          <p:cNvPr id="5" name="Picture 4"/>
+          <p:cNvPicPr>
+            <a:picLocks noChangeAspect="1"/>
+          </p:cNvPicPr>
+          <p:nvPr/>
+        </p:nvPicPr>
+        <p:blipFill>
+          <a:blip r:embed="rId2"/>
+          <a:stretch>
+            <a:fillRect/>
+          </a:stretch>
+        </p:blipFill>
+        <p:spPr>
+          <a:xfrm>
+            <a:off x="2211997" y="209740"/>
+            <a:ext cx="6496050" cy="4371975"/>
+          </a:xfrm>
+          <a:prstGeom prst="rect">
+            <a:avLst/>
+          </a:prstGeom>
+        </p:spPr>
+      </p:pic>
+      <p:grpSp>
+        <p:nvGrpSpPr>
+          <p:cNvPr id="7" name="Group 6"/>
+          <p:cNvGrpSpPr/>
+          <p:nvPr/>
+        </p:nvGrpSpPr>
+        <p:grpSpPr>
+          <a:xfrm>
+            <a:off x="3313360" y="3945734"/>
+            <a:ext cx="5078346" cy="377620"/>
+            <a:chOff x="4076090" y="5589042"/>
+            <a:chExt cx="3274081" cy="243042"/>
+          </a:xfrm>
+        </p:grpSpPr>
+        <p:grpSp>
+          <p:nvGrpSpPr>
+            <p:cNvPr id="8" name="Group 7"/>
+            <p:cNvGrpSpPr/>
+            <p:nvPr/>
+          </p:nvGrpSpPr>
+          <p:grpSpPr>
+            <a:xfrm>
+              <a:off x="4076090" y="5589042"/>
+              <a:ext cx="3274081" cy="243042"/>
+              <a:chOff x="4076090" y="5589042"/>
+              <a:chExt cx="3274081" cy="243042"/>
+            </a:xfrm>
+          </p:grpSpPr>
+          <p:grpSp>
+            <p:nvGrpSpPr>
+              <p:cNvPr id="11" name="Group 10"/>
+              <p:cNvGrpSpPr/>
+              <p:nvPr/>
+            </p:nvGrpSpPr>
+            <p:grpSpPr>
+              <a:xfrm>
+                <a:off x="4076090" y="5589042"/>
+                <a:ext cx="2768069" cy="243042"/>
+                <a:chOff x="4242089" y="5589042"/>
+                <a:chExt cx="2768069" cy="243042"/>
+              </a:xfrm>
+            </p:grpSpPr>
+            <p:pic>
+              <p:nvPicPr>
+                <p:cNvPr id="13" name="Picture 12"/>
+                <p:cNvPicPr>
+                  <a:picLocks noChangeAspect="1"/>
+                </p:cNvPicPr>
+                <p:nvPr/>
+              </p:nvPicPr>
+              <p:blipFill>
+                <a:blip r:embed="rId3" cstate="print">
+                  <a:extLst>
+                    <a:ext uri="{28A0092B-C50C-407E-A947-70E740481C1C}">
+                      <a14:useLocalDpi xmlns:a14="http://schemas.microsoft.com/office/drawing/2010/main" val="0"/>
+                    </a:ext>
+                  </a:extLst>
+                </a:blip>
+                <a:stretch>
+                  <a:fillRect/>
+                </a:stretch>
+              </p:blipFill>
+              <p:spPr>
+                <a:xfrm>
+                  <a:off x="4720426" y="5634952"/>
+                  <a:ext cx="325640" cy="161565"/>
+                </a:xfrm>
+                <a:prstGeom prst="rect">
+                  <a:avLst/>
+                </a:prstGeom>
+              </p:spPr>
+            </p:pic>
+            <p:pic>
+              <p:nvPicPr>
+                <p:cNvPr id="14" name="Picture 13"/>
+                <p:cNvPicPr>
+                  <a:picLocks noChangeAspect="1"/>
+                </p:cNvPicPr>
+                <p:nvPr/>
+              </p:nvPicPr>
+              <p:blipFill>
+                <a:blip r:embed="rId4" cstate="print">
+                  <a:extLst>
+                    <a:ext uri="{28A0092B-C50C-407E-A947-70E740481C1C}">
+                      <a14:useLocalDpi xmlns:a14="http://schemas.microsoft.com/office/drawing/2010/main" val="0"/>
+                    </a:ext>
+                  </a:extLst>
+                </a:blip>
+                <a:stretch>
+                  <a:fillRect/>
+                </a:stretch>
+              </p:blipFill>
+              <p:spPr>
+                <a:xfrm>
+                  <a:off x="5202099" y="5606488"/>
+                  <a:ext cx="280633" cy="225596"/>
+                </a:xfrm>
+                <a:prstGeom prst="rect">
+                  <a:avLst/>
+                </a:prstGeom>
+              </p:spPr>
+            </p:pic>
+            <p:pic>
+              <p:nvPicPr>
+                <p:cNvPr id="15" name="Picture 14"/>
+                <p:cNvPicPr>
+                  <a:picLocks noChangeAspect="1"/>
+                </p:cNvPicPr>
+                <p:nvPr/>
+              </p:nvPicPr>
+              <p:blipFill>
+                <a:blip r:embed="rId5" cstate="print">
+                  <a:extLst>
+                    <a:ext uri="{28A0092B-C50C-407E-A947-70E740481C1C}">
+                      <a14:useLocalDpi xmlns:a14="http://schemas.microsoft.com/office/drawing/2010/main" val="0"/>
+                    </a:ext>
+                  </a:extLst>
+                </a:blip>
+                <a:stretch>
+                  <a:fillRect/>
+                </a:stretch>
+              </p:blipFill>
+              <p:spPr>
+                <a:xfrm>
+                  <a:off x="4242089" y="5589042"/>
+                  <a:ext cx="274386" cy="225596"/>
+                </a:xfrm>
+                <a:prstGeom prst="rect">
+                  <a:avLst/>
+                </a:prstGeom>
+              </p:spPr>
+            </p:pic>
+            <p:pic>
+              <p:nvPicPr>
+                <p:cNvPr id="16" name="Picture 15"/>
+                <p:cNvPicPr>
+                  <a:picLocks noChangeAspect="1"/>
+                </p:cNvPicPr>
+                <p:nvPr/>
+              </p:nvPicPr>
+              <p:blipFill>
+                <a:blip r:embed="rId6" cstate="print">
+                  <a:extLst>
+                    <a:ext uri="{28A0092B-C50C-407E-A947-70E740481C1C}">
+                      <a14:useLocalDpi xmlns:a14="http://schemas.microsoft.com/office/drawing/2010/main" val="0"/>
+                    </a:ext>
+                  </a:extLst>
+                </a:blip>
+                <a:stretch>
+                  <a:fillRect/>
+                </a:stretch>
+              </p:blipFill>
+              <p:spPr>
+                <a:xfrm flipH="1">
+                  <a:off x="6754369" y="5606488"/>
+                  <a:ext cx="255789" cy="218495"/>
+                </a:xfrm>
+                <a:prstGeom prst="rect">
+                  <a:avLst/>
+                </a:prstGeom>
+              </p:spPr>
+            </p:pic>
+          </p:grpSp>
+          <p:pic>
+            <p:nvPicPr>
+              <p:cNvPr id="12" name="Picture 11"/>
+              <p:cNvPicPr>
+                <a:picLocks noChangeAspect="1"/>
+              </p:cNvPicPr>
+              <p:nvPr/>
+            </p:nvPicPr>
+            <p:blipFill>
+              <a:blip r:embed="rId7"/>
+              <a:stretch>
+                <a:fillRect/>
+              </a:stretch>
+            </p:blipFill>
+            <p:spPr>
+              <a:xfrm>
+                <a:off x="7048110" y="5589042"/>
+                <a:ext cx="302061" cy="235941"/>
+              </a:xfrm>
+              <a:prstGeom prst="rect">
+                <a:avLst/>
+              </a:prstGeom>
+            </p:spPr>
+          </p:pic>
+        </p:grpSp>
+        <p:pic>
+          <p:nvPicPr>
+            <p:cNvPr id="9" name="Picture 8"/>
+            <p:cNvPicPr>
+              <a:picLocks noChangeAspect="1"/>
+            </p:cNvPicPr>
+            <p:nvPr/>
+          </p:nvPicPr>
+          <p:blipFill>
+            <a:blip r:embed="rId8"/>
+            <a:stretch>
+              <a:fillRect/>
+            </a:stretch>
+          </p:blipFill>
+          <p:spPr>
+            <a:xfrm>
+              <a:off x="5531841" y="5598294"/>
+              <a:ext cx="334903" cy="198223"/>
+            </a:xfrm>
+            <a:prstGeom prst="rect">
+              <a:avLst/>
+            </a:prstGeom>
+          </p:spPr>
+        </p:pic>
+        <p:pic>
+          <p:nvPicPr>
+            <p:cNvPr id="10" name="Picture 9"/>
+            <p:cNvPicPr>
+              <a:picLocks noChangeAspect="1"/>
+            </p:cNvPicPr>
+            <p:nvPr/>
+          </p:nvPicPr>
+          <p:blipFill>
+            <a:blip r:embed="rId9"/>
+            <a:stretch>
+              <a:fillRect/>
+            </a:stretch>
+          </p:blipFill>
+          <p:spPr>
+            <a:xfrm>
+              <a:off x="6038358" y="5603347"/>
+              <a:ext cx="327300" cy="196986"/>
+            </a:xfrm>
+            <a:prstGeom prst="rect">
+              <a:avLst/>
+            </a:prstGeom>
+          </p:spPr>
+        </p:pic>
+      </p:grpSp>
+    </p:spTree>
+    <p:extLst>
+      <p:ext uri="{BB962C8B-B14F-4D97-AF65-F5344CB8AC3E}">
+        <p14:creationId xmlns:p14="http://schemas.microsoft.com/office/powerpoint/2010/main" val="22137957"/>
+      </p:ext>
+    </p:extLst>
+  </p:cSld>
+  <p:clrMapOvr>
+    <a:masterClrMapping/>
+  </p:clrMapOvr>
+</p:sld>
+</file>
+
+<file path=ppt/slides/slide5.xml><?xml version="1.0" encoding="utf-8"?>
 <p:sld xmlns:a="http://schemas.openxmlformats.org/drawingml/2006/main" xmlns:r="http://schemas.openxmlformats.org/officeDocument/2006/relationships" xmlns:p="http://schemas.openxmlformats.org/presentationml/2006/main">
   <p:cSld>
     <p:spTree>

</xml_diff>

<commit_message>
tweaks to fig 1,2, getting model done for fig 3c
</commit_message>
<xml_diff>
--- a/output/plots/Presentation1.pptx
+++ b/output/plots/Presentation1.pptx
@@ -5,14 +5,15 @@
     <p:sldMasterId id="2147483648" r:id="rId1"/>
   </p:sldMasterIdLst>
   <p:notesMasterIdLst>
-    <p:notesMasterId r:id="rId7"/>
+    <p:notesMasterId r:id="rId8"/>
   </p:notesMasterIdLst>
   <p:sldIdLst>
     <p:sldId id="258" r:id="rId2"/>
     <p:sldId id="257" r:id="rId3"/>
-    <p:sldId id="259" r:id="rId4"/>
-    <p:sldId id="260" r:id="rId5"/>
-    <p:sldId id="256" r:id="rId6"/>
+    <p:sldId id="260" r:id="rId4"/>
+    <p:sldId id="262" r:id="rId5"/>
+    <p:sldId id="261" r:id="rId6"/>
+    <p:sldId id="256" r:id="rId7"/>
   </p:sldIdLst>
   <p:sldSz cx="12192000" cy="6858000"/>
   <p:notesSz cx="6858000" cy="9144000"/>
@@ -570,11 +571,7 @@
           <a:p>
             <a:r>
               <a:rPr lang="en-US" dirty="0" smtClean="0"/>
-              <a:t>Deer </a:t>
-            </a:r>
-            <a:r>
-              <a:rPr lang="en-US" dirty="0" smtClean="0"/>
-              <a:t>– created by </a:t>
+              <a:t>Deer – created by </a:t>
             </a:r>
             <a:r>
               <a:rPr lang="en-US" sz="1200" b="0" i="0" u="none" strike="noStrike" kern="1200" dirty="0" smtClean="0">
@@ -615,11 +612,7 @@
           <a:p>
             <a:r>
               <a:rPr lang="en-US" dirty="0" smtClean="0"/>
-              <a:t>Fish </a:t>
-            </a:r>
-            <a:r>
-              <a:rPr lang="en-US" dirty="0" smtClean="0"/>
-              <a:t>– created by Iconic</a:t>
+              <a:t>Fish – created by Iconic</a:t>
             </a:r>
           </a:p>
           <a:p>
@@ -4060,96 +4053,264 @@
           <a:chExt cx="0" cy="0"/>
         </a:xfrm>
       </p:grpSpPr>
-      <p:pic>
-        <p:nvPicPr>
-          <p:cNvPr id="4" name="Picture 3"/>
-          <p:cNvPicPr>
-            <a:picLocks noChangeAspect="1"/>
-          </p:cNvPicPr>
-          <p:nvPr/>
-        </p:nvPicPr>
-        <p:blipFill>
-          <a:blip r:embed="rId2"/>
-          <a:stretch>
-            <a:fillRect/>
-          </a:stretch>
-        </p:blipFill>
-        <p:spPr>
-          <a:xfrm>
-            <a:off x="1291276" y="119864"/>
-            <a:ext cx="9003587" cy="6196018"/>
-          </a:xfrm>
-          <a:prstGeom prst="rect">
-            <a:avLst/>
-          </a:prstGeom>
-        </p:spPr>
-      </p:pic>
       <p:grpSp>
         <p:nvGrpSpPr>
-          <p:cNvPr id="6" name="Group 5"/>
+          <p:cNvPr id="8" name="Group 7"/>
           <p:cNvGrpSpPr/>
           <p:nvPr/>
         </p:nvGrpSpPr>
         <p:grpSpPr>
           <a:xfrm>
-            <a:off x="2721075" y="6066646"/>
-            <a:ext cx="2738999" cy="243895"/>
-            <a:chOff x="2721075" y="6066646"/>
-            <a:chExt cx="2738999" cy="243895"/>
+            <a:off x="2346384" y="324434"/>
+            <a:ext cx="5316289" cy="3784421"/>
+            <a:chOff x="1291276" y="119864"/>
+            <a:chExt cx="9003587" cy="6222848"/>
           </a:xfrm>
         </p:grpSpPr>
+        <p:pic>
+          <p:nvPicPr>
+            <p:cNvPr id="4" name="Picture 3"/>
+            <p:cNvPicPr>
+              <a:picLocks noChangeAspect="1"/>
+            </p:cNvPicPr>
+            <p:nvPr/>
+          </p:nvPicPr>
+          <p:blipFill>
+            <a:blip r:embed="rId2"/>
+            <a:stretch>
+              <a:fillRect/>
+            </a:stretch>
+          </p:blipFill>
+          <p:spPr>
+            <a:xfrm>
+              <a:off x="1291276" y="119864"/>
+              <a:ext cx="9003587" cy="6196018"/>
+            </a:xfrm>
+            <a:prstGeom prst="rect">
+              <a:avLst/>
+            </a:prstGeom>
+          </p:spPr>
+        </p:pic>
         <p:grpSp>
           <p:nvGrpSpPr>
-            <p:cNvPr id="5" name="Group 4"/>
+            <p:cNvPr id="7" name="Group 6"/>
             <p:cNvGrpSpPr/>
             <p:nvPr/>
           </p:nvGrpSpPr>
           <p:grpSpPr>
             <a:xfrm>
               <a:off x="2721075" y="6066646"/>
-              <a:ext cx="2738999" cy="243895"/>
+              <a:ext cx="7348959" cy="276066"/>
               <a:chOff x="2721075" y="6066646"/>
-              <a:chExt cx="2738999" cy="243895"/>
+              <a:chExt cx="7348959" cy="276066"/>
             </a:xfrm>
           </p:grpSpPr>
           <p:grpSp>
             <p:nvGrpSpPr>
-              <p:cNvPr id="3" name="Group 2"/>
+              <p:cNvPr id="6" name="Group 5"/>
               <p:cNvGrpSpPr/>
               <p:nvPr/>
             </p:nvGrpSpPr>
             <p:grpSpPr>
               <a:xfrm>
-                <a:off x="2721075" y="6083191"/>
-                <a:ext cx="2738999" cy="227350"/>
-                <a:chOff x="2887074" y="6083191"/>
-                <a:chExt cx="2738999" cy="227350"/>
+                <a:off x="2721075" y="6066646"/>
+                <a:ext cx="2738999" cy="243895"/>
+                <a:chOff x="2721075" y="6066646"/>
+                <a:chExt cx="2738999" cy="243895"/>
               </a:xfrm>
             </p:grpSpPr>
+            <p:grpSp>
+              <p:nvGrpSpPr>
+                <p:cNvPr id="5" name="Group 4"/>
+                <p:cNvGrpSpPr/>
+                <p:nvPr/>
+              </p:nvGrpSpPr>
+              <p:grpSpPr>
+                <a:xfrm>
+                  <a:off x="2721075" y="6066646"/>
+                  <a:ext cx="2738999" cy="243895"/>
+                  <a:chOff x="2721075" y="6066646"/>
+                  <a:chExt cx="2738999" cy="243895"/>
+                </a:xfrm>
+              </p:grpSpPr>
+              <p:grpSp>
+                <p:nvGrpSpPr>
+                  <p:cNvPr id="3" name="Group 2"/>
+                  <p:cNvGrpSpPr/>
+                  <p:nvPr/>
+                </p:nvGrpSpPr>
+                <p:grpSpPr>
+                  <a:xfrm>
+                    <a:off x="2721075" y="6083191"/>
+                    <a:ext cx="2738999" cy="227350"/>
+                    <a:chOff x="2887074" y="6083191"/>
+                    <a:chExt cx="2738999" cy="227350"/>
+                  </a:xfrm>
+                </p:grpSpPr>
+                <p:pic>
+                  <p:nvPicPr>
+                    <p:cNvPr id="12" name="Picture 11"/>
+                    <p:cNvPicPr>
+                      <a:picLocks noChangeAspect="1"/>
+                    </p:cNvPicPr>
+                    <p:nvPr/>
+                  </p:nvPicPr>
+                  <p:blipFill>
+                    <a:blip r:embed="rId3" cstate="print">
+                      <a:extLst>
+                        <a:ext uri="{28A0092B-C50C-407E-A947-70E740481C1C}">
+                          <a14:useLocalDpi xmlns:a14="http://schemas.microsoft.com/office/drawing/2010/main" val="0"/>
+                        </a:ext>
+                      </a:extLst>
+                    </a:blip>
+                    <a:stretch>
+                      <a:fillRect/>
+                    </a:stretch>
+                  </p:blipFill>
+                  <p:spPr>
+                    <a:xfrm>
+                      <a:off x="4079269" y="6103833"/>
+                      <a:ext cx="325640" cy="161565"/>
+                    </a:xfrm>
+                    <a:prstGeom prst="rect">
+                      <a:avLst/>
+                    </a:prstGeom>
+                  </p:spPr>
+                </p:pic>
+                <p:pic>
+                  <p:nvPicPr>
+                    <p:cNvPr id="15" name="Picture 14"/>
+                    <p:cNvPicPr>
+                      <a:picLocks noChangeAspect="1"/>
+                    </p:cNvPicPr>
+                    <p:nvPr/>
+                  </p:nvPicPr>
+                  <p:blipFill>
+                    <a:blip r:embed="rId4" cstate="print">
+                      <a:extLst>
+                        <a:ext uri="{28A0092B-C50C-407E-A947-70E740481C1C}">
+                          <a14:useLocalDpi xmlns:a14="http://schemas.microsoft.com/office/drawing/2010/main" val="0"/>
+                        </a:ext>
+                      </a:extLst>
+                    </a:blip>
+                    <a:stretch>
+                      <a:fillRect/>
+                    </a:stretch>
+                  </p:blipFill>
+                  <p:spPr>
+                    <a:xfrm>
+                      <a:off x="5345440" y="6084945"/>
+                      <a:ext cx="280633" cy="225596"/>
+                    </a:xfrm>
+                    <a:prstGeom prst="rect">
+                      <a:avLst/>
+                    </a:prstGeom>
+                  </p:spPr>
+                </p:pic>
+                <p:pic>
+                  <p:nvPicPr>
+                    <p:cNvPr id="17" name="Picture 16"/>
+                    <p:cNvPicPr>
+                      <a:picLocks noChangeAspect="1"/>
+                    </p:cNvPicPr>
+                    <p:nvPr/>
+                  </p:nvPicPr>
+                  <p:blipFill>
+                    <a:blip r:embed="rId5" cstate="print">
+                      <a:extLst>
+                        <a:ext uri="{28A0092B-C50C-407E-A947-70E740481C1C}">
+                          <a14:useLocalDpi xmlns:a14="http://schemas.microsoft.com/office/drawing/2010/main" val="0"/>
+                        </a:ext>
+                      </a:extLst>
+                    </a:blip>
+                    <a:stretch>
+                      <a:fillRect/>
+                    </a:stretch>
+                  </p:blipFill>
+                  <p:spPr>
+                    <a:xfrm>
+                      <a:off x="4515280" y="6084945"/>
+                      <a:ext cx="274386" cy="225596"/>
+                    </a:xfrm>
+                    <a:prstGeom prst="rect">
+                      <a:avLst/>
+                    </a:prstGeom>
+                  </p:spPr>
+                </p:pic>
+                <p:pic>
+                  <p:nvPicPr>
+                    <p:cNvPr id="18" name="Picture 17"/>
+                    <p:cNvPicPr>
+                      <a:picLocks noChangeAspect="1"/>
+                    </p:cNvPicPr>
+                    <p:nvPr/>
+                  </p:nvPicPr>
+                  <p:blipFill>
+                    <a:blip r:embed="rId6" cstate="print">
+                      <a:extLst>
+                        <a:ext uri="{28A0092B-C50C-407E-A947-70E740481C1C}">
+                          <a14:useLocalDpi xmlns:a14="http://schemas.microsoft.com/office/drawing/2010/main" val="0"/>
+                        </a:ext>
+                      </a:extLst>
+                    </a:blip>
+                    <a:stretch>
+                      <a:fillRect/>
+                    </a:stretch>
+                  </p:blipFill>
+                  <p:spPr>
+                    <a:xfrm flipH="1">
+                      <a:off x="2887074" y="6083191"/>
+                      <a:ext cx="255789" cy="218495"/>
+                    </a:xfrm>
+                    <a:prstGeom prst="rect">
+                      <a:avLst/>
+                    </a:prstGeom>
+                  </p:spPr>
+                </p:pic>
+              </p:grpSp>
+              <p:pic>
+                <p:nvPicPr>
+                  <p:cNvPr id="20" name="Picture 19"/>
+                  <p:cNvPicPr>
+                    <a:picLocks noChangeAspect="1"/>
+                  </p:cNvPicPr>
+                  <p:nvPr/>
+                </p:nvPicPr>
+                <p:blipFill>
+                  <a:blip r:embed="rId7"/>
+                  <a:stretch>
+                    <a:fillRect/>
+                  </a:stretch>
+                </p:blipFill>
+                <p:spPr>
+                  <a:xfrm>
+                    <a:off x="4734039" y="6066646"/>
+                    <a:ext cx="302061" cy="235941"/>
+                  </a:xfrm>
+                  <a:prstGeom prst="rect">
+                    <a:avLst/>
+                  </a:prstGeom>
+                </p:spPr>
+              </p:pic>
+            </p:grpSp>
             <p:pic>
               <p:nvPicPr>
-                <p:cNvPr id="12" name="Picture 11"/>
+                <p:cNvPr id="26" name="Picture 25"/>
                 <p:cNvPicPr>
                   <a:picLocks noChangeAspect="1"/>
                 </p:cNvPicPr>
                 <p:nvPr/>
               </p:nvPicPr>
               <p:blipFill>
-                <a:blip r:embed="rId3" cstate="print">
-                  <a:extLst>
-                    <a:ext uri="{28A0092B-C50C-407E-A947-70E740481C1C}">
-                      <a14:useLocalDpi xmlns:a14="http://schemas.microsoft.com/office/drawing/2010/main" val="0"/>
-                    </a:ext>
-                  </a:extLst>
-                </a:blip>
+                <a:blip r:embed="rId8"/>
                 <a:stretch>
                   <a:fillRect/>
                 </a:stretch>
               </p:blipFill>
               <p:spPr>
                 <a:xfrm>
-                  <a:off x="4079269" y="6103833"/>
-                  <a:ext cx="325640" cy="161565"/>
+                  <a:off x="3506696" y="6098817"/>
+                  <a:ext cx="334903" cy="198223"/>
                 </a:xfrm>
                 <a:prstGeom prst="rect">
                   <a:avLst/>
@@ -4158,28 +4319,235 @@
             </p:pic>
             <p:pic>
               <p:nvPicPr>
-                <p:cNvPr id="15" name="Picture 14"/>
+                <p:cNvPr id="27" name="Picture 26"/>
                 <p:cNvPicPr>
                   <a:picLocks noChangeAspect="1"/>
                 </p:cNvPicPr>
                 <p:nvPr/>
               </p:nvPicPr>
               <p:blipFill>
-                <a:blip r:embed="rId4" cstate="print">
-                  <a:extLst>
-                    <a:ext uri="{28A0092B-C50C-407E-A947-70E740481C1C}">
-                      <a14:useLocalDpi xmlns:a14="http://schemas.microsoft.com/office/drawing/2010/main" val="0"/>
-                    </a:ext>
-                  </a:extLst>
-                </a:blip>
+                <a:blip r:embed="rId9"/>
                 <a:stretch>
                   <a:fillRect/>
                 </a:stretch>
               </p:blipFill>
               <p:spPr>
                 <a:xfrm>
-                  <a:off x="5345440" y="6084945"/>
-                  <a:ext cx="280633" cy="225596"/>
+                  <a:off x="3107726" y="6098817"/>
+                  <a:ext cx="327300" cy="196986"/>
+                </a:xfrm>
+                <a:prstGeom prst="rect">
+                  <a:avLst/>
+                </a:prstGeom>
+              </p:spPr>
+            </p:pic>
+          </p:grpSp>
+          <p:grpSp>
+            <p:nvGrpSpPr>
+              <p:cNvPr id="29" name="Group 28"/>
+              <p:cNvGrpSpPr/>
+              <p:nvPr/>
+            </p:nvGrpSpPr>
+            <p:grpSpPr>
+              <a:xfrm>
+                <a:off x="7331035" y="6098817"/>
+                <a:ext cx="2738999" cy="243895"/>
+                <a:chOff x="2721075" y="6066646"/>
+                <a:chExt cx="2738999" cy="243895"/>
+              </a:xfrm>
+            </p:grpSpPr>
+            <p:grpSp>
+              <p:nvGrpSpPr>
+                <p:cNvPr id="30" name="Group 29"/>
+                <p:cNvGrpSpPr/>
+                <p:nvPr/>
+              </p:nvGrpSpPr>
+              <p:grpSpPr>
+                <a:xfrm>
+                  <a:off x="2721075" y="6066646"/>
+                  <a:ext cx="2738999" cy="243895"/>
+                  <a:chOff x="2721075" y="6066646"/>
+                  <a:chExt cx="2738999" cy="243895"/>
+                </a:xfrm>
+              </p:grpSpPr>
+              <p:grpSp>
+                <p:nvGrpSpPr>
+                  <p:cNvPr id="33" name="Group 32"/>
+                  <p:cNvGrpSpPr/>
+                  <p:nvPr/>
+                </p:nvGrpSpPr>
+                <p:grpSpPr>
+                  <a:xfrm>
+                    <a:off x="2721075" y="6083191"/>
+                    <a:ext cx="2738999" cy="227350"/>
+                    <a:chOff x="2887074" y="6083191"/>
+                    <a:chExt cx="2738999" cy="227350"/>
+                  </a:xfrm>
+                </p:grpSpPr>
+                <p:pic>
+                  <p:nvPicPr>
+                    <p:cNvPr id="35" name="Picture 34"/>
+                    <p:cNvPicPr>
+                      <a:picLocks noChangeAspect="1"/>
+                    </p:cNvPicPr>
+                    <p:nvPr/>
+                  </p:nvPicPr>
+                  <p:blipFill>
+                    <a:blip r:embed="rId3" cstate="print">
+                      <a:extLst>
+                        <a:ext uri="{28A0092B-C50C-407E-A947-70E740481C1C}">
+                          <a14:useLocalDpi xmlns:a14="http://schemas.microsoft.com/office/drawing/2010/main" val="0"/>
+                        </a:ext>
+                      </a:extLst>
+                    </a:blip>
+                    <a:stretch>
+                      <a:fillRect/>
+                    </a:stretch>
+                  </p:blipFill>
+                  <p:spPr>
+                    <a:xfrm>
+                      <a:off x="4079269" y="6103833"/>
+                      <a:ext cx="325640" cy="161565"/>
+                    </a:xfrm>
+                    <a:prstGeom prst="rect">
+                      <a:avLst/>
+                    </a:prstGeom>
+                  </p:spPr>
+                </p:pic>
+                <p:pic>
+                  <p:nvPicPr>
+                    <p:cNvPr id="36" name="Picture 35"/>
+                    <p:cNvPicPr>
+                      <a:picLocks noChangeAspect="1"/>
+                    </p:cNvPicPr>
+                    <p:nvPr/>
+                  </p:nvPicPr>
+                  <p:blipFill>
+                    <a:blip r:embed="rId4" cstate="print">
+                      <a:extLst>
+                        <a:ext uri="{28A0092B-C50C-407E-A947-70E740481C1C}">
+                          <a14:useLocalDpi xmlns:a14="http://schemas.microsoft.com/office/drawing/2010/main" val="0"/>
+                        </a:ext>
+                      </a:extLst>
+                    </a:blip>
+                    <a:stretch>
+                      <a:fillRect/>
+                    </a:stretch>
+                  </p:blipFill>
+                  <p:spPr>
+                    <a:xfrm>
+                      <a:off x="5345440" y="6084945"/>
+                      <a:ext cx="280633" cy="225596"/>
+                    </a:xfrm>
+                    <a:prstGeom prst="rect">
+                      <a:avLst/>
+                    </a:prstGeom>
+                  </p:spPr>
+                </p:pic>
+                <p:pic>
+                  <p:nvPicPr>
+                    <p:cNvPr id="37" name="Picture 36"/>
+                    <p:cNvPicPr>
+                      <a:picLocks noChangeAspect="1"/>
+                    </p:cNvPicPr>
+                    <p:nvPr/>
+                  </p:nvPicPr>
+                  <p:blipFill>
+                    <a:blip r:embed="rId5" cstate="print">
+                      <a:extLst>
+                        <a:ext uri="{28A0092B-C50C-407E-A947-70E740481C1C}">
+                          <a14:useLocalDpi xmlns:a14="http://schemas.microsoft.com/office/drawing/2010/main" val="0"/>
+                        </a:ext>
+                      </a:extLst>
+                    </a:blip>
+                    <a:stretch>
+                      <a:fillRect/>
+                    </a:stretch>
+                  </p:blipFill>
+                  <p:spPr>
+                    <a:xfrm>
+                      <a:off x="4515280" y="6084945"/>
+                      <a:ext cx="274386" cy="225596"/>
+                    </a:xfrm>
+                    <a:prstGeom prst="rect">
+                      <a:avLst/>
+                    </a:prstGeom>
+                  </p:spPr>
+                </p:pic>
+                <p:pic>
+                  <p:nvPicPr>
+                    <p:cNvPr id="38" name="Picture 37"/>
+                    <p:cNvPicPr>
+                      <a:picLocks noChangeAspect="1"/>
+                    </p:cNvPicPr>
+                    <p:nvPr/>
+                  </p:nvPicPr>
+                  <p:blipFill>
+                    <a:blip r:embed="rId6" cstate="print">
+                      <a:extLst>
+                        <a:ext uri="{28A0092B-C50C-407E-A947-70E740481C1C}">
+                          <a14:useLocalDpi xmlns:a14="http://schemas.microsoft.com/office/drawing/2010/main" val="0"/>
+                        </a:ext>
+                      </a:extLst>
+                    </a:blip>
+                    <a:stretch>
+                      <a:fillRect/>
+                    </a:stretch>
+                  </p:blipFill>
+                  <p:spPr>
+                    <a:xfrm flipH="1">
+                      <a:off x="2887074" y="6083191"/>
+                      <a:ext cx="255789" cy="218495"/>
+                    </a:xfrm>
+                    <a:prstGeom prst="rect">
+                      <a:avLst/>
+                    </a:prstGeom>
+                  </p:spPr>
+                </p:pic>
+              </p:grpSp>
+              <p:pic>
+                <p:nvPicPr>
+                  <p:cNvPr id="34" name="Picture 33"/>
+                  <p:cNvPicPr>
+                    <a:picLocks noChangeAspect="1"/>
+                  </p:cNvPicPr>
+                  <p:nvPr/>
+                </p:nvPicPr>
+                <p:blipFill>
+                  <a:blip r:embed="rId7"/>
+                  <a:stretch>
+                    <a:fillRect/>
+                  </a:stretch>
+                </p:blipFill>
+                <p:spPr>
+                  <a:xfrm>
+                    <a:off x="4734039" y="6066646"/>
+                    <a:ext cx="302061" cy="235941"/>
+                  </a:xfrm>
+                  <a:prstGeom prst="rect">
+                    <a:avLst/>
+                  </a:prstGeom>
+                </p:spPr>
+              </p:pic>
+            </p:grpSp>
+            <p:pic>
+              <p:nvPicPr>
+                <p:cNvPr id="31" name="Picture 30"/>
+                <p:cNvPicPr>
+                  <a:picLocks noChangeAspect="1"/>
+                </p:cNvPicPr>
+                <p:nvPr/>
+              </p:nvPicPr>
+              <p:blipFill>
+                <a:blip r:embed="rId8"/>
+                <a:stretch>
+                  <a:fillRect/>
+                </a:stretch>
+              </p:blipFill>
+              <p:spPr>
+                <a:xfrm>
+                  <a:off x="3506696" y="6098817"/>
+                  <a:ext cx="334903" cy="198223"/>
                 </a:xfrm>
                 <a:prstGeom prst="rect">
                   <a:avLst/>
@@ -4188,58 +4556,280 @@
             </p:pic>
             <p:pic>
               <p:nvPicPr>
-                <p:cNvPr id="17" name="Picture 16"/>
+                <p:cNvPr id="32" name="Picture 31"/>
                 <p:cNvPicPr>
                   <a:picLocks noChangeAspect="1"/>
                 </p:cNvPicPr>
                 <p:nvPr/>
               </p:nvPicPr>
               <p:blipFill>
-                <a:blip r:embed="rId5" cstate="print">
-                  <a:extLst>
-                    <a:ext uri="{28A0092B-C50C-407E-A947-70E740481C1C}">
-                      <a14:useLocalDpi xmlns:a14="http://schemas.microsoft.com/office/drawing/2010/main" val="0"/>
-                    </a:ext>
-                  </a:extLst>
-                </a:blip>
+                <a:blip r:embed="rId9"/>
                 <a:stretch>
                   <a:fillRect/>
                 </a:stretch>
               </p:blipFill>
               <p:spPr>
                 <a:xfrm>
-                  <a:off x="4515280" y="6084945"/>
-                  <a:ext cx="274386" cy="225596"/>
+                  <a:off x="3107726" y="6098817"/>
+                  <a:ext cx="327300" cy="196986"/>
                 </a:xfrm>
                 <a:prstGeom prst="rect">
                   <a:avLst/>
                 </a:prstGeom>
               </p:spPr>
             </p:pic>
+          </p:grpSp>
+        </p:grpSp>
+      </p:grpSp>
+      <p:sp>
+        <p:nvSpPr>
+          <p:cNvPr id="2" name="TextBox 1"/>
+          <p:cNvSpPr txBox="1"/>
+          <p:nvPr/>
+        </p:nvSpPr>
+        <p:spPr>
+          <a:xfrm>
+            <a:off x="320040" y="566928"/>
+            <a:ext cx="1060704" cy="369332"/>
+          </a:xfrm>
+          <a:prstGeom prst="rect">
+            <a:avLst/>
+          </a:prstGeom>
+          <a:noFill/>
+        </p:spPr>
+        <p:txBody>
+          <a:bodyPr wrap="square" rtlCol="0">
+            <a:spAutoFit/>
+          </a:bodyPr>
+          <a:lstStyle/>
+          <a:p>
+            <a:r>
+              <a:rPr lang="en-US" dirty="0" smtClean="0"/>
+              <a:t>Fig 1a-1f</a:t>
+            </a:r>
+            <a:endParaRPr lang="en-US" dirty="0"/>
+          </a:p>
+        </p:txBody>
+      </p:sp>
+      <p:grpSp>
+        <p:nvGrpSpPr>
+          <p:cNvPr id="28" name="Group 27"/>
+          <p:cNvGrpSpPr/>
+          <p:nvPr/>
+        </p:nvGrpSpPr>
+        <p:grpSpPr>
+          <a:xfrm>
+            <a:off x="2770004" y="4197096"/>
+            <a:ext cx="4901185" cy="2039112"/>
+            <a:chOff x="402796" y="1109733"/>
+            <a:chExt cx="11119716" cy="4014780"/>
+          </a:xfrm>
+        </p:grpSpPr>
+        <p:pic>
+          <p:nvPicPr>
+            <p:cNvPr id="39" name="Picture 38"/>
+            <p:cNvPicPr>
+              <a:picLocks noChangeAspect="1"/>
+            </p:cNvPicPr>
+            <p:nvPr/>
+          </p:nvPicPr>
+          <p:blipFill>
+            <a:blip r:embed="rId10"/>
+            <a:stretch>
+              <a:fillRect/>
+            </a:stretch>
+          </p:blipFill>
+          <p:spPr>
+            <a:xfrm>
+              <a:off x="402796" y="1160584"/>
+              <a:ext cx="5510030" cy="3578470"/>
+            </a:xfrm>
+            <a:prstGeom prst="rect">
+              <a:avLst/>
+            </a:prstGeom>
+          </p:spPr>
+        </p:pic>
+        <p:grpSp>
+          <p:nvGrpSpPr>
+            <p:cNvPr id="40" name="Group 39"/>
+            <p:cNvGrpSpPr/>
+            <p:nvPr/>
+          </p:nvGrpSpPr>
+          <p:grpSpPr>
+            <a:xfrm>
+              <a:off x="1211629" y="4687790"/>
+              <a:ext cx="4248393" cy="378945"/>
+              <a:chOff x="2721075" y="6066646"/>
+              <a:chExt cx="2738999" cy="243895"/>
+            </a:xfrm>
+          </p:grpSpPr>
+          <p:grpSp>
+            <p:nvGrpSpPr>
+              <p:cNvPr id="52" name="Group 51"/>
+              <p:cNvGrpSpPr/>
+              <p:nvPr/>
+            </p:nvGrpSpPr>
+            <p:grpSpPr>
+              <a:xfrm>
+                <a:off x="2721075" y="6066646"/>
+                <a:ext cx="2738999" cy="243895"/>
+                <a:chOff x="2721075" y="6066646"/>
+                <a:chExt cx="2738999" cy="243895"/>
+              </a:xfrm>
+            </p:grpSpPr>
+            <p:grpSp>
+              <p:nvGrpSpPr>
+                <p:cNvPr id="55" name="Group 54"/>
+                <p:cNvGrpSpPr/>
+                <p:nvPr/>
+              </p:nvGrpSpPr>
+              <p:grpSpPr>
+                <a:xfrm>
+                  <a:off x="2721075" y="6083191"/>
+                  <a:ext cx="2738999" cy="227350"/>
+                  <a:chOff x="2887074" y="6083191"/>
+                  <a:chExt cx="2738999" cy="227350"/>
+                </a:xfrm>
+              </p:grpSpPr>
+              <p:pic>
+                <p:nvPicPr>
+                  <p:cNvPr id="57" name="Picture 56"/>
+                  <p:cNvPicPr>
+                    <a:picLocks noChangeAspect="1"/>
+                  </p:cNvPicPr>
+                  <p:nvPr/>
+                </p:nvPicPr>
+                <p:blipFill>
+                  <a:blip r:embed="rId3" cstate="print">
+                    <a:extLst>
+                      <a:ext uri="{28A0092B-C50C-407E-A947-70E740481C1C}">
+                        <a14:useLocalDpi xmlns:a14="http://schemas.microsoft.com/office/drawing/2010/main" val="0"/>
+                      </a:ext>
+                    </a:extLst>
+                  </a:blip>
+                  <a:stretch>
+                    <a:fillRect/>
+                  </a:stretch>
+                </p:blipFill>
+                <p:spPr>
+                  <a:xfrm>
+                    <a:off x="4079269" y="6103833"/>
+                    <a:ext cx="325640" cy="161565"/>
+                  </a:xfrm>
+                  <a:prstGeom prst="rect">
+                    <a:avLst/>
+                  </a:prstGeom>
+                </p:spPr>
+              </p:pic>
+              <p:pic>
+                <p:nvPicPr>
+                  <p:cNvPr id="58" name="Picture 57"/>
+                  <p:cNvPicPr>
+                    <a:picLocks noChangeAspect="1"/>
+                  </p:cNvPicPr>
+                  <p:nvPr/>
+                </p:nvPicPr>
+                <p:blipFill>
+                  <a:blip r:embed="rId4" cstate="print">
+                    <a:extLst>
+                      <a:ext uri="{28A0092B-C50C-407E-A947-70E740481C1C}">
+                        <a14:useLocalDpi xmlns:a14="http://schemas.microsoft.com/office/drawing/2010/main" val="0"/>
+                      </a:ext>
+                    </a:extLst>
+                  </a:blip>
+                  <a:stretch>
+                    <a:fillRect/>
+                  </a:stretch>
+                </p:blipFill>
+                <p:spPr>
+                  <a:xfrm>
+                    <a:off x="5345440" y="6084945"/>
+                    <a:ext cx="280633" cy="225596"/>
+                  </a:xfrm>
+                  <a:prstGeom prst="rect">
+                    <a:avLst/>
+                  </a:prstGeom>
+                </p:spPr>
+              </p:pic>
+              <p:pic>
+                <p:nvPicPr>
+                  <p:cNvPr id="59" name="Picture 58"/>
+                  <p:cNvPicPr>
+                    <a:picLocks noChangeAspect="1"/>
+                  </p:cNvPicPr>
+                  <p:nvPr/>
+                </p:nvPicPr>
+                <p:blipFill>
+                  <a:blip r:embed="rId5" cstate="print">
+                    <a:extLst>
+                      <a:ext uri="{28A0092B-C50C-407E-A947-70E740481C1C}">
+                        <a14:useLocalDpi xmlns:a14="http://schemas.microsoft.com/office/drawing/2010/main" val="0"/>
+                      </a:ext>
+                    </a:extLst>
+                  </a:blip>
+                  <a:stretch>
+                    <a:fillRect/>
+                  </a:stretch>
+                </p:blipFill>
+                <p:spPr>
+                  <a:xfrm>
+                    <a:off x="4515280" y="6084945"/>
+                    <a:ext cx="274386" cy="225596"/>
+                  </a:xfrm>
+                  <a:prstGeom prst="rect">
+                    <a:avLst/>
+                  </a:prstGeom>
+                </p:spPr>
+              </p:pic>
+              <p:pic>
+                <p:nvPicPr>
+                  <p:cNvPr id="60" name="Picture 59"/>
+                  <p:cNvPicPr>
+                    <a:picLocks noChangeAspect="1"/>
+                  </p:cNvPicPr>
+                  <p:nvPr/>
+                </p:nvPicPr>
+                <p:blipFill>
+                  <a:blip r:embed="rId6" cstate="print">
+                    <a:extLst>
+                      <a:ext uri="{28A0092B-C50C-407E-A947-70E740481C1C}">
+                        <a14:useLocalDpi xmlns:a14="http://schemas.microsoft.com/office/drawing/2010/main" val="0"/>
+                      </a:ext>
+                    </a:extLst>
+                  </a:blip>
+                  <a:stretch>
+                    <a:fillRect/>
+                  </a:stretch>
+                </p:blipFill>
+                <p:spPr>
+                  <a:xfrm flipH="1">
+                    <a:off x="2887074" y="6083191"/>
+                    <a:ext cx="255789" cy="218495"/>
+                  </a:xfrm>
+                  <a:prstGeom prst="rect">
+                    <a:avLst/>
+                  </a:prstGeom>
+                </p:spPr>
+              </p:pic>
+            </p:grpSp>
             <p:pic>
               <p:nvPicPr>
-                <p:cNvPr id="18" name="Picture 17"/>
+                <p:cNvPr id="56" name="Picture 55"/>
                 <p:cNvPicPr>
                   <a:picLocks noChangeAspect="1"/>
                 </p:cNvPicPr>
                 <p:nvPr/>
               </p:nvPicPr>
               <p:blipFill>
-                <a:blip r:embed="rId6" cstate="print">
-                  <a:extLst>
-                    <a:ext uri="{28A0092B-C50C-407E-A947-70E740481C1C}">
-                      <a14:useLocalDpi xmlns:a14="http://schemas.microsoft.com/office/drawing/2010/main" val="0"/>
-                    </a:ext>
-                  </a:extLst>
-                </a:blip>
+                <a:blip r:embed="rId7"/>
                 <a:stretch>
                   <a:fillRect/>
                 </a:stretch>
               </p:blipFill>
               <p:spPr>
-                <a:xfrm flipH="1">
-                  <a:off x="2887074" y="6083191"/>
-                  <a:ext cx="255789" cy="218495"/>
+                <a:xfrm>
+                  <a:off x="4734039" y="6066646"/>
+                  <a:ext cx="302061" cy="235941"/>
                 </a:xfrm>
                 <a:prstGeom prst="rect">
                   <a:avLst/>
@@ -4249,22 +4839,283 @@
           </p:grpSp>
           <p:pic>
             <p:nvPicPr>
-              <p:cNvPr id="20" name="Picture 19"/>
+              <p:cNvPr id="53" name="Picture 52"/>
               <p:cNvPicPr>
                 <a:picLocks noChangeAspect="1"/>
               </p:cNvPicPr>
               <p:nvPr/>
             </p:nvPicPr>
             <p:blipFill>
-              <a:blip r:embed="rId7"/>
+              <a:blip r:embed="rId8"/>
               <a:stretch>
                 <a:fillRect/>
               </a:stretch>
             </p:blipFill>
             <p:spPr>
               <a:xfrm>
-                <a:off x="4734039" y="6066646"/>
-                <a:ext cx="302061" cy="235941"/>
+                <a:off x="3506696" y="6098817"/>
+                <a:ext cx="334903" cy="198223"/>
+              </a:xfrm>
+              <a:prstGeom prst="rect">
+                <a:avLst/>
+              </a:prstGeom>
+            </p:spPr>
+          </p:pic>
+          <p:pic>
+            <p:nvPicPr>
+              <p:cNvPr id="54" name="Picture 53"/>
+              <p:cNvPicPr>
+                <a:picLocks noChangeAspect="1"/>
+              </p:cNvPicPr>
+              <p:nvPr/>
+            </p:nvPicPr>
+            <p:blipFill>
+              <a:blip r:embed="rId9"/>
+              <a:stretch>
+                <a:fillRect/>
+              </a:stretch>
+            </p:blipFill>
+            <p:spPr>
+              <a:xfrm>
+                <a:off x="3107726" y="6098817"/>
+                <a:ext cx="327300" cy="196986"/>
+              </a:xfrm>
+              <a:prstGeom prst="rect">
+                <a:avLst/>
+              </a:prstGeom>
+            </p:spPr>
+          </p:pic>
+        </p:grpSp>
+        <p:grpSp>
+          <p:nvGrpSpPr>
+            <p:cNvPr id="41" name="Group 40"/>
+            <p:cNvGrpSpPr/>
+            <p:nvPr/>
+          </p:nvGrpSpPr>
+          <p:grpSpPr>
+            <a:xfrm>
+              <a:off x="6788883" y="4745568"/>
+              <a:ext cx="4248393" cy="378945"/>
+              <a:chOff x="2721075" y="6066646"/>
+              <a:chExt cx="2738999" cy="243895"/>
+            </a:xfrm>
+          </p:grpSpPr>
+          <p:grpSp>
+            <p:nvGrpSpPr>
+              <p:cNvPr id="43" name="Group 42"/>
+              <p:cNvGrpSpPr/>
+              <p:nvPr/>
+            </p:nvGrpSpPr>
+            <p:grpSpPr>
+              <a:xfrm>
+                <a:off x="2721075" y="6066646"/>
+                <a:ext cx="2738999" cy="243895"/>
+                <a:chOff x="2721075" y="6066646"/>
+                <a:chExt cx="2738999" cy="243895"/>
+              </a:xfrm>
+            </p:grpSpPr>
+            <p:grpSp>
+              <p:nvGrpSpPr>
+                <p:cNvPr id="46" name="Group 45"/>
+                <p:cNvGrpSpPr/>
+                <p:nvPr/>
+              </p:nvGrpSpPr>
+              <p:grpSpPr>
+                <a:xfrm>
+                  <a:off x="2721075" y="6083191"/>
+                  <a:ext cx="2738999" cy="227350"/>
+                  <a:chOff x="2887074" y="6083191"/>
+                  <a:chExt cx="2738999" cy="227350"/>
+                </a:xfrm>
+              </p:grpSpPr>
+              <p:pic>
+                <p:nvPicPr>
+                  <p:cNvPr id="48" name="Picture 47"/>
+                  <p:cNvPicPr>
+                    <a:picLocks noChangeAspect="1"/>
+                  </p:cNvPicPr>
+                  <p:nvPr/>
+                </p:nvPicPr>
+                <p:blipFill>
+                  <a:blip r:embed="rId3" cstate="print">
+                    <a:extLst>
+                      <a:ext uri="{28A0092B-C50C-407E-A947-70E740481C1C}">
+                        <a14:useLocalDpi xmlns:a14="http://schemas.microsoft.com/office/drawing/2010/main" val="0"/>
+                      </a:ext>
+                    </a:extLst>
+                  </a:blip>
+                  <a:stretch>
+                    <a:fillRect/>
+                  </a:stretch>
+                </p:blipFill>
+                <p:spPr>
+                  <a:xfrm>
+                    <a:off x="4079269" y="6103833"/>
+                    <a:ext cx="325640" cy="161565"/>
+                  </a:xfrm>
+                  <a:prstGeom prst="rect">
+                    <a:avLst/>
+                  </a:prstGeom>
+                </p:spPr>
+              </p:pic>
+              <p:pic>
+                <p:nvPicPr>
+                  <p:cNvPr id="49" name="Picture 48"/>
+                  <p:cNvPicPr>
+                    <a:picLocks noChangeAspect="1"/>
+                  </p:cNvPicPr>
+                  <p:nvPr/>
+                </p:nvPicPr>
+                <p:blipFill>
+                  <a:blip r:embed="rId4" cstate="print">
+                    <a:extLst>
+                      <a:ext uri="{28A0092B-C50C-407E-A947-70E740481C1C}">
+                        <a14:useLocalDpi xmlns:a14="http://schemas.microsoft.com/office/drawing/2010/main" val="0"/>
+                      </a:ext>
+                    </a:extLst>
+                  </a:blip>
+                  <a:stretch>
+                    <a:fillRect/>
+                  </a:stretch>
+                </p:blipFill>
+                <p:spPr>
+                  <a:xfrm>
+                    <a:off x="5345440" y="6084945"/>
+                    <a:ext cx="280633" cy="225596"/>
+                  </a:xfrm>
+                  <a:prstGeom prst="rect">
+                    <a:avLst/>
+                  </a:prstGeom>
+                </p:spPr>
+              </p:pic>
+              <p:pic>
+                <p:nvPicPr>
+                  <p:cNvPr id="50" name="Picture 49"/>
+                  <p:cNvPicPr>
+                    <a:picLocks noChangeAspect="1"/>
+                  </p:cNvPicPr>
+                  <p:nvPr/>
+                </p:nvPicPr>
+                <p:blipFill>
+                  <a:blip r:embed="rId5" cstate="print">
+                    <a:extLst>
+                      <a:ext uri="{28A0092B-C50C-407E-A947-70E740481C1C}">
+                        <a14:useLocalDpi xmlns:a14="http://schemas.microsoft.com/office/drawing/2010/main" val="0"/>
+                      </a:ext>
+                    </a:extLst>
+                  </a:blip>
+                  <a:stretch>
+                    <a:fillRect/>
+                  </a:stretch>
+                </p:blipFill>
+                <p:spPr>
+                  <a:xfrm>
+                    <a:off x="4515280" y="6084945"/>
+                    <a:ext cx="274386" cy="225596"/>
+                  </a:xfrm>
+                  <a:prstGeom prst="rect">
+                    <a:avLst/>
+                  </a:prstGeom>
+                </p:spPr>
+              </p:pic>
+              <p:pic>
+                <p:nvPicPr>
+                  <p:cNvPr id="51" name="Picture 50"/>
+                  <p:cNvPicPr>
+                    <a:picLocks noChangeAspect="1"/>
+                  </p:cNvPicPr>
+                  <p:nvPr/>
+                </p:nvPicPr>
+                <p:blipFill>
+                  <a:blip r:embed="rId6" cstate="print">
+                    <a:extLst>
+                      <a:ext uri="{28A0092B-C50C-407E-A947-70E740481C1C}">
+                        <a14:useLocalDpi xmlns:a14="http://schemas.microsoft.com/office/drawing/2010/main" val="0"/>
+                      </a:ext>
+                    </a:extLst>
+                  </a:blip>
+                  <a:stretch>
+                    <a:fillRect/>
+                  </a:stretch>
+                </p:blipFill>
+                <p:spPr>
+                  <a:xfrm flipH="1">
+                    <a:off x="2887074" y="6083191"/>
+                    <a:ext cx="255789" cy="218495"/>
+                  </a:xfrm>
+                  <a:prstGeom prst="rect">
+                    <a:avLst/>
+                  </a:prstGeom>
+                </p:spPr>
+              </p:pic>
+            </p:grpSp>
+            <p:pic>
+              <p:nvPicPr>
+                <p:cNvPr id="47" name="Picture 46"/>
+                <p:cNvPicPr>
+                  <a:picLocks noChangeAspect="1"/>
+                </p:cNvPicPr>
+                <p:nvPr/>
+              </p:nvPicPr>
+              <p:blipFill>
+                <a:blip r:embed="rId7"/>
+                <a:stretch>
+                  <a:fillRect/>
+                </a:stretch>
+              </p:blipFill>
+              <p:spPr>
+                <a:xfrm>
+                  <a:off x="4734039" y="6066646"/>
+                  <a:ext cx="302061" cy="235941"/>
+                </a:xfrm>
+                <a:prstGeom prst="rect">
+                  <a:avLst/>
+                </a:prstGeom>
+              </p:spPr>
+            </p:pic>
+          </p:grpSp>
+          <p:pic>
+            <p:nvPicPr>
+              <p:cNvPr id="44" name="Picture 43"/>
+              <p:cNvPicPr>
+                <a:picLocks noChangeAspect="1"/>
+              </p:cNvPicPr>
+              <p:nvPr/>
+            </p:nvPicPr>
+            <p:blipFill>
+              <a:blip r:embed="rId8"/>
+              <a:stretch>
+                <a:fillRect/>
+              </a:stretch>
+            </p:blipFill>
+            <p:spPr>
+              <a:xfrm>
+                <a:off x="3506696" y="6098817"/>
+                <a:ext cx="334903" cy="198223"/>
+              </a:xfrm>
+              <a:prstGeom prst="rect">
+                <a:avLst/>
+              </a:prstGeom>
+            </p:spPr>
+          </p:pic>
+          <p:pic>
+            <p:nvPicPr>
+              <p:cNvPr id="45" name="Picture 44"/>
+              <p:cNvPicPr>
+                <a:picLocks noChangeAspect="1"/>
+              </p:cNvPicPr>
+              <p:nvPr/>
+            </p:nvPicPr>
+            <p:blipFill>
+              <a:blip r:embed="rId9"/>
+              <a:stretch>
+                <a:fillRect/>
+              </a:stretch>
+            </p:blipFill>
+            <p:spPr>
+              <a:xfrm>
+                <a:off x="3107726" y="6098817"/>
+                <a:ext cx="327300" cy="196986"/>
               </a:xfrm>
               <a:prstGeom prst="rect">
                 <a:avLst/>
@@ -4274,283 +5125,22 @@
         </p:grpSp>
         <p:pic>
           <p:nvPicPr>
-            <p:cNvPr id="26" name="Picture 25"/>
+            <p:cNvPr id="42" name="Picture 41"/>
             <p:cNvPicPr>
               <a:picLocks noChangeAspect="1"/>
             </p:cNvPicPr>
             <p:nvPr/>
           </p:nvPicPr>
           <p:blipFill>
-            <a:blip r:embed="rId8"/>
+            <a:blip r:embed="rId11"/>
             <a:stretch>
               <a:fillRect/>
             </a:stretch>
           </p:blipFill>
           <p:spPr>
             <a:xfrm>
-              <a:off x="3506696" y="6098817"/>
-              <a:ext cx="334903" cy="198223"/>
-            </a:xfrm>
-            <a:prstGeom prst="rect">
-              <a:avLst/>
-            </a:prstGeom>
-          </p:spPr>
-        </p:pic>
-        <p:pic>
-          <p:nvPicPr>
-            <p:cNvPr id="27" name="Picture 26"/>
-            <p:cNvPicPr>
-              <a:picLocks noChangeAspect="1"/>
-            </p:cNvPicPr>
-            <p:nvPr/>
-          </p:nvPicPr>
-          <p:blipFill>
-            <a:blip r:embed="rId9"/>
-            <a:stretch>
-              <a:fillRect/>
-            </a:stretch>
-          </p:blipFill>
-          <p:spPr>
-            <a:xfrm>
-              <a:off x="3107726" y="6098817"/>
-              <a:ext cx="327300" cy="196986"/>
-            </a:xfrm>
-            <a:prstGeom prst="rect">
-              <a:avLst/>
-            </a:prstGeom>
-          </p:spPr>
-        </p:pic>
-      </p:grpSp>
-      <p:grpSp>
-        <p:nvGrpSpPr>
-          <p:cNvPr id="29" name="Group 28"/>
-          <p:cNvGrpSpPr/>
-          <p:nvPr/>
-        </p:nvGrpSpPr>
-        <p:grpSpPr>
-          <a:xfrm>
-            <a:off x="7331035" y="6098817"/>
-            <a:ext cx="2738999" cy="243895"/>
-            <a:chOff x="2721075" y="6066646"/>
-            <a:chExt cx="2738999" cy="243895"/>
-          </a:xfrm>
-        </p:grpSpPr>
-        <p:grpSp>
-          <p:nvGrpSpPr>
-            <p:cNvPr id="30" name="Group 29"/>
-            <p:cNvGrpSpPr/>
-            <p:nvPr/>
-          </p:nvGrpSpPr>
-          <p:grpSpPr>
-            <a:xfrm>
-              <a:off x="2721075" y="6066646"/>
-              <a:ext cx="2738999" cy="243895"/>
-              <a:chOff x="2721075" y="6066646"/>
-              <a:chExt cx="2738999" cy="243895"/>
-            </a:xfrm>
-          </p:grpSpPr>
-          <p:grpSp>
-            <p:nvGrpSpPr>
-              <p:cNvPr id="33" name="Group 32"/>
-              <p:cNvGrpSpPr/>
-              <p:nvPr/>
-            </p:nvGrpSpPr>
-            <p:grpSpPr>
-              <a:xfrm>
-                <a:off x="2721075" y="6083191"/>
-                <a:ext cx="2738999" cy="227350"/>
-                <a:chOff x="2887074" y="6083191"/>
-                <a:chExt cx="2738999" cy="227350"/>
-              </a:xfrm>
-            </p:grpSpPr>
-            <p:pic>
-              <p:nvPicPr>
-                <p:cNvPr id="35" name="Picture 34"/>
-                <p:cNvPicPr>
-                  <a:picLocks noChangeAspect="1"/>
-                </p:cNvPicPr>
-                <p:nvPr/>
-              </p:nvPicPr>
-              <p:blipFill>
-                <a:blip r:embed="rId3" cstate="print">
-                  <a:extLst>
-                    <a:ext uri="{28A0092B-C50C-407E-A947-70E740481C1C}">
-                      <a14:useLocalDpi xmlns:a14="http://schemas.microsoft.com/office/drawing/2010/main" val="0"/>
-                    </a:ext>
-                  </a:extLst>
-                </a:blip>
-                <a:stretch>
-                  <a:fillRect/>
-                </a:stretch>
-              </p:blipFill>
-              <p:spPr>
-                <a:xfrm>
-                  <a:off x="4079269" y="6103833"/>
-                  <a:ext cx="325640" cy="161565"/>
-                </a:xfrm>
-                <a:prstGeom prst="rect">
-                  <a:avLst/>
-                </a:prstGeom>
-              </p:spPr>
-            </p:pic>
-            <p:pic>
-              <p:nvPicPr>
-                <p:cNvPr id="36" name="Picture 35"/>
-                <p:cNvPicPr>
-                  <a:picLocks noChangeAspect="1"/>
-                </p:cNvPicPr>
-                <p:nvPr/>
-              </p:nvPicPr>
-              <p:blipFill>
-                <a:blip r:embed="rId4" cstate="print">
-                  <a:extLst>
-                    <a:ext uri="{28A0092B-C50C-407E-A947-70E740481C1C}">
-                      <a14:useLocalDpi xmlns:a14="http://schemas.microsoft.com/office/drawing/2010/main" val="0"/>
-                    </a:ext>
-                  </a:extLst>
-                </a:blip>
-                <a:stretch>
-                  <a:fillRect/>
-                </a:stretch>
-              </p:blipFill>
-              <p:spPr>
-                <a:xfrm>
-                  <a:off x="5345440" y="6084945"/>
-                  <a:ext cx="280633" cy="225596"/>
-                </a:xfrm>
-                <a:prstGeom prst="rect">
-                  <a:avLst/>
-                </a:prstGeom>
-              </p:spPr>
-            </p:pic>
-            <p:pic>
-              <p:nvPicPr>
-                <p:cNvPr id="37" name="Picture 36"/>
-                <p:cNvPicPr>
-                  <a:picLocks noChangeAspect="1"/>
-                </p:cNvPicPr>
-                <p:nvPr/>
-              </p:nvPicPr>
-              <p:blipFill>
-                <a:blip r:embed="rId5" cstate="print">
-                  <a:extLst>
-                    <a:ext uri="{28A0092B-C50C-407E-A947-70E740481C1C}">
-                      <a14:useLocalDpi xmlns:a14="http://schemas.microsoft.com/office/drawing/2010/main" val="0"/>
-                    </a:ext>
-                  </a:extLst>
-                </a:blip>
-                <a:stretch>
-                  <a:fillRect/>
-                </a:stretch>
-              </p:blipFill>
-              <p:spPr>
-                <a:xfrm>
-                  <a:off x="4515280" y="6084945"/>
-                  <a:ext cx="274386" cy="225596"/>
-                </a:xfrm>
-                <a:prstGeom prst="rect">
-                  <a:avLst/>
-                </a:prstGeom>
-              </p:spPr>
-            </p:pic>
-            <p:pic>
-              <p:nvPicPr>
-                <p:cNvPr id="38" name="Picture 37"/>
-                <p:cNvPicPr>
-                  <a:picLocks noChangeAspect="1"/>
-                </p:cNvPicPr>
-                <p:nvPr/>
-              </p:nvPicPr>
-              <p:blipFill>
-                <a:blip r:embed="rId6" cstate="print">
-                  <a:extLst>
-                    <a:ext uri="{28A0092B-C50C-407E-A947-70E740481C1C}">
-                      <a14:useLocalDpi xmlns:a14="http://schemas.microsoft.com/office/drawing/2010/main" val="0"/>
-                    </a:ext>
-                  </a:extLst>
-                </a:blip>
-                <a:stretch>
-                  <a:fillRect/>
-                </a:stretch>
-              </p:blipFill>
-              <p:spPr>
-                <a:xfrm flipH="1">
-                  <a:off x="2887074" y="6083191"/>
-                  <a:ext cx="255789" cy="218495"/>
-                </a:xfrm>
-                <a:prstGeom prst="rect">
-                  <a:avLst/>
-                </a:prstGeom>
-              </p:spPr>
-            </p:pic>
-          </p:grpSp>
-          <p:pic>
-            <p:nvPicPr>
-              <p:cNvPr id="34" name="Picture 33"/>
-              <p:cNvPicPr>
-                <a:picLocks noChangeAspect="1"/>
-              </p:cNvPicPr>
-              <p:nvPr/>
-            </p:nvPicPr>
-            <p:blipFill>
-              <a:blip r:embed="rId7"/>
-              <a:stretch>
-                <a:fillRect/>
-              </a:stretch>
-            </p:blipFill>
-            <p:spPr>
-              <a:xfrm>
-                <a:off x="4734039" y="6066646"/>
-                <a:ext cx="302061" cy="235941"/>
-              </a:xfrm>
-              <a:prstGeom prst="rect">
-                <a:avLst/>
-              </a:prstGeom>
-            </p:spPr>
-          </p:pic>
-        </p:grpSp>
-        <p:pic>
-          <p:nvPicPr>
-            <p:cNvPr id="31" name="Picture 30"/>
-            <p:cNvPicPr>
-              <a:picLocks noChangeAspect="1"/>
-            </p:cNvPicPr>
-            <p:nvPr/>
-          </p:nvPicPr>
-          <p:blipFill>
-            <a:blip r:embed="rId8"/>
-            <a:stretch>
-              <a:fillRect/>
-            </a:stretch>
-          </p:blipFill>
-          <p:spPr>
-            <a:xfrm>
-              <a:off x="3506696" y="6098817"/>
-              <a:ext cx="334903" cy="198223"/>
-            </a:xfrm>
-            <a:prstGeom prst="rect">
-              <a:avLst/>
-            </a:prstGeom>
-          </p:spPr>
-        </p:pic>
-        <p:pic>
-          <p:nvPicPr>
-            <p:cNvPr id="32" name="Picture 31"/>
-            <p:cNvPicPr>
-              <a:picLocks noChangeAspect="1"/>
-            </p:cNvPicPr>
-            <p:nvPr/>
-          </p:nvPicPr>
-          <p:blipFill>
-            <a:blip r:embed="rId9"/>
-            <a:stretch>
-              <a:fillRect/>
-            </a:stretch>
-          </p:blipFill>
-          <p:spPr>
-            <a:xfrm>
-              <a:off x="3107726" y="6098817"/>
-              <a:ext cx="327300" cy="196986"/>
+              <a:off x="6023991" y="1109733"/>
+              <a:ext cx="5498521" cy="3628041"/>
             </a:xfrm>
             <a:prstGeom prst="rect">
               <a:avLst/>
@@ -4588,576 +5178,9 @@
           <a:chExt cx="0" cy="0"/>
         </a:xfrm>
       </p:grpSpPr>
-      <p:grpSp>
-        <p:nvGrpSpPr>
-          <p:cNvPr id="22" name="Group 21"/>
-          <p:cNvGrpSpPr/>
-          <p:nvPr/>
-        </p:nvGrpSpPr>
-        <p:grpSpPr>
-          <a:xfrm>
-            <a:off x="402796" y="1022472"/>
-            <a:ext cx="11114026" cy="3716582"/>
-            <a:chOff x="402796" y="1022472"/>
-            <a:chExt cx="11114026" cy="3716582"/>
-          </a:xfrm>
-        </p:grpSpPr>
-        <p:pic>
-          <p:nvPicPr>
-            <p:cNvPr id="4" name="Picture 3"/>
-            <p:cNvPicPr>
-              <a:picLocks noChangeAspect="1"/>
-            </p:cNvPicPr>
-            <p:nvPr/>
-          </p:nvPicPr>
-          <p:blipFill>
-            <a:blip r:embed="rId2"/>
-            <a:stretch>
-              <a:fillRect/>
-            </a:stretch>
-          </p:blipFill>
-          <p:spPr>
-            <a:xfrm>
-              <a:off x="5975270" y="1022472"/>
-              <a:ext cx="5541552" cy="3716582"/>
-            </a:xfrm>
-            <a:prstGeom prst="rect">
-              <a:avLst/>
-            </a:prstGeom>
-          </p:spPr>
-        </p:pic>
-        <p:pic>
-          <p:nvPicPr>
-            <p:cNvPr id="5" name="Picture 4"/>
-            <p:cNvPicPr>
-              <a:picLocks noChangeAspect="1"/>
-            </p:cNvPicPr>
-            <p:nvPr/>
-          </p:nvPicPr>
-          <p:blipFill>
-            <a:blip r:embed="rId3"/>
-            <a:stretch>
-              <a:fillRect/>
-            </a:stretch>
-          </p:blipFill>
-          <p:spPr>
-            <a:xfrm>
-              <a:off x="402796" y="1160584"/>
-              <a:ext cx="5510030" cy="3578470"/>
-            </a:xfrm>
-            <a:prstGeom prst="rect">
-              <a:avLst/>
-            </a:prstGeom>
-          </p:spPr>
-        </p:pic>
-      </p:grpSp>
-      <p:grpSp>
-        <p:nvGrpSpPr>
-          <p:cNvPr id="23" name="Group 22"/>
-          <p:cNvGrpSpPr/>
-          <p:nvPr/>
-        </p:nvGrpSpPr>
-        <p:grpSpPr>
-          <a:xfrm>
-            <a:off x="1211629" y="4687790"/>
-            <a:ext cx="4248393" cy="378945"/>
-            <a:chOff x="2721075" y="6066646"/>
-            <a:chExt cx="2738999" cy="243895"/>
-          </a:xfrm>
-        </p:grpSpPr>
-        <p:grpSp>
-          <p:nvGrpSpPr>
-            <p:cNvPr id="24" name="Group 23"/>
-            <p:cNvGrpSpPr/>
-            <p:nvPr/>
-          </p:nvGrpSpPr>
-          <p:grpSpPr>
-            <a:xfrm>
-              <a:off x="2721075" y="6066646"/>
-              <a:ext cx="2738999" cy="243895"/>
-              <a:chOff x="2721075" y="6066646"/>
-              <a:chExt cx="2738999" cy="243895"/>
-            </a:xfrm>
-          </p:grpSpPr>
-          <p:grpSp>
-            <p:nvGrpSpPr>
-              <p:cNvPr id="27" name="Group 26"/>
-              <p:cNvGrpSpPr/>
-              <p:nvPr/>
-            </p:nvGrpSpPr>
-            <p:grpSpPr>
-              <a:xfrm>
-                <a:off x="2721075" y="6083191"/>
-                <a:ext cx="2738999" cy="227350"/>
-                <a:chOff x="2887074" y="6083191"/>
-                <a:chExt cx="2738999" cy="227350"/>
-              </a:xfrm>
-            </p:grpSpPr>
-            <p:pic>
-              <p:nvPicPr>
-                <p:cNvPr id="29" name="Picture 28"/>
-                <p:cNvPicPr>
-                  <a:picLocks noChangeAspect="1"/>
-                </p:cNvPicPr>
-                <p:nvPr/>
-              </p:nvPicPr>
-              <p:blipFill>
-                <a:blip r:embed="rId4" cstate="print">
-                  <a:extLst>
-                    <a:ext uri="{28A0092B-C50C-407E-A947-70E740481C1C}">
-                      <a14:useLocalDpi xmlns:a14="http://schemas.microsoft.com/office/drawing/2010/main" val="0"/>
-                    </a:ext>
-                  </a:extLst>
-                </a:blip>
-                <a:stretch>
-                  <a:fillRect/>
-                </a:stretch>
-              </p:blipFill>
-              <p:spPr>
-                <a:xfrm>
-                  <a:off x="4079269" y="6103833"/>
-                  <a:ext cx="325640" cy="161565"/>
-                </a:xfrm>
-                <a:prstGeom prst="rect">
-                  <a:avLst/>
-                </a:prstGeom>
-              </p:spPr>
-            </p:pic>
-            <p:pic>
-              <p:nvPicPr>
-                <p:cNvPr id="30" name="Picture 29"/>
-                <p:cNvPicPr>
-                  <a:picLocks noChangeAspect="1"/>
-                </p:cNvPicPr>
-                <p:nvPr/>
-              </p:nvPicPr>
-              <p:blipFill>
-                <a:blip r:embed="rId5" cstate="print">
-                  <a:extLst>
-                    <a:ext uri="{28A0092B-C50C-407E-A947-70E740481C1C}">
-                      <a14:useLocalDpi xmlns:a14="http://schemas.microsoft.com/office/drawing/2010/main" val="0"/>
-                    </a:ext>
-                  </a:extLst>
-                </a:blip>
-                <a:stretch>
-                  <a:fillRect/>
-                </a:stretch>
-              </p:blipFill>
-              <p:spPr>
-                <a:xfrm>
-                  <a:off x="5345440" y="6084945"/>
-                  <a:ext cx="280633" cy="225596"/>
-                </a:xfrm>
-                <a:prstGeom prst="rect">
-                  <a:avLst/>
-                </a:prstGeom>
-              </p:spPr>
-            </p:pic>
-            <p:pic>
-              <p:nvPicPr>
-                <p:cNvPr id="31" name="Picture 30"/>
-                <p:cNvPicPr>
-                  <a:picLocks noChangeAspect="1"/>
-                </p:cNvPicPr>
-                <p:nvPr/>
-              </p:nvPicPr>
-              <p:blipFill>
-                <a:blip r:embed="rId6" cstate="print">
-                  <a:extLst>
-                    <a:ext uri="{28A0092B-C50C-407E-A947-70E740481C1C}">
-                      <a14:useLocalDpi xmlns:a14="http://schemas.microsoft.com/office/drawing/2010/main" val="0"/>
-                    </a:ext>
-                  </a:extLst>
-                </a:blip>
-                <a:stretch>
-                  <a:fillRect/>
-                </a:stretch>
-              </p:blipFill>
-              <p:spPr>
-                <a:xfrm>
-                  <a:off x="4515280" y="6084945"/>
-                  <a:ext cx="274386" cy="225596"/>
-                </a:xfrm>
-                <a:prstGeom prst="rect">
-                  <a:avLst/>
-                </a:prstGeom>
-              </p:spPr>
-            </p:pic>
-            <p:pic>
-              <p:nvPicPr>
-                <p:cNvPr id="32" name="Picture 31"/>
-                <p:cNvPicPr>
-                  <a:picLocks noChangeAspect="1"/>
-                </p:cNvPicPr>
-                <p:nvPr/>
-              </p:nvPicPr>
-              <p:blipFill>
-                <a:blip r:embed="rId7" cstate="print">
-                  <a:extLst>
-                    <a:ext uri="{28A0092B-C50C-407E-A947-70E740481C1C}">
-                      <a14:useLocalDpi xmlns:a14="http://schemas.microsoft.com/office/drawing/2010/main" val="0"/>
-                    </a:ext>
-                  </a:extLst>
-                </a:blip>
-                <a:stretch>
-                  <a:fillRect/>
-                </a:stretch>
-              </p:blipFill>
-              <p:spPr>
-                <a:xfrm flipH="1">
-                  <a:off x="2887074" y="6083191"/>
-                  <a:ext cx="255789" cy="218495"/>
-                </a:xfrm>
-                <a:prstGeom prst="rect">
-                  <a:avLst/>
-                </a:prstGeom>
-              </p:spPr>
-            </p:pic>
-          </p:grpSp>
-          <p:pic>
-            <p:nvPicPr>
-              <p:cNvPr id="28" name="Picture 27"/>
-              <p:cNvPicPr>
-                <a:picLocks noChangeAspect="1"/>
-              </p:cNvPicPr>
-              <p:nvPr/>
-            </p:nvPicPr>
-            <p:blipFill>
-              <a:blip r:embed="rId8"/>
-              <a:stretch>
-                <a:fillRect/>
-              </a:stretch>
-            </p:blipFill>
-            <p:spPr>
-              <a:xfrm>
-                <a:off x="4734039" y="6066646"/>
-                <a:ext cx="302061" cy="235941"/>
-              </a:xfrm>
-              <a:prstGeom prst="rect">
-                <a:avLst/>
-              </a:prstGeom>
-            </p:spPr>
-          </p:pic>
-        </p:grpSp>
-        <p:pic>
-          <p:nvPicPr>
-            <p:cNvPr id="25" name="Picture 24"/>
-            <p:cNvPicPr>
-              <a:picLocks noChangeAspect="1"/>
-            </p:cNvPicPr>
-            <p:nvPr/>
-          </p:nvPicPr>
-          <p:blipFill>
-            <a:blip r:embed="rId9"/>
-            <a:stretch>
-              <a:fillRect/>
-            </a:stretch>
-          </p:blipFill>
-          <p:spPr>
-            <a:xfrm>
-              <a:off x="3506696" y="6098817"/>
-              <a:ext cx="334903" cy="198223"/>
-            </a:xfrm>
-            <a:prstGeom prst="rect">
-              <a:avLst/>
-            </a:prstGeom>
-          </p:spPr>
-        </p:pic>
-        <p:pic>
-          <p:nvPicPr>
-            <p:cNvPr id="26" name="Picture 25"/>
-            <p:cNvPicPr>
-              <a:picLocks noChangeAspect="1"/>
-            </p:cNvPicPr>
-            <p:nvPr/>
-          </p:nvPicPr>
-          <p:blipFill>
-            <a:blip r:embed="rId10"/>
-            <a:stretch>
-              <a:fillRect/>
-            </a:stretch>
-          </p:blipFill>
-          <p:spPr>
-            <a:xfrm>
-              <a:off x="3107726" y="6098817"/>
-              <a:ext cx="327300" cy="196986"/>
-            </a:xfrm>
-            <a:prstGeom prst="rect">
-              <a:avLst/>
-            </a:prstGeom>
-          </p:spPr>
-        </p:pic>
-      </p:grpSp>
-      <p:grpSp>
-        <p:nvGrpSpPr>
-          <p:cNvPr id="33" name="Group 32"/>
-          <p:cNvGrpSpPr/>
-          <p:nvPr/>
-        </p:nvGrpSpPr>
-        <p:grpSpPr>
-          <a:xfrm>
-            <a:off x="6788883" y="4745568"/>
-            <a:ext cx="4248393" cy="378945"/>
-            <a:chOff x="2721075" y="6066646"/>
-            <a:chExt cx="2738999" cy="243895"/>
-          </a:xfrm>
-        </p:grpSpPr>
-        <p:grpSp>
-          <p:nvGrpSpPr>
-            <p:cNvPr id="34" name="Group 33"/>
-            <p:cNvGrpSpPr/>
-            <p:nvPr/>
-          </p:nvGrpSpPr>
-          <p:grpSpPr>
-            <a:xfrm>
-              <a:off x="2721075" y="6066646"/>
-              <a:ext cx="2738999" cy="243895"/>
-              <a:chOff x="2721075" y="6066646"/>
-              <a:chExt cx="2738999" cy="243895"/>
-            </a:xfrm>
-          </p:grpSpPr>
-          <p:grpSp>
-            <p:nvGrpSpPr>
-              <p:cNvPr id="37" name="Group 36"/>
-              <p:cNvGrpSpPr/>
-              <p:nvPr/>
-            </p:nvGrpSpPr>
-            <p:grpSpPr>
-              <a:xfrm>
-                <a:off x="2721075" y="6083191"/>
-                <a:ext cx="2738999" cy="227350"/>
-                <a:chOff x="2887074" y="6083191"/>
-                <a:chExt cx="2738999" cy="227350"/>
-              </a:xfrm>
-            </p:grpSpPr>
-            <p:pic>
-              <p:nvPicPr>
-                <p:cNvPr id="39" name="Picture 38"/>
-                <p:cNvPicPr>
-                  <a:picLocks noChangeAspect="1"/>
-                </p:cNvPicPr>
-                <p:nvPr/>
-              </p:nvPicPr>
-              <p:blipFill>
-                <a:blip r:embed="rId4" cstate="print">
-                  <a:extLst>
-                    <a:ext uri="{28A0092B-C50C-407E-A947-70E740481C1C}">
-                      <a14:useLocalDpi xmlns:a14="http://schemas.microsoft.com/office/drawing/2010/main" val="0"/>
-                    </a:ext>
-                  </a:extLst>
-                </a:blip>
-                <a:stretch>
-                  <a:fillRect/>
-                </a:stretch>
-              </p:blipFill>
-              <p:spPr>
-                <a:xfrm>
-                  <a:off x="4079269" y="6103833"/>
-                  <a:ext cx="325640" cy="161565"/>
-                </a:xfrm>
-                <a:prstGeom prst="rect">
-                  <a:avLst/>
-                </a:prstGeom>
-              </p:spPr>
-            </p:pic>
-            <p:pic>
-              <p:nvPicPr>
-                <p:cNvPr id="40" name="Picture 39"/>
-                <p:cNvPicPr>
-                  <a:picLocks noChangeAspect="1"/>
-                </p:cNvPicPr>
-                <p:nvPr/>
-              </p:nvPicPr>
-              <p:blipFill>
-                <a:blip r:embed="rId5" cstate="print">
-                  <a:extLst>
-                    <a:ext uri="{28A0092B-C50C-407E-A947-70E740481C1C}">
-                      <a14:useLocalDpi xmlns:a14="http://schemas.microsoft.com/office/drawing/2010/main" val="0"/>
-                    </a:ext>
-                  </a:extLst>
-                </a:blip>
-                <a:stretch>
-                  <a:fillRect/>
-                </a:stretch>
-              </p:blipFill>
-              <p:spPr>
-                <a:xfrm>
-                  <a:off x="5345440" y="6084945"/>
-                  <a:ext cx="280633" cy="225596"/>
-                </a:xfrm>
-                <a:prstGeom prst="rect">
-                  <a:avLst/>
-                </a:prstGeom>
-              </p:spPr>
-            </p:pic>
-            <p:pic>
-              <p:nvPicPr>
-                <p:cNvPr id="41" name="Picture 40"/>
-                <p:cNvPicPr>
-                  <a:picLocks noChangeAspect="1"/>
-                </p:cNvPicPr>
-                <p:nvPr/>
-              </p:nvPicPr>
-              <p:blipFill>
-                <a:blip r:embed="rId6" cstate="print">
-                  <a:extLst>
-                    <a:ext uri="{28A0092B-C50C-407E-A947-70E740481C1C}">
-                      <a14:useLocalDpi xmlns:a14="http://schemas.microsoft.com/office/drawing/2010/main" val="0"/>
-                    </a:ext>
-                  </a:extLst>
-                </a:blip>
-                <a:stretch>
-                  <a:fillRect/>
-                </a:stretch>
-              </p:blipFill>
-              <p:spPr>
-                <a:xfrm>
-                  <a:off x="4515280" y="6084945"/>
-                  <a:ext cx="274386" cy="225596"/>
-                </a:xfrm>
-                <a:prstGeom prst="rect">
-                  <a:avLst/>
-                </a:prstGeom>
-              </p:spPr>
-            </p:pic>
-            <p:pic>
-              <p:nvPicPr>
-                <p:cNvPr id="42" name="Picture 41"/>
-                <p:cNvPicPr>
-                  <a:picLocks noChangeAspect="1"/>
-                </p:cNvPicPr>
-                <p:nvPr/>
-              </p:nvPicPr>
-              <p:blipFill>
-                <a:blip r:embed="rId7" cstate="print">
-                  <a:extLst>
-                    <a:ext uri="{28A0092B-C50C-407E-A947-70E740481C1C}">
-                      <a14:useLocalDpi xmlns:a14="http://schemas.microsoft.com/office/drawing/2010/main" val="0"/>
-                    </a:ext>
-                  </a:extLst>
-                </a:blip>
-                <a:stretch>
-                  <a:fillRect/>
-                </a:stretch>
-              </p:blipFill>
-              <p:spPr>
-                <a:xfrm flipH="1">
-                  <a:off x="2887074" y="6083191"/>
-                  <a:ext cx="255789" cy="218495"/>
-                </a:xfrm>
-                <a:prstGeom prst="rect">
-                  <a:avLst/>
-                </a:prstGeom>
-              </p:spPr>
-            </p:pic>
-          </p:grpSp>
-          <p:pic>
-            <p:nvPicPr>
-              <p:cNvPr id="38" name="Picture 37"/>
-              <p:cNvPicPr>
-                <a:picLocks noChangeAspect="1"/>
-              </p:cNvPicPr>
-              <p:nvPr/>
-            </p:nvPicPr>
-            <p:blipFill>
-              <a:blip r:embed="rId8"/>
-              <a:stretch>
-                <a:fillRect/>
-              </a:stretch>
-            </p:blipFill>
-            <p:spPr>
-              <a:xfrm>
-                <a:off x="4734039" y="6066646"/>
-                <a:ext cx="302061" cy="235941"/>
-              </a:xfrm>
-              <a:prstGeom prst="rect">
-                <a:avLst/>
-              </a:prstGeom>
-            </p:spPr>
-          </p:pic>
-        </p:grpSp>
-        <p:pic>
-          <p:nvPicPr>
-            <p:cNvPr id="35" name="Picture 34"/>
-            <p:cNvPicPr>
-              <a:picLocks noChangeAspect="1"/>
-            </p:cNvPicPr>
-            <p:nvPr/>
-          </p:nvPicPr>
-          <p:blipFill>
-            <a:blip r:embed="rId9"/>
-            <a:stretch>
-              <a:fillRect/>
-            </a:stretch>
-          </p:blipFill>
-          <p:spPr>
-            <a:xfrm>
-              <a:off x="3506696" y="6098817"/>
-              <a:ext cx="334903" cy="198223"/>
-            </a:xfrm>
-            <a:prstGeom prst="rect">
-              <a:avLst/>
-            </a:prstGeom>
-          </p:spPr>
-        </p:pic>
-        <p:pic>
-          <p:nvPicPr>
-            <p:cNvPr id="36" name="Picture 35"/>
-            <p:cNvPicPr>
-              <a:picLocks noChangeAspect="1"/>
-            </p:cNvPicPr>
-            <p:nvPr/>
-          </p:nvPicPr>
-          <p:blipFill>
-            <a:blip r:embed="rId10"/>
-            <a:stretch>
-              <a:fillRect/>
-            </a:stretch>
-          </p:blipFill>
-          <p:spPr>
-            <a:xfrm>
-              <a:off x="3107726" y="6098817"/>
-              <a:ext cx="327300" cy="196986"/>
-            </a:xfrm>
-            <a:prstGeom prst="rect">
-              <a:avLst/>
-            </a:prstGeom>
-          </p:spPr>
-        </p:pic>
-      </p:grpSp>
-    </p:spTree>
-    <p:extLst>
-      <p:ext uri="{BB962C8B-B14F-4D97-AF65-F5344CB8AC3E}">
-        <p14:creationId xmlns:p14="http://schemas.microsoft.com/office/powerpoint/2010/main" val="332487937"/>
-      </p:ext>
-    </p:extLst>
-  </p:cSld>
-  <p:clrMapOvr>
-    <a:masterClrMapping/>
-  </p:clrMapOvr>
-</p:sld>
-</file>
-
-<file path=ppt/slides/slide4.xml><?xml version="1.0" encoding="utf-8"?>
-<p:sld xmlns:a="http://schemas.openxmlformats.org/drawingml/2006/main" xmlns:r="http://schemas.openxmlformats.org/officeDocument/2006/relationships" xmlns:p="http://schemas.openxmlformats.org/presentationml/2006/main">
-  <p:cSld>
-    <p:spTree>
-      <p:nvGrpSpPr>
-        <p:cNvPr id="1" name=""/>
-        <p:cNvGrpSpPr/>
-        <p:nvPr/>
-      </p:nvGrpSpPr>
-      <p:grpSpPr>
-        <a:xfrm>
-          <a:off x="0" y="0"/>
-          <a:ext cx="0" cy="0"/>
-          <a:chOff x="0" y="0"/>
-          <a:chExt cx="0" cy="0"/>
-        </a:xfrm>
-      </p:grpSpPr>
       <p:pic>
         <p:nvPicPr>
-          <p:cNvPr id="5" name="Picture 4"/>
+          <p:cNvPr id="3" name="Picture 2"/>
           <p:cNvPicPr>
             <a:picLocks noChangeAspect="1"/>
           </p:cNvPicPr>
@@ -5171,7 +5194,31 @@
         </p:blipFill>
         <p:spPr>
           <a:xfrm>
-            <a:off x="2211997" y="209740"/>
+            <a:off x="5241277" y="28262"/>
+            <a:ext cx="7195457" cy="4278670"/>
+          </a:xfrm>
+          <a:prstGeom prst="rect">
+            <a:avLst/>
+          </a:prstGeom>
+        </p:spPr>
+      </p:pic>
+      <p:pic>
+        <p:nvPicPr>
+          <p:cNvPr id="5" name="Picture 4"/>
+          <p:cNvPicPr>
+            <a:picLocks noChangeAspect="1"/>
+          </p:cNvPicPr>
+          <p:nvPr/>
+        </p:nvPicPr>
+        <p:blipFill>
+          <a:blip r:embed="rId3"/>
+          <a:stretch>
+            <a:fillRect/>
+          </a:stretch>
+        </p:blipFill>
+        <p:spPr>
+          <a:xfrm>
+            <a:off x="383197" y="193318"/>
             <a:ext cx="6496050" cy="4371975"/>
           </a:xfrm>
           <a:prstGeom prst="rect">
@@ -5187,7 +5234,7 @@
         </p:nvGrpSpPr>
         <p:grpSpPr>
           <a:xfrm>
-            <a:off x="3313360" y="3945734"/>
+            <a:off x="1484560" y="3929312"/>
             <a:ext cx="5078346" cy="377620"/>
             <a:chOff x="4076090" y="5589042"/>
             <a:chExt cx="3274081" cy="243042"/>
@@ -5230,7 +5277,7 @@
                 <p:nvPr/>
               </p:nvPicPr>
               <p:blipFill>
-                <a:blip r:embed="rId3" cstate="print">
+                <a:blip r:embed="rId4" cstate="print">
                   <a:extLst>
                     <a:ext uri="{28A0092B-C50C-407E-A947-70E740481C1C}">
                       <a14:useLocalDpi xmlns:a14="http://schemas.microsoft.com/office/drawing/2010/main" val="0"/>
@@ -5260,7 +5307,7 @@
                 <p:nvPr/>
               </p:nvPicPr>
               <p:blipFill>
-                <a:blip r:embed="rId4" cstate="print">
+                <a:blip r:embed="rId5" cstate="print">
                   <a:extLst>
                     <a:ext uri="{28A0092B-C50C-407E-A947-70E740481C1C}">
                       <a14:useLocalDpi xmlns:a14="http://schemas.microsoft.com/office/drawing/2010/main" val="0"/>
@@ -5290,7 +5337,7 @@
                 <p:nvPr/>
               </p:nvPicPr>
               <p:blipFill>
-                <a:blip r:embed="rId5" cstate="print">
+                <a:blip r:embed="rId6" cstate="print">
                   <a:extLst>
                     <a:ext uri="{28A0092B-C50C-407E-A947-70E740481C1C}">
                       <a14:useLocalDpi xmlns:a14="http://schemas.microsoft.com/office/drawing/2010/main" val="0"/>
@@ -5320,7 +5367,7 @@
                 <p:nvPr/>
               </p:nvPicPr>
               <p:blipFill>
-                <a:blip r:embed="rId6" cstate="print">
+                <a:blip r:embed="rId7" cstate="print">
                   <a:extLst>
                     <a:ext uri="{28A0092B-C50C-407E-A947-70E740481C1C}">
                       <a14:useLocalDpi xmlns:a14="http://schemas.microsoft.com/office/drawing/2010/main" val="0"/>
@@ -5351,7 +5398,7 @@
               <p:nvPr/>
             </p:nvPicPr>
             <p:blipFill>
-              <a:blip r:embed="rId7"/>
+              <a:blip r:embed="rId8"/>
               <a:stretch>
                 <a:fillRect/>
               </a:stretch>
@@ -5376,7 +5423,7 @@
             <p:nvPr/>
           </p:nvPicPr>
           <p:blipFill>
-            <a:blip r:embed="rId8"/>
+            <a:blip r:embed="rId9"/>
             <a:stretch>
               <a:fillRect/>
             </a:stretch>
@@ -5400,7 +5447,7 @@
             <p:nvPr/>
           </p:nvPicPr>
           <p:blipFill>
-            <a:blip r:embed="rId9"/>
+            <a:blip r:embed="rId10"/>
             <a:stretch>
               <a:fillRect/>
             </a:stretch>
@@ -5416,10 +5463,249 @@
           </p:spPr>
         </p:pic>
       </p:grpSp>
+      <p:sp>
+        <p:nvSpPr>
+          <p:cNvPr id="4" name="TextBox 3"/>
+          <p:cNvSpPr txBox="1"/>
+          <p:nvPr/>
+        </p:nvSpPr>
+        <p:spPr>
+          <a:xfrm>
+            <a:off x="8120918" y="4290856"/>
+            <a:ext cx="2697480" cy="369332"/>
+          </a:xfrm>
+          <a:prstGeom prst="rect">
+            <a:avLst/>
+          </a:prstGeom>
+          <a:noFill/>
+        </p:spPr>
+        <p:txBody>
+          <a:bodyPr wrap="square" rtlCol="0">
+            <a:spAutoFit/>
+          </a:bodyPr>
+          <a:lstStyle/>
+          <a:p>
+            <a:r>
+              <a:rPr lang="en-US" dirty="0" smtClean="0"/>
+              <a:t>Check colors, grid print?</a:t>
+            </a:r>
+            <a:endParaRPr lang="en-US" dirty="0"/>
+          </a:p>
+        </p:txBody>
+      </p:sp>
+      <p:sp>
+        <p:nvSpPr>
+          <p:cNvPr id="17" name="TextBox 16"/>
+          <p:cNvSpPr txBox="1"/>
+          <p:nvPr/>
+        </p:nvSpPr>
+        <p:spPr>
+          <a:xfrm>
+            <a:off x="228600" y="193318"/>
+            <a:ext cx="1060704" cy="369332"/>
+          </a:xfrm>
+          <a:prstGeom prst="rect">
+            <a:avLst/>
+          </a:prstGeom>
+          <a:noFill/>
+        </p:spPr>
+        <p:txBody>
+          <a:bodyPr wrap="square" rtlCol="0">
+            <a:spAutoFit/>
+          </a:bodyPr>
+          <a:lstStyle/>
+          <a:p>
+            <a:r>
+              <a:rPr lang="en-US" dirty="0" smtClean="0"/>
+              <a:t>Fig 2a-2b</a:t>
+            </a:r>
+          </a:p>
+        </p:txBody>
+      </p:sp>
+      <p:pic>
+        <p:nvPicPr>
+          <p:cNvPr id="6" name="Picture 5"/>
+          <p:cNvPicPr>
+            <a:picLocks noChangeAspect="1"/>
+          </p:cNvPicPr>
+          <p:nvPr/>
+        </p:nvPicPr>
+        <p:blipFill>
+          <a:blip r:embed="rId11"/>
+          <a:stretch>
+            <a:fillRect/>
+          </a:stretch>
+        </p:blipFill>
+        <p:spPr>
+          <a:xfrm>
+            <a:off x="7569032" y="4650754"/>
+            <a:ext cx="3441278" cy="2046304"/>
+          </a:xfrm>
+          <a:prstGeom prst="rect">
+            <a:avLst/>
+          </a:prstGeom>
+        </p:spPr>
+      </p:pic>
     </p:spTree>
     <p:extLst>
       <p:ext uri="{BB962C8B-B14F-4D97-AF65-F5344CB8AC3E}">
         <p14:creationId xmlns:p14="http://schemas.microsoft.com/office/powerpoint/2010/main" val="22137957"/>
+      </p:ext>
+    </p:extLst>
+  </p:cSld>
+  <p:clrMapOvr>
+    <a:masterClrMapping/>
+  </p:clrMapOvr>
+</p:sld>
+</file>
+
+<file path=ppt/slides/slide4.xml><?xml version="1.0" encoding="utf-8"?>
+<p:sld xmlns:a="http://schemas.openxmlformats.org/drawingml/2006/main" xmlns:r="http://schemas.openxmlformats.org/officeDocument/2006/relationships" xmlns:p="http://schemas.openxmlformats.org/presentationml/2006/main">
+  <p:cSld>
+    <p:spTree>
+      <p:nvGrpSpPr>
+        <p:cNvPr id="1" name=""/>
+        <p:cNvGrpSpPr/>
+        <p:nvPr/>
+      </p:nvGrpSpPr>
+      <p:grpSpPr>
+        <a:xfrm>
+          <a:off x="0" y="0"/>
+          <a:ext cx="0" cy="0"/>
+          <a:chOff x="0" y="0"/>
+          <a:chExt cx="0" cy="0"/>
+        </a:xfrm>
+      </p:grpSpPr>
+      <p:sp>
+        <p:nvSpPr>
+          <p:cNvPr id="6" name="Rectangle 5"/>
+          <p:cNvSpPr/>
+          <p:nvPr/>
+        </p:nvSpPr>
+        <p:spPr>
+          <a:xfrm>
+            <a:off x="1432687" y="4348079"/>
+            <a:ext cx="8805672" cy="646331"/>
+          </a:xfrm>
+          <a:prstGeom prst="rect">
+            <a:avLst/>
+          </a:prstGeom>
+        </p:spPr>
+        <p:txBody>
+          <a:bodyPr wrap="square">
+            <a:spAutoFit/>
+          </a:bodyPr>
+          <a:lstStyle/>
+          <a:p>
+            <a:r>
+              <a:rPr lang="en-US" dirty="0"/>
+              <a:t>Figures 3a, 3b. Proportion of transient and core species by </a:t>
+            </a:r>
+            <a:r>
+              <a:rPr lang="en-US" dirty="0" smtClean="0"/>
+              <a:t>log of community </a:t>
+            </a:r>
+            <a:r>
+              <a:rPr lang="en-US" dirty="0"/>
+              <a:t>size </a:t>
+            </a:r>
+            <a:r>
+              <a:rPr lang="en-US" dirty="0" smtClean="0"/>
+              <a:t>(number of individuals), </a:t>
+            </a:r>
+            <a:r>
+              <a:rPr lang="en-US" dirty="0"/>
+              <a:t>colored by taxa, using the hierarchically scaled datasets.</a:t>
+            </a:r>
+          </a:p>
+        </p:txBody>
+      </p:sp>
+      <p:pic>
+        <p:nvPicPr>
+          <p:cNvPr id="2" name="Picture 1"/>
+          <p:cNvPicPr>
+            <a:picLocks noChangeAspect="1"/>
+          </p:cNvPicPr>
+          <p:nvPr/>
+        </p:nvPicPr>
+        <p:blipFill>
+          <a:blip r:embed="rId2"/>
+          <a:stretch>
+            <a:fillRect/>
+          </a:stretch>
+        </p:blipFill>
+        <p:spPr>
+          <a:xfrm>
+            <a:off x="717175" y="457200"/>
+            <a:ext cx="4870189" cy="3763328"/>
+          </a:xfrm>
+          <a:prstGeom prst="rect">
+            <a:avLst/>
+          </a:prstGeom>
+        </p:spPr>
+      </p:pic>
+      <p:sp>
+        <p:nvSpPr>
+          <p:cNvPr id="7" name="TextBox 6"/>
+          <p:cNvSpPr txBox="1"/>
+          <p:nvPr/>
+        </p:nvSpPr>
+        <p:spPr>
+          <a:xfrm>
+            <a:off x="5675502" y="1316736"/>
+            <a:ext cx="1264793" cy="830997"/>
+          </a:xfrm>
+          <a:prstGeom prst="rect">
+            <a:avLst/>
+          </a:prstGeom>
+          <a:noFill/>
+        </p:spPr>
+        <p:txBody>
+          <a:bodyPr wrap="square" rtlCol="0">
+            <a:spAutoFit/>
+          </a:bodyPr>
+          <a:lstStyle/>
+          <a:p>
+            <a:pPr algn="ctr"/>
+            <a:r>
+              <a:rPr lang="en-US" sz="1200" dirty="0" smtClean="0">
+                <a:solidFill>
+                  <a:srgbClr val="FF0000"/>
+                </a:solidFill>
+              </a:rPr>
+              <a:t>% area</a:t>
+            </a:r>
+          </a:p>
+          <a:p>
+            <a:pPr algn="ctr"/>
+            <a:r>
+              <a:rPr lang="en-US" sz="1200" dirty="0" smtClean="0">
+                <a:solidFill>
+                  <a:srgbClr val="FF0000"/>
+                </a:solidFill>
+              </a:rPr>
+              <a:t>Currently </a:t>
+            </a:r>
+            <a:r>
+              <a:rPr lang="en-US" sz="1200" dirty="0" smtClean="0">
+                <a:solidFill>
+                  <a:srgbClr val="FF0000"/>
+                </a:solidFill>
+              </a:rPr>
+              <a:t>only have smallest sampling grain</a:t>
+            </a:r>
+            <a:endParaRPr lang="en-US" sz="1200" dirty="0">
+              <a:solidFill>
+                <a:srgbClr val="FF0000"/>
+              </a:solidFill>
+            </a:endParaRPr>
+          </a:p>
+        </p:txBody>
+      </p:sp>
+    </p:spTree>
+    <p:extLst>
+      <p:ext uri="{BB962C8B-B14F-4D97-AF65-F5344CB8AC3E}">
+        <p14:creationId xmlns:p14="http://schemas.microsoft.com/office/powerpoint/2010/main" val="3027971906"/>
       </p:ext>
     </p:extLst>
   </p:cSld>
@@ -5446,6 +5732,78 @@
           <a:chExt cx="0" cy="0"/>
         </a:xfrm>
       </p:grpSpPr>
+      <p:sp>
+        <p:nvSpPr>
+          <p:cNvPr id="2" name="Title 1"/>
+          <p:cNvSpPr>
+            <a:spLocks noGrp="1"/>
+          </p:cNvSpPr>
+          <p:nvPr>
+            <p:ph type="title"/>
+          </p:nvPr>
+        </p:nvSpPr>
+        <p:spPr/>
+        <p:txBody>
+          <a:bodyPr/>
+          <a:lstStyle/>
+          <a:p>
+            <a:r>
+              <a:rPr lang="en-US" dirty="0" smtClean="0"/>
+              <a:t>Fig 4a – 4d</a:t>
+            </a:r>
+            <a:endParaRPr lang="en-US" dirty="0"/>
+          </a:p>
+        </p:txBody>
+      </p:sp>
+      <p:sp>
+        <p:nvSpPr>
+          <p:cNvPr id="3" name="Content Placeholder 2"/>
+          <p:cNvSpPr>
+            <a:spLocks noGrp="1"/>
+          </p:cNvSpPr>
+          <p:nvPr>
+            <p:ph idx="1"/>
+          </p:nvPr>
+        </p:nvSpPr>
+        <p:spPr/>
+        <p:txBody>
+          <a:bodyPr/>
+          <a:lstStyle/>
+          <a:p>
+            <a:endParaRPr lang="en-US"/>
+          </a:p>
+        </p:txBody>
+      </p:sp>
+    </p:spTree>
+    <p:extLst>
+      <p:ext uri="{BB962C8B-B14F-4D97-AF65-F5344CB8AC3E}">
+        <p14:creationId xmlns:p14="http://schemas.microsoft.com/office/powerpoint/2010/main" val="3384467380"/>
+      </p:ext>
+    </p:extLst>
+  </p:cSld>
+  <p:clrMapOvr>
+    <a:masterClrMapping/>
+  </p:clrMapOvr>
+</p:sld>
+</file>
+
+<file path=ppt/slides/slide6.xml><?xml version="1.0" encoding="utf-8"?>
+<p:sld xmlns:a="http://schemas.openxmlformats.org/drawingml/2006/main" xmlns:r="http://schemas.openxmlformats.org/officeDocument/2006/relationships" xmlns:p="http://schemas.openxmlformats.org/presentationml/2006/main">
+  <p:cSld>
+    <p:spTree>
+      <p:nvGrpSpPr>
+        <p:cNvPr id="1" name=""/>
+        <p:cNvGrpSpPr/>
+        <p:nvPr/>
+      </p:nvGrpSpPr>
+      <p:grpSpPr>
+        <a:xfrm>
+          <a:off x="0" y="0"/>
+          <a:ext cx="0" cy="0"/>
+          <a:chOff x="0" y="0"/>
+          <a:chExt cx="0" cy="0"/>
+        </a:xfrm>
+      </p:grpSpPr>
       <p:grpSp>
         <p:nvGrpSpPr>
           <p:cNvPr id="8" name="Group 7"/>
@@ -5454,8 +5812,8 @@
         </p:nvGrpSpPr>
         <p:grpSpPr>
           <a:xfrm>
-            <a:off x="97985" y="1201890"/>
-            <a:ext cx="11908632" cy="4320831"/>
+            <a:off x="0" y="1201890"/>
+            <a:ext cx="12006617" cy="4320831"/>
             <a:chOff x="97985" y="1201890"/>
             <a:chExt cx="11908632" cy="4320831"/>
           </a:xfrm>

</xml_diff>

<commit_message>
working on colors for 2b
</commit_message>
<xml_diff>
--- a/output/plots/Presentation1.pptx
+++ b/output/plots/Presentation1.pptx
@@ -5,15 +5,17 @@
     <p:sldMasterId id="2147483648" r:id="rId1"/>
   </p:sldMasterIdLst>
   <p:notesMasterIdLst>
-    <p:notesMasterId r:id="rId8"/>
+    <p:notesMasterId r:id="rId10"/>
   </p:notesMasterIdLst>
   <p:sldIdLst>
     <p:sldId id="258" r:id="rId2"/>
     <p:sldId id="257" r:id="rId3"/>
     <p:sldId id="260" r:id="rId4"/>
     <p:sldId id="262" r:id="rId5"/>
-    <p:sldId id="261" r:id="rId6"/>
-    <p:sldId id="256" r:id="rId7"/>
+    <p:sldId id="263" r:id="rId6"/>
+    <p:sldId id="264" r:id="rId7"/>
+    <p:sldId id="261" r:id="rId8"/>
+    <p:sldId id="256" r:id="rId9"/>
   </p:sldIdLst>
   <p:sldSz cx="12192000" cy="6858000"/>
   <p:notesSz cx="6858000" cy="9144000"/>
@@ -202,7 +204,7 @@
           <a:p>
             <a:fld id="{7FA21820-D199-4D82-91AF-C50B1D3B111A}" type="datetimeFigureOut">
               <a:rPr lang="en-US" smtClean="0"/>
-              <a:t>2/2/2017</a:t>
+              <a:t>2/21/2017</a:t>
             </a:fld>
             <a:endParaRPr lang="en-US"/>
           </a:p>
@@ -816,7 +818,7 @@
           <a:p>
             <a:fld id="{916B8C92-D5E3-4480-8685-D57BEE386DE2}" type="datetimeFigureOut">
               <a:rPr lang="en-US" smtClean="0"/>
-              <a:t>2/2/2017</a:t>
+              <a:t>2/21/2017</a:t>
             </a:fld>
             <a:endParaRPr lang="en-US"/>
           </a:p>
@@ -986,7 +988,7 @@
           <a:p>
             <a:fld id="{916B8C92-D5E3-4480-8685-D57BEE386DE2}" type="datetimeFigureOut">
               <a:rPr lang="en-US" smtClean="0"/>
-              <a:t>2/2/2017</a:t>
+              <a:t>2/21/2017</a:t>
             </a:fld>
             <a:endParaRPr lang="en-US"/>
           </a:p>
@@ -1166,7 +1168,7 @@
           <a:p>
             <a:fld id="{916B8C92-D5E3-4480-8685-D57BEE386DE2}" type="datetimeFigureOut">
               <a:rPr lang="en-US" smtClean="0"/>
-              <a:t>2/2/2017</a:t>
+              <a:t>2/21/2017</a:t>
             </a:fld>
             <a:endParaRPr lang="en-US"/>
           </a:p>
@@ -1336,7 +1338,7 @@
           <a:p>
             <a:fld id="{916B8C92-D5E3-4480-8685-D57BEE386DE2}" type="datetimeFigureOut">
               <a:rPr lang="en-US" smtClean="0"/>
-              <a:t>2/2/2017</a:t>
+              <a:t>2/21/2017</a:t>
             </a:fld>
             <a:endParaRPr lang="en-US"/>
           </a:p>
@@ -1582,7 +1584,7 @@
           <a:p>
             <a:fld id="{916B8C92-D5E3-4480-8685-D57BEE386DE2}" type="datetimeFigureOut">
               <a:rPr lang="en-US" smtClean="0"/>
-              <a:t>2/2/2017</a:t>
+              <a:t>2/21/2017</a:t>
             </a:fld>
             <a:endParaRPr lang="en-US"/>
           </a:p>
@@ -1814,7 +1816,7 @@
           <a:p>
             <a:fld id="{916B8C92-D5E3-4480-8685-D57BEE386DE2}" type="datetimeFigureOut">
               <a:rPr lang="en-US" smtClean="0"/>
-              <a:t>2/2/2017</a:t>
+              <a:t>2/21/2017</a:t>
             </a:fld>
             <a:endParaRPr lang="en-US"/>
           </a:p>
@@ -2181,7 +2183,7 @@
           <a:p>
             <a:fld id="{916B8C92-D5E3-4480-8685-D57BEE386DE2}" type="datetimeFigureOut">
               <a:rPr lang="en-US" smtClean="0"/>
-              <a:t>2/2/2017</a:t>
+              <a:t>2/21/2017</a:t>
             </a:fld>
             <a:endParaRPr lang="en-US"/>
           </a:p>
@@ -2299,7 +2301,7 @@
           <a:p>
             <a:fld id="{916B8C92-D5E3-4480-8685-D57BEE386DE2}" type="datetimeFigureOut">
               <a:rPr lang="en-US" smtClean="0"/>
-              <a:t>2/2/2017</a:t>
+              <a:t>2/21/2017</a:t>
             </a:fld>
             <a:endParaRPr lang="en-US"/>
           </a:p>
@@ -2394,7 +2396,7 @@
           <a:p>
             <a:fld id="{916B8C92-D5E3-4480-8685-D57BEE386DE2}" type="datetimeFigureOut">
               <a:rPr lang="en-US" smtClean="0"/>
-              <a:t>2/2/2017</a:t>
+              <a:t>2/21/2017</a:t>
             </a:fld>
             <a:endParaRPr lang="en-US"/>
           </a:p>
@@ -2671,7 +2673,7 @@
           <a:p>
             <a:fld id="{916B8C92-D5E3-4480-8685-D57BEE386DE2}" type="datetimeFigureOut">
               <a:rPr lang="en-US" smtClean="0"/>
-              <a:t>2/2/2017</a:t>
+              <a:t>2/21/2017</a:t>
             </a:fld>
             <a:endParaRPr lang="en-US"/>
           </a:p>
@@ -2924,7 +2926,7 @@
           <a:p>
             <a:fld id="{916B8C92-D5E3-4480-8685-D57BEE386DE2}" type="datetimeFigureOut">
               <a:rPr lang="en-US" smtClean="0"/>
-              <a:t>2/2/2017</a:t>
+              <a:t>2/21/2017</a:t>
             </a:fld>
             <a:endParaRPr lang="en-US"/>
           </a:p>
@@ -3137,7 +3139,7 @@
           <a:p>
             <a:fld id="{916B8C92-D5E3-4480-8685-D57BEE386DE2}" type="datetimeFigureOut">
               <a:rPr lang="en-US" smtClean="0"/>
-              <a:t>2/2/2017</a:t>
+              <a:t>2/21/2017</a:t>
             </a:fld>
             <a:endParaRPr lang="en-US"/>
           </a:p>
@@ -5186,16 +5188,15 @@
           </p:cNvPicPr>
           <p:nvPr/>
         </p:nvPicPr>
-        <p:blipFill>
+        <p:blipFill rotWithShape="1">
           <a:blip r:embed="rId2"/>
-          <a:stretch>
-            <a:fillRect/>
-          </a:stretch>
+          <a:srcRect l="18987" r="6611"/>
+          <a:stretch/>
         </p:blipFill>
         <p:spPr>
           <a:xfrm>
-            <a:off x="5241277" y="28262"/>
-            <a:ext cx="7195457" cy="4278670"/>
+            <a:off x="7842741" y="5587284"/>
+            <a:ext cx="1301259" cy="1027853"/>
           </a:xfrm>
           <a:prstGeom prst="rect">
             <a:avLst/>
@@ -5538,8 +5539,32 @@
         </p:blipFill>
         <p:spPr>
           <a:xfrm>
-            <a:off x="7569032" y="4650754"/>
-            <a:ext cx="3441278" cy="2046304"/>
+            <a:off x="9144000" y="5587284"/>
+            <a:ext cx="1866310" cy="1109773"/>
+          </a:xfrm>
+          <a:prstGeom prst="rect">
+            <a:avLst/>
+          </a:prstGeom>
+        </p:spPr>
+      </p:pic>
+      <p:pic>
+        <p:nvPicPr>
+          <p:cNvPr id="2" name="Picture 1"/>
+          <p:cNvPicPr>
+            <a:picLocks noChangeAspect="1"/>
+          </p:cNvPicPr>
+          <p:nvPr/>
+        </p:nvPicPr>
+        <p:blipFill>
+          <a:blip r:embed="rId12"/>
+          <a:stretch>
+            <a:fillRect/>
+          </a:stretch>
+        </p:blipFill>
+        <p:spPr>
+          <a:xfrm>
+            <a:off x="7385722" y="193318"/>
+            <a:ext cx="3851348" cy="5067563"/>
           </a:xfrm>
           <a:prstGeom prst="rect">
             <a:avLst/>
@@ -5584,7 +5609,7 @@
         </p:nvSpPr>
         <p:spPr>
           <a:xfrm>
-            <a:off x="1432687" y="4348079"/>
+            <a:off x="1423895" y="5077841"/>
             <a:ext cx="8805672" cy="646331"/>
           </a:xfrm>
           <a:prstGeom prst="rect">
@@ -5598,31 +5623,47 @@
           <a:lstStyle/>
           <a:p>
             <a:r>
+              <a:rPr lang="en-US" dirty="0" smtClean="0"/>
+              <a:t>Figure3a. </a:t>
+            </a:r>
+            <a:r>
               <a:rPr lang="en-US" dirty="0"/>
-              <a:t>Figures 3a, 3b. Proportion of transient and core species by </a:t>
+              <a:t>Proportion of transient </a:t>
             </a:r>
             <a:r>
               <a:rPr lang="en-US" dirty="0" smtClean="0"/>
-              <a:t>log of community </a:t>
+              <a:t>species </a:t>
             </a:r>
             <a:r>
               <a:rPr lang="en-US" dirty="0"/>
-              <a:t>size </a:t>
+              <a:t>by </a:t>
             </a:r>
             <a:r>
               <a:rPr lang="en-US" dirty="0" smtClean="0"/>
-              <a:t>(number of individuals), </a:t>
+              <a:t>log of </a:t>
+            </a:r>
+            <a:r>
+              <a:rPr lang="en-US" dirty="0" smtClean="0"/>
+              <a:t>area, colored </a:t>
             </a:r>
             <a:r>
               <a:rPr lang="en-US" dirty="0"/>
-              <a:t>colored by taxa, using the hierarchically scaled datasets.</a:t>
+              <a:t>by taxa, using the hierarchically </a:t>
+            </a:r>
+            <a:r>
+              <a:rPr lang="en-US" dirty="0" smtClean="0"/>
+              <a:t>scaled count </a:t>
+            </a:r>
+            <a:r>
+              <a:rPr lang="en-US" dirty="0"/>
+              <a:t>datasets.</a:t>
             </a:r>
           </a:p>
         </p:txBody>
       </p:sp>
       <p:pic>
         <p:nvPicPr>
-          <p:cNvPr id="2" name="Picture 1"/>
+          <p:cNvPr id="5" name="Picture 4"/>
           <p:cNvPicPr>
             <a:picLocks noChangeAspect="1"/>
           </p:cNvPicPr>
@@ -5636,72 +5677,14 @@
         </p:blipFill>
         <p:spPr>
           <a:xfrm>
-            <a:off x="717175" y="457200"/>
-            <a:ext cx="4870189" cy="3763328"/>
+            <a:off x="2259624" y="270644"/>
+            <a:ext cx="6122375" cy="4807197"/>
           </a:xfrm>
           <a:prstGeom prst="rect">
             <a:avLst/>
           </a:prstGeom>
         </p:spPr>
       </p:pic>
-      <p:sp>
-        <p:nvSpPr>
-          <p:cNvPr id="7" name="TextBox 6"/>
-          <p:cNvSpPr txBox="1"/>
-          <p:nvPr/>
-        </p:nvSpPr>
-        <p:spPr>
-          <a:xfrm>
-            <a:off x="5675502" y="1316736"/>
-            <a:ext cx="1264793" cy="830997"/>
-          </a:xfrm>
-          <a:prstGeom prst="rect">
-            <a:avLst/>
-          </a:prstGeom>
-          <a:noFill/>
-        </p:spPr>
-        <p:txBody>
-          <a:bodyPr wrap="square" rtlCol="0">
-            <a:spAutoFit/>
-          </a:bodyPr>
-          <a:lstStyle/>
-          <a:p>
-            <a:pPr algn="ctr"/>
-            <a:r>
-              <a:rPr lang="en-US" sz="1200" dirty="0" smtClean="0">
-                <a:solidFill>
-                  <a:srgbClr val="FF0000"/>
-                </a:solidFill>
-              </a:rPr>
-              <a:t>% area</a:t>
-            </a:r>
-          </a:p>
-          <a:p>
-            <a:pPr algn="ctr"/>
-            <a:r>
-              <a:rPr lang="en-US" sz="1200" dirty="0" smtClean="0">
-                <a:solidFill>
-                  <a:srgbClr val="FF0000"/>
-                </a:solidFill>
-              </a:rPr>
-              <a:t>Currently </a:t>
-            </a:r>
-            <a:r>
-              <a:rPr lang="en-US" sz="1200" dirty="0" smtClean="0">
-                <a:solidFill>
-                  <a:srgbClr val="FF0000"/>
-                </a:solidFill>
-              </a:rPr>
-              <a:t>only have smallest sampling grain</a:t>
-            </a:r>
-            <a:endParaRPr lang="en-US" sz="1200" dirty="0">
-              <a:solidFill>
-                <a:srgbClr val="FF0000"/>
-              </a:solidFill>
-            </a:endParaRPr>
-          </a:p>
-        </p:txBody>
-      </p:sp>
     </p:spTree>
     <p:extLst>
       <p:ext uri="{BB962C8B-B14F-4D97-AF65-F5344CB8AC3E}">
@@ -5734,6 +5717,483 @@
       </p:grpSpPr>
       <p:sp>
         <p:nvSpPr>
+          <p:cNvPr id="6" name="Rectangle 5"/>
+          <p:cNvSpPr/>
+          <p:nvPr/>
+        </p:nvSpPr>
+        <p:spPr>
+          <a:xfrm>
+            <a:off x="1432687" y="4348079"/>
+            <a:ext cx="8805672" cy="646331"/>
+          </a:xfrm>
+          <a:prstGeom prst="rect">
+            <a:avLst/>
+          </a:prstGeom>
+        </p:spPr>
+        <p:txBody>
+          <a:bodyPr wrap="square">
+            <a:spAutoFit/>
+          </a:bodyPr>
+          <a:lstStyle/>
+          <a:p>
+            <a:r>
+              <a:rPr lang="en-US" dirty="0" smtClean="0"/>
+              <a:t>Figure3b</a:t>
+            </a:r>
+            <a:r>
+              <a:rPr lang="en-US" dirty="0"/>
+              <a:t>. Proportion of transient </a:t>
+            </a:r>
+            <a:r>
+              <a:rPr lang="en-US" dirty="0" smtClean="0"/>
+              <a:t>species </a:t>
+            </a:r>
+            <a:r>
+              <a:rPr lang="en-US" dirty="0"/>
+              <a:t>by </a:t>
+            </a:r>
+            <a:r>
+              <a:rPr lang="en-US" dirty="0" smtClean="0"/>
+              <a:t>log of community </a:t>
+            </a:r>
+            <a:r>
+              <a:rPr lang="en-US" dirty="0"/>
+              <a:t>size </a:t>
+            </a:r>
+            <a:r>
+              <a:rPr lang="en-US" dirty="0" smtClean="0"/>
+              <a:t>(number of individuals), </a:t>
+            </a:r>
+            <a:r>
+              <a:rPr lang="en-US" dirty="0"/>
+              <a:t>colored by taxa, using the hierarchically scaled </a:t>
+            </a:r>
+            <a:r>
+              <a:rPr lang="en-US" dirty="0" smtClean="0"/>
+              <a:t>count datasets</a:t>
+            </a:r>
+            <a:r>
+              <a:rPr lang="en-US" dirty="0"/>
+              <a:t>.</a:t>
+            </a:r>
+          </a:p>
+        </p:txBody>
+      </p:sp>
+      <p:pic>
+        <p:nvPicPr>
+          <p:cNvPr id="2" name="Picture 1"/>
+          <p:cNvPicPr>
+            <a:picLocks noChangeAspect="1"/>
+          </p:cNvPicPr>
+          <p:nvPr/>
+        </p:nvPicPr>
+        <p:blipFill>
+          <a:blip r:embed="rId2"/>
+          <a:stretch>
+            <a:fillRect/>
+          </a:stretch>
+        </p:blipFill>
+        <p:spPr>
+          <a:xfrm>
+            <a:off x="9601981" y="4914900"/>
+            <a:ext cx="2315845" cy="1789517"/>
+          </a:xfrm>
+          <a:prstGeom prst="rect">
+            <a:avLst/>
+          </a:prstGeom>
+        </p:spPr>
+      </p:pic>
+      <p:pic>
+        <p:nvPicPr>
+          <p:cNvPr id="3" name="Picture 2"/>
+          <p:cNvPicPr>
+            <a:picLocks noChangeAspect="1"/>
+          </p:cNvPicPr>
+          <p:nvPr/>
+        </p:nvPicPr>
+        <p:blipFill>
+          <a:blip r:embed="rId3"/>
+          <a:stretch>
+            <a:fillRect/>
+          </a:stretch>
+        </p:blipFill>
+        <p:spPr>
+          <a:xfrm>
+            <a:off x="2942406" y="95166"/>
+            <a:ext cx="5300236" cy="4252913"/>
+          </a:xfrm>
+          <a:prstGeom prst="rect">
+            <a:avLst/>
+          </a:prstGeom>
+        </p:spPr>
+      </p:pic>
+      <p:sp>
+        <p:nvSpPr>
+          <p:cNvPr id="4" name="TextBox 3"/>
+          <p:cNvSpPr txBox="1"/>
+          <p:nvPr/>
+        </p:nvSpPr>
+        <p:spPr>
+          <a:xfrm>
+            <a:off x="8765931" y="1757124"/>
+            <a:ext cx="2106154" cy="369332"/>
+          </a:xfrm>
+          <a:prstGeom prst="rect">
+            <a:avLst/>
+          </a:prstGeom>
+          <a:noFill/>
+        </p:spPr>
+        <p:txBody>
+          <a:bodyPr wrap="none" rtlCol="0">
+            <a:spAutoFit/>
+          </a:bodyPr>
+          <a:lstStyle/>
+          <a:p>
+            <a:r>
+              <a:rPr lang="en-US" dirty="0" smtClean="0"/>
+              <a:t>Count data removed</a:t>
+            </a:r>
+            <a:endParaRPr lang="en-US" dirty="0"/>
+          </a:p>
+        </p:txBody>
+      </p:sp>
+    </p:spTree>
+    <p:extLst>
+      <p:ext uri="{BB962C8B-B14F-4D97-AF65-F5344CB8AC3E}">
+        <p14:creationId xmlns:p14="http://schemas.microsoft.com/office/powerpoint/2010/main" val="2173986586"/>
+      </p:ext>
+    </p:extLst>
+  </p:cSld>
+  <p:clrMapOvr>
+    <a:masterClrMapping/>
+  </p:clrMapOvr>
+</p:sld>
+</file>
+
+<file path=ppt/slides/slide6.xml><?xml version="1.0" encoding="utf-8"?>
+<p:sld xmlns:a="http://schemas.openxmlformats.org/drawingml/2006/main" xmlns:r="http://schemas.openxmlformats.org/officeDocument/2006/relationships" xmlns:p="http://schemas.openxmlformats.org/presentationml/2006/main">
+  <p:cSld>
+    <p:spTree>
+      <p:nvGrpSpPr>
+        <p:cNvPr id="1" name=""/>
+        <p:cNvGrpSpPr/>
+        <p:nvPr/>
+      </p:nvGrpSpPr>
+      <p:grpSpPr>
+        <a:xfrm>
+          <a:off x="0" y="0"/>
+          <a:ext cx="0" cy="0"/>
+          <a:chOff x="0" y="0"/>
+          <a:chExt cx="0" cy="0"/>
+        </a:xfrm>
+      </p:grpSpPr>
+      <p:sp>
+        <p:nvSpPr>
+          <p:cNvPr id="6" name="Rectangle 5"/>
+          <p:cNvSpPr/>
+          <p:nvPr/>
+        </p:nvSpPr>
+        <p:spPr>
+          <a:xfrm>
+            <a:off x="1318816" y="4130898"/>
+            <a:ext cx="8805672" cy="369332"/>
+          </a:xfrm>
+          <a:prstGeom prst="rect">
+            <a:avLst/>
+          </a:prstGeom>
+        </p:spPr>
+        <p:txBody>
+          <a:bodyPr wrap="square">
+            <a:spAutoFit/>
+          </a:bodyPr>
+          <a:lstStyle/>
+          <a:p>
+            <a:r>
+              <a:rPr lang="en-US" dirty="0" smtClean="0"/>
+              <a:t>Figure3c. Predicted values of hierarchically scaled count datasets by taxa. </a:t>
+            </a:r>
+            <a:endParaRPr lang="en-US" dirty="0"/>
+          </a:p>
+        </p:txBody>
+      </p:sp>
+      <p:pic>
+        <p:nvPicPr>
+          <p:cNvPr id="3" name="Picture 2"/>
+          <p:cNvPicPr>
+            <a:picLocks noChangeAspect="1"/>
+          </p:cNvPicPr>
+          <p:nvPr/>
+        </p:nvPicPr>
+        <p:blipFill>
+          <a:blip r:embed="rId2"/>
+          <a:stretch>
+            <a:fillRect/>
+          </a:stretch>
+        </p:blipFill>
+        <p:spPr>
+          <a:xfrm>
+            <a:off x="1733908" y="687208"/>
+            <a:ext cx="4962133" cy="2956810"/>
+          </a:xfrm>
+          <a:prstGeom prst="rect">
+            <a:avLst/>
+          </a:prstGeom>
+        </p:spPr>
+      </p:pic>
+      <p:grpSp>
+        <p:nvGrpSpPr>
+          <p:cNvPr id="7" name="Group 6"/>
+          <p:cNvGrpSpPr/>
+          <p:nvPr/>
+        </p:nvGrpSpPr>
+        <p:grpSpPr>
+          <a:xfrm>
+            <a:off x="2170360" y="3447174"/>
+            <a:ext cx="4293483" cy="377620"/>
+            <a:chOff x="4076090" y="5589042"/>
+            <a:chExt cx="2768069" cy="243042"/>
+          </a:xfrm>
+        </p:grpSpPr>
+        <p:grpSp>
+          <p:nvGrpSpPr>
+            <p:cNvPr id="11" name="Group 10"/>
+            <p:cNvGrpSpPr/>
+            <p:nvPr/>
+          </p:nvGrpSpPr>
+          <p:grpSpPr>
+            <a:xfrm>
+              <a:off x="4076090" y="5589042"/>
+              <a:ext cx="2768069" cy="243042"/>
+              <a:chOff x="4242089" y="5589042"/>
+              <a:chExt cx="2768069" cy="243042"/>
+            </a:xfrm>
+          </p:grpSpPr>
+          <p:pic>
+            <p:nvPicPr>
+              <p:cNvPr id="13" name="Picture 12"/>
+              <p:cNvPicPr>
+                <a:picLocks noChangeAspect="1"/>
+              </p:cNvPicPr>
+              <p:nvPr/>
+            </p:nvPicPr>
+            <p:blipFill>
+              <a:blip r:embed="rId3" cstate="print">
+                <a:extLst>
+                  <a:ext uri="{28A0092B-C50C-407E-A947-70E740481C1C}">
+                    <a14:useLocalDpi xmlns:a14="http://schemas.microsoft.com/office/drawing/2010/main" val="0"/>
+                  </a:ext>
+                </a:extLst>
+              </a:blip>
+              <a:stretch>
+                <a:fillRect/>
+              </a:stretch>
+            </p:blipFill>
+            <p:spPr>
+              <a:xfrm>
+                <a:off x="4720426" y="5634952"/>
+                <a:ext cx="325640" cy="161565"/>
+              </a:xfrm>
+              <a:prstGeom prst="rect">
+                <a:avLst/>
+              </a:prstGeom>
+            </p:spPr>
+          </p:pic>
+          <p:pic>
+            <p:nvPicPr>
+              <p:cNvPr id="14" name="Picture 13"/>
+              <p:cNvPicPr>
+                <a:picLocks noChangeAspect="1"/>
+              </p:cNvPicPr>
+              <p:nvPr/>
+            </p:nvPicPr>
+            <p:blipFill>
+              <a:blip r:embed="rId4" cstate="print">
+                <a:extLst>
+                  <a:ext uri="{28A0092B-C50C-407E-A947-70E740481C1C}">
+                    <a14:useLocalDpi xmlns:a14="http://schemas.microsoft.com/office/drawing/2010/main" val="0"/>
+                  </a:ext>
+                </a:extLst>
+              </a:blip>
+              <a:stretch>
+                <a:fillRect/>
+              </a:stretch>
+            </p:blipFill>
+            <p:spPr>
+              <a:xfrm>
+                <a:off x="5202099" y="5606488"/>
+                <a:ext cx="280633" cy="225596"/>
+              </a:xfrm>
+              <a:prstGeom prst="rect">
+                <a:avLst/>
+              </a:prstGeom>
+            </p:spPr>
+          </p:pic>
+          <p:pic>
+            <p:nvPicPr>
+              <p:cNvPr id="15" name="Picture 14"/>
+              <p:cNvPicPr>
+                <a:picLocks noChangeAspect="1"/>
+              </p:cNvPicPr>
+              <p:nvPr/>
+            </p:nvPicPr>
+            <p:blipFill>
+              <a:blip r:embed="rId5" cstate="print">
+                <a:extLst>
+                  <a:ext uri="{28A0092B-C50C-407E-A947-70E740481C1C}">
+                    <a14:useLocalDpi xmlns:a14="http://schemas.microsoft.com/office/drawing/2010/main" val="0"/>
+                  </a:ext>
+                </a:extLst>
+              </a:blip>
+              <a:stretch>
+                <a:fillRect/>
+              </a:stretch>
+            </p:blipFill>
+            <p:spPr>
+              <a:xfrm>
+                <a:off x="4242089" y="5589042"/>
+                <a:ext cx="274386" cy="225596"/>
+              </a:xfrm>
+              <a:prstGeom prst="rect">
+                <a:avLst/>
+              </a:prstGeom>
+            </p:spPr>
+          </p:pic>
+          <p:pic>
+            <p:nvPicPr>
+              <p:cNvPr id="16" name="Picture 15"/>
+              <p:cNvPicPr>
+                <a:picLocks noChangeAspect="1"/>
+              </p:cNvPicPr>
+              <p:nvPr/>
+            </p:nvPicPr>
+            <p:blipFill>
+              <a:blip r:embed="rId6" cstate="print">
+                <a:extLst>
+                  <a:ext uri="{28A0092B-C50C-407E-A947-70E740481C1C}">
+                    <a14:useLocalDpi xmlns:a14="http://schemas.microsoft.com/office/drawing/2010/main" val="0"/>
+                  </a:ext>
+                </a:extLst>
+              </a:blip>
+              <a:stretch>
+                <a:fillRect/>
+              </a:stretch>
+            </p:blipFill>
+            <p:spPr>
+              <a:xfrm flipH="1">
+                <a:off x="6754369" y="5606488"/>
+                <a:ext cx="255789" cy="218495"/>
+              </a:xfrm>
+              <a:prstGeom prst="rect">
+                <a:avLst/>
+              </a:prstGeom>
+            </p:spPr>
+          </p:pic>
+        </p:grpSp>
+        <p:pic>
+          <p:nvPicPr>
+            <p:cNvPr id="9" name="Picture 8"/>
+            <p:cNvPicPr>
+              <a:picLocks noChangeAspect="1"/>
+            </p:cNvPicPr>
+            <p:nvPr/>
+          </p:nvPicPr>
+          <p:blipFill>
+            <a:blip r:embed="rId7"/>
+            <a:stretch>
+              <a:fillRect/>
+            </a:stretch>
+          </p:blipFill>
+          <p:spPr>
+            <a:xfrm>
+              <a:off x="5531841" y="5598294"/>
+              <a:ext cx="334903" cy="198223"/>
+            </a:xfrm>
+            <a:prstGeom prst="rect">
+              <a:avLst/>
+            </a:prstGeom>
+          </p:spPr>
+        </p:pic>
+        <p:pic>
+          <p:nvPicPr>
+            <p:cNvPr id="10" name="Picture 9"/>
+            <p:cNvPicPr>
+              <a:picLocks noChangeAspect="1"/>
+            </p:cNvPicPr>
+            <p:nvPr/>
+          </p:nvPicPr>
+          <p:blipFill>
+            <a:blip r:embed="rId8"/>
+            <a:stretch>
+              <a:fillRect/>
+            </a:stretch>
+          </p:blipFill>
+          <p:spPr>
+            <a:xfrm>
+              <a:off x="6038358" y="5603347"/>
+              <a:ext cx="327300" cy="196986"/>
+            </a:xfrm>
+            <a:prstGeom prst="rect">
+              <a:avLst/>
+            </a:prstGeom>
+          </p:spPr>
+        </p:pic>
+      </p:grpSp>
+      <p:pic>
+        <p:nvPicPr>
+          <p:cNvPr id="4" name="Picture 3"/>
+          <p:cNvPicPr>
+            <a:picLocks noChangeAspect="1"/>
+          </p:cNvPicPr>
+          <p:nvPr/>
+        </p:nvPicPr>
+        <p:blipFill>
+          <a:blip r:embed="rId9"/>
+          <a:stretch>
+            <a:fillRect/>
+          </a:stretch>
+        </p:blipFill>
+        <p:spPr>
+          <a:xfrm>
+            <a:off x="3814924" y="3824794"/>
+            <a:ext cx="765868" cy="309994"/>
+          </a:xfrm>
+          <a:prstGeom prst="rect">
+            <a:avLst/>
+          </a:prstGeom>
+        </p:spPr>
+      </p:pic>
+    </p:spTree>
+    <p:extLst>
+      <p:ext uri="{BB962C8B-B14F-4D97-AF65-F5344CB8AC3E}">
+        <p14:creationId xmlns:p14="http://schemas.microsoft.com/office/powerpoint/2010/main" val="894196904"/>
+      </p:ext>
+    </p:extLst>
+  </p:cSld>
+  <p:clrMapOvr>
+    <a:masterClrMapping/>
+  </p:clrMapOvr>
+</p:sld>
+</file>
+
+<file path=ppt/slides/slide7.xml><?xml version="1.0" encoding="utf-8"?>
+<p:sld xmlns:a="http://schemas.openxmlformats.org/drawingml/2006/main" xmlns:r="http://schemas.openxmlformats.org/officeDocument/2006/relationships" xmlns:p="http://schemas.openxmlformats.org/presentationml/2006/main">
+  <p:cSld>
+    <p:spTree>
+      <p:nvGrpSpPr>
+        <p:cNvPr id="1" name=""/>
+        <p:cNvGrpSpPr/>
+        <p:nvPr/>
+      </p:nvGrpSpPr>
+      <p:grpSpPr>
+        <a:xfrm>
+          <a:off x="0" y="0"/>
+          <a:ext cx="0" cy="0"/>
+          <a:chOff x="0" y="0"/>
+          <a:chExt cx="0" cy="0"/>
+        </a:xfrm>
+      </p:grpSpPr>
+      <p:sp>
+        <p:nvSpPr>
           <p:cNvPr id="2" name="Title 1"/>
           <p:cNvSpPr>
             <a:spLocks noGrp="1"/>
@@ -5787,7 +6247,7 @@
 </p:sld>
 </file>
 
-<file path=ppt/slides/slide6.xml><?xml version="1.0" encoding="utf-8"?>
+<file path=ppt/slides/slide8.xml><?xml version="1.0" encoding="utf-8"?>
 <p:sld xmlns:a="http://schemas.openxmlformats.org/drawingml/2006/main" xmlns:r="http://schemas.openxmlformats.org/officeDocument/2006/relationships" xmlns:p="http://schemas.openxmlformats.org/presentationml/2006/main">
   <p:cSld>
     <p:spTree>

</xml_diff>